<commit_message>
add debug signal table to report and presntaion update ref's in report doc
</commit_message>
<xml_diff>
--- a/Presintaions and Reports/Final presntaion VLSI.pptx
+++ b/Presintaions and Reports/Final presntaion VLSI.pptx
@@ -14,9 +14,11 @@
     <p:sldId id="300" r:id="rId8"/>
     <p:sldId id="298" r:id="rId9"/>
     <p:sldId id="299" r:id="rId10"/>
-    <p:sldId id="301" r:id="rId11"/>
-    <p:sldId id="302" r:id="rId12"/>
-    <p:sldId id="303" r:id="rId13"/>
+    <p:sldId id="304" r:id="rId11"/>
+    <p:sldId id="305" r:id="rId12"/>
+    <p:sldId id="301" r:id="rId13"/>
+    <p:sldId id="302" r:id="rId14"/>
+    <p:sldId id="303" r:id="rId15"/>
   </p:sldIdLst>
   <p:sldSz cx="12192000" cy="6858000"/>
   <p:notesSz cx="6858000" cy="9144000"/>
@@ -115,6 +117,11 @@
       </a:defRPr>
     </a:lvl9pPr>
   </p:defaultTextStyle>
+  <p:extLst>
+    <p:ext uri="{EFAFB233-063F-42B5-8137-9DF3F51BA10A}">
+      <p15:sldGuideLst xmlns:p15="http://schemas.microsoft.com/office/powerpoint/2012/main"/>
+    </p:ext>
+  </p:extLst>
 </p:presentation>
 </file>
 
@@ -3444,7 +3451,7 @@
           <a:p>
             <a:fld id="{4C1E25F6-6904-4FC1-8C19-2CBB5B46E60E}" type="datetimeFigureOut">
               <a:rPr lang="en-IL" smtClean="0"/>
-              <a:t>19/06/2025</a:t>
+              <a:t>21/06/2025</a:t>
             </a:fld>
             <a:endParaRPr lang="en-IL"/>
           </a:p>
@@ -3644,7 +3651,7 @@
           <a:p>
             <a:fld id="{4C1E25F6-6904-4FC1-8C19-2CBB5B46E60E}" type="datetimeFigureOut">
               <a:rPr lang="en-IL" smtClean="0"/>
-              <a:t>19/06/2025</a:t>
+              <a:t>21/06/2025</a:t>
             </a:fld>
             <a:endParaRPr lang="en-IL"/>
           </a:p>
@@ -3854,7 +3861,7 @@
           <a:p>
             <a:fld id="{4C1E25F6-6904-4FC1-8C19-2CBB5B46E60E}" type="datetimeFigureOut">
               <a:rPr lang="en-IL" smtClean="0"/>
-              <a:t>19/06/2025</a:t>
+              <a:t>21/06/2025</a:t>
             </a:fld>
             <a:endParaRPr lang="en-IL"/>
           </a:p>
@@ -4054,7 +4061,7 @@
           <a:p>
             <a:fld id="{4C1E25F6-6904-4FC1-8C19-2CBB5B46E60E}" type="datetimeFigureOut">
               <a:rPr lang="en-IL" smtClean="0"/>
-              <a:t>19/06/2025</a:t>
+              <a:t>21/06/2025</a:t>
             </a:fld>
             <a:endParaRPr lang="en-IL"/>
           </a:p>
@@ -4330,7 +4337,7 @@
           <a:p>
             <a:fld id="{4C1E25F6-6904-4FC1-8C19-2CBB5B46E60E}" type="datetimeFigureOut">
               <a:rPr lang="en-IL" smtClean="0"/>
-              <a:t>19/06/2025</a:t>
+              <a:t>21/06/2025</a:t>
             </a:fld>
             <a:endParaRPr lang="en-IL"/>
           </a:p>
@@ -4598,7 +4605,7 @@
           <a:p>
             <a:fld id="{4C1E25F6-6904-4FC1-8C19-2CBB5B46E60E}" type="datetimeFigureOut">
               <a:rPr lang="en-IL" smtClean="0"/>
-              <a:t>19/06/2025</a:t>
+              <a:t>21/06/2025</a:t>
             </a:fld>
             <a:endParaRPr lang="en-IL"/>
           </a:p>
@@ -5013,7 +5020,7 @@
           <a:p>
             <a:fld id="{4C1E25F6-6904-4FC1-8C19-2CBB5B46E60E}" type="datetimeFigureOut">
               <a:rPr lang="en-IL" smtClean="0"/>
-              <a:t>19/06/2025</a:t>
+              <a:t>21/06/2025</a:t>
             </a:fld>
             <a:endParaRPr lang="en-IL"/>
           </a:p>
@@ -5155,7 +5162,7 @@
           <a:p>
             <a:fld id="{4C1E25F6-6904-4FC1-8C19-2CBB5B46E60E}" type="datetimeFigureOut">
               <a:rPr lang="en-IL" smtClean="0"/>
-              <a:t>19/06/2025</a:t>
+              <a:t>21/06/2025</a:t>
             </a:fld>
             <a:endParaRPr lang="en-IL"/>
           </a:p>
@@ -5268,7 +5275,7 @@
           <a:p>
             <a:fld id="{4C1E25F6-6904-4FC1-8C19-2CBB5B46E60E}" type="datetimeFigureOut">
               <a:rPr lang="en-IL" smtClean="0"/>
-              <a:t>19/06/2025</a:t>
+              <a:t>21/06/2025</a:t>
             </a:fld>
             <a:endParaRPr lang="en-IL"/>
           </a:p>
@@ -5581,7 +5588,7 @@
           <a:p>
             <a:fld id="{4C1E25F6-6904-4FC1-8C19-2CBB5B46E60E}" type="datetimeFigureOut">
               <a:rPr lang="en-IL" smtClean="0"/>
-              <a:t>19/06/2025</a:t>
+              <a:t>21/06/2025</a:t>
             </a:fld>
             <a:endParaRPr lang="en-IL"/>
           </a:p>
@@ -5870,7 +5877,7 @@
           <a:p>
             <a:fld id="{4C1E25F6-6904-4FC1-8C19-2CBB5B46E60E}" type="datetimeFigureOut">
               <a:rPr lang="en-IL" smtClean="0"/>
-              <a:t>19/06/2025</a:t>
+              <a:t>21/06/2025</a:t>
             </a:fld>
             <a:endParaRPr lang="en-IL"/>
           </a:p>
@@ -6113,7 +6120,7 @@
           <a:p>
             <a:fld id="{4C1E25F6-6904-4FC1-8C19-2CBB5B46E60E}" type="datetimeFigureOut">
               <a:rPr lang="en-IL" smtClean="0"/>
-              <a:t>19/06/2025</a:t>
+              <a:t>21/06/2025</a:t>
             </a:fld>
             <a:endParaRPr lang="en-IL"/>
           </a:p>
@@ -6867,6 +6874,3337 @@
         <p:cNvPr id="1" name="">
           <a:extLst>
             <a:ext uri="{FF2B5EF4-FFF2-40B4-BE49-F238E27FC236}">
+              <a16:creationId xmlns:a16="http://schemas.microsoft.com/office/drawing/2014/main" id="{38F78A77-F07C-FB08-CC5C-CBC7D0034E50}"/>
+            </a:ext>
+          </a:extLst>
+        </p:cNvPr>
+        <p:cNvGrpSpPr/>
+        <p:nvPr/>
+      </p:nvGrpSpPr>
+      <p:grpSpPr>
+        <a:xfrm>
+          <a:off x="0" y="0"/>
+          <a:ext cx="0" cy="0"/>
+          <a:chOff x="0" y="0"/>
+          <a:chExt cx="0" cy="0"/>
+        </a:xfrm>
+      </p:grpSpPr>
+      <p:sp>
+        <p:nvSpPr>
+          <p:cNvPr id="19" name="Rectangle 18">
+            <a:extLst>
+              <a:ext uri="{FF2B5EF4-FFF2-40B4-BE49-F238E27FC236}">
+                <a16:creationId xmlns:a16="http://schemas.microsoft.com/office/drawing/2014/main" id="{A312919A-8A9C-3ED7-0321-8F572757E2AA}"/>
+              </a:ext>
+            </a:extLst>
+          </p:cNvPr>
+          <p:cNvSpPr/>
+          <p:nvPr/>
+        </p:nvSpPr>
+        <p:spPr>
+          <a:xfrm>
+            <a:off x="1462167" y="1195602"/>
+            <a:ext cx="10729833" cy="1053885"/>
+          </a:xfrm>
+          <a:prstGeom prst="rect">
+            <a:avLst/>
+          </a:prstGeom>
+        </p:spPr>
+        <p:style>
+          <a:lnRef idx="0">
+            <a:schemeClr val="dk1">
+              <a:alpha val="0"/>
+              <a:hueOff val="0"/>
+              <a:satOff val="0"/>
+              <a:lumOff val="0"/>
+              <a:alphaOff val="0"/>
+            </a:schemeClr>
+          </a:lnRef>
+          <a:fillRef idx="0">
+            <a:schemeClr val="lt1">
+              <a:alpha val="0"/>
+              <a:hueOff val="0"/>
+              <a:satOff val="0"/>
+              <a:lumOff val="0"/>
+              <a:alphaOff val="0"/>
+            </a:schemeClr>
+          </a:fillRef>
+          <a:effectRef idx="0">
+            <a:schemeClr val="lt1">
+              <a:alpha val="0"/>
+              <a:hueOff val="0"/>
+              <a:satOff val="0"/>
+              <a:lumOff val="0"/>
+              <a:alphaOff val="0"/>
+            </a:schemeClr>
+          </a:effectRef>
+          <a:fontRef idx="minor">
+            <a:schemeClr val="tx1">
+              <a:hueOff val="0"/>
+              <a:satOff val="0"/>
+              <a:lumOff val="0"/>
+              <a:alphaOff val="0"/>
+            </a:schemeClr>
+          </a:fontRef>
+        </p:style>
+        <p:txBody>
+          <a:bodyPr/>
+          <a:lstStyle/>
+          <a:p>
+            <a:endParaRPr lang="en-IL"/>
+          </a:p>
+        </p:txBody>
+      </p:sp>
+      <p:sp>
+        <p:nvSpPr>
+          <p:cNvPr id="7" name="כותרת 1">
+            <a:extLst>
+              <a:ext uri="{FF2B5EF4-FFF2-40B4-BE49-F238E27FC236}">
+                <a16:creationId xmlns:a16="http://schemas.microsoft.com/office/drawing/2014/main" id="{10B28AE1-3F7C-7702-972F-A1F7B3336FB7}"/>
+              </a:ext>
+            </a:extLst>
+          </p:cNvPr>
+          <p:cNvSpPr>
+            <a:spLocks noGrp="1"/>
+          </p:cNvSpPr>
+          <p:nvPr>
+            <p:ph type="title"/>
+          </p:nvPr>
+        </p:nvSpPr>
+        <p:spPr>
+          <a:xfrm>
+            <a:off x="305349" y="603066"/>
+            <a:ext cx="10319512" cy="592536"/>
+          </a:xfrm>
+        </p:spPr>
+        <p:txBody>
+          <a:bodyPr vert="horz" lIns="91440" tIns="45720" rIns="91440" bIns="45720" rtlCol="0" anchor="b">
+            <a:normAutofit fontScale="90000"/>
+          </a:bodyPr>
+          <a:lstStyle/>
+          <a:p>
+            <a:pPr algn="ctr" rtl="0"/>
+            <a:r>
+              <a:rPr lang="en-US" sz="3200" b="1" i="0" kern="1200" dirty="0">
+                <a:solidFill>
+                  <a:schemeClr val="tx1"/>
+                </a:solidFill>
+                <a:effectLst/>
+                <a:latin typeface="+mj-lt"/>
+                <a:ea typeface="+mj-ea"/>
+                <a:cs typeface="+mj-cs"/>
+              </a:rPr>
+              <a:t>Architectural design of the selected solution </a:t>
+            </a:r>
+            <a:br>
+              <a:rPr lang="en-US" sz="3200" b="1" i="0" kern="1200" dirty="0">
+                <a:solidFill>
+                  <a:schemeClr val="tx1"/>
+                </a:solidFill>
+                <a:effectLst/>
+                <a:latin typeface="+mj-lt"/>
+                <a:ea typeface="+mj-ea"/>
+                <a:cs typeface="+mj-cs"/>
+              </a:rPr>
+            </a:br>
+            <a:r>
+              <a:rPr lang="en-US" sz="3200" b="1" i="0" kern="1200" dirty="0">
+                <a:solidFill>
+                  <a:schemeClr val="tx1"/>
+                </a:solidFill>
+                <a:effectLst/>
+                <a:latin typeface="+mj-lt"/>
+                <a:ea typeface="+mj-ea"/>
+                <a:cs typeface="+mj-cs"/>
+              </a:rPr>
+              <a:t>Debug unit</a:t>
+            </a:r>
+            <a:endParaRPr lang="en-US" sz="3200" b="1" kern="1200" dirty="0">
+              <a:solidFill>
+                <a:schemeClr val="tx1"/>
+              </a:solidFill>
+              <a:latin typeface="+mj-lt"/>
+              <a:ea typeface="+mj-ea"/>
+              <a:cs typeface="+mj-cs"/>
+            </a:endParaRPr>
+          </a:p>
+        </p:txBody>
+      </p:sp>
+      <p:graphicFrame>
+        <p:nvGraphicFramePr>
+          <p:cNvPr id="3" name="Content Placeholder 2">
+            <a:extLst>
+              <a:ext uri="{FF2B5EF4-FFF2-40B4-BE49-F238E27FC236}">
+                <a16:creationId xmlns:a16="http://schemas.microsoft.com/office/drawing/2014/main" id="{6A5C7A67-DEF0-6D19-7A80-2AF5F3831DC8}"/>
+              </a:ext>
+            </a:extLst>
+          </p:cNvPr>
+          <p:cNvGraphicFramePr>
+            <a:graphicFrameLocks noGrp="1"/>
+          </p:cNvGraphicFramePr>
+          <p:nvPr>
+            <p:ph idx="1"/>
+            <p:extLst>
+              <p:ext uri="{D42A27DB-BD31-4B8C-83A1-F6EECF244321}">
+                <p14:modId xmlns:p14="http://schemas.microsoft.com/office/powerpoint/2010/main" val="3187440825"/>
+              </p:ext>
+            </p:extLst>
+          </p:nvPr>
+        </p:nvGraphicFramePr>
+        <p:xfrm>
+          <a:off x="0" y="1195602"/>
+          <a:ext cx="12192001" cy="5662397"/>
+        </p:xfrm>
+        <a:graphic>
+          <a:graphicData uri="http://schemas.openxmlformats.org/drawingml/2006/table">
+            <a:tbl>
+              <a:tblPr firstRow="1" firstCol="1" bandRow="1">
+                <a:tableStyleId>{5C22544A-7EE6-4342-B048-85BDC9FD1C3A}</a:tableStyleId>
+              </a:tblPr>
+              <a:tblGrid>
+                <a:gridCol w="582804">
+                  <a:extLst>
+                    <a:ext uri="{9D8B030D-6E8A-4147-A177-3AD203B41FA5}">
+                      <a16:colId xmlns:a16="http://schemas.microsoft.com/office/drawing/2014/main" val="3077749885"/>
+                    </a:ext>
+                  </a:extLst>
+                </a:gridCol>
+                <a:gridCol w="2914022">
+                  <a:extLst>
+                    <a:ext uri="{9D8B030D-6E8A-4147-A177-3AD203B41FA5}">
+                      <a16:colId xmlns:a16="http://schemas.microsoft.com/office/drawing/2014/main" val="2445671152"/>
+                    </a:ext>
+                  </a:extLst>
+                </a:gridCol>
+                <a:gridCol w="8695175">
+                  <a:extLst>
+                    <a:ext uri="{9D8B030D-6E8A-4147-A177-3AD203B41FA5}">
+                      <a16:colId xmlns:a16="http://schemas.microsoft.com/office/drawing/2014/main" val="251754406"/>
+                    </a:ext>
+                  </a:extLst>
+                </a:gridCol>
+              </a:tblGrid>
+              <a:tr h="357727">
+                <a:tc>
+                  <a:txBody>
+                    <a:bodyPr/>
+                    <a:lstStyle/>
+                    <a:p>
+                      <a:pPr>
+                        <a:lnSpc>
+                          <a:spcPct val="115000"/>
+                        </a:lnSpc>
+                        <a:spcAft>
+                          <a:spcPts val="800"/>
+                        </a:spcAft>
+                        <a:buNone/>
+                      </a:pPr>
+                      <a:r>
+                        <a:rPr lang="en-IL" sz="1200" kern="100" dirty="0">
+                          <a:effectLst/>
+                        </a:rPr>
+                        <a:t>0</a:t>
+                      </a:r>
+                      <a:endParaRPr lang="en-IL" sz="1200" kern="100" dirty="0">
+                        <a:effectLst/>
+                        <a:latin typeface="Aptos" panose="020B0004020202020204" pitchFamily="34" charset="0"/>
+                        <a:ea typeface="Aptos" panose="020B0004020202020204" pitchFamily="34" charset="0"/>
+                        <a:cs typeface="Arial" panose="020B0604020202020204" pitchFamily="34" charset="0"/>
+                      </a:endParaRPr>
+                    </a:p>
+                  </a:txBody>
+                  <a:tcPr marL="67744" marR="67744" marT="0" marB="0"/>
+                </a:tc>
+                <a:tc>
+                  <a:txBody>
+                    <a:bodyPr/>
+                    <a:lstStyle/>
+                    <a:p>
+                      <a:pPr>
+                        <a:lnSpc>
+                          <a:spcPct val="115000"/>
+                        </a:lnSpc>
+                        <a:spcAft>
+                          <a:spcPts val="800"/>
+                        </a:spcAft>
+                        <a:buNone/>
+                      </a:pPr>
+                      <a:r>
+                        <a:rPr lang="en-IL" sz="1200" kern="100">
+                          <a:effectLst/>
+                        </a:rPr>
+                        <a:t>        {25'b0, opcodeFetch}</a:t>
+                      </a:r>
+                      <a:endParaRPr lang="en-IL" sz="1200" kern="100">
+                        <a:effectLst/>
+                        <a:latin typeface="Aptos" panose="020B0004020202020204" pitchFamily="34" charset="0"/>
+                        <a:ea typeface="Aptos" panose="020B0004020202020204" pitchFamily="34" charset="0"/>
+                        <a:cs typeface="Arial" panose="020B0604020202020204" pitchFamily="34" charset="0"/>
+                      </a:endParaRPr>
+                    </a:p>
+                  </a:txBody>
+                  <a:tcPr marL="67744" marR="67744" marT="0" marB="0"/>
+                </a:tc>
+                <a:tc>
+                  <a:txBody>
+                    <a:bodyPr/>
+                    <a:lstStyle/>
+                    <a:p>
+                      <a:pPr>
+                        <a:lnSpc>
+                          <a:spcPct val="115000"/>
+                        </a:lnSpc>
+                        <a:spcAft>
+                          <a:spcPts val="800"/>
+                        </a:spcAft>
+                        <a:buNone/>
+                      </a:pPr>
+                      <a:r>
+                        <a:rPr lang="en-IL" sz="1200" kern="100" dirty="0">
+                          <a:effectLst/>
+                        </a:rPr>
+                        <a:t>Opcode from Fetch stage (padded to 32 bits)</a:t>
+                      </a:r>
+                      <a:endParaRPr lang="en-IL" sz="1200" kern="100" dirty="0">
+                        <a:effectLst/>
+                        <a:latin typeface="Aptos" panose="020B0004020202020204" pitchFamily="34" charset="0"/>
+                        <a:ea typeface="Aptos" panose="020B0004020202020204" pitchFamily="34" charset="0"/>
+                        <a:cs typeface="Arial" panose="020B0604020202020204" pitchFamily="34" charset="0"/>
+                      </a:endParaRPr>
+                    </a:p>
+                  </a:txBody>
+                  <a:tcPr marL="67744" marR="67744" marT="0" marB="0"/>
+                </a:tc>
+                <a:extLst>
+                  <a:ext uri="{0D108BD9-81ED-4DB2-BD59-A6C34878D82A}">
+                    <a16:rowId xmlns:a16="http://schemas.microsoft.com/office/drawing/2014/main" val="695007286"/>
+                  </a:ext>
+                </a:extLst>
+              </a:tr>
+              <a:tr h="400055">
+                <a:tc>
+                  <a:txBody>
+                    <a:bodyPr/>
+                    <a:lstStyle/>
+                    <a:p>
+                      <a:pPr>
+                        <a:lnSpc>
+                          <a:spcPct val="115000"/>
+                        </a:lnSpc>
+                        <a:spcAft>
+                          <a:spcPts val="800"/>
+                        </a:spcAft>
+                        <a:buNone/>
+                      </a:pPr>
+                      <a:r>
+                        <a:rPr lang="en-IL" sz="1200" kern="100">
+                          <a:effectLst/>
+                        </a:rPr>
+                        <a:t>1</a:t>
+                      </a:r>
+                      <a:endParaRPr lang="en-IL" sz="1200" kern="100">
+                        <a:effectLst/>
+                        <a:latin typeface="Aptos" panose="020B0004020202020204" pitchFamily="34" charset="0"/>
+                        <a:ea typeface="Aptos" panose="020B0004020202020204" pitchFamily="34" charset="0"/>
+                        <a:cs typeface="Arial" panose="020B0604020202020204" pitchFamily="34" charset="0"/>
+                      </a:endParaRPr>
+                    </a:p>
+                  </a:txBody>
+                  <a:tcPr marL="67744" marR="67744" marT="0" marB="0"/>
+                </a:tc>
+                <a:tc>
+                  <a:txBody>
+                    <a:bodyPr/>
+                    <a:lstStyle/>
+                    <a:p>
+                      <a:pPr>
+                        <a:lnSpc>
+                          <a:spcPct val="115000"/>
+                        </a:lnSpc>
+                        <a:spcAft>
+                          <a:spcPts val="800"/>
+                        </a:spcAft>
+                        <a:buNone/>
+                      </a:pPr>
+                      <a:r>
+                        <a:rPr lang="en-IL" sz="1200" kern="100" dirty="0">
+                          <a:effectLst/>
+                        </a:rPr>
+                        <a:t>        {25'b0, </a:t>
+                      </a:r>
+                      <a:r>
+                        <a:rPr lang="en-IL" sz="1200" kern="100" dirty="0" err="1">
+                          <a:effectLst/>
+                        </a:rPr>
+                        <a:t>opcodeDecode</a:t>
+                      </a:r>
+                      <a:r>
+                        <a:rPr lang="en-IL" sz="1200" kern="100" dirty="0">
+                          <a:effectLst/>
+                        </a:rPr>
+                        <a:t>}</a:t>
+                      </a:r>
+                      <a:endParaRPr lang="en-IL" sz="1200" kern="100" dirty="0">
+                        <a:effectLst/>
+                        <a:latin typeface="Aptos" panose="020B0004020202020204" pitchFamily="34" charset="0"/>
+                        <a:ea typeface="Aptos" panose="020B0004020202020204" pitchFamily="34" charset="0"/>
+                        <a:cs typeface="Arial" panose="020B0604020202020204" pitchFamily="34" charset="0"/>
+                      </a:endParaRPr>
+                    </a:p>
+                  </a:txBody>
+                  <a:tcPr marL="67744" marR="67744" marT="0" marB="0"/>
+                </a:tc>
+                <a:tc>
+                  <a:txBody>
+                    <a:bodyPr/>
+                    <a:lstStyle/>
+                    <a:p>
+                      <a:pPr>
+                        <a:lnSpc>
+                          <a:spcPct val="115000"/>
+                        </a:lnSpc>
+                        <a:spcAft>
+                          <a:spcPts val="800"/>
+                        </a:spcAft>
+                        <a:buNone/>
+                      </a:pPr>
+                      <a:r>
+                        <a:rPr lang="en-IL" sz="1200" kern="100" dirty="0">
+                          <a:effectLst/>
+                        </a:rPr>
+                        <a:t>Opcode form the operation in Decode stage (padded to 32 bits)</a:t>
+                      </a:r>
+                      <a:endParaRPr lang="en-IL" sz="1200" kern="100" dirty="0">
+                        <a:effectLst/>
+                        <a:latin typeface="Aptos" panose="020B0004020202020204" pitchFamily="34" charset="0"/>
+                        <a:ea typeface="Aptos" panose="020B0004020202020204" pitchFamily="34" charset="0"/>
+                        <a:cs typeface="Arial" panose="020B0604020202020204" pitchFamily="34" charset="0"/>
+                      </a:endParaRPr>
+                    </a:p>
+                  </a:txBody>
+                  <a:tcPr marL="67744" marR="67744" marT="0" marB="0"/>
+                </a:tc>
+                <a:extLst>
+                  <a:ext uri="{0D108BD9-81ED-4DB2-BD59-A6C34878D82A}">
+                    <a16:rowId xmlns:a16="http://schemas.microsoft.com/office/drawing/2014/main" val="62836912"/>
+                  </a:ext>
+                </a:extLst>
+              </a:tr>
+              <a:tr h="400055">
+                <a:tc>
+                  <a:txBody>
+                    <a:bodyPr/>
+                    <a:lstStyle/>
+                    <a:p>
+                      <a:pPr>
+                        <a:lnSpc>
+                          <a:spcPct val="115000"/>
+                        </a:lnSpc>
+                        <a:spcAft>
+                          <a:spcPts val="800"/>
+                        </a:spcAft>
+                        <a:buNone/>
+                      </a:pPr>
+                      <a:r>
+                        <a:rPr lang="en-IL" sz="1200" kern="100">
+                          <a:effectLst/>
+                        </a:rPr>
+                        <a:t>2</a:t>
+                      </a:r>
+                      <a:endParaRPr lang="en-IL" sz="1200" kern="100">
+                        <a:effectLst/>
+                        <a:latin typeface="Aptos" panose="020B0004020202020204" pitchFamily="34" charset="0"/>
+                        <a:ea typeface="Aptos" panose="020B0004020202020204" pitchFamily="34" charset="0"/>
+                        <a:cs typeface="Arial" panose="020B0604020202020204" pitchFamily="34" charset="0"/>
+                      </a:endParaRPr>
+                    </a:p>
+                  </a:txBody>
+                  <a:tcPr marL="67744" marR="67744" marT="0" marB="0"/>
+                </a:tc>
+                <a:tc>
+                  <a:txBody>
+                    <a:bodyPr/>
+                    <a:lstStyle/>
+                    <a:p>
+                      <a:pPr>
+                        <a:lnSpc>
+                          <a:spcPct val="115000"/>
+                        </a:lnSpc>
+                        <a:spcAft>
+                          <a:spcPts val="800"/>
+                        </a:spcAft>
+                        <a:buNone/>
+                      </a:pPr>
+                      <a:r>
+                        <a:rPr lang="en-IL" sz="1200" kern="100">
+                          <a:effectLst/>
+                        </a:rPr>
+                        <a:t>        {25'b0, opcodeExecute}</a:t>
+                      </a:r>
+                      <a:endParaRPr lang="en-IL" sz="1200" kern="100">
+                        <a:effectLst/>
+                        <a:latin typeface="Aptos" panose="020B0004020202020204" pitchFamily="34" charset="0"/>
+                        <a:ea typeface="Aptos" panose="020B0004020202020204" pitchFamily="34" charset="0"/>
+                        <a:cs typeface="Arial" panose="020B0604020202020204" pitchFamily="34" charset="0"/>
+                      </a:endParaRPr>
+                    </a:p>
+                  </a:txBody>
+                  <a:tcPr marL="67744" marR="67744" marT="0" marB="0"/>
+                </a:tc>
+                <a:tc>
+                  <a:txBody>
+                    <a:bodyPr/>
+                    <a:lstStyle/>
+                    <a:p>
+                      <a:pPr>
+                        <a:lnSpc>
+                          <a:spcPct val="115000"/>
+                        </a:lnSpc>
+                        <a:spcAft>
+                          <a:spcPts val="800"/>
+                        </a:spcAft>
+                        <a:buNone/>
+                      </a:pPr>
+                      <a:r>
+                        <a:rPr lang="en-IL" sz="1200" kern="100">
+                          <a:effectLst/>
+                        </a:rPr>
+                        <a:t>Opcode form the operation in Execute stage (padded to 32 bits)</a:t>
+                      </a:r>
+                      <a:endParaRPr lang="en-IL" sz="1200" kern="100">
+                        <a:effectLst/>
+                        <a:latin typeface="Aptos" panose="020B0004020202020204" pitchFamily="34" charset="0"/>
+                        <a:ea typeface="Aptos" panose="020B0004020202020204" pitchFamily="34" charset="0"/>
+                        <a:cs typeface="Arial" panose="020B0604020202020204" pitchFamily="34" charset="0"/>
+                      </a:endParaRPr>
+                    </a:p>
+                  </a:txBody>
+                  <a:tcPr marL="67744" marR="67744" marT="0" marB="0"/>
+                </a:tc>
+                <a:extLst>
+                  <a:ext uri="{0D108BD9-81ED-4DB2-BD59-A6C34878D82A}">
+                    <a16:rowId xmlns:a16="http://schemas.microsoft.com/office/drawing/2014/main" val="641854708"/>
+                  </a:ext>
+                </a:extLst>
+              </a:tr>
+              <a:tr h="400055">
+                <a:tc>
+                  <a:txBody>
+                    <a:bodyPr/>
+                    <a:lstStyle/>
+                    <a:p>
+                      <a:pPr>
+                        <a:lnSpc>
+                          <a:spcPct val="115000"/>
+                        </a:lnSpc>
+                        <a:spcAft>
+                          <a:spcPts val="800"/>
+                        </a:spcAft>
+                        <a:buNone/>
+                      </a:pPr>
+                      <a:r>
+                        <a:rPr lang="en-IL" sz="1200" kern="100">
+                          <a:effectLst/>
+                        </a:rPr>
+                        <a:t>3</a:t>
+                      </a:r>
+                      <a:endParaRPr lang="en-IL" sz="1200" kern="100">
+                        <a:effectLst/>
+                        <a:latin typeface="Aptos" panose="020B0004020202020204" pitchFamily="34" charset="0"/>
+                        <a:ea typeface="Aptos" panose="020B0004020202020204" pitchFamily="34" charset="0"/>
+                        <a:cs typeface="Arial" panose="020B0604020202020204" pitchFamily="34" charset="0"/>
+                      </a:endParaRPr>
+                    </a:p>
+                  </a:txBody>
+                  <a:tcPr marL="67744" marR="67744" marT="0" marB="0"/>
+                </a:tc>
+                <a:tc>
+                  <a:txBody>
+                    <a:bodyPr/>
+                    <a:lstStyle/>
+                    <a:p>
+                      <a:pPr>
+                        <a:lnSpc>
+                          <a:spcPct val="115000"/>
+                        </a:lnSpc>
+                        <a:spcAft>
+                          <a:spcPts val="800"/>
+                        </a:spcAft>
+                        <a:buNone/>
+                      </a:pPr>
+                      <a:r>
+                        <a:rPr lang="en-IL" sz="1200" kern="100">
+                          <a:effectLst/>
+                        </a:rPr>
+                        <a:t>        {25'b0, opcodeMem}</a:t>
+                      </a:r>
+                      <a:endParaRPr lang="en-IL" sz="1200" kern="100">
+                        <a:effectLst/>
+                        <a:latin typeface="Aptos" panose="020B0004020202020204" pitchFamily="34" charset="0"/>
+                        <a:ea typeface="Aptos" panose="020B0004020202020204" pitchFamily="34" charset="0"/>
+                        <a:cs typeface="Arial" panose="020B0604020202020204" pitchFamily="34" charset="0"/>
+                      </a:endParaRPr>
+                    </a:p>
+                  </a:txBody>
+                  <a:tcPr marL="67744" marR="67744" marT="0" marB="0"/>
+                </a:tc>
+                <a:tc>
+                  <a:txBody>
+                    <a:bodyPr/>
+                    <a:lstStyle/>
+                    <a:p>
+                      <a:pPr>
+                        <a:lnSpc>
+                          <a:spcPct val="115000"/>
+                        </a:lnSpc>
+                        <a:spcAft>
+                          <a:spcPts val="800"/>
+                        </a:spcAft>
+                        <a:buNone/>
+                      </a:pPr>
+                      <a:r>
+                        <a:rPr lang="en-IL" sz="1200" kern="100">
+                          <a:effectLst/>
+                        </a:rPr>
+                        <a:t>Opcode form the operation in Memory stage (padded to 32 bits)</a:t>
+                      </a:r>
+                      <a:endParaRPr lang="en-IL" sz="1200" kern="100">
+                        <a:effectLst/>
+                        <a:latin typeface="Aptos" panose="020B0004020202020204" pitchFamily="34" charset="0"/>
+                        <a:ea typeface="Aptos" panose="020B0004020202020204" pitchFamily="34" charset="0"/>
+                        <a:cs typeface="Arial" panose="020B0604020202020204" pitchFamily="34" charset="0"/>
+                      </a:endParaRPr>
+                    </a:p>
+                  </a:txBody>
+                  <a:tcPr marL="67744" marR="67744" marT="0" marB="0"/>
+                </a:tc>
+                <a:extLst>
+                  <a:ext uri="{0D108BD9-81ED-4DB2-BD59-A6C34878D82A}">
+                    <a16:rowId xmlns:a16="http://schemas.microsoft.com/office/drawing/2014/main" val="380594605"/>
+                  </a:ext>
+                </a:extLst>
+              </a:tr>
+              <a:tr h="400055">
+                <a:tc>
+                  <a:txBody>
+                    <a:bodyPr/>
+                    <a:lstStyle/>
+                    <a:p>
+                      <a:pPr>
+                        <a:lnSpc>
+                          <a:spcPct val="115000"/>
+                        </a:lnSpc>
+                        <a:spcAft>
+                          <a:spcPts val="800"/>
+                        </a:spcAft>
+                        <a:buNone/>
+                      </a:pPr>
+                      <a:r>
+                        <a:rPr lang="en-IL" sz="1200" kern="100">
+                          <a:effectLst/>
+                        </a:rPr>
+                        <a:t>4</a:t>
+                      </a:r>
+                      <a:endParaRPr lang="en-IL" sz="1200" kern="100">
+                        <a:effectLst/>
+                        <a:latin typeface="Aptos" panose="020B0004020202020204" pitchFamily="34" charset="0"/>
+                        <a:ea typeface="Aptos" panose="020B0004020202020204" pitchFamily="34" charset="0"/>
+                        <a:cs typeface="Arial" panose="020B0604020202020204" pitchFamily="34" charset="0"/>
+                      </a:endParaRPr>
+                    </a:p>
+                  </a:txBody>
+                  <a:tcPr marL="67744" marR="67744" marT="0" marB="0"/>
+                </a:tc>
+                <a:tc>
+                  <a:txBody>
+                    <a:bodyPr/>
+                    <a:lstStyle/>
+                    <a:p>
+                      <a:pPr>
+                        <a:lnSpc>
+                          <a:spcPct val="115000"/>
+                        </a:lnSpc>
+                        <a:spcAft>
+                          <a:spcPts val="800"/>
+                        </a:spcAft>
+                        <a:buNone/>
+                      </a:pPr>
+                      <a:r>
+                        <a:rPr lang="en-IL" sz="1200" kern="100" dirty="0">
+                          <a:effectLst/>
+                        </a:rPr>
+                        <a:t>        {25'b0, </a:t>
+                      </a:r>
+                      <a:r>
+                        <a:rPr lang="en-IL" sz="1200" kern="100" dirty="0" err="1">
+                          <a:effectLst/>
+                        </a:rPr>
+                        <a:t>opcodeWb</a:t>
+                      </a:r>
+                      <a:r>
+                        <a:rPr lang="en-IL" sz="1200" kern="100" dirty="0">
+                          <a:effectLst/>
+                        </a:rPr>
+                        <a:t>}</a:t>
+                      </a:r>
+                      <a:endParaRPr lang="en-IL" sz="1200" kern="100" dirty="0">
+                        <a:effectLst/>
+                        <a:latin typeface="Aptos" panose="020B0004020202020204" pitchFamily="34" charset="0"/>
+                        <a:ea typeface="Aptos" panose="020B0004020202020204" pitchFamily="34" charset="0"/>
+                        <a:cs typeface="Arial" panose="020B0604020202020204" pitchFamily="34" charset="0"/>
+                      </a:endParaRPr>
+                    </a:p>
+                  </a:txBody>
+                  <a:tcPr marL="67744" marR="67744" marT="0" marB="0"/>
+                </a:tc>
+                <a:tc>
+                  <a:txBody>
+                    <a:bodyPr/>
+                    <a:lstStyle/>
+                    <a:p>
+                      <a:pPr>
+                        <a:lnSpc>
+                          <a:spcPct val="115000"/>
+                        </a:lnSpc>
+                        <a:spcAft>
+                          <a:spcPts val="800"/>
+                        </a:spcAft>
+                        <a:buNone/>
+                      </a:pPr>
+                      <a:r>
+                        <a:rPr lang="en-IL" sz="1200" kern="100" dirty="0">
+                          <a:effectLst/>
+                        </a:rPr>
+                        <a:t>Opcode form the operation in Writeback stage (padded to 32 bits)</a:t>
+                      </a:r>
+                      <a:endParaRPr lang="en-IL" sz="1200" kern="100" dirty="0">
+                        <a:effectLst/>
+                        <a:latin typeface="Aptos" panose="020B0004020202020204" pitchFamily="34" charset="0"/>
+                        <a:ea typeface="Aptos" panose="020B0004020202020204" pitchFamily="34" charset="0"/>
+                        <a:cs typeface="Arial" panose="020B0604020202020204" pitchFamily="34" charset="0"/>
+                      </a:endParaRPr>
+                    </a:p>
+                  </a:txBody>
+                  <a:tcPr marL="67744" marR="67744" marT="0" marB="0"/>
+                </a:tc>
+                <a:extLst>
+                  <a:ext uri="{0D108BD9-81ED-4DB2-BD59-A6C34878D82A}">
+                    <a16:rowId xmlns:a16="http://schemas.microsoft.com/office/drawing/2014/main" val="638985610"/>
+                  </a:ext>
+                </a:extLst>
+              </a:tr>
+              <a:tr h="400055">
+                <a:tc>
+                  <a:txBody>
+                    <a:bodyPr/>
+                    <a:lstStyle/>
+                    <a:p>
+                      <a:pPr>
+                        <a:lnSpc>
+                          <a:spcPct val="115000"/>
+                        </a:lnSpc>
+                        <a:spcAft>
+                          <a:spcPts val="800"/>
+                        </a:spcAft>
+                        <a:buNone/>
+                      </a:pPr>
+                      <a:r>
+                        <a:rPr lang="en-IL" sz="1200" kern="100">
+                          <a:effectLst/>
+                        </a:rPr>
+                        <a:t>5</a:t>
+                      </a:r>
+                      <a:endParaRPr lang="en-IL" sz="1200" kern="100">
+                        <a:effectLst/>
+                        <a:latin typeface="Aptos" panose="020B0004020202020204" pitchFamily="34" charset="0"/>
+                        <a:ea typeface="Aptos" panose="020B0004020202020204" pitchFamily="34" charset="0"/>
+                        <a:cs typeface="Arial" panose="020B0604020202020204" pitchFamily="34" charset="0"/>
+                      </a:endParaRPr>
+                    </a:p>
+                  </a:txBody>
+                  <a:tcPr marL="67744" marR="67744" marT="0" marB="0"/>
+                </a:tc>
+                <a:tc>
+                  <a:txBody>
+                    <a:bodyPr/>
+                    <a:lstStyle/>
+                    <a:p>
+                      <a:pPr>
+                        <a:lnSpc>
+                          <a:spcPct val="115000"/>
+                        </a:lnSpc>
+                        <a:spcAft>
+                          <a:spcPts val="800"/>
+                        </a:spcAft>
+                        <a:buNone/>
+                      </a:pPr>
+                      <a:r>
+                        <a:rPr lang="en-IL" sz="1200" kern="100">
+                          <a:effectLst/>
+                        </a:rPr>
+                        <a:t>        {25'b0, Funct7Decode_Dout}</a:t>
+                      </a:r>
+                      <a:endParaRPr lang="en-IL" sz="1200" kern="100">
+                        <a:effectLst/>
+                        <a:latin typeface="Aptos" panose="020B0004020202020204" pitchFamily="34" charset="0"/>
+                        <a:ea typeface="Aptos" panose="020B0004020202020204" pitchFamily="34" charset="0"/>
+                        <a:cs typeface="Arial" panose="020B0604020202020204" pitchFamily="34" charset="0"/>
+                      </a:endParaRPr>
+                    </a:p>
+                  </a:txBody>
+                  <a:tcPr marL="67744" marR="67744" marT="0" marB="0"/>
+                </a:tc>
+                <a:tc>
+                  <a:txBody>
+                    <a:bodyPr/>
+                    <a:lstStyle/>
+                    <a:p>
+                      <a:pPr>
+                        <a:lnSpc>
+                          <a:spcPct val="115000"/>
+                        </a:lnSpc>
+                        <a:spcAft>
+                          <a:spcPts val="800"/>
+                        </a:spcAft>
+                        <a:buNone/>
+                      </a:pPr>
+                      <a:r>
+                        <a:rPr lang="en-IL" sz="1200" kern="100">
+                          <a:effectLst/>
+                        </a:rPr>
+                        <a:t>Funct7 form the operation in Decode stage (padded to 32 bits)</a:t>
+                      </a:r>
+                      <a:endParaRPr lang="en-IL" sz="1200" kern="100">
+                        <a:effectLst/>
+                        <a:latin typeface="Aptos" panose="020B0004020202020204" pitchFamily="34" charset="0"/>
+                        <a:ea typeface="Aptos" panose="020B0004020202020204" pitchFamily="34" charset="0"/>
+                        <a:cs typeface="Arial" panose="020B0604020202020204" pitchFamily="34" charset="0"/>
+                      </a:endParaRPr>
+                    </a:p>
+                  </a:txBody>
+                  <a:tcPr marL="67744" marR="67744" marT="0" marB="0"/>
+                </a:tc>
+                <a:extLst>
+                  <a:ext uri="{0D108BD9-81ED-4DB2-BD59-A6C34878D82A}">
+                    <a16:rowId xmlns:a16="http://schemas.microsoft.com/office/drawing/2014/main" val="450847136"/>
+                  </a:ext>
+                </a:extLst>
+              </a:tr>
+              <a:tr h="400055">
+                <a:tc>
+                  <a:txBody>
+                    <a:bodyPr/>
+                    <a:lstStyle/>
+                    <a:p>
+                      <a:pPr>
+                        <a:lnSpc>
+                          <a:spcPct val="115000"/>
+                        </a:lnSpc>
+                        <a:spcAft>
+                          <a:spcPts val="800"/>
+                        </a:spcAft>
+                        <a:buNone/>
+                      </a:pPr>
+                      <a:r>
+                        <a:rPr lang="en-IL" sz="1200" kern="100">
+                          <a:effectLst/>
+                        </a:rPr>
+                        <a:t>6</a:t>
+                      </a:r>
+                      <a:endParaRPr lang="en-IL" sz="1200" kern="100">
+                        <a:effectLst/>
+                        <a:latin typeface="Aptos" panose="020B0004020202020204" pitchFamily="34" charset="0"/>
+                        <a:ea typeface="Aptos" panose="020B0004020202020204" pitchFamily="34" charset="0"/>
+                        <a:cs typeface="Arial" panose="020B0604020202020204" pitchFamily="34" charset="0"/>
+                      </a:endParaRPr>
+                    </a:p>
+                  </a:txBody>
+                  <a:tcPr marL="67744" marR="67744" marT="0" marB="0"/>
+                </a:tc>
+                <a:tc>
+                  <a:txBody>
+                    <a:bodyPr/>
+                    <a:lstStyle/>
+                    <a:p>
+                      <a:pPr>
+                        <a:lnSpc>
+                          <a:spcPct val="115000"/>
+                        </a:lnSpc>
+                        <a:spcAft>
+                          <a:spcPts val="800"/>
+                        </a:spcAft>
+                        <a:buNone/>
+                      </a:pPr>
+                      <a:r>
+                        <a:rPr lang="en-IL" sz="1200" kern="100">
+                          <a:effectLst/>
+                        </a:rPr>
+                        <a:t>        {29'b0, Funct3Decode_Dout}</a:t>
+                      </a:r>
+                      <a:endParaRPr lang="en-IL" sz="1200" kern="100">
+                        <a:effectLst/>
+                        <a:latin typeface="Aptos" panose="020B0004020202020204" pitchFamily="34" charset="0"/>
+                        <a:ea typeface="Aptos" panose="020B0004020202020204" pitchFamily="34" charset="0"/>
+                        <a:cs typeface="Arial" panose="020B0604020202020204" pitchFamily="34" charset="0"/>
+                      </a:endParaRPr>
+                    </a:p>
+                  </a:txBody>
+                  <a:tcPr marL="67744" marR="67744" marT="0" marB="0"/>
+                </a:tc>
+                <a:tc>
+                  <a:txBody>
+                    <a:bodyPr/>
+                    <a:lstStyle/>
+                    <a:p>
+                      <a:pPr>
+                        <a:lnSpc>
+                          <a:spcPct val="115000"/>
+                        </a:lnSpc>
+                        <a:spcAft>
+                          <a:spcPts val="800"/>
+                        </a:spcAft>
+                        <a:buNone/>
+                      </a:pPr>
+                      <a:r>
+                        <a:rPr lang="en-IL" sz="1200" kern="100">
+                          <a:effectLst/>
+                        </a:rPr>
+                        <a:t>Funct3 form the operation in Decode stage (padded to 32 bits)</a:t>
+                      </a:r>
+                      <a:endParaRPr lang="en-IL" sz="1200" kern="100">
+                        <a:effectLst/>
+                        <a:latin typeface="Aptos" panose="020B0004020202020204" pitchFamily="34" charset="0"/>
+                        <a:ea typeface="Aptos" panose="020B0004020202020204" pitchFamily="34" charset="0"/>
+                        <a:cs typeface="Arial" panose="020B0604020202020204" pitchFamily="34" charset="0"/>
+                      </a:endParaRPr>
+                    </a:p>
+                  </a:txBody>
+                  <a:tcPr marL="67744" marR="67744" marT="0" marB="0"/>
+                </a:tc>
+                <a:extLst>
+                  <a:ext uri="{0D108BD9-81ED-4DB2-BD59-A6C34878D82A}">
+                    <a16:rowId xmlns:a16="http://schemas.microsoft.com/office/drawing/2014/main" val="3752264911"/>
+                  </a:ext>
+                </a:extLst>
+              </a:tr>
+              <a:tr h="400055">
+                <a:tc>
+                  <a:txBody>
+                    <a:bodyPr/>
+                    <a:lstStyle/>
+                    <a:p>
+                      <a:pPr>
+                        <a:lnSpc>
+                          <a:spcPct val="115000"/>
+                        </a:lnSpc>
+                        <a:spcAft>
+                          <a:spcPts val="800"/>
+                        </a:spcAft>
+                        <a:buNone/>
+                      </a:pPr>
+                      <a:r>
+                        <a:rPr lang="en-IL" sz="1200" kern="100">
+                          <a:effectLst/>
+                        </a:rPr>
+                        <a:t>7</a:t>
+                      </a:r>
+                      <a:endParaRPr lang="en-IL" sz="1200" kern="100">
+                        <a:effectLst/>
+                        <a:latin typeface="Aptos" panose="020B0004020202020204" pitchFamily="34" charset="0"/>
+                        <a:ea typeface="Aptos" panose="020B0004020202020204" pitchFamily="34" charset="0"/>
+                        <a:cs typeface="Arial" panose="020B0604020202020204" pitchFamily="34" charset="0"/>
+                      </a:endParaRPr>
+                    </a:p>
+                  </a:txBody>
+                  <a:tcPr marL="67744" marR="67744" marT="0" marB="0"/>
+                </a:tc>
+                <a:tc>
+                  <a:txBody>
+                    <a:bodyPr/>
+                    <a:lstStyle/>
+                    <a:p>
+                      <a:pPr>
+                        <a:lnSpc>
+                          <a:spcPct val="115000"/>
+                        </a:lnSpc>
+                        <a:spcAft>
+                          <a:spcPts val="800"/>
+                        </a:spcAft>
+                        <a:buNone/>
+                      </a:pPr>
+                      <a:r>
+                        <a:rPr lang="en-IL" sz="1200" kern="100">
+                          <a:effectLst/>
+                        </a:rPr>
+                        <a:t>        {25'b0, Funct7Execute_Dout}</a:t>
+                      </a:r>
+                      <a:endParaRPr lang="en-IL" sz="1200" kern="100">
+                        <a:effectLst/>
+                        <a:latin typeface="Aptos" panose="020B0004020202020204" pitchFamily="34" charset="0"/>
+                        <a:ea typeface="Aptos" panose="020B0004020202020204" pitchFamily="34" charset="0"/>
+                        <a:cs typeface="Arial" panose="020B0604020202020204" pitchFamily="34" charset="0"/>
+                      </a:endParaRPr>
+                    </a:p>
+                  </a:txBody>
+                  <a:tcPr marL="67744" marR="67744" marT="0" marB="0"/>
+                </a:tc>
+                <a:tc>
+                  <a:txBody>
+                    <a:bodyPr/>
+                    <a:lstStyle/>
+                    <a:p>
+                      <a:pPr>
+                        <a:lnSpc>
+                          <a:spcPct val="115000"/>
+                        </a:lnSpc>
+                        <a:spcAft>
+                          <a:spcPts val="800"/>
+                        </a:spcAft>
+                        <a:buNone/>
+                      </a:pPr>
+                      <a:r>
+                        <a:rPr lang="en-IL" sz="1200" kern="100">
+                          <a:effectLst/>
+                        </a:rPr>
+                        <a:t>Funct7 form the operation in Execute stage (padded to 32 bits)</a:t>
+                      </a:r>
+                      <a:endParaRPr lang="en-IL" sz="1200" kern="100">
+                        <a:effectLst/>
+                        <a:latin typeface="Aptos" panose="020B0004020202020204" pitchFamily="34" charset="0"/>
+                        <a:ea typeface="Aptos" panose="020B0004020202020204" pitchFamily="34" charset="0"/>
+                        <a:cs typeface="Arial" panose="020B0604020202020204" pitchFamily="34" charset="0"/>
+                      </a:endParaRPr>
+                    </a:p>
+                  </a:txBody>
+                  <a:tcPr marL="67744" marR="67744" marT="0" marB="0"/>
+                </a:tc>
+                <a:extLst>
+                  <a:ext uri="{0D108BD9-81ED-4DB2-BD59-A6C34878D82A}">
+                    <a16:rowId xmlns:a16="http://schemas.microsoft.com/office/drawing/2014/main" val="3771358217"/>
+                  </a:ext>
+                </a:extLst>
+              </a:tr>
+              <a:tr h="400055">
+                <a:tc>
+                  <a:txBody>
+                    <a:bodyPr/>
+                    <a:lstStyle/>
+                    <a:p>
+                      <a:pPr>
+                        <a:lnSpc>
+                          <a:spcPct val="115000"/>
+                        </a:lnSpc>
+                        <a:spcAft>
+                          <a:spcPts val="800"/>
+                        </a:spcAft>
+                        <a:buNone/>
+                      </a:pPr>
+                      <a:r>
+                        <a:rPr lang="en-IL" sz="1200" kern="100">
+                          <a:effectLst/>
+                        </a:rPr>
+                        <a:t>8</a:t>
+                      </a:r>
+                      <a:endParaRPr lang="en-IL" sz="1200" kern="100">
+                        <a:effectLst/>
+                        <a:latin typeface="Aptos" panose="020B0004020202020204" pitchFamily="34" charset="0"/>
+                        <a:ea typeface="Aptos" panose="020B0004020202020204" pitchFamily="34" charset="0"/>
+                        <a:cs typeface="Arial" panose="020B0604020202020204" pitchFamily="34" charset="0"/>
+                      </a:endParaRPr>
+                    </a:p>
+                  </a:txBody>
+                  <a:tcPr marL="67744" marR="67744" marT="0" marB="0"/>
+                </a:tc>
+                <a:tc>
+                  <a:txBody>
+                    <a:bodyPr/>
+                    <a:lstStyle/>
+                    <a:p>
+                      <a:pPr>
+                        <a:lnSpc>
+                          <a:spcPct val="115000"/>
+                        </a:lnSpc>
+                        <a:spcAft>
+                          <a:spcPts val="800"/>
+                        </a:spcAft>
+                        <a:buNone/>
+                      </a:pPr>
+                      <a:r>
+                        <a:rPr lang="en-IL" sz="1200" kern="100">
+                          <a:effectLst/>
+                        </a:rPr>
+                        <a:t>        {29'b0, Funct3Execute_Dout}</a:t>
+                      </a:r>
+                      <a:endParaRPr lang="en-IL" sz="1200" kern="100">
+                        <a:effectLst/>
+                        <a:latin typeface="Aptos" panose="020B0004020202020204" pitchFamily="34" charset="0"/>
+                        <a:ea typeface="Aptos" panose="020B0004020202020204" pitchFamily="34" charset="0"/>
+                        <a:cs typeface="Arial" panose="020B0604020202020204" pitchFamily="34" charset="0"/>
+                      </a:endParaRPr>
+                    </a:p>
+                  </a:txBody>
+                  <a:tcPr marL="67744" marR="67744" marT="0" marB="0"/>
+                </a:tc>
+                <a:tc>
+                  <a:txBody>
+                    <a:bodyPr/>
+                    <a:lstStyle/>
+                    <a:p>
+                      <a:pPr>
+                        <a:lnSpc>
+                          <a:spcPct val="115000"/>
+                        </a:lnSpc>
+                        <a:spcAft>
+                          <a:spcPts val="800"/>
+                        </a:spcAft>
+                        <a:buNone/>
+                      </a:pPr>
+                      <a:r>
+                        <a:rPr lang="en-IL" sz="1200" kern="100">
+                          <a:effectLst/>
+                        </a:rPr>
+                        <a:t>Funct3 form the operation in Execute stage (padded to 32 bits)</a:t>
+                      </a:r>
+                      <a:endParaRPr lang="en-IL" sz="1200" kern="100">
+                        <a:effectLst/>
+                        <a:latin typeface="Aptos" panose="020B0004020202020204" pitchFamily="34" charset="0"/>
+                        <a:ea typeface="Aptos" panose="020B0004020202020204" pitchFamily="34" charset="0"/>
+                        <a:cs typeface="Arial" panose="020B0604020202020204" pitchFamily="34" charset="0"/>
+                      </a:endParaRPr>
+                    </a:p>
+                  </a:txBody>
+                  <a:tcPr marL="67744" marR="67744" marT="0" marB="0"/>
+                </a:tc>
+                <a:extLst>
+                  <a:ext uri="{0D108BD9-81ED-4DB2-BD59-A6C34878D82A}">
+                    <a16:rowId xmlns:a16="http://schemas.microsoft.com/office/drawing/2014/main" val="3441526153"/>
+                  </a:ext>
+                </a:extLst>
+              </a:tr>
+              <a:tr h="400055">
+                <a:tc>
+                  <a:txBody>
+                    <a:bodyPr/>
+                    <a:lstStyle/>
+                    <a:p>
+                      <a:pPr>
+                        <a:lnSpc>
+                          <a:spcPct val="115000"/>
+                        </a:lnSpc>
+                        <a:spcAft>
+                          <a:spcPts val="800"/>
+                        </a:spcAft>
+                        <a:buNone/>
+                      </a:pPr>
+                      <a:r>
+                        <a:rPr lang="en-IL" sz="1200" kern="100">
+                          <a:effectLst/>
+                        </a:rPr>
+                        <a:t>9</a:t>
+                      </a:r>
+                      <a:endParaRPr lang="en-IL" sz="1200" kern="100">
+                        <a:effectLst/>
+                        <a:latin typeface="Aptos" panose="020B0004020202020204" pitchFamily="34" charset="0"/>
+                        <a:ea typeface="Aptos" panose="020B0004020202020204" pitchFamily="34" charset="0"/>
+                        <a:cs typeface="Arial" panose="020B0604020202020204" pitchFamily="34" charset="0"/>
+                      </a:endParaRPr>
+                    </a:p>
+                  </a:txBody>
+                  <a:tcPr marL="67744" marR="67744" marT="0" marB="0"/>
+                </a:tc>
+                <a:tc>
+                  <a:txBody>
+                    <a:bodyPr/>
+                    <a:lstStyle/>
+                    <a:p>
+                      <a:pPr>
+                        <a:lnSpc>
+                          <a:spcPct val="115000"/>
+                        </a:lnSpc>
+                        <a:spcAft>
+                          <a:spcPts val="800"/>
+                        </a:spcAft>
+                        <a:buNone/>
+                      </a:pPr>
+                      <a:r>
+                        <a:rPr lang="en-IL" sz="1200" kern="100">
+                          <a:effectLst/>
+                        </a:rPr>
+                        <a:t>        {25'b0, Funct7Mem_Dout}</a:t>
+                      </a:r>
+                      <a:endParaRPr lang="en-IL" sz="1200" kern="100">
+                        <a:effectLst/>
+                        <a:latin typeface="Aptos" panose="020B0004020202020204" pitchFamily="34" charset="0"/>
+                        <a:ea typeface="Aptos" panose="020B0004020202020204" pitchFamily="34" charset="0"/>
+                        <a:cs typeface="Arial" panose="020B0604020202020204" pitchFamily="34" charset="0"/>
+                      </a:endParaRPr>
+                    </a:p>
+                  </a:txBody>
+                  <a:tcPr marL="67744" marR="67744" marT="0" marB="0"/>
+                </a:tc>
+                <a:tc>
+                  <a:txBody>
+                    <a:bodyPr/>
+                    <a:lstStyle/>
+                    <a:p>
+                      <a:pPr>
+                        <a:lnSpc>
+                          <a:spcPct val="115000"/>
+                        </a:lnSpc>
+                        <a:spcAft>
+                          <a:spcPts val="800"/>
+                        </a:spcAft>
+                        <a:buNone/>
+                      </a:pPr>
+                      <a:r>
+                        <a:rPr lang="en-IL" sz="1200" kern="100" dirty="0">
+                          <a:effectLst/>
+                        </a:rPr>
+                        <a:t>Funct7 form the operation in Memory stage (padded to 32 bits)</a:t>
+                      </a:r>
+                      <a:endParaRPr lang="en-IL" sz="1200" kern="100" dirty="0">
+                        <a:effectLst/>
+                        <a:latin typeface="Aptos" panose="020B0004020202020204" pitchFamily="34" charset="0"/>
+                        <a:ea typeface="Aptos" panose="020B0004020202020204" pitchFamily="34" charset="0"/>
+                        <a:cs typeface="Arial" panose="020B0604020202020204" pitchFamily="34" charset="0"/>
+                      </a:endParaRPr>
+                    </a:p>
+                  </a:txBody>
+                  <a:tcPr marL="67744" marR="67744" marT="0" marB="0"/>
+                </a:tc>
+                <a:extLst>
+                  <a:ext uri="{0D108BD9-81ED-4DB2-BD59-A6C34878D82A}">
+                    <a16:rowId xmlns:a16="http://schemas.microsoft.com/office/drawing/2014/main" val="1684641981"/>
+                  </a:ext>
+                </a:extLst>
+              </a:tr>
+              <a:tr h="400055">
+                <a:tc>
+                  <a:txBody>
+                    <a:bodyPr/>
+                    <a:lstStyle/>
+                    <a:p>
+                      <a:pPr>
+                        <a:lnSpc>
+                          <a:spcPct val="115000"/>
+                        </a:lnSpc>
+                        <a:spcAft>
+                          <a:spcPts val="800"/>
+                        </a:spcAft>
+                        <a:buNone/>
+                      </a:pPr>
+                      <a:r>
+                        <a:rPr lang="en-IL" sz="1200" kern="100">
+                          <a:effectLst/>
+                        </a:rPr>
+                        <a:t>10</a:t>
+                      </a:r>
+                      <a:endParaRPr lang="en-IL" sz="1200" kern="100">
+                        <a:effectLst/>
+                        <a:latin typeface="Aptos" panose="020B0004020202020204" pitchFamily="34" charset="0"/>
+                        <a:ea typeface="Aptos" panose="020B0004020202020204" pitchFamily="34" charset="0"/>
+                        <a:cs typeface="Arial" panose="020B0604020202020204" pitchFamily="34" charset="0"/>
+                      </a:endParaRPr>
+                    </a:p>
+                  </a:txBody>
+                  <a:tcPr marL="67744" marR="67744" marT="0" marB="0"/>
+                </a:tc>
+                <a:tc>
+                  <a:txBody>
+                    <a:bodyPr/>
+                    <a:lstStyle/>
+                    <a:p>
+                      <a:pPr>
+                        <a:lnSpc>
+                          <a:spcPct val="115000"/>
+                        </a:lnSpc>
+                        <a:spcAft>
+                          <a:spcPts val="800"/>
+                        </a:spcAft>
+                        <a:buNone/>
+                      </a:pPr>
+                      <a:r>
+                        <a:rPr lang="en-IL" sz="1200" kern="100">
+                          <a:effectLst/>
+                        </a:rPr>
+                        <a:t>        {29'b0, Funct3Mem_Dout}</a:t>
+                      </a:r>
+                      <a:endParaRPr lang="en-IL" sz="1200" kern="100">
+                        <a:effectLst/>
+                        <a:latin typeface="Aptos" panose="020B0004020202020204" pitchFamily="34" charset="0"/>
+                        <a:ea typeface="Aptos" panose="020B0004020202020204" pitchFamily="34" charset="0"/>
+                        <a:cs typeface="Arial" panose="020B0604020202020204" pitchFamily="34" charset="0"/>
+                      </a:endParaRPr>
+                    </a:p>
+                  </a:txBody>
+                  <a:tcPr marL="67744" marR="67744" marT="0" marB="0"/>
+                </a:tc>
+                <a:tc>
+                  <a:txBody>
+                    <a:bodyPr/>
+                    <a:lstStyle/>
+                    <a:p>
+                      <a:pPr>
+                        <a:lnSpc>
+                          <a:spcPct val="115000"/>
+                        </a:lnSpc>
+                        <a:spcAft>
+                          <a:spcPts val="800"/>
+                        </a:spcAft>
+                        <a:buNone/>
+                      </a:pPr>
+                      <a:r>
+                        <a:rPr lang="en-IL" sz="1200" kern="100">
+                          <a:effectLst/>
+                        </a:rPr>
+                        <a:t>Funct3 form the operation in Memory stage (padded to 32 bits)</a:t>
+                      </a:r>
+                      <a:endParaRPr lang="en-IL" sz="1200" kern="100">
+                        <a:effectLst/>
+                        <a:latin typeface="Aptos" panose="020B0004020202020204" pitchFamily="34" charset="0"/>
+                        <a:ea typeface="Aptos" panose="020B0004020202020204" pitchFamily="34" charset="0"/>
+                        <a:cs typeface="Arial" panose="020B0604020202020204" pitchFamily="34" charset="0"/>
+                      </a:endParaRPr>
+                    </a:p>
+                  </a:txBody>
+                  <a:tcPr marL="67744" marR="67744" marT="0" marB="0"/>
+                </a:tc>
+                <a:extLst>
+                  <a:ext uri="{0D108BD9-81ED-4DB2-BD59-A6C34878D82A}">
+                    <a16:rowId xmlns:a16="http://schemas.microsoft.com/office/drawing/2014/main" val="4005919814"/>
+                  </a:ext>
+                </a:extLst>
+              </a:tr>
+              <a:tr h="400055">
+                <a:tc>
+                  <a:txBody>
+                    <a:bodyPr/>
+                    <a:lstStyle/>
+                    <a:p>
+                      <a:pPr>
+                        <a:lnSpc>
+                          <a:spcPct val="115000"/>
+                        </a:lnSpc>
+                        <a:spcAft>
+                          <a:spcPts val="800"/>
+                        </a:spcAft>
+                        <a:buNone/>
+                      </a:pPr>
+                      <a:r>
+                        <a:rPr lang="en-IL" sz="1200" kern="100">
+                          <a:effectLst/>
+                        </a:rPr>
+                        <a:t>11</a:t>
+                      </a:r>
+                      <a:endParaRPr lang="en-IL" sz="1200" kern="100">
+                        <a:effectLst/>
+                        <a:latin typeface="Aptos" panose="020B0004020202020204" pitchFamily="34" charset="0"/>
+                        <a:ea typeface="Aptos" panose="020B0004020202020204" pitchFamily="34" charset="0"/>
+                        <a:cs typeface="Arial" panose="020B0604020202020204" pitchFamily="34" charset="0"/>
+                      </a:endParaRPr>
+                    </a:p>
+                  </a:txBody>
+                  <a:tcPr marL="67744" marR="67744" marT="0" marB="0"/>
+                </a:tc>
+                <a:tc>
+                  <a:txBody>
+                    <a:bodyPr/>
+                    <a:lstStyle/>
+                    <a:p>
+                      <a:pPr>
+                        <a:lnSpc>
+                          <a:spcPct val="115000"/>
+                        </a:lnSpc>
+                        <a:spcAft>
+                          <a:spcPts val="800"/>
+                        </a:spcAft>
+                        <a:buNone/>
+                      </a:pPr>
+                      <a:r>
+                        <a:rPr lang="en-IL" sz="1200" kern="100">
+                          <a:effectLst/>
+                        </a:rPr>
+                        <a:t>        {25'b0, Funct7Wb_Dout}</a:t>
+                      </a:r>
+                      <a:endParaRPr lang="en-IL" sz="1200" kern="100">
+                        <a:effectLst/>
+                        <a:latin typeface="Aptos" panose="020B0004020202020204" pitchFamily="34" charset="0"/>
+                        <a:ea typeface="Aptos" panose="020B0004020202020204" pitchFamily="34" charset="0"/>
+                        <a:cs typeface="Arial" panose="020B0604020202020204" pitchFamily="34" charset="0"/>
+                      </a:endParaRPr>
+                    </a:p>
+                  </a:txBody>
+                  <a:tcPr marL="67744" marR="67744" marT="0" marB="0"/>
+                </a:tc>
+                <a:tc>
+                  <a:txBody>
+                    <a:bodyPr/>
+                    <a:lstStyle/>
+                    <a:p>
+                      <a:pPr>
+                        <a:lnSpc>
+                          <a:spcPct val="115000"/>
+                        </a:lnSpc>
+                        <a:spcAft>
+                          <a:spcPts val="800"/>
+                        </a:spcAft>
+                        <a:buNone/>
+                      </a:pPr>
+                      <a:r>
+                        <a:rPr lang="en-IL" sz="1200" kern="100">
+                          <a:effectLst/>
+                        </a:rPr>
+                        <a:t>Funct7 form the operation in Writeback stage (padded to 32 bits)</a:t>
+                      </a:r>
+                      <a:endParaRPr lang="en-IL" sz="1200" kern="100">
+                        <a:effectLst/>
+                        <a:latin typeface="Aptos" panose="020B0004020202020204" pitchFamily="34" charset="0"/>
+                        <a:ea typeface="Aptos" panose="020B0004020202020204" pitchFamily="34" charset="0"/>
+                        <a:cs typeface="Arial" panose="020B0604020202020204" pitchFamily="34" charset="0"/>
+                      </a:endParaRPr>
+                    </a:p>
+                  </a:txBody>
+                  <a:tcPr marL="67744" marR="67744" marT="0" marB="0"/>
+                </a:tc>
+                <a:extLst>
+                  <a:ext uri="{0D108BD9-81ED-4DB2-BD59-A6C34878D82A}">
+                    <a16:rowId xmlns:a16="http://schemas.microsoft.com/office/drawing/2014/main" val="120394810"/>
+                  </a:ext>
+                </a:extLst>
+              </a:tr>
+              <a:tr h="400055">
+                <a:tc>
+                  <a:txBody>
+                    <a:bodyPr/>
+                    <a:lstStyle/>
+                    <a:p>
+                      <a:pPr>
+                        <a:lnSpc>
+                          <a:spcPct val="115000"/>
+                        </a:lnSpc>
+                        <a:spcAft>
+                          <a:spcPts val="800"/>
+                        </a:spcAft>
+                        <a:buNone/>
+                      </a:pPr>
+                      <a:r>
+                        <a:rPr lang="en-IL" sz="1200" kern="100">
+                          <a:effectLst/>
+                        </a:rPr>
+                        <a:t>12</a:t>
+                      </a:r>
+                      <a:endParaRPr lang="en-IL" sz="1200" kern="100">
+                        <a:effectLst/>
+                        <a:latin typeface="Aptos" panose="020B0004020202020204" pitchFamily="34" charset="0"/>
+                        <a:ea typeface="Aptos" panose="020B0004020202020204" pitchFamily="34" charset="0"/>
+                        <a:cs typeface="Arial" panose="020B0604020202020204" pitchFamily="34" charset="0"/>
+                      </a:endParaRPr>
+                    </a:p>
+                  </a:txBody>
+                  <a:tcPr marL="67744" marR="67744" marT="0" marB="0"/>
+                </a:tc>
+                <a:tc>
+                  <a:txBody>
+                    <a:bodyPr/>
+                    <a:lstStyle/>
+                    <a:p>
+                      <a:pPr>
+                        <a:lnSpc>
+                          <a:spcPct val="115000"/>
+                        </a:lnSpc>
+                        <a:spcAft>
+                          <a:spcPts val="800"/>
+                        </a:spcAft>
+                        <a:buNone/>
+                      </a:pPr>
+                      <a:r>
+                        <a:rPr lang="en-IL" sz="1200" kern="100">
+                          <a:effectLst/>
+                        </a:rPr>
+                        <a:t>        {29'b0, Funct3Wb_Dout}</a:t>
+                      </a:r>
+                      <a:endParaRPr lang="en-IL" sz="1200" kern="100">
+                        <a:effectLst/>
+                        <a:latin typeface="Aptos" panose="020B0004020202020204" pitchFamily="34" charset="0"/>
+                        <a:ea typeface="Aptos" panose="020B0004020202020204" pitchFamily="34" charset="0"/>
+                        <a:cs typeface="Arial" panose="020B0604020202020204" pitchFamily="34" charset="0"/>
+                      </a:endParaRPr>
+                    </a:p>
+                  </a:txBody>
+                  <a:tcPr marL="67744" marR="67744" marT="0" marB="0"/>
+                </a:tc>
+                <a:tc>
+                  <a:txBody>
+                    <a:bodyPr/>
+                    <a:lstStyle/>
+                    <a:p>
+                      <a:pPr>
+                        <a:lnSpc>
+                          <a:spcPct val="115000"/>
+                        </a:lnSpc>
+                        <a:spcAft>
+                          <a:spcPts val="800"/>
+                        </a:spcAft>
+                        <a:buNone/>
+                      </a:pPr>
+                      <a:r>
+                        <a:rPr lang="en-IL" sz="1200" kern="100">
+                          <a:effectLst/>
+                        </a:rPr>
+                        <a:t>Funct3 form the operation in Writeback stage (padded to 32 bits)</a:t>
+                      </a:r>
+                      <a:endParaRPr lang="en-IL" sz="1200" kern="100">
+                        <a:effectLst/>
+                        <a:latin typeface="Aptos" panose="020B0004020202020204" pitchFamily="34" charset="0"/>
+                        <a:ea typeface="Aptos" panose="020B0004020202020204" pitchFamily="34" charset="0"/>
+                        <a:cs typeface="Arial" panose="020B0604020202020204" pitchFamily="34" charset="0"/>
+                      </a:endParaRPr>
+                    </a:p>
+                  </a:txBody>
+                  <a:tcPr marL="67744" marR="67744" marT="0" marB="0"/>
+                </a:tc>
+                <a:extLst>
+                  <a:ext uri="{0D108BD9-81ED-4DB2-BD59-A6C34878D82A}">
+                    <a16:rowId xmlns:a16="http://schemas.microsoft.com/office/drawing/2014/main" val="606544536"/>
+                  </a:ext>
+                </a:extLst>
+              </a:tr>
+              <a:tr h="264467">
+                <a:tc>
+                  <a:txBody>
+                    <a:bodyPr/>
+                    <a:lstStyle/>
+                    <a:p>
+                      <a:pPr>
+                        <a:lnSpc>
+                          <a:spcPct val="115000"/>
+                        </a:lnSpc>
+                        <a:spcAft>
+                          <a:spcPts val="800"/>
+                        </a:spcAft>
+                        <a:buNone/>
+                      </a:pPr>
+                      <a:r>
+                        <a:rPr lang="en-IL" sz="1200" kern="100">
+                          <a:effectLst/>
+                        </a:rPr>
+                        <a:t>13</a:t>
+                      </a:r>
+                      <a:endParaRPr lang="en-IL" sz="1200" kern="100">
+                        <a:effectLst/>
+                        <a:latin typeface="Aptos" panose="020B0004020202020204" pitchFamily="34" charset="0"/>
+                        <a:ea typeface="Aptos" panose="020B0004020202020204" pitchFamily="34" charset="0"/>
+                        <a:cs typeface="Arial" panose="020B0604020202020204" pitchFamily="34" charset="0"/>
+                      </a:endParaRPr>
+                    </a:p>
+                  </a:txBody>
+                  <a:tcPr marL="67744" marR="67744" marT="0" marB="0"/>
+                </a:tc>
+                <a:tc>
+                  <a:txBody>
+                    <a:bodyPr/>
+                    <a:lstStyle/>
+                    <a:p>
+                      <a:pPr>
+                        <a:lnSpc>
+                          <a:spcPct val="115000"/>
+                        </a:lnSpc>
+                        <a:spcAft>
+                          <a:spcPts val="800"/>
+                        </a:spcAft>
+                        <a:buNone/>
+                      </a:pPr>
+                      <a:r>
+                        <a:rPr lang="en-IL" sz="1200" kern="100" dirty="0">
+                          <a:effectLst/>
+                        </a:rPr>
+                        <a:t>        {23'b0, </a:t>
+                      </a:r>
+                      <a:r>
+                        <a:rPr lang="en-IL" sz="1200" kern="100" dirty="0" err="1">
+                          <a:effectLst/>
+                        </a:rPr>
+                        <a:t>PC_debug</a:t>
+                      </a:r>
+                      <a:r>
+                        <a:rPr lang="en-IL" sz="1200" kern="100" dirty="0">
+                          <a:effectLst/>
+                        </a:rPr>
+                        <a:t>}</a:t>
+                      </a:r>
+                      <a:endParaRPr lang="en-IL" sz="1200" kern="100" dirty="0">
+                        <a:effectLst/>
+                        <a:latin typeface="Aptos" panose="020B0004020202020204" pitchFamily="34" charset="0"/>
+                        <a:ea typeface="Aptos" panose="020B0004020202020204" pitchFamily="34" charset="0"/>
+                        <a:cs typeface="Arial" panose="020B0604020202020204" pitchFamily="34" charset="0"/>
+                      </a:endParaRPr>
+                    </a:p>
+                  </a:txBody>
+                  <a:tcPr marL="67744" marR="67744" marT="0" marB="0"/>
+                </a:tc>
+                <a:tc>
+                  <a:txBody>
+                    <a:bodyPr/>
+                    <a:lstStyle/>
+                    <a:p>
+                      <a:pPr>
+                        <a:lnSpc>
+                          <a:spcPct val="115000"/>
+                        </a:lnSpc>
+                        <a:spcAft>
+                          <a:spcPts val="800"/>
+                        </a:spcAft>
+                        <a:buNone/>
+                      </a:pPr>
+                      <a:r>
+                        <a:rPr lang="en-IL" sz="1200" kern="100">
+                          <a:effectLst/>
+                        </a:rPr>
+                        <a:t>Program Counter (padded to 32 bits)</a:t>
+                      </a:r>
+                      <a:endParaRPr lang="en-IL" sz="1200" kern="100">
+                        <a:effectLst/>
+                        <a:latin typeface="Aptos" panose="020B0004020202020204" pitchFamily="34" charset="0"/>
+                        <a:ea typeface="Aptos" panose="020B0004020202020204" pitchFamily="34" charset="0"/>
+                        <a:cs typeface="Arial" panose="020B0604020202020204" pitchFamily="34" charset="0"/>
+                      </a:endParaRPr>
+                    </a:p>
+                  </a:txBody>
+                  <a:tcPr marL="67744" marR="67744" marT="0" marB="0"/>
+                </a:tc>
+                <a:extLst>
+                  <a:ext uri="{0D108BD9-81ED-4DB2-BD59-A6C34878D82A}">
+                    <a16:rowId xmlns:a16="http://schemas.microsoft.com/office/drawing/2014/main" val="3427536868"/>
+                  </a:ext>
+                </a:extLst>
+              </a:tr>
+              <a:tr h="239543">
+                <a:tc>
+                  <a:txBody>
+                    <a:bodyPr/>
+                    <a:lstStyle/>
+                    <a:p>
+                      <a:pPr>
+                        <a:lnSpc>
+                          <a:spcPct val="115000"/>
+                        </a:lnSpc>
+                        <a:spcAft>
+                          <a:spcPts val="800"/>
+                        </a:spcAft>
+                        <a:buNone/>
+                      </a:pPr>
+                      <a:r>
+                        <a:rPr lang="en-IL" sz="1200" kern="100">
+                          <a:effectLst/>
+                        </a:rPr>
+                        <a:t>14</a:t>
+                      </a:r>
+                      <a:endParaRPr lang="en-IL" sz="1200" kern="100">
+                        <a:effectLst/>
+                        <a:latin typeface="Aptos" panose="020B0004020202020204" pitchFamily="34" charset="0"/>
+                        <a:ea typeface="Aptos" panose="020B0004020202020204" pitchFamily="34" charset="0"/>
+                        <a:cs typeface="Arial" panose="020B0604020202020204" pitchFamily="34" charset="0"/>
+                      </a:endParaRPr>
+                    </a:p>
+                  </a:txBody>
+                  <a:tcPr marL="67744" marR="67744" marT="0" marB="0"/>
+                </a:tc>
+                <a:tc>
+                  <a:txBody>
+                    <a:bodyPr/>
+                    <a:lstStyle/>
+                    <a:p>
+                      <a:pPr>
+                        <a:lnSpc>
+                          <a:spcPct val="115000"/>
+                        </a:lnSpc>
+                        <a:spcAft>
+                          <a:spcPts val="800"/>
+                        </a:spcAft>
+                        <a:buNone/>
+                      </a:pPr>
+                      <a:r>
+                        <a:rPr lang="en-IL" sz="1200" kern="100">
+                          <a:effectLst/>
+                        </a:rPr>
+                        <a:t>        FAmux_Result_debug</a:t>
+                      </a:r>
+                      <a:endParaRPr lang="en-IL" sz="1200" kern="100">
+                        <a:effectLst/>
+                        <a:latin typeface="Aptos" panose="020B0004020202020204" pitchFamily="34" charset="0"/>
+                        <a:ea typeface="Aptos" panose="020B0004020202020204" pitchFamily="34" charset="0"/>
+                        <a:cs typeface="Arial" panose="020B0604020202020204" pitchFamily="34" charset="0"/>
+                      </a:endParaRPr>
+                    </a:p>
+                  </a:txBody>
+                  <a:tcPr marL="67744" marR="67744" marT="0" marB="0"/>
+                </a:tc>
+                <a:tc>
+                  <a:txBody>
+                    <a:bodyPr/>
+                    <a:lstStyle/>
+                    <a:p>
+                      <a:pPr>
+                        <a:lnSpc>
+                          <a:spcPct val="115000"/>
+                        </a:lnSpc>
+                        <a:spcAft>
+                          <a:spcPts val="800"/>
+                        </a:spcAft>
+                        <a:buNone/>
+                      </a:pPr>
+                      <a:r>
+                        <a:rPr lang="en-IL" sz="1200" kern="100" dirty="0">
+                          <a:effectLst/>
+                        </a:rPr>
+                        <a:t>Forwarding A MUX result</a:t>
+                      </a:r>
+                      <a:endParaRPr lang="en-IL" sz="1200" kern="100" dirty="0">
+                        <a:effectLst/>
+                        <a:latin typeface="Aptos" panose="020B0004020202020204" pitchFamily="34" charset="0"/>
+                        <a:ea typeface="Aptos" panose="020B0004020202020204" pitchFamily="34" charset="0"/>
+                        <a:cs typeface="Arial" panose="020B0604020202020204" pitchFamily="34" charset="0"/>
+                      </a:endParaRPr>
+                    </a:p>
+                  </a:txBody>
+                  <a:tcPr marL="67744" marR="67744" marT="0" marB="0"/>
+                </a:tc>
+                <a:extLst>
+                  <a:ext uri="{0D108BD9-81ED-4DB2-BD59-A6C34878D82A}">
+                    <a16:rowId xmlns:a16="http://schemas.microsoft.com/office/drawing/2014/main" val="2373910422"/>
+                  </a:ext>
+                </a:extLst>
+              </a:tr>
+            </a:tbl>
+          </a:graphicData>
+        </a:graphic>
+      </p:graphicFrame>
+    </p:spTree>
+    <p:extLst>
+      <p:ext uri="{BB962C8B-B14F-4D97-AF65-F5344CB8AC3E}">
+        <p14:creationId xmlns:p14="http://schemas.microsoft.com/office/powerpoint/2010/main" val="2802876541"/>
+      </p:ext>
+    </p:extLst>
+  </p:cSld>
+  <p:clrMapOvr>
+    <a:masterClrMapping/>
+  </p:clrMapOvr>
+</p:sld>
+</file>
+
+<file path=ppt/slides/slide11.xml><?xml version="1.0" encoding="utf-8"?>
+<p:sld xmlns:a="http://schemas.openxmlformats.org/drawingml/2006/main" xmlns:r="http://schemas.openxmlformats.org/officeDocument/2006/relationships" xmlns:p="http://schemas.openxmlformats.org/presentationml/2006/main">
+  <p:cSld>
+    <p:spTree>
+      <p:nvGrpSpPr>
+        <p:cNvPr id="1" name="">
+          <a:extLst>
+            <a:ext uri="{FF2B5EF4-FFF2-40B4-BE49-F238E27FC236}">
+              <a16:creationId xmlns:a16="http://schemas.microsoft.com/office/drawing/2014/main" id="{781AA9EA-E9F9-A326-3F16-EB8153A4F31E}"/>
+            </a:ext>
+          </a:extLst>
+        </p:cNvPr>
+        <p:cNvGrpSpPr/>
+        <p:nvPr/>
+      </p:nvGrpSpPr>
+      <p:grpSpPr>
+        <a:xfrm>
+          <a:off x="0" y="0"/>
+          <a:ext cx="0" cy="0"/>
+          <a:chOff x="0" y="0"/>
+          <a:chExt cx="0" cy="0"/>
+        </a:xfrm>
+      </p:grpSpPr>
+      <p:sp>
+        <p:nvSpPr>
+          <p:cNvPr id="19" name="Rectangle 18">
+            <a:extLst>
+              <a:ext uri="{FF2B5EF4-FFF2-40B4-BE49-F238E27FC236}">
+                <a16:creationId xmlns:a16="http://schemas.microsoft.com/office/drawing/2014/main" id="{3D61C9F6-4617-CF28-E1DD-E09CC9F06F8D}"/>
+              </a:ext>
+            </a:extLst>
+          </p:cNvPr>
+          <p:cNvSpPr/>
+          <p:nvPr/>
+        </p:nvSpPr>
+        <p:spPr>
+          <a:xfrm>
+            <a:off x="1462167" y="1195602"/>
+            <a:ext cx="10729833" cy="1053885"/>
+          </a:xfrm>
+          <a:prstGeom prst="rect">
+            <a:avLst/>
+          </a:prstGeom>
+        </p:spPr>
+        <p:style>
+          <a:lnRef idx="0">
+            <a:schemeClr val="dk1">
+              <a:alpha val="0"/>
+              <a:hueOff val="0"/>
+              <a:satOff val="0"/>
+              <a:lumOff val="0"/>
+              <a:alphaOff val="0"/>
+            </a:schemeClr>
+          </a:lnRef>
+          <a:fillRef idx="0">
+            <a:schemeClr val="lt1">
+              <a:alpha val="0"/>
+              <a:hueOff val="0"/>
+              <a:satOff val="0"/>
+              <a:lumOff val="0"/>
+              <a:alphaOff val="0"/>
+            </a:schemeClr>
+          </a:fillRef>
+          <a:effectRef idx="0">
+            <a:schemeClr val="lt1">
+              <a:alpha val="0"/>
+              <a:hueOff val="0"/>
+              <a:satOff val="0"/>
+              <a:lumOff val="0"/>
+              <a:alphaOff val="0"/>
+            </a:schemeClr>
+          </a:effectRef>
+          <a:fontRef idx="minor">
+            <a:schemeClr val="tx1">
+              <a:hueOff val="0"/>
+              <a:satOff val="0"/>
+              <a:lumOff val="0"/>
+              <a:alphaOff val="0"/>
+            </a:schemeClr>
+          </a:fontRef>
+        </p:style>
+        <p:txBody>
+          <a:bodyPr/>
+          <a:lstStyle/>
+          <a:p>
+            <a:endParaRPr lang="en-IL"/>
+          </a:p>
+        </p:txBody>
+      </p:sp>
+      <p:sp>
+        <p:nvSpPr>
+          <p:cNvPr id="7" name="כותרת 1">
+            <a:extLst>
+              <a:ext uri="{FF2B5EF4-FFF2-40B4-BE49-F238E27FC236}">
+                <a16:creationId xmlns:a16="http://schemas.microsoft.com/office/drawing/2014/main" id="{88B65038-0ADF-F966-41C8-B846679D6009}"/>
+              </a:ext>
+            </a:extLst>
+          </p:cNvPr>
+          <p:cNvSpPr>
+            <a:spLocks noGrp="1"/>
+          </p:cNvSpPr>
+          <p:nvPr>
+            <p:ph type="title"/>
+          </p:nvPr>
+        </p:nvSpPr>
+        <p:spPr>
+          <a:xfrm>
+            <a:off x="305349" y="603066"/>
+            <a:ext cx="10319512" cy="592536"/>
+          </a:xfrm>
+        </p:spPr>
+        <p:txBody>
+          <a:bodyPr vert="horz" lIns="91440" tIns="45720" rIns="91440" bIns="45720" rtlCol="0" anchor="b">
+            <a:normAutofit fontScale="90000"/>
+          </a:bodyPr>
+          <a:lstStyle/>
+          <a:p>
+            <a:pPr algn="ctr" rtl="0"/>
+            <a:r>
+              <a:rPr lang="en-US" sz="3200" b="1" i="0" kern="1200" dirty="0">
+                <a:solidFill>
+                  <a:schemeClr val="tx1"/>
+                </a:solidFill>
+                <a:effectLst/>
+                <a:latin typeface="+mj-lt"/>
+                <a:ea typeface="+mj-ea"/>
+                <a:cs typeface="+mj-cs"/>
+              </a:rPr>
+              <a:t>Architectural design of the selected solution </a:t>
+            </a:r>
+            <a:br>
+              <a:rPr lang="en-US" sz="3200" b="1" i="0" kern="1200" dirty="0">
+                <a:solidFill>
+                  <a:schemeClr val="tx1"/>
+                </a:solidFill>
+                <a:effectLst/>
+                <a:latin typeface="+mj-lt"/>
+                <a:ea typeface="+mj-ea"/>
+                <a:cs typeface="+mj-cs"/>
+              </a:rPr>
+            </a:br>
+            <a:r>
+              <a:rPr lang="en-US" sz="3200" b="1" i="0" kern="1200" dirty="0">
+                <a:solidFill>
+                  <a:schemeClr val="tx1"/>
+                </a:solidFill>
+                <a:effectLst/>
+                <a:latin typeface="+mj-lt"/>
+                <a:ea typeface="+mj-ea"/>
+                <a:cs typeface="+mj-cs"/>
+              </a:rPr>
+              <a:t>Debug unit</a:t>
+            </a:r>
+            <a:endParaRPr lang="en-US" sz="3200" b="1" kern="1200" dirty="0">
+              <a:solidFill>
+                <a:schemeClr val="tx1"/>
+              </a:solidFill>
+              <a:latin typeface="+mj-lt"/>
+              <a:ea typeface="+mj-ea"/>
+              <a:cs typeface="+mj-cs"/>
+            </a:endParaRPr>
+          </a:p>
+        </p:txBody>
+      </p:sp>
+      <p:graphicFrame>
+        <p:nvGraphicFramePr>
+          <p:cNvPr id="5" name="Content Placeholder 4">
+            <a:extLst>
+              <a:ext uri="{FF2B5EF4-FFF2-40B4-BE49-F238E27FC236}">
+                <a16:creationId xmlns:a16="http://schemas.microsoft.com/office/drawing/2014/main" id="{23C28224-D79A-EA2C-C5D2-51DCF839AD1C}"/>
+              </a:ext>
+            </a:extLst>
+          </p:cNvPr>
+          <p:cNvGraphicFramePr>
+            <a:graphicFrameLocks noGrp="1"/>
+          </p:cNvGraphicFramePr>
+          <p:nvPr>
+            <p:ph idx="1"/>
+            <p:extLst>
+              <p:ext uri="{D42A27DB-BD31-4B8C-83A1-F6EECF244321}">
+                <p14:modId xmlns:p14="http://schemas.microsoft.com/office/powerpoint/2010/main" val="2381226379"/>
+              </p:ext>
+            </p:extLst>
+          </p:nvPr>
+        </p:nvGraphicFramePr>
+        <p:xfrm>
+          <a:off x="1" y="1396721"/>
+          <a:ext cx="12192000" cy="5461274"/>
+        </p:xfrm>
+        <a:graphic>
+          <a:graphicData uri="http://schemas.openxmlformats.org/drawingml/2006/table">
+            <a:tbl>
+              <a:tblPr firstRow="1" firstCol="1" bandRow="1">
+                <a:tableStyleId>{5C22544A-7EE6-4342-B048-85BDC9FD1C3A}</a:tableStyleId>
+              </a:tblPr>
+              <a:tblGrid>
+                <a:gridCol w="598206">
+                  <a:extLst>
+                    <a:ext uri="{9D8B030D-6E8A-4147-A177-3AD203B41FA5}">
+                      <a16:colId xmlns:a16="http://schemas.microsoft.com/office/drawing/2014/main" val="1480150233"/>
+                    </a:ext>
+                  </a:extLst>
+                </a:gridCol>
+                <a:gridCol w="2144993">
+                  <a:extLst>
+                    <a:ext uri="{9D8B030D-6E8A-4147-A177-3AD203B41FA5}">
+                      <a16:colId xmlns:a16="http://schemas.microsoft.com/office/drawing/2014/main" val="1601913796"/>
+                    </a:ext>
+                  </a:extLst>
+                </a:gridCol>
+                <a:gridCol w="9448801">
+                  <a:extLst>
+                    <a:ext uri="{9D8B030D-6E8A-4147-A177-3AD203B41FA5}">
+                      <a16:colId xmlns:a16="http://schemas.microsoft.com/office/drawing/2014/main" val="663607051"/>
+                    </a:ext>
+                  </a:extLst>
+                </a:gridCol>
+              </a:tblGrid>
+              <a:tr h="318325">
+                <a:tc>
+                  <a:txBody>
+                    <a:bodyPr/>
+                    <a:lstStyle/>
+                    <a:p>
+                      <a:pPr>
+                        <a:lnSpc>
+                          <a:spcPct val="115000"/>
+                        </a:lnSpc>
+                        <a:spcAft>
+                          <a:spcPts val="800"/>
+                        </a:spcAft>
+                        <a:buNone/>
+                      </a:pPr>
+                      <a:r>
+                        <a:rPr lang="en-IL" sz="1200" kern="100">
+                          <a:effectLst/>
+                        </a:rPr>
+                        <a:t>15</a:t>
+                      </a:r>
+                      <a:endParaRPr lang="en-IL" sz="1200" kern="100">
+                        <a:effectLst/>
+                        <a:latin typeface="Aptos" panose="020B0004020202020204" pitchFamily="34" charset="0"/>
+                        <a:ea typeface="Aptos" panose="020B0004020202020204" pitchFamily="34" charset="0"/>
+                        <a:cs typeface="Arial" panose="020B0604020202020204" pitchFamily="34" charset="0"/>
+                      </a:endParaRPr>
+                    </a:p>
+                  </a:txBody>
+                  <a:tcPr marL="68580" marR="68580" marT="0" marB="0"/>
+                </a:tc>
+                <a:tc>
+                  <a:txBody>
+                    <a:bodyPr/>
+                    <a:lstStyle/>
+                    <a:p>
+                      <a:pPr>
+                        <a:lnSpc>
+                          <a:spcPct val="115000"/>
+                        </a:lnSpc>
+                        <a:spcAft>
+                          <a:spcPts val="800"/>
+                        </a:spcAft>
+                        <a:buNone/>
+                      </a:pPr>
+                      <a:r>
+                        <a:rPr lang="en-IL" sz="1200" kern="100" dirty="0">
+                          <a:effectLst/>
+                        </a:rPr>
+                        <a:t>        </a:t>
+                      </a:r>
+                      <a:r>
+                        <a:rPr lang="en-IL" sz="1200" kern="100" dirty="0" err="1">
+                          <a:effectLst/>
+                        </a:rPr>
+                        <a:t>SrcB_debug</a:t>
+                      </a:r>
+                      <a:endParaRPr lang="en-IL" sz="1200" kern="100" dirty="0">
+                        <a:effectLst/>
+                        <a:latin typeface="Aptos" panose="020B0004020202020204" pitchFamily="34" charset="0"/>
+                        <a:ea typeface="Aptos" panose="020B0004020202020204" pitchFamily="34" charset="0"/>
+                        <a:cs typeface="Arial" panose="020B0604020202020204" pitchFamily="34" charset="0"/>
+                      </a:endParaRPr>
+                    </a:p>
+                  </a:txBody>
+                  <a:tcPr marL="68580" marR="68580" marT="0" marB="0"/>
+                </a:tc>
+                <a:tc>
+                  <a:txBody>
+                    <a:bodyPr/>
+                    <a:lstStyle/>
+                    <a:p>
+                      <a:pPr>
+                        <a:lnSpc>
+                          <a:spcPct val="115000"/>
+                        </a:lnSpc>
+                        <a:spcAft>
+                          <a:spcPts val="800"/>
+                        </a:spcAft>
+                        <a:buNone/>
+                      </a:pPr>
+                      <a:r>
+                        <a:rPr lang="en-IL" sz="1200" kern="100" dirty="0">
+                          <a:effectLst/>
+                        </a:rPr>
+                        <a:t>Source B debug</a:t>
+                      </a:r>
+                      <a:endParaRPr lang="en-IL" sz="1200" kern="100" dirty="0">
+                        <a:effectLst/>
+                        <a:latin typeface="Aptos" panose="020B0004020202020204" pitchFamily="34" charset="0"/>
+                        <a:ea typeface="Aptos" panose="020B0004020202020204" pitchFamily="34" charset="0"/>
+                        <a:cs typeface="Arial" panose="020B0604020202020204" pitchFamily="34" charset="0"/>
+                      </a:endParaRPr>
+                    </a:p>
+                  </a:txBody>
+                  <a:tcPr marL="68580" marR="68580" marT="0" marB="0"/>
+                </a:tc>
+                <a:extLst>
+                  <a:ext uri="{0D108BD9-81ED-4DB2-BD59-A6C34878D82A}">
+                    <a16:rowId xmlns:a16="http://schemas.microsoft.com/office/drawing/2014/main" val="619800027"/>
+                  </a:ext>
+                </a:extLst>
+              </a:tr>
+              <a:tr h="318325">
+                <a:tc>
+                  <a:txBody>
+                    <a:bodyPr/>
+                    <a:lstStyle/>
+                    <a:p>
+                      <a:pPr>
+                        <a:lnSpc>
+                          <a:spcPct val="115000"/>
+                        </a:lnSpc>
+                        <a:spcAft>
+                          <a:spcPts val="800"/>
+                        </a:spcAft>
+                        <a:buNone/>
+                      </a:pPr>
+                      <a:r>
+                        <a:rPr lang="en-IL" sz="1200" kern="100">
+                          <a:effectLst/>
+                        </a:rPr>
+                        <a:t>16</a:t>
+                      </a:r>
+                      <a:endParaRPr lang="en-IL" sz="1200" kern="100">
+                        <a:effectLst/>
+                        <a:latin typeface="Aptos" panose="020B0004020202020204" pitchFamily="34" charset="0"/>
+                        <a:ea typeface="Aptos" panose="020B0004020202020204" pitchFamily="34" charset="0"/>
+                        <a:cs typeface="Arial" panose="020B0604020202020204" pitchFamily="34" charset="0"/>
+                      </a:endParaRPr>
+                    </a:p>
+                  </a:txBody>
+                  <a:tcPr marL="68580" marR="68580" marT="0" marB="0"/>
+                </a:tc>
+                <a:tc>
+                  <a:txBody>
+                    <a:bodyPr/>
+                    <a:lstStyle/>
+                    <a:p>
+                      <a:pPr>
+                        <a:lnSpc>
+                          <a:spcPct val="115000"/>
+                        </a:lnSpc>
+                        <a:spcAft>
+                          <a:spcPts val="800"/>
+                        </a:spcAft>
+                        <a:buNone/>
+                      </a:pPr>
+                      <a:r>
+                        <a:rPr lang="en-IL" sz="1200" kern="100">
+                          <a:effectLst/>
+                        </a:rPr>
+                        <a:t>        {31'b0, PcSel_debug}</a:t>
+                      </a:r>
+                      <a:endParaRPr lang="en-IL" sz="1200" kern="100">
+                        <a:effectLst/>
+                        <a:latin typeface="Aptos" panose="020B0004020202020204" pitchFamily="34" charset="0"/>
+                        <a:ea typeface="Aptos" panose="020B0004020202020204" pitchFamily="34" charset="0"/>
+                        <a:cs typeface="Arial" panose="020B0604020202020204" pitchFamily="34" charset="0"/>
+                      </a:endParaRPr>
+                    </a:p>
+                  </a:txBody>
+                  <a:tcPr marL="68580" marR="68580" marT="0" marB="0"/>
+                </a:tc>
+                <a:tc>
+                  <a:txBody>
+                    <a:bodyPr/>
+                    <a:lstStyle/>
+                    <a:p>
+                      <a:pPr>
+                        <a:lnSpc>
+                          <a:spcPct val="115000"/>
+                        </a:lnSpc>
+                        <a:spcAft>
+                          <a:spcPts val="800"/>
+                        </a:spcAft>
+                        <a:buNone/>
+                      </a:pPr>
+                      <a:r>
+                        <a:rPr lang="en-IL" sz="1200" kern="100">
+                          <a:effectLst/>
+                        </a:rPr>
+                        <a:t>PC select signal (padded to 32 bits)</a:t>
+                      </a:r>
+                      <a:endParaRPr lang="en-IL" sz="1200" kern="100">
+                        <a:effectLst/>
+                        <a:latin typeface="Aptos" panose="020B0004020202020204" pitchFamily="34" charset="0"/>
+                        <a:ea typeface="Aptos" panose="020B0004020202020204" pitchFamily="34" charset="0"/>
+                        <a:cs typeface="Arial" panose="020B0604020202020204" pitchFamily="34" charset="0"/>
+                      </a:endParaRPr>
+                    </a:p>
+                  </a:txBody>
+                  <a:tcPr marL="68580" marR="68580" marT="0" marB="0"/>
+                </a:tc>
+                <a:extLst>
+                  <a:ext uri="{0D108BD9-81ED-4DB2-BD59-A6C34878D82A}">
+                    <a16:rowId xmlns:a16="http://schemas.microsoft.com/office/drawing/2014/main" val="1355159200"/>
+                  </a:ext>
+                </a:extLst>
+              </a:tr>
+              <a:tr h="318325">
+                <a:tc>
+                  <a:txBody>
+                    <a:bodyPr/>
+                    <a:lstStyle/>
+                    <a:p>
+                      <a:pPr>
+                        <a:lnSpc>
+                          <a:spcPct val="115000"/>
+                        </a:lnSpc>
+                        <a:spcAft>
+                          <a:spcPts val="800"/>
+                        </a:spcAft>
+                        <a:buNone/>
+                      </a:pPr>
+                      <a:r>
+                        <a:rPr lang="en-IL" sz="1200" kern="100">
+                          <a:effectLst/>
+                        </a:rPr>
+                        <a:t>17</a:t>
+                      </a:r>
+                      <a:endParaRPr lang="en-IL" sz="1200" kern="100">
+                        <a:effectLst/>
+                        <a:latin typeface="Aptos" panose="020B0004020202020204" pitchFamily="34" charset="0"/>
+                        <a:ea typeface="Aptos" panose="020B0004020202020204" pitchFamily="34" charset="0"/>
+                        <a:cs typeface="Arial" panose="020B0604020202020204" pitchFamily="34" charset="0"/>
+                      </a:endParaRPr>
+                    </a:p>
+                  </a:txBody>
+                  <a:tcPr marL="68580" marR="68580" marT="0" marB="0"/>
+                </a:tc>
+                <a:tc>
+                  <a:txBody>
+                    <a:bodyPr/>
+                    <a:lstStyle/>
+                    <a:p>
+                      <a:pPr>
+                        <a:lnSpc>
+                          <a:spcPct val="115000"/>
+                        </a:lnSpc>
+                        <a:spcAft>
+                          <a:spcPts val="800"/>
+                        </a:spcAft>
+                        <a:buNone/>
+                      </a:pPr>
+                      <a:r>
+                        <a:rPr lang="en-IL" sz="1200" kern="100">
+                          <a:effectLst/>
+                        </a:rPr>
+                        <a:t>        {23'b0, BrPC_debug}</a:t>
+                      </a:r>
+                      <a:endParaRPr lang="en-IL" sz="1200" kern="100">
+                        <a:effectLst/>
+                        <a:latin typeface="Aptos" panose="020B0004020202020204" pitchFamily="34" charset="0"/>
+                        <a:ea typeface="Aptos" panose="020B0004020202020204" pitchFamily="34" charset="0"/>
+                        <a:cs typeface="Arial" panose="020B0604020202020204" pitchFamily="34" charset="0"/>
+                      </a:endParaRPr>
+                    </a:p>
+                  </a:txBody>
+                  <a:tcPr marL="68580" marR="68580" marT="0" marB="0"/>
+                </a:tc>
+                <a:tc>
+                  <a:txBody>
+                    <a:bodyPr/>
+                    <a:lstStyle/>
+                    <a:p>
+                      <a:pPr>
+                        <a:lnSpc>
+                          <a:spcPct val="115000"/>
+                        </a:lnSpc>
+                        <a:spcAft>
+                          <a:spcPts val="800"/>
+                        </a:spcAft>
+                        <a:buNone/>
+                      </a:pPr>
+                      <a:r>
+                        <a:rPr lang="en-IL" sz="1200" kern="100">
+                          <a:effectLst/>
+                        </a:rPr>
+                        <a:t>Branch PC (padded to 32 bits)</a:t>
+                      </a:r>
+                      <a:endParaRPr lang="en-IL" sz="1200" kern="100">
+                        <a:effectLst/>
+                        <a:latin typeface="Aptos" panose="020B0004020202020204" pitchFamily="34" charset="0"/>
+                        <a:ea typeface="Aptos" panose="020B0004020202020204" pitchFamily="34" charset="0"/>
+                        <a:cs typeface="Arial" panose="020B0604020202020204" pitchFamily="34" charset="0"/>
+                      </a:endParaRPr>
+                    </a:p>
+                  </a:txBody>
+                  <a:tcPr marL="68580" marR="68580" marT="0" marB="0"/>
+                </a:tc>
+                <a:extLst>
+                  <a:ext uri="{0D108BD9-81ED-4DB2-BD59-A6C34878D82A}">
+                    <a16:rowId xmlns:a16="http://schemas.microsoft.com/office/drawing/2014/main" val="127196094"/>
+                  </a:ext>
+                </a:extLst>
+              </a:tr>
+              <a:tr h="318325">
+                <a:tc>
+                  <a:txBody>
+                    <a:bodyPr/>
+                    <a:lstStyle/>
+                    <a:p>
+                      <a:pPr>
+                        <a:lnSpc>
+                          <a:spcPct val="115000"/>
+                        </a:lnSpc>
+                        <a:spcAft>
+                          <a:spcPts val="800"/>
+                        </a:spcAft>
+                        <a:buNone/>
+                      </a:pPr>
+                      <a:r>
+                        <a:rPr lang="en-IL" sz="1200" kern="100">
+                          <a:effectLst/>
+                        </a:rPr>
+                        <a:t>18</a:t>
+                      </a:r>
+                      <a:endParaRPr lang="en-IL" sz="1200" kern="100">
+                        <a:effectLst/>
+                        <a:latin typeface="Aptos" panose="020B0004020202020204" pitchFamily="34" charset="0"/>
+                        <a:ea typeface="Aptos" panose="020B0004020202020204" pitchFamily="34" charset="0"/>
+                        <a:cs typeface="Arial" panose="020B0604020202020204" pitchFamily="34" charset="0"/>
+                      </a:endParaRPr>
+                    </a:p>
+                  </a:txBody>
+                  <a:tcPr marL="68580" marR="68580" marT="0" marB="0"/>
+                </a:tc>
+                <a:tc>
+                  <a:txBody>
+                    <a:bodyPr/>
+                    <a:lstStyle/>
+                    <a:p>
+                      <a:pPr>
+                        <a:lnSpc>
+                          <a:spcPct val="115000"/>
+                        </a:lnSpc>
+                        <a:spcAft>
+                          <a:spcPts val="800"/>
+                        </a:spcAft>
+                        <a:buNone/>
+                      </a:pPr>
+                      <a:r>
+                        <a:rPr lang="en-IL" sz="1200" kern="100">
+                          <a:effectLst/>
+                        </a:rPr>
+                        <a:t>        ALUResult_debug</a:t>
+                      </a:r>
+                      <a:endParaRPr lang="en-IL" sz="1200" kern="100">
+                        <a:effectLst/>
+                        <a:latin typeface="Aptos" panose="020B0004020202020204" pitchFamily="34" charset="0"/>
+                        <a:ea typeface="Aptos" panose="020B0004020202020204" pitchFamily="34" charset="0"/>
+                        <a:cs typeface="Arial" panose="020B0604020202020204" pitchFamily="34" charset="0"/>
+                      </a:endParaRPr>
+                    </a:p>
+                  </a:txBody>
+                  <a:tcPr marL="68580" marR="68580" marT="0" marB="0"/>
+                </a:tc>
+                <a:tc>
+                  <a:txBody>
+                    <a:bodyPr/>
+                    <a:lstStyle/>
+                    <a:p>
+                      <a:pPr>
+                        <a:lnSpc>
+                          <a:spcPct val="115000"/>
+                        </a:lnSpc>
+                        <a:spcAft>
+                          <a:spcPts val="800"/>
+                        </a:spcAft>
+                        <a:buNone/>
+                      </a:pPr>
+                      <a:r>
+                        <a:rPr lang="en-IL" sz="1200" kern="100">
+                          <a:effectLst/>
+                        </a:rPr>
+                        <a:t>ALU result</a:t>
+                      </a:r>
+                      <a:endParaRPr lang="en-IL" sz="1200" kern="100">
+                        <a:effectLst/>
+                        <a:latin typeface="Aptos" panose="020B0004020202020204" pitchFamily="34" charset="0"/>
+                        <a:ea typeface="Aptos" panose="020B0004020202020204" pitchFamily="34" charset="0"/>
+                        <a:cs typeface="Arial" panose="020B0604020202020204" pitchFamily="34" charset="0"/>
+                      </a:endParaRPr>
+                    </a:p>
+                  </a:txBody>
+                  <a:tcPr marL="68580" marR="68580" marT="0" marB="0"/>
+                </a:tc>
+                <a:extLst>
+                  <a:ext uri="{0D108BD9-81ED-4DB2-BD59-A6C34878D82A}">
+                    <a16:rowId xmlns:a16="http://schemas.microsoft.com/office/drawing/2014/main" val="341708794"/>
+                  </a:ext>
+                </a:extLst>
+              </a:tr>
+              <a:tr h="318325">
+                <a:tc>
+                  <a:txBody>
+                    <a:bodyPr/>
+                    <a:lstStyle/>
+                    <a:p>
+                      <a:pPr>
+                        <a:lnSpc>
+                          <a:spcPct val="115000"/>
+                        </a:lnSpc>
+                        <a:spcAft>
+                          <a:spcPts val="800"/>
+                        </a:spcAft>
+                        <a:buNone/>
+                      </a:pPr>
+                      <a:r>
+                        <a:rPr lang="en-IL" sz="1200" kern="100">
+                          <a:effectLst/>
+                        </a:rPr>
+                        <a:t>19</a:t>
+                      </a:r>
+                      <a:endParaRPr lang="en-IL" sz="1200" kern="100">
+                        <a:effectLst/>
+                        <a:latin typeface="Aptos" panose="020B0004020202020204" pitchFamily="34" charset="0"/>
+                        <a:ea typeface="Aptos" panose="020B0004020202020204" pitchFamily="34" charset="0"/>
+                        <a:cs typeface="Arial" panose="020B0604020202020204" pitchFamily="34" charset="0"/>
+                      </a:endParaRPr>
+                    </a:p>
+                  </a:txBody>
+                  <a:tcPr marL="68580" marR="68580" marT="0" marB="0"/>
+                </a:tc>
+                <a:tc>
+                  <a:txBody>
+                    <a:bodyPr/>
+                    <a:lstStyle/>
+                    <a:p>
+                      <a:pPr>
+                        <a:lnSpc>
+                          <a:spcPct val="115000"/>
+                        </a:lnSpc>
+                        <a:spcAft>
+                          <a:spcPts val="800"/>
+                        </a:spcAft>
+                        <a:buNone/>
+                      </a:pPr>
+                      <a:r>
+                        <a:rPr lang="en-IL" sz="1200" kern="100">
+                          <a:effectLst/>
+                        </a:rPr>
+                        <a:t>        {28'b0, Operation}</a:t>
+                      </a:r>
+                      <a:endParaRPr lang="en-IL" sz="1200" kern="100">
+                        <a:effectLst/>
+                        <a:latin typeface="Aptos" panose="020B0004020202020204" pitchFamily="34" charset="0"/>
+                        <a:ea typeface="Aptos" panose="020B0004020202020204" pitchFamily="34" charset="0"/>
+                        <a:cs typeface="Arial" panose="020B0604020202020204" pitchFamily="34" charset="0"/>
+                      </a:endParaRPr>
+                    </a:p>
+                  </a:txBody>
+                  <a:tcPr marL="68580" marR="68580" marT="0" marB="0"/>
+                </a:tc>
+                <a:tc>
+                  <a:txBody>
+                    <a:bodyPr/>
+                    <a:lstStyle/>
+                    <a:p>
+                      <a:pPr>
+                        <a:lnSpc>
+                          <a:spcPct val="115000"/>
+                        </a:lnSpc>
+                        <a:spcAft>
+                          <a:spcPts val="800"/>
+                        </a:spcAft>
+                        <a:buNone/>
+                      </a:pPr>
+                      <a:r>
+                        <a:rPr lang="en-IL" sz="1200" kern="100">
+                          <a:effectLst/>
+                        </a:rPr>
+                        <a:t>ALU operation code (padded to 32 bits)</a:t>
+                      </a:r>
+                      <a:endParaRPr lang="en-IL" sz="1200" kern="100">
+                        <a:effectLst/>
+                        <a:latin typeface="Aptos" panose="020B0004020202020204" pitchFamily="34" charset="0"/>
+                        <a:ea typeface="Aptos" panose="020B0004020202020204" pitchFamily="34" charset="0"/>
+                        <a:cs typeface="Arial" panose="020B0604020202020204" pitchFamily="34" charset="0"/>
+                      </a:endParaRPr>
+                    </a:p>
+                  </a:txBody>
+                  <a:tcPr marL="68580" marR="68580" marT="0" marB="0"/>
+                </a:tc>
+                <a:extLst>
+                  <a:ext uri="{0D108BD9-81ED-4DB2-BD59-A6C34878D82A}">
+                    <a16:rowId xmlns:a16="http://schemas.microsoft.com/office/drawing/2014/main" val="3833009289"/>
+                  </a:ext>
+                </a:extLst>
+              </a:tr>
+              <a:tr h="318325">
+                <a:tc>
+                  <a:txBody>
+                    <a:bodyPr/>
+                    <a:lstStyle/>
+                    <a:p>
+                      <a:pPr>
+                        <a:lnSpc>
+                          <a:spcPct val="115000"/>
+                        </a:lnSpc>
+                        <a:spcAft>
+                          <a:spcPts val="800"/>
+                        </a:spcAft>
+                        <a:buNone/>
+                      </a:pPr>
+                      <a:r>
+                        <a:rPr lang="en-IL" sz="1200" kern="100">
+                          <a:effectLst/>
+                        </a:rPr>
+                        <a:t>20</a:t>
+                      </a:r>
+                      <a:endParaRPr lang="en-IL" sz="1200" kern="100">
+                        <a:effectLst/>
+                        <a:latin typeface="Aptos" panose="020B0004020202020204" pitchFamily="34" charset="0"/>
+                        <a:ea typeface="Aptos" panose="020B0004020202020204" pitchFamily="34" charset="0"/>
+                        <a:cs typeface="Arial" panose="020B0604020202020204" pitchFamily="34" charset="0"/>
+                      </a:endParaRPr>
+                    </a:p>
+                  </a:txBody>
+                  <a:tcPr marL="68580" marR="68580" marT="0" marB="0"/>
+                </a:tc>
+                <a:tc>
+                  <a:txBody>
+                    <a:bodyPr/>
+                    <a:lstStyle/>
+                    <a:p>
+                      <a:pPr>
+                        <a:lnSpc>
+                          <a:spcPct val="115000"/>
+                        </a:lnSpc>
+                        <a:spcAft>
+                          <a:spcPts val="800"/>
+                        </a:spcAft>
+                        <a:buNone/>
+                      </a:pPr>
+                      <a:r>
+                        <a:rPr lang="en-IL" sz="1200" kern="100">
+                          <a:effectLst/>
+                        </a:rPr>
+                        <a:t>        {23'b0, addr}</a:t>
+                      </a:r>
+                      <a:endParaRPr lang="en-IL" sz="1200" kern="100">
+                        <a:effectLst/>
+                        <a:latin typeface="Aptos" panose="020B0004020202020204" pitchFamily="34" charset="0"/>
+                        <a:ea typeface="Aptos" panose="020B0004020202020204" pitchFamily="34" charset="0"/>
+                        <a:cs typeface="Arial" panose="020B0604020202020204" pitchFamily="34" charset="0"/>
+                      </a:endParaRPr>
+                    </a:p>
+                  </a:txBody>
+                  <a:tcPr marL="68580" marR="68580" marT="0" marB="0"/>
+                </a:tc>
+                <a:tc>
+                  <a:txBody>
+                    <a:bodyPr/>
+                    <a:lstStyle/>
+                    <a:p>
+                      <a:pPr>
+                        <a:lnSpc>
+                          <a:spcPct val="115000"/>
+                        </a:lnSpc>
+                        <a:spcAft>
+                          <a:spcPts val="800"/>
+                        </a:spcAft>
+                        <a:buNone/>
+                      </a:pPr>
+                      <a:r>
+                        <a:rPr lang="en-IL" sz="1200" kern="100">
+                          <a:effectLst/>
+                        </a:rPr>
+                        <a:t>Memory address (padded to 32 bits)</a:t>
+                      </a:r>
+                      <a:endParaRPr lang="en-IL" sz="1200" kern="100">
+                        <a:effectLst/>
+                        <a:latin typeface="Aptos" panose="020B0004020202020204" pitchFamily="34" charset="0"/>
+                        <a:ea typeface="Aptos" panose="020B0004020202020204" pitchFamily="34" charset="0"/>
+                        <a:cs typeface="Arial" panose="020B0604020202020204" pitchFamily="34" charset="0"/>
+                      </a:endParaRPr>
+                    </a:p>
+                  </a:txBody>
+                  <a:tcPr marL="68580" marR="68580" marT="0" marB="0"/>
+                </a:tc>
+                <a:extLst>
+                  <a:ext uri="{0D108BD9-81ED-4DB2-BD59-A6C34878D82A}">
+                    <a16:rowId xmlns:a16="http://schemas.microsoft.com/office/drawing/2014/main" val="253475164"/>
+                  </a:ext>
+                </a:extLst>
+              </a:tr>
+              <a:tr h="318325">
+                <a:tc>
+                  <a:txBody>
+                    <a:bodyPr/>
+                    <a:lstStyle/>
+                    <a:p>
+                      <a:pPr>
+                        <a:lnSpc>
+                          <a:spcPct val="115000"/>
+                        </a:lnSpc>
+                        <a:spcAft>
+                          <a:spcPts val="800"/>
+                        </a:spcAft>
+                        <a:buNone/>
+                      </a:pPr>
+                      <a:r>
+                        <a:rPr lang="en-IL" sz="1200" kern="100">
+                          <a:effectLst/>
+                        </a:rPr>
+                        <a:t>21</a:t>
+                      </a:r>
+                      <a:endParaRPr lang="en-IL" sz="1200" kern="100">
+                        <a:effectLst/>
+                        <a:latin typeface="Aptos" panose="020B0004020202020204" pitchFamily="34" charset="0"/>
+                        <a:ea typeface="Aptos" panose="020B0004020202020204" pitchFamily="34" charset="0"/>
+                        <a:cs typeface="Arial" panose="020B0604020202020204" pitchFamily="34" charset="0"/>
+                      </a:endParaRPr>
+                    </a:p>
+                  </a:txBody>
+                  <a:tcPr marL="68580" marR="68580" marT="0" marB="0"/>
+                </a:tc>
+                <a:tc>
+                  <a:txBody>
+                    <a:bodyPr/>
+                    <a:lstStyle/>
+                    <a:p>
+                      <a:pPr>
+                        <a:lnSpc>
+                          <a:spcPct val="115000"/>
+                        </a:lnSpc>
+                        <a:spcAft>
+                          <a:spcPts val="800"/>
+                        </a:spcAft>
+                        <a:buNone/>
+                      </a:pPr>
+                      <a:r>
+                        <a:rPr lang="en-IL" sz="1200" kern="100">
+                          <a:effectLst/>
+                        </a:rPr>
+                        <a:t>        wr_data</a:t>
+                      </a:r>
+                      <a:endParaRPr lang="en-IL" sz="1200" kern="100">
+                        <a:effectLst/>
+                        <a:latin typeface="Aptos" panose="020B0004020202020204" pitchFamily="34" charset="0"/>
+                        <a:ea typeface="Aptos" panose="020B0004020202020204" pitchFamily="34" charset="0"/>
+                        <a:cs typeface="Arial" panose="020B0604020202020204" pitchFamily="34" charset="0"/>
+                      </a:endParaRPr>
+                    </a:p>
+                  </a:txBody>
+                  <a:tcPr marL="68580" marR="68580" marT="0" marB="0"/>
+                </a:tc>
+                <a:tc>
+                  <a:txBody>
+                    <a:bodyPr/>
+                    <a:lstStyle/>
+                    <a:p>
+                      <a:pPr>
+                        <a:lnSpc>
+                          <a:spcPct val="115000"/>
+                        </a:lnSpc>
+                        <a:spcAft>
+                          <a:spcPts val="800"/>
+                        </a:spcAft>
+                        <a:buNone/>
+                      </a:pPr>
+                      <a:r>
+                        <a:rPr lang="en-IL" sz="1200" kern="100">
+                          <a:effectLst/>
+                        </a:rPr>
+                        <a:t>Data written to memory</a:t>
+                      </a:r>
+                      <a:endParaRPr lang="en-IL" sz="1200" kern="100">
+                        <a:effectLst/>
+                        <a:latin typeface="Aptos" panose="020B0004020202020204" pitchFamily="34" charset="0"/>
+                        <a:ea typeface="Aptos" panose="020B0004020202020204" pitchFamily="34" charset="0"/>
+                        <a:cs typeface="Arial" panose="020B0604020202020204" pitchFamily="34" charset="0"/>
+                      </a:endParaRPr>
+                    </a:p>
+                  </a:txBody>
+                  <a:tcPr marL="68580" marR="68580" marT="0" marB="0"/>
+                </a:tc>
+                <a:extLst>
+                  <a:ext uri="{0D108BD9-81ED-4DB2-BD59-A6C34878D82A}">
+                    <a16:rowId xmlns:a16="http://schemas.microsoft.com/office/drawing/2014/main" val="3850429458"/>
+                  </a:ext>
+                </a:extLst>
+              </a:tr>
+              <a:tr h="318325">
+                <a:tc>
+                  <a:txBody>
+                    <a:bodyPr/>
+                    <a:lstStyle/>
+                    <a:p>
+                      <a:pPr>
+                        <a:lnSpc>
+                          <a:spcPct val="115000"/>
+                        </a:lnSpc>
+                        <a:spcAft>
+                          <a:spcPts val="800"/>
+                        </a:spcAft>
+                        <a:buNone/>
+                      </a:pPr>
+                      <a:r>
+                        <a:rPr lang="en-IL" sz="1200" kern="100">
+                          <a:effectLst/>
+                        </a:rPr>
+                        <a:t>22</a:t>
+                      </a:r>
+                      <a:endParaRPr lang="en-IL" sz="1200" kern="100">
+                        <a:effectLst/>
+                        <a:latin typeface="Aptos" panose="020B0004020202020204" pitchFamily="34" charset="0"/>
+                        <a:ea typeface="Aptos" panose="020B0004020202020204" pitchFamily="34" charset="0"/>
+                        <a:cs typeface="Arial" panose="020B0604020202020204" pitchFamily="34" charset="0"/>
+                      </a:endParaRPr>
+                    </a:p>
+                  </a:txBody>
+                  <a:tcPr marL="68580" marR="68580" marT="0" marB="0"/>
+                </a:tc>
+                <a:tc>
+                  <a:txBody>
+                    <a:bodyPr/>
+                    <a:lstStyle/>
+                    <a:p>
+                      <a:pPr>
+                        <a:lnSpc>
+                          <a:spcPct val="115000"/>
+                        </a:lnSpc>
+                        <a:spcAft>
+                          <a:spcPts val="800"/>
+                        </a:spcAft>
+                        <a:buNone/>
+                      </a:pPr>
+                      <a:r>
+                        <a:rPr lang="en-IL" sz="1200" kern="100">
+                          <a:effectLst/>
+                        </a:rPr>
+                        <a:t>        rd_data</a:t>
+                      </a:r>
+                      <a:endParaRPr lang="en-IL" sz="1200" kern="100">
+                        <a:effectLst/>
+                        <a:latin typeface="Aptos" panose="020B0004020202020204" pitchFamily="34" charset="0"/>
+                        <a:ea typeface="Aptos" panose="020B0004020202020204" pitchFamily="34" charset="0"/>
+                        <a:cs typeface="Arial" panose="020B0604020202020204" pitchFamily="34" charset="0"/>
+                      </a:endParaRPr>
+                    </a:p>
+                  </a:txBody>
+                  <a:tcPr marL="68580" marR="68580" marT="0" marB="0"/>
+                </a:tc>
+                <a:tc>
+                  <a:txBody>
+                    <a:bodyPr/>
+                    <a:lstStyle/>
+                    <a:p>
+                      <a:pPr>
+                        <a:lnSpc>
+                          <a:spcPct val="115000"/>
+                        </a:lnSpc>
+                        <a:spcAft>
+                          <a:spcPts val="800"/>
+                        </a:spcAft>
+                        <a:buNone/>
+                      </a:pPr>
+                      <a:r>
+                        <a:rPr lang="en-IL" sz="1200" kern="100">
+                          <a:effectLst/>
+                        </a:rPr>
+                        <a:t>Data read from memory</a:t>
+                      </a:r>
+                      <a:endParaRPr lang="en-IL" sz="1200" kern="100">
+                        <a:effectLst/>
+                        <a:latin typeface="Aptos" panose="020B0004020202020204" pitchFamily="34" charset="0"/>
+                        <a:ea typeface="Aptos" panose="020B0004020202020204" pitchFamily="34" charset="0"/>
+                        <a:cs typeface="Arial" panose="020B0604020202020204" pitchFamily="34" charset="0"/>
+                      </a:endParaRPr>
+                    </a:p>
+                  </a:txBody>
+                  <a:tcPr marL="68580" marR="68580" marT="0" marB="0"/>
+                </a:tc>
+                <a:extLst>
+                  <a:ext uri="{0D108BD9-81ED-4DB2-BD59-A6C34878D82A}">
+                    <a16:rowId xmlns:a16="http://schemas.microsoft.com/office/drawing/2014/main" val="1536025911"/>
+                  </a:ext>
+                </a:extLst>
+              </a:tr>
+              <a:tr h="653233">
+                <a:tc>
+                  <a:txBody>
+                    <a:bodyPr/>
+                    <a:lstStyle/>
+                    <a:p>
+                      <a:pPr>
+                        <a:lnSpc>
+                          <a:spcPct val="115000"/>
+                        </a:lnSpc>
+                        <a:spcAft>
+                          <a:spcPts val="800"/>
+                        </a:spcAft>
+                        <a:buNone/>
+                      </a:pPr>
+                      <a:r>
+                        <a:rPr lang="en-IL" sz="1200" kern="100">
+                          <a:effectLst/>
+                        </a:rPr>
+                        <a:t>23</a:t>
+                      </a:r>
+                      <a:endParaRPr lang="en-IL" sz="1200" kern="100">
+                        <a:effectLst/>
+                        <a:latin typeface="Aptos" panose="020B0004020202020204" pitchFamily="34" charset="0"/>
+                        <a:ea typeface="Aptos" panose="020B0004020202020204" pitchFamily="34" charset="0"/>
+                        <a:cs typeface="Arial" panose="020B0604020202020204" pitchFamily="34" charset="0"/>
+                      </a:endParaRPr>
+                    </a:p>
+                  </a:txBody>
+                  <a:tcPr marL="68580" marR="68580" marT="0" marB="0"/>
+                </a:tc>
+                <a:tc>
+                  <a:txBody>
+                    <a:bodyPr/>
+                    <a:lstStyle/>
+                    <a:p>
+                      <a:pPr>
+                        <a:lnSpc>
+                          <a:spcPct val="115000"/>
+                        </a:lnSpc>
+                        <a:spcAft>
+                          <a:spcPts val="800"/>
+                        </a:spcAft>
+                        <a:buNone/>
+                      </a:pPr>
+                      <a:r>
+                        <a:rPr lang="en-IL" sz="1200" kern="100">
+                          <a:effectLst/>
+                        </a:rPr>
+                        <a:t>        {31'b0, wr}</a:t>
+                      </a:r>
+                      <a:endParaRPr lang="en-IL" sz="1200" kern="100">
+                        <a:effectLst/>
+                        <a:latin typeface="Aptos" panose="020B0004020202020204" pitchFamily="34" charset="0"/>
+                        <a:ea typeface="Aptos" panose="020B0004020202020204" pitchFamily="34" charset="0"/>
+                        <a:cs typeface="Arial" panose="020B0604020202020204" pitchFamily="34" charset="0"/>
+                      </a:endParaRPr>
+                    </a:p>
+                  </a:txBody>
+                  <a:tcPr marL="68580" marR="68580" marT="0" marB="0"/>
+                </a:tc>
+                <a:tc>
+                  <a:txBody>
+                    <a:bodyPr/>
+                    <a:lstStyle/>
+                    <a:p>
+                      <a:pPr>
+                        <a:lnSpc>
+                          <a:spcPct val="115000"/>
+                        </a:lnSpc>
+                        <a:spcAft>
+                          <a:spcPts val="800"/>
+                        </a:spcAft>
+                        <a:buNone/>
+                      </a:pPr>
+                      <a:r>
+                        <a:rPr lang="en-IL" sz="1200" kern="100">
+                          <a:effectLst/>
+                        </a:rPr>
+                        <a:t>Register written to number (padded to 32 bits)</a:t>
+                      </a:r>
+                      <a:endParaRPr lang="en-IL" sz="1200" kern="100">
+                        <a:effectLst/>
+                        <a:latin typeface="Aptos" panose="020B0004020202020204" pitchFamily="34" charset="0"/>
+                        <a:ea typeface="Aptos" panose="020B0004020202020204" pitchFamily="34" charset="0"/>
+                        <a:cs typeface="Arial" panose="020B0604020202020204" pitchFamily="34" charset="0"/>
+                      </a:endParaRPr>
+                    </a:p>
+                  </a:txBody>
+                  <a:tcPr marL="68580" marR="68580" marT="0" marB="0"/>
+                </a:tc>
+                <a:extLst>
+                  <a:ext uri="{0D108BD9-81ED-4DB2-BD59-A6C34878D82A}">
+                    <a16:rowId xmlns:a16="http://schemas.microsoft.com/office/drawing/2014/main" val="2287667421"/>
+                  </a:ext>
+                </a:extLst>
+              </a:tr>
+              <a:tr h="653233">
+                <a:tc>
+                  <a:txBody>
+                    <a:bodyPr/>
+                    <a:lstStyle/>
+                    <a:p>
+                      <a:pPr>
+                        <a:lnSpc>
+                          <a:spcPct val="115000"/>
+                        </a:lnSpc>
+                        <a:spcAft>
+                          <a:spcPts val="800"/>
+                        </a:spcAft>
+                        <a:buNone/>
+                      </a:pPr>
+                      <a:r>
+                        <a:rPr lang="en-IL" sz="1200" kern="100">
+                          <a:effectLst/>
+                        </a:rPr>
+                        <a:t>24</a:t>
+                      </a:r>
+                      <a:endParaRPr lang="en-IL" sz="1200" kern="100">
+                        <a:effectLst/>
+                        <a:latin typeface="Aptos" panose="020B0004020202020204" pitchFamily="34" charset="0"/>
+                        <a:ea typeface="Aptos" panose="020B0004020202020204" pitchFamily="34" charset="0"/>
+                        <a:cs typeface="Arial" panose="020B0604020202020204" pitchFamily="34" charset="0"/>
+                      </a:endParaRPr>
+                    </a:p>
+                  </a:txBody>
+                  <a:tcPr marL="68580" marR="68580" marT="0" marB="0"/>
+                </a:tc>
+                <a:tc>
+                  <a:txBody>
+                    <a:bodyPr/>
+                    <a:lstStyle/>
+                    <a:p>
+                      <a:pPr>
+                        <a:lnSpc>
+                          <a:spcPct val="115000"/>
+                        </a:lnSpc>
+                        <a:spcAft>
+                          <a:spcPts val="800"/>
+                        </a:spcAft>
+                        <a:buNone/>
+                      </a:pPr>
+                      <a:r>
+                        <a:rPr lang="en-IL" sz="1200" kern="100">
+                          <a:effectLst/>
+                        </a:rPr>
+                        <a:t>        {31'b0, rd}</a:t>
+                      </a:r>
+                      <a:endParaRPr lang="en-IL" sz="1200" kern="100">
+                        <a:effectLst/>
+                        <a:latin typeface="Aptos" panose="020B0004020202020204" pitchFamily="34" charset="0"/>
+                        <a:ea typeface="Aptos" panose="020B0004020202020204" pitchFamily="34" charset="0"/>
+                        <a:cs typeface="Arial" panose="020B0604020202020204" pitchFamily="34" charset="0"/>
+                      </a:endParaRPr>
+                    </a:p>
+                  </a:txBody>
+                  <a:tcPr marL="68580" marR="68580" marT="0" marB="0"/>
+                </a:tc>
+                <a:tc>
+                  <a:txBody>
+                    <a:bodyPr/>
+                    <a:lstStyle/>
+                    <a:p>
+                      <a:pPr>
+                        <a:lnSpc>
+                          <a:spcPct val="115000"/>
+                        </a:lnSpc>
+                        <a:spcAft>
+                          <a:spcPts val="800"/>
+                        </a:spcAft>
+                        <a:buNone/>
+                      </a:pPr>
+                      <a:r>
+                        <a:rPr lang="en-IL" sz="1200" kern="100">
+                          <a:effectLst/>
+                        </a:rPr>
+                        <a:t>Register read from number (padded to 32 bits)</a:t>
+                      </a:r>
+                      <a:endParaRPr lang="en-IL" sz="1200" kern="100">
+                        <a:effectLst/>
+                        <a:latin typeface="Aptos" panose="020B0004020202020204" pitchFamily="34" charset="0"/>
+                        <a:ea typeface="Aptos" panose="020B0004020202020204" pitchFamily="34" charset="0"/>
+                        <a:cs typeface="Arial" panose="020B0604020202020204" pitchFamily="34" charset="0"/>
+                      </a:endParaRPr>
+                    </a:p>
+                  </a:txBody>
+                  <a:tcPr marL="68580" marR="68580" marT="0" marB="0"/>
+                </a:tc>
+                <a:extLst>
+                  <a:ext uri="{0D108BD9-81ED-4DB2-BD59-A6C34878D82A}">
+                    <a16:rowId xmlns:a16="http://schemas.microsoft.com/office/drawing/2014/main" val="2589831575"/>
+                  </a:ext>
+                </a:extLst>
+              </a:tr>
+              <a:tr h="318325">
+                <a:tc>
+                  <a:txBody>
+                    <a:bodyPr/>
+                    <a:lstStyle/>
+                    <a:p>
+                      <a:pPr>
+                        <a:lnSpc>
+                          <a:spcPct val="115000"/>
+                        </a:lnSpc>
+                        <a:spcAft>
+                          <a:spcPts val="800"/>
+                        </a:spcAft>
+                        <a:buNone/>
+                      </a:pPr>
+                      <a:r>
+                        <a:rPr lang="en-IL" sz="1200" kern="100">
+                          <a:effectLst/>
+                        </a:rPr>
+                        <a:t>25</a:t>
+                      </a:r>
+                      <a:endParaRPr lang="en-IL" sz="1200" kern="100">
+                        <a:effectLst/>
+                        <a:latin typeface="Aptos" panose="020B0004020202020204" pitchFamily="34" charset="0"/>
+                        <a:ea typeface="Aptos" panose="020B0004020202020204" pitchFamily="34" charset="0"/>
+                        <a:cs typeface="Arial" panose="020B0604020202020204" pitchFamily="34" charset="0"/>
+                      </a:endParaRPr>
+                    </a:p>
+                  </a:txBody>
+                  <a:tcPr marL="68580" marR="68580" marT="0" marB="0"/>
+                </a:tc>
+                <a:tc>
+                  <a:txBody>
+                    <a:bodyPr/>
+                    <a:lstStyle/>
+                    <a:p>
+                      <a:pPr>
+                        <a:lnSpc>
+                          <a:spcPct val="115000"/>
+                        </a:lnSpc>
+                        <a:spcAft>
+                          <a:spcPts val="800"/>
+                        </a:spcAft>
+                        <a:buNone/>
+                      </a:pPr>
+                      <a:r>
+                        <a:rPr lang="en-IL" sz="1200" kern="100">
+                          <a:effectLst/>
+                        </a:rPr>
+                        <a:t>        {27'b0, reg_num}</a:t>
+                      </a:r>
+                      <a:endParaRPr lang="en-IL" sz="1200" kern="100">
+                        <a:effectLst/>
+                        <a:latin typeface="Aptos" panose="020B0004020202020204" pitchFamily="34" charset="0"/>
+                        <a:ea typeface="Aptos" panose="020B0004020202020204" pitchFamily="34" charset="0"/>
+                        <a:cs typeface="Arial" panose="020B0604020202020204" pitchFamily="34" charset="0"/>
+                      </a:endParaRPr>
+                    </a:p>
+                  </a:txBody>
+                  <a:tcPr marL="68580" marR="68580" marT="0" marB="0"/>
+                </a:tc>
+                <a:tc>
+                  <a:txBody>
+                    <a:bodyPr/>
+                    <a:lstStyle/>
+                    <a:p>
+                      <a:pPr>
+                        <a:lnSpc>
+                          <a:spcPct val="115000"/>
+                        </a:lnSpc>
+                        <a:spcAft>
+                          <a:spcPts val="800"/>
+                        </a:spcAft>
+                        <a:buNone/>
+                      </a:pPr>
+                      <a:r>
+                        <a:rPr lang="en-IL" sz="1200" kern="100">
+                          <a:effectLst/>
+                        </a:rPr>
+                        <a:t>Register number (padded to 32 bits)</a:t>
+                      </a:r>
+                      <a:endParaRPr lang="en-IL" sz="1200" kern="100">
+                        <a:effectLst/>
+                        <a:latin typeface="Aptos" panose="020B0004020202020204" pitchFamily="34" charset="0"/>
+                        <a:ea typeface="Aptos" panose="020B0004020202020204" pitchFamily="34" charset="0"/>
+                        <a:cs typeface="Arial" panose="020B0604020202020204" pitchFamily="34" charset="0"/>
+                      </a:endParaRPr>
+                    </a:p>
+                  </a:txBody>
+                  <a:tcPr marL="68580" marR="68580" marT="0" marB="0"/>
+                </a:tc>
+                <a:extLst>
+                  <a:ext uri="{0D108BD9-81ED-4DB2-BD59-A6C34878D82A}">
+                    <a16:rowId xmlns:a16="http://schemas.microsoft.com/office/drawing/2014/main" val="1035189743"/>
+                  </a:ext>
+                </a:extLst>
+              </a:tr>
+              <a:tr h="318325">
+                <a:tc>
+                  <a:txBody>
+                    <a:bodyPr/>
+                    <a:lstStyle/>
+                    <a:p>
+                      <a:pPr>
+                        <a:lnSpc>
+                          <a:spcPct val="115000"/>
+                        </a:lnSpc>
+                        <a:spcAft>
+                          <a:spcPts val="800"/>
+                        </a:spcAft>
+                        <a:buNone/>
+                      </a:pPr>
+                      <a:r>
+                        <a:rPr lang="en-IL" sz="1200" kern="100">
+                          <a:effectLst/>
+                        </a:rPr>
+                        <a:t>26</a:t>
+                      </a:r>
+                      <a:endParaRPr lang="en-IL" sz="1200" kern="100">
+                        <a:effectLst/>
+                        <a:latin typeface="Aptos" panose="020B0004020202020204" pitchFamily="34" charset="0"/>
+                        <a:ea typeface="Aptos" panose="020B0004020202020204" pitchFamily="34" charset="0"/>
+                        <a:cs typeface="Arial" panose="020B0604020202020204" pitchFamily="34" charset="0"/>
+                      </a:endParaRPr>
+                    </a:p>
+                  </a:txBody>
+                  <a:tcPr marL="68580" marR="68580" marT="0" marB="0"/>
+                </a:tc>
+                <a:tc>
+                  <a:txBody>
+                    <a:bodyPr/>
+                    <a:lstStyle/>
+                    <a:p>
+                      <a:pPr>
+                        <a:lnSpc>
+                          <a:spcPct val="115000"/>
+                        </a:lnSpc>
+                        <a:spcAft>
+                          <a:spcPts val="800"/>
+                        </a:spcAft>
+                        <a:buNone/>
+                      </a:pPr>
+                      <a:r>
+                        <a:rPr lang="en-IL" sz="1200" kern="100">
+                          <a:effectLst/>
+                        </a:rPr>
+                        <a:t>        reg_data</a:t>
+                      </a:r>
+                      <a:endParaRPr lang="en-IL" sz="1200" kern="100">
+                        <a:effectLst/>
+                        <a:latin typeface="Aptos" panose="020B0004020202020204" pitchFamily="34" charset="0"/>
+                        <a:ea typeface="Aptos" panose="020B0004020202020204" pitchFamily="34" charset="0"/>
+                        <a:cs typeface="Arial" panose="020B0604020202020204" pitchFamily="34" charset="0"/>
+                      </a:endParaRPr>
+                    </a:p>
+                  </a:txBody>
+                  <a:tcPr marL="68580" marR="68580" marT="0" marB="0"/>
+                </a:tc>
+                <a:tc>
+                  <a:txBody>
+                    <a:bodyPr/>
+                    <a:lstStyle/>
+                    <a:p>
+                      <a:pPr>
+                        <a:lnSpc>
+                          <a:spcPct val="115000"/>
+                        </a:lnSpc>
+                        <a:spcAft>
+                          <a:spcPts val="800"/>
+                        </a:spcAft>
+                        <a:buNone/>
+                      </a:pPr>
+                      <a:r>
+                        <a:rPr lang="en-IL" sz="1200" kern="100">
+                          <a:effectLst/>
+                        </a:rPr>
+                        <a:t>Data read from register</a:t>
+                      </a:r>
+                      <a:endParaRPr lang="en-IL" sz="1200" kern="100">
+                        <a:effectLst/>
+                        <a:latin typeface="Aptos" panose="020B0004020202020204" pitchFamily="34" charset="0"/>
+                        <a:ea typeface="Aptos" panose="020B0004020202020204" pitchFamily="34" charset="0"/>
+                        <a:cs typeface="Arial" panose="020B0604020202020204" pitchFamily="34" charset="0"/>
+                      </a:endParaRPr>
+                    </a:p>
+                  </a:txBody>
+                  <a:tcPr marL="68580" marR="68580" marT="0" marB="0"/>
+                </a:tc>
+                <a:extLst>
+                  <a:ext uri="{0D108BD9-81ED-4DB2-BD59-A6C34878D82A}">
+                    <a16:rowId xmlns:a16="http://schemas.microsoft.com/office/drawing/2014/main" val="3211054036"/>
+                  </a:ext>
+                </a:extLst>
+              </a:tr>
+              <a:tr h="653233">
+                <a:tc>
+                  <a:txBody>
+                    <a:bodyPr/>
+                    <a:lstStyle/>
+                    <a:p>
+                      <a:pPr>
+                        <a:lnSpc>
+                          <a:spcPct val="115000"/>
+                        </a:lnSpc>
+                        <a:spcAft>
+                          <a:spcPts val="800"/>
+                        </a:spcAft>
+                        <a:buNone/>
+                      </a:pPr>
+                      <a:r>
+                        <a:rPr lang="en-IL" sz="1200" kern="100">
+                          <a:effectLst/>
+                        </a:rPr>
+                        <a:t>27</a:t>
+                      </a:r>
+                      <a:endParaRPr lang="en-IL" sz="1200" kern="100">
+                        <a:effectLst/>
+                        <a:latin typeface="Aptos" panose="020B0004020202020204" pitchFamily="34" charset="0"/>
+                        <a:ea typeface="Aptos" panose="020B0004020202020204" pitchFamily="34" charset="0"/>
+                        <a:cs typeface="Arial" panose="020B0604020202020204" pitchFamily="34" charset="0"/>
+                      </a:endParaRPr>
+                    </a:p>
+                  </a:txBody>
+                  <a:tcPr marL="68580" marR="68580" marT="0" marB="0"/>
+                </a:tc>
+                <a:tc>
+                  <a:txBody>
+                    <a:bodyPr/>
+                    <a:lstStyle/>
+                    <a:p>
+                      <a:pPr>
+                        <a:lnSpc>
+                          <a:spcPct val="115000"/>
+                        </a:lnSpc>
+                        <a:spcAft>
+                          <a:spcPts val="800"/>
+                        </a:spcAft>
+                        <a:buNone/>
+                      </a:pPr>
+                      <a:r>
+                        <a:rPr lang="en-IL" sz="1200" kern="100">
+                          <a:effectLst/>
+                        </a:rPr>
+                        <a:t>        {31'b0, reg_write_sig}</a:t>
+                      </a:r>
+                      <a:endParaRPr lang="en-IL" sz="1200" kern="100">
+                        <a:effectLst/>
+                        <a:latin typeface="Aptos" panose="020B0004020202020204" pitchFamily="34" charset="0"/>
+                        <a:ea typeface="Aptos" panose="020B0004020202020204" pitchFamily="34" charset="0"/>
+                        <a:cs typeface="Arial" panose="020B0604020202020204" pitchFamily="34" charset="0"/>
+                      </a:endParaRPr>
+                    </a:p>
+                  </a:txBody>
+                  <a:tcPr marL="68580" marR="68580" marT="0" marB="0"/>
+                </a:tc>
+                <a:tc>
+                  <a:txBody>
+                    <a:bodyPr/>
+                    <a:lstStyle/>
+                    <a:p>
+                      <a:pPr>
+                        <a:lnSpc>
+                          <a:spcPct val="115000"/>
+                        </a:lnSpc>
+                        <a:spcAft>
+                          <a:spcPts val="800"/>
+                        </a:spcAft>
+                        <a:buNone/>
+                      </a:pPr>
+                      <a:r>
+                        <a:rPr lang="en-IL" sz="1200" kern="100">
+                          <a:effectLst/>
+                        </a:rPr>
+                        <a:t>Register writes enable signal (padded to 32 bits)</a:t>
+                      </a:r>
+                      <a:endParaRPr lang="en-IL" sz="1200" kern="100">
+                        <a:effectLst/>
+                        <a:latin typeface="Aptos" panose="020B0004020202020204" pitchFamily="34" charset="0"/>
+                        <a:ea typeface="Aptos" panose="020B0004020202020204" pitchFamily="34" charset="0"/>
+                        <a:cs typeface="Arial" panose="020B0604020202020204" pitchFamily="34" charset="0"/>
+                      </a:endParaRPr>
+                    </a:p>
+                  </a:txBody>
+                  <a:tcPr marL="68580" marR="68580" marT="0" marB="0"/>
+                </a:tc>
+                <a:extLst>
+                  <a:ext uri="{0D108BD9-81ED-4DB2-BD59-A6C34878D82A}">
+                    <a16:rowId xmlns:a16="http://schemas.microsoft.com/office/drawing/2014/main" val="2189144247"/>
+                  </a:ext>
+                </a:extLst>
+              </a:tr>
+              <a:tr h="318325">
+                <a:tc>
+                  <a:txBody>
+                    <a:bodyPr/>
+                    <a:lstStyle/>
+                    <a:p>
+                      <a:pPr>
+                        <a:lnSpc>
+                          <a:spcPct val="115000"/>
+                        </a:lnSpc>
+                        <a:spcAft>
+                          <a:spcPts val="800"/>
+                        </a:spcAft>
+                        <a:buNone/>
+                      </a:pPr>
+                      <a:r>
+                        <a:rPr lang="en-IL" sz="1200" kern="100">
+                          <a:effectLst/>
+                        </a:rPr>
+                        <a:t>28</a:t>
+                      </a:r>
+                      <a:endParaRPr lang="en-IL" sz="1200" kern="100">
+                        <a:effectLst/>
+                        <a:latin typeface="Aptos" panose="020B0004020202020204" pitchFamily="34" charset="0"/>
+                        <a:ea typeface="Aptos" panose="020B0004020202020204" pitchFamily="34" charset="0"/>
+                        <a:cs typeface="Arial" panose="020B0604020202020204" pitchFamily="34" charset="0"/>
+                      </a:endParaRPr>
+                    </a:p>
+                  </a:txBody>
+                  <a:tcPr marL="68580" marR="68580" marT="0" marB="0"/>
+                </a:tc>
+                <a:tc>
+                  <a:txBody>
+                    <a:bodyPr/>
+                    <a:lstStyle/>
+                    <a:p>
+                      <a:pPr>
+                        <a:lnSpc>
+                          <a:spcPct val="115000"/>
+                        </a:lnSpc>
+                        <a:spcAft>
+                          <a:spcPts val="800"/>
+                        </a:spcAft>
+                        <a:buNone/>
+                      </a:pPr>
+                      <a:r>
+                        <a:rPr lang="en-IL" sz="1200" kern="100" dirty="0">
+                          <a:effectLst/>
+                        </a:rPr>
+                        <a:t>        </a:t>
+                      </a:r>
+                      <a:r>
+                        <a:rPr lang="en-IL" sz="1200" kern="100" dirty="0" err="1">
+                          <a:effectLst/>
+                        </a:rPr>
+                        <a:t>WB_Data</a:t>
+                      </a:r>
+                      <a:endParaRPr lang="en-IL" sz="1200" kern="100" dirty="0">
+                        <a:effectLst/>
+                        <a:latin typeface="Aptos" panose="020B0004020202020204" pitchFamily="34" charset="0"/>
+                        <a:ea typeface="Aptos" panose="020B0004020202020204" pitchFamily="34" charset="0"/>
+                        <a:cs typeface="Arial" panose="020B0604020202020204" pitchFamily="34" charset="0"/>
+                      </a:endParaRPr>
+                    </a:p>
+                  </a:txBody>
+                  <a:tcPr marL="68580" marR="68580" marT="0" marB="0"/>
+                </a:tc>
+                <a:tc>
+                  <a:txBody>
+                    <a:bodyPr/>
+                    <a:lstStyle/>
+                    <a:p>
+                      <a:pPr>
+                        <a:lnSpc>
+                          <a:spcPct val="115000"/>
+                        </a:lnSpc>
+                        <a:spcAft>
+                          <a:spcPts val="800"/>
+                        </a:spcAft>
+                        <a:buNone/>
+                      </a:pPr>
+                      <a:r>
+                        <a:rPr lang="en-IL" sz="1200" kern="100" dirty="0">
+                          <a:effectLst/>
+                        </a:rPr>
+                        <a:t>Write-back data</a:t>
+                      </a:r>
+                      <a:endParaRPr lang="en-IL" sz="1200" kern="100" dirty="0">
+                        <a:effectLst/>
+                        <a:latin typeface="Aptos" panose="020B0004020202020204" pitchFamily="34" charset="0"/>
+                        <a:ea typeface="Aptos" panose="020B0004020202020204" pitchFamily="34" charset="0"/>
+                        <a:cs typeface="Arial" panose="020B0604020202020204" pitchFamily="34" charset="0"/>
+                      </a:endParaRPr>
+                    </a:p>
+                  </a:txBody>
+                  <a:tcPr marL="68580" marR="68580" marT="0" marB="0"/>
+                </a:tc>
+                <a:extLst>
+                  <a:ext uri="{0D108BD9-81ED-4DB2-BD59-A6C34878D82A}">
+                    <a16:rowId xmlns:a16="http://schemas.microsoft.com/office/drawing/2014/main" val="3697683012"/>
+                  </a:ext>
+                </a:extLst>
+              </a:tr>
+            </a:tbl>
+          </a:graphicData>
+        </a:graphic>
+      </p:graphicFrame>
+    </p:spTree>
+    <p:extLst>
+      <p:ext uri="{BB962C8B-B14F-4D97-AF65-F5344CB8AC3E}">
+        <p14:creationId xmlns:p14="http://schemas.microsoft.com/office/powerpoint/2010/main" val="926961068"/>
+      </p:ext>
+    </p:extLst>
+  </p:cSld>
+  <p:clrMapOvr>
+    <a:masterClrMapping/>
+  </p:clrMapOvr>
+</p:sld>
+</file>
+
+<file path=ppt/slides/slide12.xml><?xml version="1.0" encoding="utf-8"?>
+<p:sld xmlns:a="http://schemas.openxmlformats.org/drawingml/2006/main" xmlns:r="http://schemas.openxmlformats.org/officeDocument/2006/relationships" xmlns:p="http://schemas.openxmlformats.org/presentationml/2006/main">
+  <p:cSld>
+    <p:spTree>
+      <p:nvGrpSpPr>
+        <p:cNvPr id="1" name="">
+          <a:extLst>
+            <a:ext uri="{FF2B5EF4-FFF2-40B4-BE49-F238E27FC236}">
               <a16:creationId xmlns:a16="http://schemas.microsoft.com/office/drawing/2014/main" id="{8C85286A-8A90-83D4-4BB0-D4D5DBB9A24C}"/>
             </a:ext>
           </a:extLst>
@@ -7123,7 +10461,7 @@
 </p:sld>
 </file>
 
-<file path=ppt/slides/slide11.xml><?xml version="1.0" encoding="utf-8"?>
+<file path=ppt/slides/slide13.xml><?xml version="1.0" encoding="utf-8"?>
 <p:sld xmlns:a="http://schemas.openxmlformats.org/drawingml/2006/main" xmlns:r="http://schemas.openxmlformats.org/officeDocument/2006/relationships" xmlns:p="http://schemas.openxmlformats.org/presentationml/2006/main">
   <p:cSld>
     <p:spTree>
@@ -7283,7 +10621,7 @@
 </p:sld>
 </file>
 
-<file path=ppt/slides/slide12.xml><?xml version="1.0" encoding="utf-8"?>
+<file path=ppt/slides/slide14.xml><?xml version="1.0" encoding="utf-8"?>
 <p:sld xmlns:a="http://schemas.openxmlformats.org/drawingml/2006/main" xmlns:r="http://schemas.openxmlformats.org/officeDocument/2006/relationships" xmlns:p="http://schemas.openxmlformats.org/presentationml/2006/main">
   <p:cSld>
     <p:spTree>
@@ -9424,8 +12762,8 @@
         </p:nvSpPr>
         <p:spPr>
           <a:xfrm>
-            <a:off x="111206" y="1673352"/>
-            <a:ext cx="11026186" cy="4864608"/>
+            <a:off x="0" y="1195602"/>
+            <a:ext cx="12283440" cy="5662398"/>
           </a:xfrm>
         </p:spPr>
         <p:txBody>
@@ -9434,100 +12772,33 @@
           </a:bodyPr>
           <a:lstStyle/>
           <a:p>
-            <a:pPr rtl="0"/>
-            <a:r>
-              <a:rPr lang="ar-JO" sz="2400" dirty="0">
+            <a:r>
+              <a:rPr lang="en-US" sz="2400" dirty="0">
                 <a:effectLst/>
                 <a:latin typeface="Arial" panose="020B0604020202020204" pitchFamily="34" charset="0"/>
                 <a:ea typeface="Times New Roman" panose="02020603050405020304" pitchFamily="18" charset="0"/>
                 <a:cs typeface="Arial" panose="020B0604020202020204" pitchFamily="34" charset="0"/>
               </a:rPr>
-              <a:t>ح</a:t>
-            </a:r>
-            <a:r>
-              <a:rPr lang="ar-JO" sz="2400" dirty="0">
-                <a:latin typeface="Arial" panose="020B0604020202020204" pitchFamily="34" charset="0"/>
-                <a:ea typeface="Times New Roman" panose="02020603050405020304" pitchFamily="18" charset="0"/>
-                <a:cs typeface="Arial" panose="020B0604020202020204" pitchFamily="34" charset="0"/>
-              </a:rPr>
-              <a:t>ط جدول ال</a:t>
-            </a:r>
-            <a:r>
-              <a:rPr lang="he-IL" sz="2400" dirty="0">
-                <a:latin typeface="Arial" panose="020B0604020202020204" pitchFamily="34" charset="0"/>
-                <a:ea typeface="Times New Roman" panose="02020603050405020304" pitchFamily="18" charset="0"/>
-                <a:cs typeface="Arial" panose="020B0604020202020204" pitchFamily="34" charset="0"/>
-              </a:rPr>
-              <a:t>כניסות וחיבורים</a:t>
-            </a:r>
-            <a:endParaRPr lang="ar-JO" sz="2400" dirty="0">
-              <a:latin typeface="Arial" panose="020B0604020202020204" pitchFamily="34" charset="0"/>
-              <a:ea typeface="Times New Roman" panose="02020603050405020304" pitchFamily="18" charset="0"/>
-              <a:cs typeface="Arial" panose="020B0604020202020204" pitchFamily="34" charset="0"/>
-            </a:endParaRPr>
-          </a:p>
-          <a:p>
-            <a:pPr rtl="0"/>
-            <a:r>
-              <a:rPr lang="ar-JO" sz="2400" dirty="0">
-                <a:effectLst/>
-                <a:latin typeface="Arial" panose="020B0604020202020204" pitchFamily="34" charset="0"/>
-                <a:ea typeface="Times New Roman" panose="02020603050405020304" pitchFamily="18" charset="0"/>
-                <a:cs typeface="Arial" panose="020B0604020202020204" pitchFamily="34" charset="0"/>
-              </a:rPr>
-              <a:t>احكي عن </a:t>
-            </a:r>
-            <a:r>
-              <a:rPr lang="ar-JO" sz="2400" dirty="0" err="1">
-                <a:effectLst/>
-                <a:latin typeface="Arial" panose="020B0604020202020204" pitchFamily="34" charset="0"/>
-                <a:ea typeface="Times New Roman" panose="02020603050405020304" pitchFamily="18" charset="0"/>
-                <a:cs typeface="Arial" panose="020B0604020202020204" pitchFamily="34" charset="0"/>
-              </a:rPr>
-              <a:t>الموكس</a:t>
-            </a:r>
-            <a:endParaRPr lang="ar-JO" sz="2400" dirty="0">
-              <a:effectLst/>
-              <a:latin typeface="Arial" panose="020B0604020202020204" pitchFamily="34" charset="0"/>
-              <a:ea typeface="Times New Roman" panose="02020603050405020304" pitchFamily="18" charset="0"/>
-              <a:cs typeface="Arial" panose="020B0604020202020204" pitchFamily="34" charset="0"/>
-            </a:endParaRPr>
-          </a:p>
-          <a:p>
-            <a:pPr rtl="0"/>
-            <a:r>
-              <a:rPr lang="ar-JO" sz="2400" dirty="0" err="1">
-                <a:latin typeface="Arial" panose="020B0604020202020204" pitchFamily="34" charset="0"/>
-                <a:ea typeface="Times New Roman" panose="02020603050405020304" pitchFamily="18" charset="0"/>
-                <a:cs typeface="Arial" panose="020B0604020202020204" pitchFamily="34" charset="0"/>
-              </a:rPr>
-              <a:t>ليش</a:t>
-            </a:r>
-            <a:r>
-              <a:rPr lang="ar-JO" sz="2400" dirty="0">
-                <a:latin typeface="Arial" panose="020B0604020202020204" pitchFamily="34" charset="0"/>
-                <a:ea typeface="Times New Roman" panose="02020603050405020304" pitchFamily="18" charset="0"/>
-                <a:cs typeface="Arial" panose="020B0604020202020204" pitchFamily="34" charset="0"/>
-              </a:rPr>
-              <a:t> أصلا رجعنا </a:t>
-            </a:r>
-            <a:r>
-              <a:rPr lang="ar-JO" sz="2400" dirty="0" err="1">
-                <a:latin typeface="Arial" panose="020B0604020202020204" pitchFamily="34" charset="0"/>
-                <a:ea typeface="Times New Roman" panose="02020603050405020304" pitchFamily="18" charset="0"/>
-                <a:cs typeface="Arial" panose="020B0604020202020204" pitchFamily="34" charset="0"/>
-              </a:rPr>
-              <a:t>للموكس</a:t>
-            </a:r>
-            <a:endParaRPr lang="en-US" sz="2400" dirty="0">
-              <a:effectLst/>
-              <a:latin typeface="Arial" panose="020B0604020202020204" pitchFamily="34" charset="0"/>
-              <a:ea typeface="Times New Roman" panose="02020603050405020304" pitchFamily="18" charset="0"/>
-              <a:cs typeface="Arial" panose="020B0604020202020204" pitchFamily="34" charset="0"/>
-            </a:endParaRPr>
-          </a:p>
-          <a:p>
-            <a:pPr rtl="0"/>
+              <a:t>27 circuit points </a:t>
+            </a:r>
+            <a:r>
+              <a:rPr lang="en-US" dirty="0"/>
+              <a:t>across various pipeline stages and control/data paths were connected to a </a:t>
+            </a:r>
+            <a:r>
+              <a:rPr lang="en-US" b="1" dirty="0"/>
+              <a:t>32-input multiplexer system</a:t>
+            </a:r>
+            <a:r>
+              <a:rPr lang="en-US" dirty="0"/>
+              <a:t>.</a:t>
+            </a:r>
+          </a:p>
+          <a:p>
+            <a:r>
+              <a:rPr lang="en-US" dirty="0"/>
+              <a:t> This externally controlled MUX allowed users to select and observe specific signals dynamically, enabling real-time inspection of key Datapath and memory elements such as ALU results, fetched opcodes, register values, memory addresses, and read/write data.</a:t>
+            </a:r>
             <a:endParaRPr lang="en-US" sz="2400" dirty="0">
               <a:effectLst/>
               <a:latin typeface="Arial" panose="020B0604020202020204" pitchFamily="34" charset="0"/>

</xml_diff>

<commit_message>
instructionLoad simulation opcode picture updated, final presentation updated
</commit_message>
<xml_diff>
--- a/Presintaions and Reports/Final presntaion VLSI.pptx
+++ b/Presintaions and Reports/Final presntaion VLSI.pptx
@@ -4,6 +4,9 @@
   <p:sldMasterIdLst>
     <p:sldMasterId id="2147483648" r:id="rId1"/>
   </p:sldMasterIdLst>
+  <p:notesMasterIdLst>
+    <p:notesMasterId r:id="rId19"/>
+  </p:notesMasterIdLst>
   <p:sldIdLst>
     <p:sldId id="257" r:id="rId2"/>
     <p:sldId id="294" r:id="rId3"/>
@@ -15,10 +18,13 @@
     <p:sldId id="298" r:id="rId9"/>
     <p:sldId id="299" r:id="rId10"/>
     <p:sldId id="304" r:id="rId11"/>
-    <p:sldId id="305" r:id="rId12"/>
-    <p:sldId id="301" r:id="rId13"/>
-    <p:sldId id="302" r:id="rId14"/>
-    <p:sldId id="303" r:id="rId15"/>
+    <p:sldId id="301" r:id="rId12"/>
+    <p:sldId id="302" r:id="rId13"/>
+    <p:sldId id="303" r:id="rId14"/>
+    <p:sldId id="305" r:id="rId15"/>
+    <p:sldId id="306" r:id="rId16"/>
+    <p:sldId id="307" r:id="rId17"/>
+    <p:sldId id="308" r:id="rId18"/>
   </p:sldIdLst>
   <p:sldSz cx="12192000" cy="6858000"/>
   <p:notesSz cx="6858000" cy="9144000"/>
@@ -3302,6 +3308,440 @@
 </dgm:styleDef>
 </file>
 
+<file path=ppt/notesMasters/notesMaster1.xml><?xml version="1.0" encoding="utf-8"?>
+<p:notesMaster xmlns:a="http://schemas.openxmlformats.org/drawingml/2006/main" xmlns:r="http://schemas.openxmlformats.org/officeDocument/2006/relationships" xmlns:p="http://schemas.openxmlformats.org/presentationml/2006/main">
+  <p:cSld>
+    <p:bg>
+      <p:bgRef idx="1001">
+        <a:schemeClr val="bg1"/>
+      </p:bgRef>
+    </p:bg>
+    <p:spTree>
+      <p:nvGrpSpPr>
+        <p:cNvPr id="1" name=""/>
+        <p:cNvGrpSpPr/>
+        <p:nvPr/>
+      </p:nvGrpSpPr>
+      <p:grpSpPr>
+        <a:xfrm>
+          <a:off x="0" y="0"/>
+          <a:ext cx="0" cy="0"/>
+          <a:chOff x="0" y="0"/>
+          <a:chExt cx="0" cy="0"/>
+        </a:xfrm>
+      </p:grpSpPr>
+      <p:sp>
+        <p:nvSpPr>
+          <p:cNvPr id="2" name="Header Placeholder 1"/>
+          <p:cNvSpPr>
+            <a:spLocks noGrp="1"/>
+          </p:cNvSpPr>
+          <p:nvPr>
+            <p:ph type="hdr" sz="quarter"/>
+          </p:nvPr>
+        </p:nvSpPr>
+        <p:spPr>
+          <a:xfrm>
+            <a:off x="0" y="0"/>
+            <a:ext cx="2971800" cy="458788"/>
+          </a:xfrm>
+          <a:prstGeom prst="rect">
+            <a:avLst/>
+          </a:prstGeom>
+        </p:spPr>
+        <p:txBody>
+          <a:bodyPr vert="horz" lIns="91440" tIns="45720" rIns="91440" bIns="45720" rtlCol="0"/>
+          <a:lstStyle>
+            <a:lvl1pPr algn="l">
+              <a:defRPr sz="1200"/>
+            </a:lvl1pPr>
+          </a:lstStyle>
+          <a:p>
+            <a:endParaRPr lang="en-IL"/>
+          </a:p>
+        </p:txBody>
+      </p:sp>
+      <p:sp>
+        <p:nvSpPr>
+          <p:cNvPr id="3" name="Date Placeholder 2"/>
+          <p:cNvSpPr>
+            <a:spLocks noGrp="1"/>
+          </p:cNvSpPr>
+          <p:nvPr>
+            <p:ph type="dt" idx="1"/>
+          </p:nvPr>
+        </p:nvSpPr>
+        <p:spPr>
+          <a:xfrm>
+            <a:off x="3884613" y="0"/>
+            <a:ext cx="2971800" cy="458788"/>
+          </a:xfrm>
+          <a:prstGeom prst="rect">
+            <a:avLst/>
+          </a:prstGeom>
+        </p:spPr>
+        <p:txBody>
+          <a:bodyPr vert="horz" lIns="91440" tIns="45720" rIns="91440" bIns="45720" rtlCol="0"/>
+          <a:lstStyle>
+            <a:lvl1pPr algn="r">
+              <a:defRPr sz="1200"/>
+            </a:lvl1pPr>
+          </a:lstStyle>
+          <a:p>
+            <a:fld id="{00968C3E-619B-4AA5-B3D1-45D581164E23}" type="datetimeFigureOut">
+              <a:rPr lang="en-IL" smtClean="0"/>
+              <a:t>26/06/2025</a:t>
+            </a:fld>
+            <a:endParaRPr lang="en-IL"/>
+          </a:p>
+        </p:txBody>
+      </p:sp>
+      <p:sp>
+        <p:nvSpPr>
+          <p:cNvPr id="4" name="Slide Image Placeholder 3"/>
+          <p:cNvSpPr>
+            <a:spLocks noGrp="1" noRot="1" noChangeAspect="1"/>
+          </p:cNvSpPr>
+          <p:nvPr>
+            <p:ph type="sldImg" idx="2"/>
+          </p:nvPr>
+        </p:nvSpPr>
+        <p:spPr>
+          <a:xfrm>
+            <a:off x="685800" y="1143000"/>
+            <a:ext cx="5486400" cy="3086100"/>
+          </a:xfrm>
+          <a:prstGeom prst="rect">
+            <a:avLst/>
+          </a:prstGeom>
+          <a:noFill/>
+          <a:ln w="12700">
+            <a:solidFill>
+              <a:prstClr val="black"/>
+            </a:solidFill>
+          </a:ln>
+        </p:spPr>
+        <p:txBody>
+          <a:bodyPr vert="horz" lIns="91440" tIns="45720" rIns="91440" bIns="45720" rtlCol="0" anchor="ctr"/>
+          <a:lstStyle/>
+          <a:p>
+            <a:endParaRPr lang="en-IL"/>
+          </a:p>
+        </p:txBody>
+      </p:sp>
+      <p:sp>
+        <p:nvSpPr>
+          <p:cNvPr id="5" name="Notes Placeholder 4"/>
+          <p:cNvSpPr>
+            <a:spLocks noGrp="1"/>
+          </p:cNvSpPr>
+          <p:nvPr>
+            <p:ph type="body" sz="quarter" idx="3"/>
+          </p:nvPr>
+        </p:nvSpPr>
+        <p:spPr>
+          <a:xfrm>
+            <a:off x="685800" y="4400550"/>
+            <a:ext cx="5486400" cy="3600450"/>
+          </a:xfrm>
+          <a:prstGeom prst="rect">
+            <a:avLst/>
+          </a:prstGeom>
+        </p:spPr>
+        <p:txBody>
+          <a:bodyPr vert="horz" lIns="91440" tIns="45720" rIns="91440" bIns="45720" rtlCol="0"/>
+          <a:lstStyle/>
+          <a:p>
+            <a:pPr lvl="0"/>
+            <a:r>
+              <a:rPr lang="en-US"/>
+              <a:t>Click to edit Master text styles</a:t>
+            </a:r>
+          </a:p>
+          <a:p>
+            <a:pPr lvl="1"/>
+            <a:r>
+              <a:rPr lang="en-US"/>
+              <a:t>Second level</a:t>
+            </a:r>
+          </a:p>
+          <a:p>
+            <a:pPr lvl="2"/>
+            <a:r>
+              <a:rPr lang="en-US"/>
+              <a:t>Third level</a:t>
+            </a:r>
+          </a:p>
+          <a:p>
+            <a:pPr lvl="3"/>
+            <a:r>
+              <a:rPr lang="en-US"/>
+              <a:t>Fourth level</a:t>
+            </a:r>
+          </a:p>
+          <a:p>
+            <a:pPr lvl="4"/>
+            <a:r>
+              <a:rPr lang="en-US"/>
+              <a:t>Fifth level</a:t>
+            </a:r>
+            <a:endParaRPr lang="en-IL"/>
+          </a:p>
+        </p:txBody>
+      </p:sp>
+      <p:sp>
+        <p:nvSpPr>
+          <p:cNvPr id="6" name="Footer Placeholder 5"/>
+          <p:cNvSpPr>
+            <a:spLocks noGrp="1"/>
+          </p:cNvSpPr>
+          <p:nvPr>
+            <p:ph type="ftr" sz="quarter" idx="4"/>
+          </p:nvPr>
+        </p:nvSpPr>
+        <p:spPr>
+          <a:xfrm>
+            <a:off x="0" y="8685213"/>
+            <a:ext cx="2971800" cy="458787"/>
+          </a:xfrm>
+          <a:prstGeom prst="rect">
+            <a:avLst/>
+          </a:prstGeom>
+        </p:spPr>
+        <p:txBody>
+          <a:bodyPr vert="horz" lIns="91440" tIns="45720" rIns="91440" bIns="45720" rtlCol="0" anchor="b"/>
+          <a:lstStyle>
+            <a:lvl1pPr algn="l">
+              <a:defRPr sz="1200"/>
+            </a:lvl1pPr>
+          </a:lstStyle>
+          <a:p>
+            <a:endParaRPr lang="en-IL"/>
+          </a:p>
+        </p:txBody>
+      </p:sp>
+      <p:sp>
+        <p:nvSpPr>
+          <p:cNvPr id="7" name="Slide Number Placeholder 6"/>
+          <p:cNvSpPr>
+            <a:spLocks noGrp="1"/>
+          </p:cNvSpPr>
+          <p:nvPr>
+            <p:ph type="sldNum" sz="quarter" idx="5"/>
+          </p:nvPr>
+        </p:nvSpPr>
+        <p:spPr>
+          <a:xfrm>
+            <a:off x="3884613" y="8685213"/>
+            <a:ext cx="2971800" cy="458787"/>
+          </a:xfrm>
+          <a:prstGeom prst="rect">
+            <a:avLst/>
+          </a:prstGeom>
+        </p:spPr>
+        <p:txBody>
+          <a:bodyPr vert="horz" lIns="91440" tIns="45720" rIns="91440" bIns="45720" rtlCol="0" anchor="b"/>
+          <a:lstStyle>
+            <a:lvl1pPr algn="r">
+              <a:defRPr sz="1200"/>
+            </a:lvl1pPr>
+          </a:lstStyle>
+          <a:p>
+            <a:fld id="{DBE48960-B9A4-412F-A6E0-8A918D6AEC5C}" type="slidenum">
+              <a:rPr lang="en-IL" smtClean="0"/>
+              <a:t>‹#›</a:t>
+            </a:fld>
+            <a:endParaRPr lang="en-IL"/>
+          </a:p>
+        </p:txBody>
+      </p:sp>
+    </p:spTree>
+    <p:extLst>
+      <p:ext uri="{BB962C8B-B14F-4D97-AF65-F5344CB8AC3E}">
+        <p14:creationId xmlns:p14="http://schemas.microsoft.com/office/powerpoint/2010/main" val="1311000136"/>
+      </p:ext>
+    </p:extLst>
+  </p:cSld>
+  <p:clrMap bg1="lt1" tx1="dk1" bg2="lt2" tx2="dk2" accent1="accent1" accent2="accent2" accent3="accent3" accent4="accent4" accent5="accent5" accent6="accent6" hlink="hlink" folHlink="folHlink"/>
+  <p:notesStyle>
+    <a:lvl1pPr marL="0" algn="l" defTabSz="914400" rtl="0" eaLnBrk="1" latinLnBrk="0" hangingPunct="1">
+      <a:defRPr sz="1200" kern="1200">
+        <a:solidFill>
+          <a:schemeClr val="tx1"/>
+        </a:solidFill>
+        <a:latin typeface="+mn-lt"/>
+        <a:ea typeface="+mn-ea"/>
+        <a:cs typeface="+mn-cs"/>
+      </a:defRPr>
+    </a:lvl1pPr>
+    <a:lvl2pPr marL="457200" algn="l" defTabSz="914400" rtl="0" eaLnBrk="1" latinLnBrk="0" hangingPunct="1">
+      <a:defRPr sz="1200" kern="1200">
+        <a:solidFill>
+          <a:schemeClr val="tx1"/>
+        </a:solidFill>
+        <a:latin typeface="+mn-lt"/>
+        <a:ea typeface="+mn-ea"/>
+        <a:cs typeface="+mn-cs"/>
+      </a:defRPr>
+    </a:lvl2pPr>
+    <a:lvl3pPr marL="914400" algn="l" defTabSz="914400" rtl="0" eaLnBrk="1" latinLnBrk="0" hangingPunct="1">
+      <a:defRPr sz="1200" kern="1200">
+        <a:solidFill>
+          <a:schemeClr val="tx1"/>
+        </a:solidFill>
+        <a:latin typeface="+mn-lt"/>
+        <a:ea typeface="+mn-ea"/>
+        <a:cs typeface="+mn-cs"/>
+      </a:defRPr>
+    </a:lvl3pPr>
+    <a:lvl4pPr marL="1371600" algn="l" defTabSz="914400" rtl="0" eaLnBrk="1" latinLnBrk="0" hangingPunct="1">
+      <a:defRPr sz="1200" kern="1200">
+        <a:solidFill>
+          <a:schemeClr val="tx1"/>
+        </a:solidFill>
+        <a:latin typeface="+mn-lt"/>
+        <a:ea typeface="+mn-ea"/>
+        <a:cs typeface="+mn-cs"/>
+      </a:defRPr>
+    </a:lvl4pPr>
+    <a:lvl5pPr marL="1828800" algn="l" defTabSz="914400" rtl="0" eaLnBrk="1" latinLnBrk="0" hangingPunct="1">
+      <a:defRPr sz="1200" kern="1200">
+        <a:solidFill>
+          <a:schemeClr val="tx1"/>
+        </a:solidFill>
+        <a:latin typeface="+mn-lt"/>
+        <a:ea typeface="+mn-ea"/>
+        <a:cs typeface="+mn-cs"/>
+      </a:defRPr>
+    </a:lvl5pPr>
+    <a:lvl6pPr marL="2286000" algn="l" defTabSz="914400" rtl="0" eaLnBrk="1" latinLnBrk="0" hangingPunct="1">
+      <a:defRPr sz="1200" kern="1200">
+        <a:solidFill>
+          <a:schemeClr val="tx1"/>
+        </a:solidFill>
+        <a:latin typeface="+mn-lt"/>
+        <a:ea typeface="+mn-ea"/>
+        <a:cs typeface="+mn-cs"/>
+      </a:defRPr>
+    </a:lvl6pPr>
+    <a:lvl7pPr marL="2743200" algn="l" defTabSz="914400" rtl="0" eaLnBrk="1" latinLnBrk="0" hangingPunct="1">
+      <a:defRPr sz="1200" kern="1200">
+        <a:solidFill>
+          <a:schemeClr val="tx1"/>
+        </a:solidFill>
+        <a:latin typeface="+mn-lt"/>
+        <a:ea typeface="+mn-ea"/>
+        <a:cs typeface="+mn-cs"/>
+      </a:defRPr>
+    </a:lvl7pPr>
+    <a:lvl8pPr marL="3200400" algn="l" defTabSz="914400" rtl="0" eaLnBrk="1" latinLnBrk="0" hangingPunct="1">
+      <a:defRPr sz="1200" kern="1200">
+        <a:solidFill>
+          <a:schemeClr val="tx1"/>
+        </a:solidFill>
+        <a:latin typeface="+mn-lt"/>
+        <a:ea typeface="+mn-ea"/>
+        <a:cs typeface="+mn-cs"/>
+      </a:defRPr>
+    </a:lvl8pPr>
+    <a:lvl9pPr marL="3657600" algn="l" defTabSz="914400" rtl="0" eaLnBrk="1" latinLnBrk="0" hangingPunct="1">
+      <a:defRPr sz="1200" kern="1200">
+        <a:solidFill>
+          <a:schemeClr val="tx1"/>
+        </a:solidFill>
+        <a:latin typeface="+mn-lt"/>
+        <a:ea typeface="+mn-ea"/>
+        <a:cs typeface="+mn-cs"/>
+      </a:defRPr>
+    </a:lvl9pPr>
+  </p:notesStyle>
+</p:notesMaster>
+</file>
+
+<file path=ppt/notesSlides/notesSlide1.xml><?xml version="1.0" encoding="utf-8"?>
+<p:notes xmlns:a="http://schemas.openxmlformats.org/drawingml/2006/main" xmlns:r="http://schemas.openxmlformats.org/officeDocument/2006/relationships" xmlns:p="http://schemas.openxmlformats.org/presentationml/2006/main">
+  <p:cSld>
+    <p:spTree>
+      <p:nvGrpSpPr>
+        <p:cNvPr id="1" name=""/>
+        <p:cNvGrpSpPr/>
+        <p:nvPr/>
+      </p:nvGrpSpPr>
+      <p:grpSpPr>
+        <a:xfrm>
+          <a:off x="0" y="0"/>
+          <a:ext cx="0" cy="0"/>
+          <a:chOff x="0" y="0"/>
+          <a:chExt cx="0" cy="0"/>
+        </a:xfrm>
+      </p:grpSpPr>
+      <p:sp>
+        <p:nvSpPr>
+          <p:cNvPr id="2" name="Slide Image Placeholder 1"/>
+          <p:cNvSpPr>
+            <a:spLocks noGrp="1" noRot="1" noChangeAspect="1"/>
+          </p:cNvSpPr>
+          <p:nvPr>
+            <p:ph type="sldImg"/>
+          </p:nvPr>
+        </p:nvSpPr>
+        <p:spPr/>
+      </p:sp>
+      <p:sp>
+        <p:nvSpPr>
+          <p:cNvPr id="3" name="Notes Placeholder 2"/>
+          <p:cNvSpPr>
+            <a:spLocks noGrp="1"/>
+          </p:cNvSpPr>
+          <p:nvPr>
+            <p:ph type="body" idx="1"/>
+          </p:nvPr>
+        </p:nvSpPr>
+        <p:spPr/>
+        <p:txBody>
+          <a:bodyPr/>
+          <a:lstStyle/>
+          <a:p>
+            <a:endParaRPr lang="en-IL" dirty="0"/>
+          </a:p>
+        </p:txBody>
+      </p:sp>
+      <p:sp>
+        <p:nvSpPr>
+          <p:cNvPr id="4" name="Slide Number Placeholder 3"/>
+          <p:cNvSpPr>
+            <a:spLocks noGrp="1"/>
+          </p:cNvSpPr>
+          <p:nvPr>
+            <p:ph type="sldNum" sz="quarter" idx="5"/>
+          </p:nvPr>
+        </p:nvSpPr>
+        <p:spPr/>
+        <p:txBody>
+          <a:bodyPr/>
+          <a:lstStyle/>
+          <a:p>
+            <a:fld id="{DBE48960-B9A4-412F-A6E0-8A918D6AEC5C}" type="slidenum">
+              <a:rPr lang="en-IL" smtClean="0"/>
+              <a:t>10</a:t>
+            </a:fld>
+            <a:endParaRPr lang="en-IL"/>
+          </a:p>
+        </p:txBody>
+      </p:sp>
+    </p:spTree>
+    <p:extLst>
+      <p:ext uri="{BB962C8B-B14F-4D97-AF65-F5344CB8AC3E}">
+        <p14:creationId xmlns:p14="http://schemas.microsoft.com/office/powerpoint/2010/main" val="1376693991"/>
+      </p:ext>
+    </p:extLst>
+  </p:cSld>
+  <p:clrMapOvr>
+    <a:masterClrMapping/>
+  </p:clrMapOvr>
+</p:notes>
+</file>
+
 <file path=ppt/slideLayouts/slideLayout1.xml><?xml version="1.0" encoding="utf-8"?>
 <p:sldLayout xmlns:a="http://schemas.openxmlformats.org/drawingml/2006/main" xmlns:r="http://schemas.openxmlformats.org/officeDocument/2006/relationships" xmlns:p="http://schemas.openxmlformats.org/presentationml/2006/main" type="title" preserve="1">
   <p:cSld name="Title Slide">
@@ -3451,7 +3891,7 @@
           <a:p>
             <a:fld id="{4C1E25F6-6904-4FC1-8C19-2CBB5B46E60E}" type="datetimeFigureOut">
               <a:rPr lang="en-IL" smtClean="0"/>
-              <a:t>21/06/2025</a:t>
+              <a:t>26/06/2025</a:t>
             </a:fld>
             <a:endParaRPr lang="en-IL"/>
           </a:p>
@@ -3651,7 +4091,7 @@
           <a:p>
             <a:fld id="{4C1E25F6-6904-4FC1-8C19-2CBB5B46E60E}" type="datetimeFigureOut">
               <a:rPr lang="en-IL" smtClean="0"/>
-              <a:t>21/06/2025</a:t>
+              <a:t>26/06/2025</a:t>
             </a:fld>
             <a:endParaRPr lang="en-IL"/>
           </a:p>
@@ -3861,7 +4301,7 @@
           <a:p>
             <a:fld id="{4C1E25F6-6904-4FC1-8C19-2CBB5B46E60E}" type="datetimeFigureOut">
               <a:rPr lang="en-IL" smtClean="0"/>
-              <a:t>21/06/2025</a:t>
+              <a:t>26/06/2025</a:t>
             </a:fld>
             <a:endParaRPr lang="en-IL"/>
           </a:p>
@@ -4061,7 +4501,7 @@
           <a:p>
             <a:fld id="{4C1E25F6-6904-4FC1-8C19-2CBB5B46E60E}" type="datetimeFigureOut">
               <a:rPr lang="en-IL" smtClean="0"/>
-              <a:t>21/06/2025</a:t>
+              <a:t>26/06/2025</a:t>
             </a:fld>
             <a:endParaRPr lang="en-IL"/>
           </a:p>
@@ -4337,7 +4777,7 @@
           <a:p>
             <a:fld id="{4C1E25F6-6904-4FC1-8C19-2CBB5B46E60E}" type="datetimeFigureOut">
               <a:rPr lang="en-IL" smtClean="0"/>
-              <a:t>21/06/2025</a:t>
+              <a:t>26/06/2025</a:t>
             </a:fld>
             <a:endParaRPr lang="en-IL"/>
           </a:p>
@@ -4605,7 +5045,7 @@
           <a:p>
             <a:fld id="{4C1E25F6-6904-4FC1-8C19-2CBB5B46E60E}" type="datetimeFigureOut">
               <a:rPr lang="en-IL" smtClean="0"/>
-              <a:t>21/06/2025</a:t>
+              <a:t>26/06/2025</a:t>
             </a:fld>
             <a:endParaRPr lang="en-IL"/>
           </a:p>
@@ -5020,7 +5460,7 @@
           <a:p>
             <a:fld id="{4C1E25F6-6904-4FC1-8C19-2CBB5B46E60E}" type="datetimeFigureOut">
               <a:rPr lang="en-IL" smtClean="0"/>
-              <a:t>21/06/2025</a:t>
+              <a:t>26/06/2025</a:t>
             </a:fld>
             <a:endParaRPr lang="en-IL"/>
           </a:p>
@@ -5162,7 +5602,7 @@
           <a:p>
             <a:fld id="{4C1E25F6-6904-4FC1-8C19-2CBB5B46E60E}" type="datetimeFigureOut">
               <a:rPr lang="en-IL" smtClean="0"/>
-              <a:t>21/06/2025</a:t>
+              <a:t>26/06/2025</a:t>
             </a:fld>
             <a:endParaRPr lang="en-IL"/>
           </a:p>
@@ -5275,7 +5715,7 @@
           <a:p>
             <a:fld id="{4C1E25F6-6904-4FC1-8C19-2CBB5B46E60E}" type="datetimeFigureOut">
               <a:rPr lang="en-IL" smtClean="0"/>
-              <a:t>21/06/2025</a:t>
+              <a:t>26/06/2025</a:t>
             </a:fld>
             <a:endParaRPr lang="en-IL"/>
           </a:p>
@@ -5588,7 +6028,7 @@
           <a:p>
             <a:fld id="{4C1E25F6-6904-4FC1-8C19-2CBB5B46E60E}" type="datetimeFigureOut">
               <a:rPr lang="en-IL" smtClean="0"/>
-              <a:t>21/06/2025</a:t>
+              <a:t>26/06/2025</a:t>
             </a:fld>
             <a:endParaRPr lang="en-IL"/>
           </a:p>
@@ -5877,7 +6317,7 @@
           <a:p>
             <a:fld id="{4C1E25F6-6904-4FC1-8C19-2CBB5B46E60E}" type="datetimeFigureOut">
               <a:rPr lang="en-IL" smtClean="0"/>
-              <a:t>21/06/2025</a:t>
+              <a:t>26/06/2025</a:t>
             </a:fld>
             <a:endParaRPr lang="en-IL"/>
           </a:p>
@@ -6120,7 +6560,7 @@
           <a:p>
             <a:fld id="{4C1E25F6-6904-4FC1-8C19-2CBB5B46E60E}" type="datetimeFigureOut">
               <a:rPr lang="en-IL" smtClean="0"/>
-              <a:t>21/06/2025</a:t>
+              <a:t>26/06/2025</a:t>
             </a:fld>
             <a:endParaRPr lang="en-IL"/>
           </a:p>
@@ -6973,13 +7413,13 @@
         </p:nvSpPr>
         <p:spPr>
           <a:xfrm>
-            <a:off x="305349" y="603066"/>
-            <a:ext cx="10319512" cy="592536"/>
+            <a:off x="579669" y="10153"/>
+            <a:ext cx="10319512" cy="1003578"/>
           </a:xfrm>
         </p:spPr>
         <p:txBody>
           <a:bodyPr vert="horz" lIns="91440" tIns="45720" rIns="91440" bIns="45720" rtlCol="0" anchor="b">
-            <a:normAutofit fontScale="90000"/>
+            <a:normAutofit/>
           </a:bodyPr>
           <a:lstStyle/>
           <a:p>
@@ -7046,14 +7486,14 @@
             <p:ph idx="1"/>
             <p:extLst>
               <p:ext uri="{D42A27DB-BD31-4B8C-83A1-F6EECF244321}">
-                <p14:modId xmlns:p14="http://schemas.microsoft.com/office/powerpoint/2010/main" val="3187440825"/>
+                <p14:modId xmlns:p14="http://schemas.microsoft.com/office/powerpoint/2010/main" val="2252473926"/>
               </p:ext>
             </p:extLst>
           </p:nvPr>
         </p:nvGraphicFramePr>
         <p:xfrm>
-          <a:off x="0" y="1195602"/>
-          <a:ext cx="12192001" cy="5662397"/>
+          <a:off x="0" y="1143379"/>
+          <a:ext cx="7059167" cy="5704466"/>
         </p:xfrm>
         <a:graphic>
           <a:graphicData uri="http://schemas.openxmlformats.org/drawingml/2006/table">
@@ -7062,21 +7502,21 @@
                 <a:tableStyleId>{5C22544A-7EE6-4342-B048-85BDC9FD1C3A}</a:tableStyleId>
               </a:tblPr>
               <a:tblGrid>
-                <a:gridCol w="582804">
+                <a:gridCol w="357542">
                   <a:extLst>
                     <a:ext uri="{9D8B030D-6E8A-4147-A177-3AD203B41FA5}">
                       <a16:colId xmlns:a16="http://schemas.microsoft.com/office/drawing/2014/main" val="3077749885"/>
                     </a:ext>
                   </a:extLst>
                 </a:gridCol>
-                <a:gridCol w="2914022">
+                <a:gridCol w="2040765">
                   <a:extLst>
                     <a:ext uri="{9D8B030D-6E8A-4147-A177-3AD203B41FA5}">
                       <a16:colId xmlns:a16="http://schemas.microsoft.com/office/drawing/2014/main" val="2445671152"/>
                     </a:ext>
                   </a:extLst>
                 </a:gridCol>
-                <a:gridCol w="8695175">
+                <a:gridCol w="4660860">
                   <a:extLst>
                     <a:ext uri="{9D8B030D-6E8A-4147-A177-3AD203B41FA5}">
                       <a16:colId xmlns:a16="http://schemas.microsoft.com/office/drawing/2014/main" val="251754406"/>
@@ -7084,13 +7524,13 @@
                   </a:extLst>
                 </a:gridCol>
               </a:tblGrid>
-              <a:tr h="357727">
+              <a:tr h="178864">
                 <a:tc>
                   <a:txBody>
                     <a:bodyPr/>
                     <a:lstStyle/>
                     <a:p>
-                      <a:pPr>
+                      <a:pPr algn="ctr">
                         <a:lnSpc>
                           <a:spcPct val="115000"/>
                         </a:lnSpc>
@@ -7100,8 +7540,117 @@
                         <a:buNone/>
                       </a:pPr>
                       <a:r>
-                        <a:rPr lang="en-IL" sz="1200" kern="100" dirty="0">
+                        <a:rPr lang="en-US" sz="1200" kern="100" dirty="0">
                           <a:effectLst/>
+                          <a:latin typeface="Aptos" panose="020B0004020202020204" pitchFamily="34" charset="0"/>
+                          <a:ea typeface="Aptos" panose="020B0004020202020204" pitchFamily="34" charset="0"/>
+                          <a:cs typeface="Arial" panose="020B0604020202020204" pitchFamily="34" charset="0"/>
+                        </a:rPr>
+                        <a:t>Sel</a:t>
+                      </a:r>
+                      <a:endParaRPr lang="en-IL" sz="1200" kern="100" dirty="0">
+                        <a:effectLst/>
+                        <a:latin typeface="Aptos" panose="020B0004020202020204" pitchFamily="34" charset="0"/>
+                        <a:ea typeface="Aptos" panose="020B0004020202020204" pitchFamily="34" charset="0"/>
+                        <a:cs typeface="Arial" panose="020B0604020202020204" pitchFamily="34" charset="0"/>
+                      </a:endParaRPr>
+                    </a:p>
+                  </a:txBody>
+                  <a:tcPr marL="67744" marR="67744" marT="0" marB="0"/>
+                </a:tc>
+                <a:tc>
+                  <a:txBody>
+                    <a:bodyPr/>
+                    <a:lstStyle/>
+                    <a:p>
+                      <a:pPr algn="ctr">
+                        <a:lnSpc>
+                          <a:spcPct val="115000"/>
+                        </a:lnSpc>
+                        <a:spcAft>
+                          <a:spcPts val="800"/>
+                        </a:spcAft>
+                        <a:buNone/>
+                      </a:pPr>
+                      <a:r>
+                        <a:rPr lang="en-US" sz="1200" kern="100" dirty="0">
+                          <a:effectLst/>
+                          <a:latin typeface="Aptos" panose="020B0004020202020204" pitchFamily="34" charset="0"/>
+                          <a:ea typeface="Aptos" panose="020B0004020202020204" pitchFamily="34" charset="0"/>
+                          <a:cs typeface="Arial" panose="020B0604020202020204" pitchFamily="34" charset="0"/>
+                        </a:rPr>
+                        <a:t>Output</a:t>
+                      </a:r>
+                      <a:endParaRPr lang="en-IL" sz="1200" kern="100" dirty="0">
+                        <a:effectLst/>
+                        <a:latin typeface="Aptos" panose="020B0004020202020204" pitchFamily="34" charset="0"/>
+                        <a:ea typeface="Aptos" panose="020B0004020202020204" pitchFamily="34" charset="0"/>
+                        <a:cs typeface="Arial" panose="020B0604020202020204" pitchFamily="34" charset="0"/>
+                      </a:endParaRPr>
+                    </a:p>
+                  </a:txBody>
+                  <a:tcPr marL="67744" marR="67744" marT="0" marB="0"/>
+                </a:tc>
+                <a:tc>
+                  <a:txBody>
+                    <a:bodyPr/>
+                    <a:lstStyle/>
+                    <a:p>
+                      <a:pPr algn="ctr">
+                        <a:lnSpc>
+                          <a:spcPct val="115000"/>
+                        </a:lnSpc>
+                        <a:spcAft>
+                          <a:spcPts val="800"/>
+                        </a:spcAft>
+                        <a:buNone/>
+                      </a:pPr>
+                      <a:r>
+                        <a:rPr lang="en-US" sz="1200" kern="100" dirty="0">
+                          <a:effectLst/>
+                          <a:latin typeface="Aptos" panose="020B0004020202020204" pitchFamily="34" charset="0"/>
+                          <a:ea typeface="Aptos" panose="020B0004020202020204" pitchFamily="34" charset="0"/>
+                          <a:cs typeface="Arial" panose="020B0604020202020204" pitchFamily="34" charset="0"/>
+                        </a:rPr>
+                        <a:t>Description</a:t>
+                      </a:r>
+                      <a:endParaRPr lang="en-IL" sz="1200" kern="100" dirty="0">
+                        <a:effectLst/>
+                        <a:latin typeface="Aptos" panose="020B0004020202020204" pitchFamily="34" charset="0"/>
+                        <a:ea typeface="Aptos" panose="020B0004020202020204" pitchFamily="34" charset="0"/>
+                        <a:cs typeface="Arial" panose="020B0604020202020204" pitchFamily="34" charset="0"/>
+                      </a:endParaRPr>
+                    </a:p>
+                  </a:txBody>
+                  <a:tcPr marL="67744" marR="67744" marT="0" marB="0"/>
+                </a:tc>
+                <a:extLst>
+                  <a:ext uri="{0D108BD9-81ED-4DB2-BD59-A6C34878D82A}">
+                    <a16:rowId xmlns:a16="http://schemas.microsoft.com/office/drawing/2014/main" val="695007286"/>
+                  </a:ext>
+                </a:extLst>
+              </a:tr>
+              <a:tr h="178864">
+                <a:tc>
+                  <a:txBody>
+                    <a:bodyPr/>
+                    <a:lstStyle/>
+                    <a:p>
+                      <a:pPr algn="ctr">
+                        <a:lnSpc>
+                          <a:spcPct val="115000"/>
+                        </a:lnSpc>
+                        <a:spcAft>
+                          <a:spcPts val="800"/>
+                        </a:spcAft>
+                        <a:buNone/>
+                      </a:pPr>
+                      <a:r>
+                        <a:rPr lang="en-US" sz="1200" kern="100" dirty="0">
+                          <a:effectLst/>
+                          <a:latin typeface="Aptos" panose="020B0004020202020204" pitchFamily="34" charset="0"/>
+                          <a:ea typeface="Aptos" panose="020B0004020202020204" pitchFamily="34" charset="0"/>
+                          <a:cs typeface="Arial" panose="020B0604020202020204" pitchFamily="34" charset="0"/>
                         </a:rPr>
                         <a:t>0</a:t>
                       </a:r>
@@ -7120,7 +7669,7 @@
                     <a:bodyPr/>
                     <a:lstStyle/>
                     <a:p>
-                      <a:pPr>
+                      <a:pPr algn="ctr">
                         <a:lnSpc>
                           <a:spcPct val="115000"/>
                         </a:lnSpc>
@@ -7130,12 +7679,33 @@
                         <a:buNone/>
                       </a:pPr>
                       <a:r>
-                        <a:rPr lang="en-IL" sz="1200" kern="100">
+                        <a:rPr lang="en-US" sz="1200" kern="100" dirty="0">
                           <a:effectLst/>
+                          <a:latin typeface="Aptos" panose="020B0004020202020204" pitchFamily="34" charset="0"/>
+                          <a:ea typeface="Aptos" panose="020B0004020202020204" pitchFamily="34" charset="0"/>
+                          <a:cs typeface="Arial" panose="020B0604020202020204" pitchFamily="34" charset="0"/>
                         </a:rPr>
-                        <a:t>        {25'b0, opcodeFetch}</a:t>
+                        <a:t>{25'b0, </a:t>
                       </a:r>
-                      <a:endParaRPr lang="en-IL" sz="1200" kern="100">
+                      <a:r>
+                        <a:rPr lang="en-US" sz="1200" kern="100" dirty="0" err="1">
+                          <a:effectLst/>
+                          <a:latin typeface="Aptos" panose="020B0004020202020204" pitchFamily="34" charset="0"/>
+                          <a:ea typeface="Aptos" panose="020B0004020202020204" pitchFamily="34" charset="0"/>
+                          <a:cs typeface="Arial" panose="020B0604020202020204" pitchFamily="34" charset="0"/>
+                        </a:rPr>
+                        <a:t>opcodeFetch</a:t>
+                      </a:r>
+                      <a:r>
+                        <a:rPr lang="en-US" sz="1200" kern="100" dirty="0">
+                          <a:effectLst/>
+                          <a:latin typeface="Aptos" panose="020B0004020202020204" pitchFamily="34" charset="0"/>
+                          <a:ea typeface="Aptos" panose="020B0004020202020204" pitchFamily="34" charset="0"/>
+                          <a:cs typeface="Arial" panose="020B0604020202020204" pitchFamily="34" charset="0"/>
+                        </a:rPr>
+                        <a:t>}</a:t>
+                      </a:r>
+                      <a:endParaRPr lang="en-IL" sz="1200" kern="100" dirty="0">
                         <a:effectLst/>
                         <a:latin typeface="Aptos" panose="020B0004020202020204" pitchFamily="34" charset="0"/>
                         <a:ea typeface="Aptos" panose="020B0004020202020204" pitchFamily="34" charset="0"/>
@@ -7150,7 +7720,7 @@
                     <a:bodyPr/>
                     <a:lstStyle/>
                     <a:p>
-                      <a:pPr>
+                      <a:pPr algn="ctr">
                         <a:lnSpc>
                           <a:spcPct val="115000"/>
                         </a:lnSpc>
@@ -7160,24 +7730,21 @@
                         <a:buNone/>
                       </a:pPr>
                       <a:r>
-                        <a:rPr lang="en-IL" sz="1200" kern="100" dirty="0">
+                        <a:rPr lang="en-US" sz="1200" kern="100" dirty="0">
                           <a:effectLst/>
+                          <a:latin typeface="Aptos" panose="020B0004020202020204" pitchFamily="34" charset="0"/>
+                          <a:ea typeface="Aptos" panose="020B0004020202020204" pitchFamily="34" charset="0"/>
+                          <a:cs typeface="Arial" panose="020B0604020202020204" pitchFamily="34" charset="0"/>
                         </a:rPr>
                         <a:t>Opcode from Fetch stage (padded to 32 bits)</a:t>
                       </a:r>
-                      <a:endParaRPr lang="en-IL" sz="1200" kern="100" dirty="0">
-                        <a:effectLst/>
-                        <a:latin typeface="Aptos" panose="020B0004020202020204" pitchFamily="34" charset="0"/>
-                        <a:ea typeface="Aptos" panose="020B0004020202020204" pitchFamily="34" charset="0"/>
-                        <a:cs typeface="Arial" panose="020B0604020202020204" pitchFamily="34" charset="0"/>
-                      </a:endParaRPr>
                     </a:p>
                   </a:txBody>
                   <a:tcPr marL="67744" marR="67744" marT="0" marB="0"/>
                 </a:tc>
                 <a:extLst>
                   <a:ext uri="{0D108BD9-81ED-4DB2-BD59-A6C34878D82A}">
-                    <a16:rowId xmlns:a16="http://schemas.microsoft.com/office/drawing/2014/main" val="695007286"/>
+                    <a16:rowId xmlns:a16="http://schemas.microsoft.com/office/drawing/2014/main" val="2194129227"/>
                   </a:ext>
                 </a:extLst>
               </a:tr>
@@ -7187,7 +7754,7 @@
                     <a:bodyPr/>
                     <a:lstStyle/>
                     <a:p>
-                      <a:pPr>
+                      <a:pPr algn="ctr">
                         <a:lnSpc>
                           <a:spcPct val="115000"/>
                         </a:lnSpc>
@@ -7217,7 +7784,7 @@
                     <a:bodyPr/>
                     <a:lstStyle/>
                     <a:p>
-                      <a:pPr>
+                      <a:pPr algn="ctr">
                         <a:lnSpc>
                           <a:spcPct val="115000"/>
                         </a:lnSpc>
@@ -7230,19 +7797,7 @@
                         <a:rPr lang="en-IL" sz="1200" kern="100" dirty="0">
                           <a:effectLst/>
                         </a:rPr>
-                        <a:t>        {25'b0, </a:t>
-                      </a:r>
-                      <a:r>
-                        <a:rPr lang="en-IL" sz="1200" kern="100" dirty="0" err="1">
-                          <a:effectLst/>
-                        </a:rPr>
-                        <a:t>opcodeDecode</a:t>
-                      </a:r>
-                      <a:r>
-                        <a:rPr lang="en-IL" sz="1200" kern="100" dirty="0">
-                          <a:effectLst/>
-                        </a:rPr>
-                        <a:t>}</a:t>
+                        <a:t>{25'b0, opcodeDecode}</a:t>
                       </a:r>
                       <a:endParaRPr lang="en-IL" sz="1200" kern="100" dirty="0">
                         <a:effectLst/>
@@ -7259,7 +7814,7 @@
                     <a:bodyPr/>
                     <a:lstStyle/>
                     <a:p>
-                      <a:pPr>
+                      <a:pPr algn="ctr">
                         <a:lnSpc>
                           <a:spcPct val="115000"/>
                         </a:lnSpc>
@@ -7296,7 +7851,7 @@
                     <a:bodyPr/>
                     <a:lstStyle/>
                     <a:p>
-                      <a:pPr>
+                      <a:pPr algn="ctr">
                         <a:lnSpc>
                           <a:spcPct val="115000"/>
                         </a:lnSpc>
@@ -7326,7 +7881,7 @@
                     <a:bodyPr/>
                     <a:lstStyle/>
                     <a:p>
-                      <a:pPr>
+                      <a:pPr algn="ctr">
                         <a:lnSpc>
                           <a:spcPct val="115000"/>
                         </a:lnSpc>
@@ -7336,12 +7891,12 @@
                         <a:buNone/>
                       </a:pPr>
                       <a:r>
-                        <a:rPr lang="en-IL" sz="1200" kern="100">
+                        <a:rPr lang="en-IL" sz="1200" kern="100" dirty="0">
                           <a:effectLst/>
                         </a:rPr>
-                        <a:t>        {25'b0, opcodeExecute}</a:t>
+                        <a:t>{25'b0, opcodeExecute}</a:t>
                       </a:r>
-                      <a:endParaRPr lang="en-IL" sz="1200" kern="100">
+                      <a:endParaRPr lang="en-IL" sz="1200" kern="100" dirty="0">
                         <a:effectLst/>
                         <a:latin typeface="Aptos" panose="020B0004020202020204" pitchFamily="34" charset="0"/>
                         <a:ea typeface="Aptos" panose="020B0004020202020204" pitchFamily="34" charset="0"/>
@@ -7356,7 +7911,7 @@
                     <a:bodyPr/>
                     <a:lstStyle/>
                     <a:p>
-                      <a:pPr>
+                      <a:pPr algn="ctr">
                         <a:lnSpc>
                           <a:spcPct val="115000"/>
                         </a:lnSpc>
@@ -7366,12 +7921,12 @@
                         <a:buNone/>
                       </a:pPr>
                       <a:r>
-                        <a:rPr lang="en-IL" sz="1200" kern="100">
+                        <a:rPr lang="en-IL" sz="1200" kern="100" dirty="0">
                           <a:effectLst/>
                         </a:rPr>
                         <a:t>Opcode form the operation in Execute stage (padded to 32 bits)</a:t>
                       </a:r>
-                      <a:endParaRPr lang="en-IL" sz="1200" kern="100">
+                      <a:endParaRPr lang="en-IL" sz="1200" kern="100" dirty="0">
                         <a:effectLst/>
                         <a:latin typeface="Aptos" panose="020B0004020202020204" pitchFamily="34" charset="0"/>
                         <a:ea typeface="Aptos" panose="020B0004020202020204" pitchFamily="34" charset="0"/>
@@ -7393,7 +7948,7 @@
                     <a:bodyPr/>
                     <a:lstStyle/>
                     <a:p>
-                      <a:pPr>
+                      <a:pPr algn="ctr">
                         <a:lnSpc>
                           <a:spcPct val="115000"/>
                         </a:lnSpc>
@@ -7423,7 +7978,7 @@
                     <a:bodyPr/>
                     <a:lstStyle/>
                     <a:p>
-                      <a:pPr>
+                      <a:pPr algn="ctr">
                         <a:lnSpc>
                           <a:spcPct val="115000"/>
                         </a:lnSpc>
@@ -7433,12 +7988,12 @@
                         <a:buNone/>
                       </a:pPr>
                       <a:r>
-                        <a:rPr lang="en-IL" sz="1200" kern="100">
+                        <a:rPr lang="en-IL" sz="1200" kern="100" dirty="0">
                           <a:effectLst/>
                         </a:rPr>
-                        <a:t>        {25'b0, opcodeMem}</a:t>
+                        <a:t>{25'b0, opcodeMem}</a:t>
                       </a:r>
-                      <a:endParaRPr lang="en-IL" sz="1200" kern="100">
+                      <a:endParaRPr lang="en-IL" sz="1200" kern="100" dirty="0">
                         <a:effectLst/>
                         <a:latin typeface="Aptos" panose="020B0004020202020204" pitchFamily="34" charset="0"/>
                         <a:ea typeface="Aptos" panose="020B0004020202020204" pitchFamily="34" charset="0"/>
@@ -7453,7 +8008,7 @@
                     <a:bodyPr/>
                     <a:lstStyle/>
                     <a:p>
-                      <a:pPr>
+                      <a:pPr algn="ctr">
                         <a:lnSpc>
                           <a:spcPct val="115000"/>
                         </a:lnSpc>
@@ -7463,12 +8018,12 @@
                         <a:buNone/>
                       </a:pPr>
                       <a:r>
-                        <a:rPr lang="en-IL" sz="1200" kern="100">
+                        <a:rPr lang="en-IL" sz="1200" kern="100" dirty="0">
                           <a:effectLst/>
                         </a:rPr>
                         <a:t>Opcode form the operation in Memory stage (padded to 32 bits)</a:t>
                       </a:r>
-                      <a:endParaRPr lang="en-IL" sz="1200" kern="100">
+                      <a:endParaRPr lang="en-IL" sz="1200" kern="100" dirty="0">
                         <a:effectLst/>
                         <a:latin typeface="Aptos" panose="020B0004020202020204" pitchFamily="34" charset="0"/>
                         <a:ea typeface="Aptos" panose="020B0004020202020204" pitchFamily="34" charset="0"/>
@@ -7490,7 +8045,7 @@
                     <a:bodyPr/>
                     <a:lstStyle/>
                     <a:p>
-                      <a:pPr>
+                      <a:pPr algn="ctr">
                         <a:lnSpc>
                           <a:spcPct val="115000"/>
                         </a:lnSpc>
@@ -7520,7 +8075,7 @@
                     <a:bodyPr/>
                     <a:lstStyle/>
                     <a:p>
-                      <a:pPr>
+                      <a:pPr algn="ctr">
                         <a:lnSpc>
                           <a:spcPct val="115000"/>
                         </a:lnSpc>
@@ -7533,19 +8088,7 @@
                         <a:rPr lang="en-IL" sz="1200" kern="100" dirty="0">
                           <a:effectLst/>
                         </a:rPr>
-                        <a:t>        {25'b0, </a:t>
-                      </a:r>
-                      <a:r>
-                        <a:rPr lang="en-IL" sz="1200" kern="100" dirty="0" err="1">
-                          <a:effectLst/>
-                        </a:rPr>
-                        <a:t>opcodeWb</a:t>
-                      </a:r>
-                      <a:r>
-                        <a:rPr lang="en-IL" sz="1200" kern="100" dirty="0">
-                          <a:effectLst/>
-                        </a:rPr>
-                        <a:t>}</a:t>
+                        <a:t>{25'b0, opcodeWb}</a:t>
                       </a:r>
                       <a:endParaRPr lang="en-IL" sz="1200" kern="100" dirty="0">
                         <a:effectLst/>
@@ -7562,7 +8105,7 @@
                     <a:bodyPr/>
                     <a:lstStyle/>
                     <a:p>
-                      <a:pPr>
+                      <a:pPr algn="ctr">
                         <a:lnSpc>
                           <a:spcPct val="115000"/>
                         </a:lnSpc>
@@ -7599,7 +8142,7 @@
                     <a:bodyPr/>
                     <a:lstStyle/>
                     <a:p>
-                      <a:pPr>
+                      <a:pPr algn="ctr">
                         <a:lnSpc>
                           <a:spcPct val="115000"/>
                         </a:lnSpc>
@@ -7629,7 +8172,7 @@
                     <a:bodyPr/>
                     <a:lstStyle/>
                     <a:p>
-                      <a:pPr>
+                      <a:pPr algn="ctr">
                         <a:lnSpc>
                           <a:spcPct val="115000"/>
                         </a:lnSpc>
@@ -7639,12 +8182,12 @@
                         <a:buNone/>
                       </a:pPr>
                       <a:r>
-                        <a:rPr lang="en-IL" sz="1200" kern="100">
+                        <a:rPr lang="en-IL" sz="1200" kern="100" dirty="0">
                           <a:effectLst/>
                         </a:rPr>
-                        <a:t>        {25'b0, Funct7Decode_Dout}</a:t>
+                        <a:t>{25'b0, Funct7Decode_Dout}</a:t>
                       </a:r>
-                      <a:endParaRPr lang="en-IL" sz="1200" kern="100">
+                      <a:endParaRPr lang="en-IL" sz="1200" kern="100" dirty="0">
                         <a:effectLst/>
                         <a:latin typeface="Aptos" panose="020B0004020202020204" pitchFamily="34" charset="0"/>
                         <a:ea typeface="Aptos" panose="020B0004020202020204" pitchFamily="34" charset="0"/>
@@ -7659,7 +8202,7 @@
                     <a:bodyPr/>
                     <a:lstStyle/>
                     <a:p>
-                      <a:pPr>
+                      <a:pPr algn="ctr">
                         <a:lnSpc>
                           <a:spcPct val="115000"/>
                         </a:lnSpc>
@@ -7669,12 +8212,12 @@
                         <a:buNone/>
                       </a:pPr>
                       <a:r>
-                        <a:rPr lang="en-IL" sz="1200" kern="100">
+                        <a:rPr lang="en-IL" sz="1200" kern="100" dirty="0">
                           <a:effectLst/>
                         </a:rPr>
                         <a:t>Funct7 form the operation in Decode stage (padded to 32 bits)</a:t>
                       </a:r>
-                      <a:endParaRPr lang="en-IL" sz="1200" kern="100">
+                      <a:endParaRPr lang="en-IL" sz="1200" kern="100" dirty="0">
                         <a:effectLst/>
                         <a:latin typeface="Aptos" panose="020B0004020202020204" pitchFamily="34" charset="0"/>
                         <a:ea typeface="Aptos" panose="020B0004020202020204" pitchFamily="34" charset="0"/>
@@ -7696,7 +8239,7 @@
                     <a:bodyPr/>
                     <a:lstStyle/>
                     <a:p>
-                      <a:pPr>
+                      <a:pPr algn="ctr">
                         <a:lnSpc>
                           <a:spcPct val="115000"/>
                         </a:lnSpc>
@@ -7726,7 +8269,7 @@
                     <a:bodyPr/>
                     <a:lstStyle/>
                     <a:p>
-                      <a:pPr>
+                      <a:pPr algn="ctr">
                         <a:lnSpc>
                           <a:spcPct val="115000"/>
                         </a:lnSpc>
@@ -7736,12 +8279,12 @@
                         <a:buNone/>
                       </a:pPr>
                       <a:r>
-                        <a:rPr lang="en-IL" sz="1200" kern="100">
+                        <a:rPr lang="en-IL" sz="1200" kern="100" dirty="0">
                           <a:effectLst/>
                         </a:rPr>
-                        <a:t>        {29'b0, Funct3Decode_Dout}</a:t>
+                        <a:t>{29'b0, Funct3Decode_Dout}</a:t>
                       </a:r>
-                      <a:endParaRPr lang="en-IL" sz="1200" kern="100">
+                      <a:endParaRPr lang="en-IL" sz="1200" kern="100" dirty="0">
                         <a:effectLst/>
                         <a:latin typeface="Aptos" panose="020B0004020202020204" pitchFamily="34" charset="0"/>
                         <a:ea typeface="Aptos" panose="020B0004020202020204" pitchFamily="34" charset="0"/>
@@ -7756,7 +8299,7 @@
                     <a:bodyPr/>
                     <a:lstStyle/>
                     <a:p>
-                      <a:pPr>
+                      <a:pPr algn="ctr">
                         <a:lnSpc>
                           <a:spcPct val="115000"/>
                         </a:lnSpc>
@@ -7766,12 +8309,12 @@
                         <a:buNone/>
                       </a:pPr>
                       <a:r>
-                        <a:rPr lang="en-IL" sz="1200" kern="100">
+                        <a:rPr lang="en-IL" sz="1200" kern="100" dirty="0">
                           <a:effectLst/>
                         </a:rPr>
                         <a:t>Funct3 form the operation in Decode stage (padded to 32 bits)</a:t>
                       </a:r>
-                      <a:endParaRPr lang="en-IL" sz="1200" kern="100">
+                      <a:endParaRPr lang="en-IL" sz="1200" kern="100" dirty="0">
                         <a:effectLst/>
                         <a:latin typeface="Aptos" panose="020B0004020202020204" pitchFamily="34" charset="0"/>
                         <a:ea typeface="Aptos" panose="020B0004020202020204" pitchFamily="34" charset="0"/>
@@ -7793,7 +8336,7 @@
                     <a:bodyPr/>
                     <a:lstStyle/>
                     <a:p>
-                      <a:pPr>
+                      <a:pPr algn="ctr">
                         <a:lnSpc>
                           <a:spcPct val="115000"/>
                         </a:lnSpc>
@@ -7823,7 +8366,7 @@
                     <a:bodyPr/>
                     <a:lstStyle/>
                     <a:p>
-                      <a:pPr>
+                      <a:pPr algn="ctr">
                         <a:lnSpc>
                           <a:spcPct val="115000"/>
                         </a:lnSpc>
@@ -7833,12 +8376,12 @@
                         <a:buNone/>
                       </a:pPr>
                       <a:r>
-                        <a:rPr lang="en-IL" sz="1200" kern="100">
+                        <a:rPr lang="en-IL" sz="1200" kern="100" dirty="0">
                           <a:effectLst/>
                         </a:rPr>
-                        <a:t>        {25'b0, Funct7Execute_Dout}</a:t>
+                        <a:t>{25'b0, Funct7Execute_Dout}</a:t>
                       </a:r>
-                      <a:endParaRPr lang="en-IL" sz="1200" kern="100">
+                      <a:endParaRPr lang="en-IL" sz="1200" kern="100" dirty="0">
                         <a:effectLst/>
                         <a:latin typeface="Aptos" panose="020B0004020202020204" pitchFamily="34" charset="0"/>
                         <a:ea typeface="Aptos" panose="020B0004020202020204" pitchFamily="34" charset="0"/>
@@ -7853,7 +8396,7 @@
                     <a:bodyPr/>
                     <a:lstStyle/>
                     <a:p>
-                      <a:pPr>
+                      <a:pPr algn="ctr">
                         <a:lnSpc>
                           <a:spcPct val="115000"/>
                         </a:lnSpc>
@@ -7863,12 +8406,12 @@
                         <a:buNone/>
                       </a:pPr>
                       <a:r>
-                        <a:rPr lang="en-IL" sz="1200" kern="100">
+                        <a:rPr lang="en-IL" sz="1200" kern="100" dirty="0">
                           <a:effectLst/>
                         </a:rPr>
                         <a:t>Funct7 form the operation in Execute stage (padded to 32 bits)</a:t>
                       </a:r>
-                      <a:endParaRPr lang="en-IL" sz="1200" kern="100">
+                      <a:endParaRPr lang="en-IL" sz="1200" kern="100" dirty="0">
                         <a:effectLst/>
                         <a:latin typeface="Aptos" panose="020B0004020202020204" pitchFamily="34" charset="0"/>
                         <a:ea typeface="Aptos" panose="020B0004020202020204" pitchFamily="34" charset="0"/>
@@ -7890,7 +8433,7 @@
                     <a:bodyPr/>
                     <a:lstStyle/>
                     <a:p>
-                      <a:pPr>
+                      <a:pPr algn="ctr">
                         <a:lnSpc>
                           <a:spcPct val="115000"/>
                         </a:lnSpc>
@@ -7920,7 +8463,7 @@
                     <a:bodyPr/>
                     <a:lstStyle/>
                     <a:p>
-                      <a:pPr>
+                      <a:pPr algn="ctr">
                         <a:lnSpc>
                           <a:spcPct val="115000"/>
                         </a:lnSpc>
@@ -7930,12 +8473,12 @@
                         <a:buNone/>
                       </a:pPr>
                       <a:r>
-                        <a:rPr lang="en-IL" sz="1200" kern="100">
+                        <a:rPr lang="en-IL" sz="1200" kern="100" dirty="0">
                           <a:effectLst/>
                         </a:rPr>
-                        <a:t>        {29'b0, Funct3Execute_Dout}</a:t>
+                        <a:t>{29'b0, Funct3Execute_Dout}</a:t>
                       </a:r>
-                      <a:endParaRPr lang="en-IL" sz="1200" kern="100">
+                      <a:endParaRPr lang="en-IL" sz="1200" kern="100" dirty="0">
                         <a:effectLst/>
                         <a:latin typeface="Aptos" panose="020B0004020202020204" pitchFamily="34" charset="0"/>
                         <a:ea typeface="Aptos" panose="020B0004020202020204" pitchFamily="34" charset="0"/>
@@ -7950,7 +8493,7 @@
                     <a:bodyPr/>
                     <a:lstStyle/>
                     <a:p>
-                      <a:pPr>
+                      <a:pPr algn="ctr">
                         <a:lnSpc>
                           <a:spcPct val="115000"/>
                         </a:lnSpc>
@@ -7960,12 +8503,12 @@
                         <a:buNone/>
                       </a:pPr>
                       <a:r>
-                        <a:rPr lang="en-IL" sz="1200" kern="100">
+                        <a:rPr lang="en-IL" sz="1200" kern="100" dirty="0">
                           <a:effectLst/>
                         </a:rPr>
                         <a:t>Funct3 form the operation in Execute stage (padded to 32 bits)</a:t>
                       </a:r>
-                      <a:endParaRPr lang="en-IL" sz="1200" kern="100">
+                      <a:endParaRPr lang="en-IL" sz="1200" kern="100" dirty="0">
                         <a:effectLst/>
                         <a:latin typeface="Aptos" panose="020B0004020202020204" pitchFamily="34" charset="0"/>
                         <a:ea typeface="Aptos" panose="020B0004020202020204" pitchFamily="34" charset="0"/>
@@ -7987,7 +8530,7 @@
                     <a:bodyPr/>
                     <a:lstStyle/>
                     <a:p>
-                      <a:pPr>
+                      <a:pPr algn="ctr">
                         <a:lnSpc>
                           <a:spcPct val="115000"/>
                         </a:lnSpc>
@@ -8017,7 +8560,7 @@
                     <a:bodyPr/>
                     <a:lstStyle/>
                     <a:p>
-                      <a:pPr>
+                      <a:pPr algn="ctr">
                         <a:lnSpc>
                           <a:spcPct val="115000"/>
                         </a:lnSpc>
@@ -8027,12 +8570,12 @@
                         <a:buNone/>
                       </a:pPr>
                       <a:r>
-                        <a:rPr lang="en-IL" sz="1200" kern="100">
+                        <a:rPr lang="en-IL" sz="1200" kern="100" dirty="0">
                           <a:effectLst/>
                         </a:rPr>
-                        <a:t>        {25'b0, Funct7Mem_Dout}</a:t>
+                        <a:t>{25'b0, Funct7Mem_Dout}</a:t>
                       </a:r>
-                      <a:endParaRPr lang="en-IL" sz="1200" kern="100">
+                      <a:endParaRPr lang="en-IL" sz="1200" kern="100" dirty="0">
                         <a:effectLst/>
                         <a:latin typeface="Aptos" panose="020B0004020202020204" pitchFamily="34" charset="0"/>
                         <a:ea typeface="Aptos" panose="020B0004020202020204" pitchFamily="34" charset="0"/>
@@ -8047,7 +8590,7 @@
                     <a:bodyPr/>
                     <a:lstStyle/>
                     <a:p>
-                      <a:pPr>
+                      <a:pPr algn="ctr">
                         <a:lnSpc>
                           <a:spcPct val="115000"/>
                         </a:lnSpc>
@@ -8084,7 +8627,7 @@
                     <a:bodyPr/>
                     <a:lstStyle/>
                     <a:p>
-                      <a:pPr>
+                      <a:pPr algn="ctr">
                         <a:lnSpc>
                           <a:spcPct val="115000"/>
                         </a:lnSpc>
@@ -8114,7 +8657,7 @@
                     <a:bodyPr/>
                     <a:lstStyle/>
                     <a:p>
-                      <a:pPr>
+                      <a:pPr algn="ctr">
                         <a:lnSpc>
                           <a:spcPct val="115000"/>
                         </a:lnSpc>
@@ -8124,12 +8667,12 @@
                         <a:buNone/>
                       </a:pPr>
                       <a:r>
-                        <a:rPr lang="en-IL" sz="1200" kern="100">
+                        <a:rPr lang="en-IL" sz="1200" kern="100" dirty="0">
                           <a:effectLst/>
                         </a:rPr>
-                        <a:t>        {29'b0, Funct3Mem_Dout}</a:t>
+                        <a:t>{29'b0, Funct3Mem_Dout}</a:t>
                       </a:r>
-                      <a:endParaRPr lang="en-IL" sz="1200" kern="100">
+                      <a:endParaRPr lang="en-IL" sz="1200" kern="100" dirty="0">
                         <a:effectLst/>
                         <a:latin typeface="Aptos" panose="020B0004020202020204" pitchFamily="34" charset="0"/>
                         <a:ea typeface="Aptos" panose="020B0004020202020204" pitchFamily="34" charset="0"/>
@@ -8144,7 +8687,7 @@
                     <a:bodyPr/>
                     <a:lstStyle/>
                     <a:p>
-                      <a:pPr>
+                      <a:pPr algn="ctr">
                         <a:lnSpc>
                           <a:spcPct val="115000"/>
                         </a:lnSpc>
@@ -8154,12 +8697,12 @@
                         <a:buNone/>
                       </a:pPr>
                       <a:r>
-                        <a:rPr lang="en-IL" sz="1200" kern="100">
+                        <a:rPr lang="en-IL" sz="1200" kern="100" dirty="0">
                           <a:effectLst/>
                         </a:rPr>
                         <a:t>Funct3 form the operation in Memory stage (padded to 32 bits)</a:t>
                       </a:r>
-                      <a:endParaRPr lang="en-IL" sz="1200" kern="100">
+                      <a:endParaRPr lang="en-IL" sz="1200" kern="100" dirty="0">
                         <a:effectLst/>
                         <a:latin typeface="Aptos" panose="020B0004020202020204" pitchFamily="34" charset="0"/>
                         <a:ea typeface="Aptos" panose="020B0004020202020204" pitchFamily="34" charset="0"/>
@@ -8181,7 +8724,7 @@
                     <a:bodyPr/>
                     <a:lstStyle/>
                     <a:p>
-                      <a:pPr>
+                      <a:pPr algn="ctr">
                         <a:lnSpc>
                           <a:spcPct val="115000"/>
                         </a:lnSpc>
@@ -8211,7 +8754,7 @@
                     <a:bodyPr/>
                     <a:lstStyle/>
                     <a:p>
-                      <a:pPr>
+                      <a:pPr algn="ctr">
                         <a:lnSpc>
                           <a:spcPct val="115000"/>
                         </a:lnSpc>
@@ -8221,12 +8764,12 @@
                         <a:buNone/>
                       </a:pPr>
                       <a:r>
-                        <a:rPr lang="en-IL" sz="1200" kern="100">
+                        <a:rPr lang="en-IL" sz="1200" kern="100" dirty="0">
                           <a:effectLst/>
                         </a:rPr>
-                        <a:t>        {25'b0, Funct7Wb_Dout}</a:t>
+                        <a:t>{25'b0, Funct7Wb_Dout}</a:t>
                       </a:r>
-                      <a:endParaRPr lang="en-IL" sz="1200" kern="100">
+                      <a:endParaRPr lang="en-IL" sz="1200" kern="100" dirty="0">
                         <a:effectLst/>
                         <a:latin typeface="Aptos" panose="020B0004020202020204" pitchFamily="34" charset="0"/>
                         <a:ea typeface="Aptos" panose="020B0004020202020204" pitchFamily="34" charset="0"/>
@@ -8241,7 +8784,7 @@
                     <a:bodyPr/>
                     <a:lstStyle/>
                     <a:p>
-                      <a:pPr>
+                      <a:pPr algn="ctr">
                         <a:lnSpc>
                           <a:spcPct val="115000"/>
                         </a:lnSpc>
@@ -8251,12 +8794,12 @@
                         <a:buNone/>
                       </a:pPr>
                       <a:r>
-                        <a:rPr lang="en-IL" sz="1200" kern="100">
+                        <a:rPr lang="en-IL" sz="1200" kern="100" dirty="0">
                           <a:effectLst/>
                         </a:rPr>
                         <a:t>Funct7 form the operation in Writeback stage (padded to 32 bits)</a:t>
                       </a:r>
-                      <a:endParaRPr lang="en-IL" sz="1200" kern="100">
+                      <a:endParaRPr lang="en-IL" sz="1200" kern="100" dirty="0">
                         <a:effectLst/>
                         <a:latin typeface="Aptos" panose="020B0004020202020204" pitchFamily="34" charset="0"/>
                         <a:ea typeface="Aptos" panose="020B0004020202020204" pitchFamily="34" charset="0"/>
@@ -8278,7 +8821,7 @@
                     <a:bodyPr/>
                     <a:lstStyle/>
                     <a:p>
-                      <a:pPr>
+                      <a:pPr algn="ctr">
                         <a:lnSpc>
                           <a:spcPct val="115000"/>
                         </a:lnSpc>
@@ -8308,7 +8851,7 @@
                     <a:bodyPr/>
                     <a:lstStyle/>
                     <a:p>
-                      <a:pPr>
+                      <a:pPr algn="ctr">
                         <a:lnSpc>
                           <a:spcPct val="115000"/>
                         </a:lnSpc>
@@ -8318,12 +8861,12 @@
                         <a:buNone/>
                       </a:pPr>
                       <a:r>
-                        <a:rPr lang="en-IL" sz="1200" kern="100">
+                        <a:rPr lang="en-IL" sz="1200" kern="100" dirty="0">
                           <a:effectLst/>
                         </a:rPr>
-                        <a:t>        {29'b0, Funct3Wb_Dout}</a:t>
+                        <a:t>{29'b0, Funct3Wb_Dout}</a:t>
                       </a:r>
-                      <a:endParaRPr lang="en-IL" sz="1200" kern="100">
+                      <a:endParaRPr lang="en-IL" sz="1200" kern="100" dirty="0">
                         <a:effectLst/>
                         <a:latin typeface="Aptos" panose="020B0004020202020204" pitchFamily="34" charset="0"/>
                         <a:ea typeface="Aptos" panose="020B0004020202020204" pitchFamily="34" charset="0"/>
@@ -8338,7 +8881,7 @@
                     <a:bodyPr/>
                     <a:lstStyle/>
                     <a:p>
-                      <a:pPr>
+                      <a:pPr algn="ctr">
                         <a:lnSpc>
                           <a:spcPct val="115000"/>
                         </a:lnSpc>
@@ -8348,12 +8891,12 @@
                         <a:buNone/>
                       </a:pPr>
                       <a:r>
-                        <a:rPr lang="en-IL" sz="1200" kern="100">
+                        <a:rPr lang="en-IL" sz="1200" kern="100" dirty="0">
                           <a:effectLst/>
                         </a:rPr>
                         <a:t>Funct3 form the operation in Writeback stage (padded to 32 bits)</a:t>
                       </a:r>
-                      <a:endParaRPr lang="en-IL" sz="1200" kern="100">
+                      <a:endParaRPr lang="en-IL" sz="1200" kern="100" dirty="0">
                         <a:effectLst/>
                         <a:latin typeface="Aptos" panose="020B0004020202020204" pitchFamily="34" charset="0"/>
                         <a:ea typeface="Aptos" panose="020B0004020202020204" pitchFamily="34" charset="0"/>
@@ -8375,7 +8918,7 @@
                     <a:bodyPr/>
                     <a:lstStyle/>
                     <a:p>
-                      <a:pPr>
+                      <a:pPr algn="ctr">
                         <a:lnSpc>
                           <a:spcPct val="115000"/>
                         </a:lnSpc>
@@ -8405,7 +8948,7 @@
                     <a:bodyPr/>
                     <a:lstStyle/>
                     <a:p>
-                      <a:pPr>
+                      <a:pPr algn="ctr">
                         <a:lnSpc>
                           <a:spcPct val="115000"/>
                         </a:lnSpc>
@@ -8418,7 +8961,7 @@
                         <a:rPr lang="en-IL" sz="1200" kern="100" dirty="0">
                           <a:effectLst/>
                         </a:rPr>
-                        <a:t>        {23'b0, </a:t>
+                        <a:t>{23'b0, </a:t>
                       </a:r>
                       <a:r>
                         <a:rPr lang="en-IL" sz="1200" kern="100" dirty="0" err="1">
@@ -8447,7 +8990,7 @@
                     <a:bodyPr/>
                     <a:lstStyle/>
                     <a:p>
-                      <a:pPr>
+                      <a:pPr algn="ctr">
                         <a:lnSpc>
                           <a:spcPct val="115000"/>
                         </a:lnSpc>
@@ -8457,12 +9000,12 @@
                         <a:buNone/>
                       </a:pPr>
                       <a:r>
-                        <a:rPr lang="en-IL" sz="1200" kern="100">
+                        <a:rPr lang="en-IL" sz="1200" kern="100" dirty="0">
                           <a:effectLst/>
                         </a:rPr>
                         <a:t>Program Counter (padded to 32 bits)</a:t>
                       </a:r>
-                      <a:endParaRPr lang="en-IL" sz="1200" kern="100">
+                      <a:endParaRPr lang="en-IL" sz="1200" kern="100" dirty="0">
                         <a:effectLst/>
                         <a:latin typeface="Aptos" panose="020B0004020202020204" pitchFamily="34" charset="0"/>
                         <a:ea typeface="Aptos" panose="020B0004020202020204" pitchFamily="34" charset="0"/>
@@ -8484,7 +9027,7 @@
                     <a:bodyPr/>
                     <a:lstStyle/>
                     <a:p>
-                      <a:pPr>
+                      <a:pPr algn="ctr">
                         <a:lnSpc>
                           <a:spcPct val="115000"/>
                         </a:lnSpc>
@@ -8514,7 +9057,7 @@
                     <a:bodyPr/>
                     <a:lstStyle/>
                     <a:p>
-                      <a:pPr>
+                      <a:pPr algn="ctr">
                         <a:lnSpc>
                           <a:spcPct val="115000"/>
                         </a:lnSpc>
@@ -8524,12 +9067,12 @@
                         <a:buNone/>
                       </a:pPr>
                       <a:r>
-                        <a:rPr lang="en-IL" sz="1200" kern="100">
+                        <a:rPr lang="en-IL" sz="1200" kern="100" dirty="0" err="1">
                           <a:effectLst/>
                         </a:rPr>
-                        <a:t>        FAmux_Result_debug</a:t>
+                        <a:t>FAmux_Result_debug</a:t>
                       </a:r>
-                      <a:endParaRPr lang="en-IL" sz="1200" kern="100">
+                      <a:endParaRPr lang="en-IL" sz="1200" kern="100" dirty="0">
                         <a:effectLst/>
                         <a:latin typeface="Aptos" panose="020B0004020202020204" pitchFamily="34" charset="0"/>
                         <a:ea typeface="Aptos" panose="020B0004020202020204" pitchFamily="34" charset="0"/>
@@ -8544,7 +9087,7 @@
                     <a:bodyPr/>
                     <a:lstStyle/>
                     <a:p>
-                      <a:pPr>
+                      <a:pPr algn="ctr">
                         <a:lnSpc>
                           <a:spcPct val="115000"/>
                         </a:lnSpc>
@@ -8579,207 +9122,29 @@
           </a:graphicData>
         </a:graphic>
       </p:graphicFrame>
-    </p:spTree>
-    <p:extLst>
-      <p:ext uri="{BB962C8B-B14F-4D97-AF65-F5344CB8AC3E}">
-        <p14:creationId xmlns:p14="http://schemas.microsoft.com/office/powerpoint/2010/main" val="2802876541"/>
-      </p:ext>
-    </p:extLst>
-  </p:cSld>
-  <p:clrMapOvr>
-    <a:masterClrMapping/>
-  </p:clrMapOvr>
-</p:sld>
-</file>
-
-<file path=ppt/slides/slide11.xml><?xml version="1.0" encoding="utf-8"?>
-<p:sld xmlns:a="http://schemas.openxmlformats.org/drawingml/2006/main" xmlns:r="http://schemas.openxmlformats.org/officeDocument/2006/relationships" xmlns:p="http://schemas.openxmlformats.org/presentationml/2006/main">
-  <p:cSld>
-    <p:spTree>
-      <p:nvGrpSpPr>
-        <p:cNvPr id="1" name="">
-          <a:extLst>
-            <a:ext uri="{FF2B5EF4-FFF2-40B4-BE49-F238E27FC236}">
-              <a16:creationId xmlns:a16="http://schemas.microsoft.com/office/drawing/2014/main" id="{781AA9EA-E9F9-A326-3F16-EB8153A4F31E}"/>
-            </a:ext>
-          </a:extLst>
-        </p:cNvPr>
-        <p:cNvGrpSpPr/>
-        <p:nvPr/>
-      </p:nvGrpSpPr>
-      <p:grpSpPr>
-        <a:xfrm>
-          <a:off x="0" y="0"/>
-          <a:ext cx="0" cy="0"/>
-          <a:chOff x="0" y="0"/>
-          <a:chExt cx="0" cy="0"/>
-        </a:xfrm>
-      </p:grpSpPr>
-      <p:sp>
-        <p:nvSpPr>
-          <p:cNvPr id="19" name="Rectangle 18">
+      <p:graphicFrame>
+        <p:nvGraphicFramePr>
+          <p:cNvPr id="2" name="Content Placeholder 4">
             <a:extLst>
               <a:ext uri="{FF2B5EF4-FFF2-40B4-BE49-F238E27FC236}">
-                <a16:creationId xmlns:a16="http://schemas.microsoft.com/office/drawing/2014/main" id="{3D61C9F6-4617-CF28-E1DD-E09CC9F06F8D}"/>
-              </a:ext>
-            </a:extLst>
-          </p:cNvPr>
-          <p:cNvSpPr/>
-          <p:nvPr/>
-        </p:nvSpPr>
-        <p:spPr>
-          <a:xfrm>
-            <a:off x="1462167" y="1195602"/>
-            <a:ext cx="10729833" cy="1053885"/>
-          </a:xfrm>
-          <a:prstGeom prst="rect">
-            <a:avLst/>
-          </a:prstGeom>
-        </p:spPr>
-        <p:style>
-          <a:lnRef idx="0">
-            <a:schemeClr val="dk1">
-              <a:alpha val="0"/>
-              <a:hueOff val="0"/>
-              <a:satOff val="0"/>
-              <a:lumOff val="0"/>
-              <a:alphaOff val="0"/>
-            </a:schemeClr>
-          </a:lnRef>
-          <a:fillRef idx="0">
-            <a:schemeClr val="lt1">
-              <a:alpha val="0"/>
-              <a:hueOff val="0"/>
-              <a:satOff val="0"/>
-              <a:lumOff val="0"/>
-              <a:alphaOff val="0"/>
-            </a:schemeClr>
-          </a:fillRef>
-          <a:effectRef idx="0">
-            <a:schemeClr val="lt1">
-              <a:alpha val="0"/>
-              <a:hueOff val="0"/>
-              <a:satOff val="0"/>
-              <a:lumOff val="0"/>
-              <a:alphaOff val="0"/>
-            </a:schemeClr>
-          </a:effectRef>
-          <a:fontRef idx="minor">
-            <a:schemeClr val="tx1">
-              <a:hueOff val="0"/>
-              <a:satOff val="0"/>
-              <a:lumOff val="0"/>
-              <a:alphaOff val="0"/>
-            </a:schemeClr>
-          </a:fontRef>
-        </p:style>
-        <p:txBody>
-          <a:bodyPr/>
-          <a:lstStyle/>
-          <a:p>
-            <a:endParaRPr lang="en-IL"/>
-          </a:p>
-        </p:txBody>
-      </p:sp>
-      <p:sp>
-        <p:nvSpPr>
-          <p:cNvPr id="7" name="כותרת 1">
-            <a:extLst>
-              <a:ext uri="{FF2B5EF4-FFF2-40B4-BE49-F238E27FC236}">
-                <a16:creationId xmlns:a16="http://schemas.microsoft.com/office/drawing/2014/main" id="{88B65038-0ADF-F966-41C8-B846679D6009}"/>
-              </a:ext>
-            </a:extLst>
-          </p:cNvPr>
-          <p:cNvSpPr>
-            <a:spLocks noGrp="1"/>
-          </p:cNvSpPr>
-          <p:nvPr>
-            <p:ph type="title"/>
-          </p:nvPr>
-        </p:nvSpPr>
-        <p:spPr>
-          <a:xfrm>
-            <a:off x="305349" y="603066"/>
-            <a:ext cx="10319512" cy="592536"/>
-          </a:xfrm>
-        </p:spPr>
-        <p:txBody>
-          <a:bodyPr vert="horz" lIns="91440" tIns="45720" rIns="91440" bIns="45720" rtlCol="0" anchor="b">
-            <a:normAutofit fontScale="90000"/>
-          </a:bodyPr>
-          <a:lstStyle/>
-          <a:p>
-            <a:pPr algn="ctr" rtl="0"/>
-            <a:r>
-              <a:rPr lang="en-US" sz="3200" b="1" i="0" kern="1200" dirty="0">
-                <a:solidFill>
-                  <a:schemeClr val="tx1"/>
-                </a:solidFill>
-                <a:effectLst/>
-                <a:latin typeface="+mj-lt"/>
-                <a:ea typeface="+mj-ea"/>
-                <a:cs typeface="+mj-cs"/>
-              </a:rPr>
-              <a:t>Architectural design of the selected solution </a:t>
-            </a:r>
-            <a:br>
-              <a:rPr lang="en-US" sz="3200" b="1" i="0" kern="1200" dirty="0">
-                <a:solidFill>
-                  <a:schemeClr val="tx1"/>
-                </a:solidFill>
-                <a:effectLst/>
-                <a:latin typeface="+mj-lt"/>
-                <a:ea typeface="+mj-ea"/>
-                <a:cs typeface="+mj-cs"/>
-              </a:rPr>
-            </a:br>
-            <a:r>
-              <a:rPr lang="en-US" sz="3200" b="1" i="0" kern="1200" dirty="0">
-                <a:solidFill>
-                  <a:schemeClr val="tx1"/>
-                </a:solidFill>
-                <a:effectLst/>
-                <a:latin typeface="+mj-lt"/>
-                <a:ea typeface="+mj-ea"/>
-                <a:cs typeface="+mj-cs"/>
-              </a:rPr>
-              <a:t>Debug unit</a:t>
-            </a:r>
-            <a:endParaRPr lang="en-US" sz="3200" b="1" kern="1200" dirty="0">
-              <a:solidFill>
-                <a:schemeClr val="tx1"/>
-              </a:solidFill>
-              <a:latin typeface="+mj-lt"/>
-              <a:ea typeface="+mj-ea"/>
-              <a:cs typeface="+mj-cs"/>
-            </a:endParaRPr>
-          </a:p>
-        </p:txBody>
-      </p:sp>
-      <p:graphicFrame>
-        <p:nvGraphicFramePr>
-          <p:cNvPr id="5" name="Content Placeholder 4">
-            <a:extLst>
-              <a:ext uri="{FF2B5EF4-FFF2-40B4-BE49-F238E27FC236}">
-                <a16:creationId xmlns:a16="http://schemas.microsoft.com/office/drawing/2014/main" id="{23C28224-D79A-EA2C-C5D2-51DCF839AD1C}"/>
+                <a16:creationId xmlns:a16="http://schemas.microsoft.com/office/drawing/2014/main" id="{2634EE20-72FF-FCAC-299F-F301FDE62D20}"/>
               </a:ext>
             </a:extLst>
           </p:cNvPr>
           <p:cNvGraphicFramePr>
-            <a:graphicFrameLocks noGrp="1"/>
+            <a:graphicFrameLocks/>
           </p:cNvGraphicFramePr>
           <p:nvPr>
-            <p:ph idx="1"/>
             <p:extLst>
               <p:ext uri="{D42A27DB-BD31-4B8C-83A1-F6EECF244321}">
-                <p14:modId xmlns:p14="http://schemas.microsoft.com/office/powerpoint/2010/main" val="2381226379"/>
+                <p14:modId xmlns:p14="http://schemas.microsoft.com/office/powerpoint/2010/main" val="1780487609"/>
               </p:ext>
             </p:extLst>
           </p:nvPr>
         </p:nvGraphicFramePr>
         <p:xfrm>
-          <a:off x="1" y="1396721"/>
-          <a:ext cx="12192000" cy="5461274"/>
+          <a:off x="7059167" y="1143378"/>
+          <a:ext cx="5132833" cy="5704469"/>
         </p:xfrm>
         <a:graphic>
           <a:graphicData uri="http://schemas.openxmlformats.org/drawingml/2006/table">
@@ -8788,21 +9153,21 @@
                 <a:tableStyleId>{5C22544A-7EE6-4342-B048-85BDC9FD1C3A}</a:tableStyleId>
               </a:tblPr>
               <a:tblGrid>
-                <a:gridCol w="598206">
+                <a:gridCol w="356617">
                   <a:extLst>
                     <a:ext uri="{9D8B030D-6E8A-4147-A177-3AD203B41FA5}">
                       <a16:colId xmlns:a16="http://schemas.microsoft.com/office/drawing/2014/main" val="1480150233"/>
                     </a:ext>
                   </a:extLst>
                 </a:gridCol>
-                <a:gridCol w="2144993">
+                <a:gridCol w="1490472">
                   <a:extLst>
                     <a:ext uri="{9D8B030D-6E8A-4147-A177-3AD203B41FA5}">
                       <a16:colId xmlns:a16="http://schemas.microsoft.com/office/drawing/2014/main" val="1601913796"/>
                     </a:ext>
                   </a:extLst>
                 </a:gridCol>
-                <a:gridCol w="9448801">
+                <a:gridCol w="3285744">
                   <a:extLst>
                     <a:ext uri="{9D8B030D-6E8A-4147-A177-3AD203B41FA5}">
                       <a16:colId xmlns:a16="http://schemas.microsoft.com/office/drawing/2014/main" val="663607051"/>
@@ -8810,13 +9175,13 @@
                   </a:extLst>
                 </a:gridCol>
               </a:tblGrid>
-              <a:tr h="318325">
+              <a:tr h="206661">
                 <a:tc>
                   <a:txBody>
                     <a:bodyPr/>
                     <a:lstStyle/>
                     <a:p>
-                      <a:pPr>
+                      <a:pPr algn="ctr">
                         <a:lnSpc>
                           <a:spcPct val="115000"/>
                         </a:lnSpc>
@@ -8826,12 +9191,15 @@
                         <a:buNone/>
                       </a:pPr>
                       <a:r>
-                        <a:rPr lang="en-IL" sz="1200" kern="100">
+                        <a:rPr lang="en-US" sz="1200" kern="100" dirty="0">
                           <a:effectLst/>
+                          <a:latin typeface="Aptos" panose="020B0004020202020204" pitchFamily="34" charset="0"/>
+                          <a:ea typeface="Aptos" panose="020B0004020202020204" pitchFamily="34" charset="0"/>
+                          <a:cs typeface="Arial" panose="020B0604020202020204" pitchFamily="34" charset="0"/>
                         </a:rPr>
-                        <a:t>15</a:t>
+                        <a:t>Sel</a:t>
                       </a:r>
-                      <a:endParaRPr lang="en-IL" sz="1200" kern="100">
+                      <a:endParaRPr lang="en-IL" sz="1200" kern="100" dirty="0">
                         <a:effectLst/>
                         <a:latin typeface="Aptos" panose="020B0004020202020204" pitchFamily="34" charset="0"/>
                         <a:ea typeface="Aptos" panose="020B0004020202020204" pitchFamily="34" charset="0"/>
@@ -8846,7 +9214,7 @@
                     <a:bodyPr/>
                     <a:lstStyle/>
                     <a:p>
-                      <a:pPr>
+                      <a:pPr algn="ctr">
                         <a:lnSpc>
                           <a:spcPct val="115000"/>
                         </a:lnSpc>
@@ -8856,14 +9224,117 @@
                         <a:buNone/>
                       </a:pPr>
                       <a:r>
-                        <a:rPr lang="en-IL" sz="1200" kern="100" dirty="0">
+                        <a:rPr lang="en-US" sz="1200" kern="100" dirty="0">
                           <a:effectLst/>
+                          <a:latin typeface="Aptos" panose="020B0004020202020204" pitchFamily="34" charset="0"/>
+                          <a:ea typeface="Aptos" panose="020B0004020202020204" pitchFamily="34" charset="0"/>
+                          <a:cs typeface="Arial" panose="020B0604020202020204" pitchFamily="34" charset="0"/>
                         </a:rPr>
-                        <a:t>        </a:t>
+                        <a:t>Output</a:t>
                       </a:r>
+                      <a:endParaRPr lang="en-IL" sz="1200" kern="100" dirty="0">
+                        <a:effectLst/>
+                        <a:latin typeface="Aptos" panose="020B0004020202020204" pitchFamily="34" charset="0"/>
+                        <a:ea typeface="Aptos" panose="020B0004020202020204" pitchFamily="34" charset="0"/>
+                        <a:cs typeface="Arial" panose="020B0604020202020204" pitchFamily="34" charset="0"/>
+                      </a:endParaRPr>
+                    </a:p>
+                  </a:txBody>
+                  <a:tcPr marL="68580" marR="68580" marT="0" marB="0"/>
+                </a:tc>
+                <a:tc>
+                  <a:txBody>
+                    <a:bodyPr/>
+                    <a:lstStyle/>
+                    <a:p>
+                      <a:pPr algn="ctr">
+                        <a:lnSpc>
+                          <a:spcPct val="115000"/>
+                        </a:lnSpc>
+                        <a:spcAft>
+                          <a:spcPts val="800"/>
+                        </a:spcAft>
+                        <a:buNone/>
+                      </a:pPr>
                       <a:r>
-                        <a:rPr lang="en-IL" sz="1200" kern="100" dirty="0" err="1">
+                        <a:rPr lang="en-US" sz="1200" kern="100" dirty="0">
                           <a:effectLst/>
+                          <a:latin typeface="Aptos" panose="020B0004020202020204" pitchFamily="34" charset="0"/>
+                          <a:ea typeface="Aptos" panose="020B0004020202020204" pitchFamily="34" charset="0"/>
+                          <a:cs typeface="Arial" panose="020B0604020202020204" pitchFamily="34" charset="0"/>
+                        </a:rPr>
+                        <a:t>Description</a:t>
+                      </a:r>
+                      <a:endParaRPr lang="en-IL" sz="1200" kern="100" dirty="0">
+                        <a:effectLst/>
+                        <a:latin typeface="Aptos" panose="020B0004020202020204" pitchFamily="34" charset="0"/>
+                        <a:ea typeface="Aptos" panose="020B0004020202020204" pitchFamily="34" charset="0"/>
+                        <a:cs typeface="Arial" panose="020B0604020202020204" pitchFamily="34" charset="0"/>
+                      </a:endParaRPr>
+                    </a:p>
+                  </a:txBody>
+                  <a:tcPr marL="68580" marR="68580" marT="0" marB="0"/>
+                </a:tc>
+                <a:extLst>
+                  <a:ext uri="{0D108BD9-81ED-4DB2-BD59-A6C34878D82A}">
+                    <a16:rowId xmlns:a16="http://schemas.microsoft.com/office/drawing/2014/main" val="619800027"/>
+                  </a:ext>
+                </a:extLst>
+              </a:tr>
+              <a:tr h="206661">
+                <a:tc>
+                  <a:txBody>
+                    <a:bodyPr/>
+                    <a:lstStyle/>
+                    <a:p>
+                      <a:pPr algn="ctr">
+                        <a:lnSpc>
+                          <a:spcPct val="115000"/>
+                        </a:lnSpc>
+                        <a:spcAft>
+                          <a:spcPts val="800"/>
+                        </a:spcAft>
+                        <a:buNone/>
+                      </a:pPr>
+                      <a:r>
+                        <a:rPr lang="en-US" sz="1200" kern="100" dirty="0">
+                          <a:effectLst/>
+                          <a:latin typeface="Aptos" panose="020B0004020202020204" pitchFamily="34" charset="0"/>
+                          <a:ea typeface="Aptos" panose="020B0004020202020204" pitchFamily="34" charset="0"/>
+                          <a:cs typeface="Arial" panose="020B0604020202020204" pitchFamily="34" charset="0"/>
+                        </a:rPr>
+                        <a:t>15</a:t>
+                      </a:r>
+                      <a:endParaRPr lang="en-IL" sz="1200" kern="100" dirty="0">
+                        <a:effectLst/>
+                        <a:latin typeface="Aptos" panose="020B0004020202020204" pitchFamily="34" charset="0"/>
+                        <a:ea typeface="Aptos" panose="020B0004020202020204" pitchFamily="34" charset="0"/>
+                        <a:cs typeface="Arial" panose="020B0604020202020204" pitchFamily="34" charset="0"/>
+                      </a:endParaRPr>
+                    </a:p>
+                  </a:txBody>
+                  <a:tcPr marL="68580" marR="68580" marT="0" marB="0"/>
+                </a:tc>
+                <a:tc>
+                  <a:txBody>
+                    <a:bodyPr/>
+                    <a:lstStyle/>
+                    <a:p>
+                      <a:pPr algn="ctr">
+                        <a:lnSpc>
+                          <a:spcPct val="115000"/>
+                        </a:lnSpc>
+                        <a:spcAft>
+                          <a:spcPts val="800"/>
+                        </a:spcAft>
+                        <a:buNone/>
+                      </a:pPr>
+                      <a:r>
+                        <a:rPr lang="en-US" sz="1200" kern="100" dirty="0" err="1">
+                          <a:effectLst/>
+                          <a:latin typeface="Aptos" panose="020B0004020202020204" pitchFamily="34" charset="0"/>
+                          <a:ea typeface="Aptos" panose="020B0004020202020204" pitchFamily="34" charset="0"/>
+                          <a:cs typeface="Arial" panose="020B0604020202020204" pitchFamily="34" charset="0"/>
                         </a:rPr>
                         <a:t>SrcB_debug</a:t>
                       </a:r>
@@ -8882,7 +9353,7 @@
                     <a:bodyPr/>
                     <a:lstStyle/>
                     <a:p>
-                      <a:pPr>
+                      <a:pPr algn="ctr">
                         <a:lnSpc>
                           <a:spcPct val="115000"/>
                         </a:lnSpc>
@@ -8892,34 +9363,31 @@
                         <a:buNone/>
                       </a:pPr>
                       <a:r>
-                        <a:rPr lang="en-IL" sz="1200" kern="100" dirty="0">
+                        <a:rPr lang="en-US" sz="1200" kern="100" dirty="0">
                           <a:effectLst/>
+                          <a:latin typeface="Aptos" panose="020B0004020202020204" pitchFamily="34" charset="0"/>
+                          <a:ea typeface="Aptos" panose="020B0004020202020204" pitchFamily="34" charset="0"/>
+                          <a:cs typeface="Arial" panose="020B0604020202020204" pitchFamily="34" charset="0"/>
                         </a:rPr>
                         <a:t>Source B debug</a:t>
                       </a:r>
-                      <a:endParaRPr lang="en-IL" sz="1200" kern="100" dirty="0">
-                        <a:effectLst/>
-                        <a:latin typeface="Aptos" panose="020B0004020202020204" pitchFamily="34" charset="0"/>
-                        <a:ea typeface="Aptos" panose="020B0004020202020204" pitchFamily="34" charset="0"/>
-                        <a:cs typeface="Arial" panose="020B0604020202020204" pitchFamily="34" charset="0"/>
-                      </a:endParaRPr>
                     </a:p>
                   </a:txBody>
                   <a:tcPr marL="68580" marR="68580" marT="0" marB="0"/>
                 </a:tc>
                 <a:extLst>
                   <a:ext uri="{0D108BD9-81ED-4DB2-BD59-A6C34878D82A}">
-                    <a16:rowId xmlns:a16="http://schemas.microsoft.com/office/drawing/2014/main" val="619800027"/>
+                    <a16:rowId xmlns:a16="http://schemas.microsoft.com/office/drawing/2014/main" val="2121893194"/>
                   </a:ext>
                 </a:extLst>
               </a:tr>
-              <a:tr h="318325">
+              <a:tr h="417560">
                 <a:tc>
                   <a:txBody>
                     <a:bodyPr/>
                     <a:lstStyle/>
                     <a:p>
-                      <a:pPr>
+                      <a:pPr algn="ctr">
                         <a:lnSpc>
                           <a:spcPct val="115000"/>
                         </a:lnSpc>
@@ -8949,7 +9417,7 @@
                     <a:bodyPr/>
                     <a:lstStyle/>
                     <a:p>
-                      <a:pPr>
+                      <a:pPr algn="ctr">
                         <a:lnSpc>
                           <a:spcPct val="115000"/>
                         </a:lnSpc>
@@ -8959,12 +9427,24 @@
                         <a:buNone/>
                       </a:pPr>
                       <a:r>
-                        <a:rPr lang="en-IL" sz="1200" kern="100">
+                        <a:rPr lang="en-IL" sz="1200" kern="100" dirty="0">
                           <a:effectLst/>
                         </a:rPr>
-                        <a:t>        {31'b0, PcSel_debug}</a:t>
+                        <a:t>{31'b0, </a:t>
                       </a:r>
-                      <a:endParaRPr lang="en-IL" sz="1200" kern="100">
+                      <a:r>
+                        <a:rPr lang="en-IL" sz="1200" kern="100" dirty="0" err="1">
+                          <a:effectLst/>
+                        </a:rPr>
+                        <a:t>PcSel_debug</a:t>
+                      </a:r>
+                      <a:r>
+                        <a:rPr lang="en-IL" sz="1200" kern="100" dirty="0">
+                          <a:effectLst/>
+                        </a:rPr>
+                        <a:t>}</a:t>
+                      </a:r>
+                      <a:endParaRPr lang="en-IL" sz="1200" kern="100" dirty="0">
                         <a:effectLst/>
                         <a:latin typeface="Aptos" panose="020B0004020202020204" pitchFamily="34" charset="0"/>
                         <a:ea typeface="Aptos" panose="020B0004020202020204" pitchFamily="34" charset="0"/>
@@ -8979,7 +9459,7 @@
                     <a:bodyPr/>
                     <a:lstStyle/>
                     <a:p>
-                      <a:pPr>
+                      <a:pPr algn="ctr">
                         <a:lnSpc>
                           <a:spcPct val="115000"/>
                         </a:lnSpc>
@@ -8989,12 +9469,12 @@
                         <a:buNone/>
                       </a:pPr>
                       <a:r>
-                        <a:rPr lang="en-IL" sz="1200" kern="100">
+                        <a:rPr lang="en-IL" sz="1200" kern="100" dirty="0">
                           <a:effectLst/>
                         </a:rPr>
                         <a:t>PC select signal (padded to 32 bits)</a:t>
                       </a:r>
-                      <a:endParaRPr lang="en-IL" sz="1200" kern="100">
+                      <a:endParaRPr lang="en-IL" sz="1200" kern="100" dirty="0">
                         <a:effectLst/>
                         <a:latin typeface="Aptos" panose="020B0004020202020204" pitchFamily="34" charset="0"/>
                         <a:ea typeface="Aptos" panose="020B0004020202020204" pitchFamily="34" charset="0"/>
@@ -9010,13 +9490,13 @@
                   </a:ext>
                 </a:extLst>
               </a:tr>
-              <a:tr h="318325">
+              <a:tr h="417560">
                 <a:tc>
                   <a:txBody>
                     <a:bodyPr/>
                     <a:lstStyle/>
                     <a:p>
-                      <a:pPr>
+                      <a:pPr algn="ctr">
                         <a:lnSpc>
                           <a:spcPct val="115000"/>
                         </a:lnSpc>
@@ -9046,7 +9526,7 @@
                     <a:bodyPr/>
                     <a:lstStyle/>
                     <a:p>
-                      <a:pPr>
+                      <a:pPr algn="ctr">
                         <a:lnSpc>
                           <a:spcPct val="115000"/>
                         </a:lnSpc>
@@ -9056,12 +9536,24 @@
                         <a:buNone/>
                       </a:pPr>
                       <a:r>
-                        <a:rPr lang="en-IL" sz="1200" kern="100">
+                        <a:rPr lang="en-IL" sz="1200" kern="100" dirty="0">
                           <a:effectLst/>
                         </a:rPr>
-                        <a:t>        {23'b0, BrPC_debug}</a:t>
+                        <a:t>{23'b0, </a:t>
                       </a:r>
-                      <a:endParaRPr lang="en-IL" sz="1200" kern="100">
+                      <a:r>
+                        <a:rPr lang="en-IL" sz="1200" kern="100" dirty="0" err="1">
+                          <a:effectLst/>
+                        </a:rPr>
+                        <a:t>BrPC_debug</a:t>
+                      </a:r>
+                      <a:r>
+                        <a:rPr lang="en-IL" sz="1200" kern="100" dirty="0">
+                          <a:effectLst/>
+                        </a:rPr>
+                        <a:t>}</a:t>
+                      </a:r>
+                      <a:endParaRPr lang="en-IL" sz="1200" kern="100" dirty="0">
                         <a:effectLst/>
                         <a:latin typeface="Aptos" panose="020B0004020202020204" pitchFamily="34" charset="0"/>
                         <a:ea typeface="Aptos" panose="020B0004020202020204" pitchFamily="34" charset="0"/>
@@ -9076,7 +9568,7 @@
                     <a:bodyPr/>
                     <a:lstStyle/>
                     <a:p>
-                      <a:pPr>
+                      <a:pPr algn="ctr">
                         <a:lnSpc>
                           <a:spcPct val="115000"/>
                         </a:lnSpc>
@@ -9086,12 +9578,12 @@
                         <a:buNone/>
                       </a:pPr>
                       <a:r>
-                        <a:rPr lang="en-IL" sz="1200" kern="100">
+                        <a:rPr lang="en-IL" sz="1200" kern="100" dirty="0">
                           <a:effectLst/>
                         </a:rPr>
                         <a:t>Branch PC (padded to 32 bits)</a:t>
                       </a:r>
-                      <a:endParaRPr lang="en-IL" sz="1200" kern="100">
+                      <a:endParaRPr lang="en-IL" sz="1200" kern="100" dirty="0">
                         <a:effectLst/>
                         <a:latin typeface="Aptos" panose="020B0004020202020204" pitchFamily="34" charset="0"/>
                         <a:ea typeface="Aptos" panose="020B0004020202020204" pitchFamily="34" charset="0"/>
@@ -9107,13 +9599,13 @@
                   </a:ext>
                 </a:extLst>
               </a:tr>
-              <a:tr h="318325">
+              <a:tr h="325054">
                 <a:tc>
                   <a:txBody>
                     <a:bodyPr/>
                     <a:lstStyle/>
                     <a:p>
-                      <a:pPr>
+                      <a:pPr algn="ctr">
                         <a:lnSpc>
                           <a:spcPct val="115000"/>
                         </a:lnSpc>
@@ -9143,7 +9635,7 @@
                     <a:bodyPr/>
                     <a:lstStyle/>
                     <a:p>
-                      <a:pPr>
+                      <a:pPr algn="ctr">
                         <a:lnSpc>
                           <a:spcPct val="115000"/>
                         </a:lnSpc>
@@ -9153,12 +9645,12 @@
                         <a:buNone/>
                       </a:pPr>
                       <a:r>
-                        <a:rPr lang="en-IL" sz="1200" kern="100">
+                        <a:rPr lang="en-IL" sz="1200" kern="100" dirty="0" err="1">
                           <a:effectLst/>
                         </a:rPr>
-                        <a:t>        ALUResult_debug</a:t>
+                        <a:t>ALUResult_debug</a:t>
                       </a:r>
-                      <a:endParaRPr lang="en-IL" sz="1200" kern="100">
+                      <a:endParaRPr lang="en-IL" sz="1200" kern="100" dirty="0">
                         <a:effectLst/>
                         <a:latin typeface="Aptos" panose="020B0004020202020204" pitchFamily="34" charset="0"/>
                         <a:ea typeface="Aptos" panose="020B0004020202020204" pitchFamily="34" charset="0"/>
@@ -9173,7 +9665,7 @@
                     <a:bodyPr/>
                     <a:lstStyle/>
                     <a:p>
-                      <a:pPr>
+                      <a:pPr algn="ctr">
                         <a:lnSpc>
                           <a:spcPct val="115000"/>
                         </a:lnSpc>
@@ -9183,12 +9675,12 @@
                         <a:buNone/>
                       </a:pPr>
                       <a:r>
-                        <a:rPr lang="en-IL" sz="1200" kern="100">
+                        <a:rPr lang="en-IL" sz="1200" kern="100" dirty="0">
                           <a:effectLst/>
                         </a:rPr>
                         <a:t>ALU result</a:t>
                       </a:r>
-                      <a:endParaRPr lang="en-IL" sz="1200" kern="100">
+                      <a:endParaRPr lang="en-IL" sz="1200" kern="100" dirty="0">
                         <a:effectLst/>
                         <a:latin typeface="Aptos" panose="020B0004020202020204" pitchFamily="34" charset="0"/>
                         <a:ea typeface="Aptos" panose="020B0004020202020204" pitchFamily="34" charset="0"/>
@@ -9204,13 +9696,13 @@
                   </a:ext>
                 </a:extLst>
               </a:tr>
-              <a:tr h="318325">
+              <a:tr h="325054">
                 <a:tc>
                   <a:txBody>
                     <a:bodyPr/>
                     <a:lstStyle/>
                     <a:p>
-                      <a:pPr>
+                      <a:pPr algn="ctr">
                         <a:lnSpc>
                           <a:spcPct val="115000"/>
                         </a:lnSpc>
@@ -9240,7 +9732,7 @@
                     <a:bodyPr/>
                     <a:lstStyle/>
                     <a:p>
-                      <a:pPr>
+                      <a:pPr algn="ctr">
                         <a:lnSpc>
                           <a:spcPct val="115000"/>
                         </a:lnSpc>
@@ -9250,12 +9742,12 @@
                         <a:buNone/>
                       </a:pPr>
                       <a:r>
-                        <a:rPr lang="en-IL" sz="1200" kern="100">
+                        <a:rPr lang="en-IL" sz="1200" kern="100" dirty="0">
                           <a:effectLst/>
                         </a:rPr>
-                        <a:t>        {28'b0, Operation}</a:t>
+                        <a:t>{28'b0, Operation}</a:t>
                       </a:r>
-                      <a:endParaRPr lang="en-IL" sz="1200" kern="100">
+                      <a:endParaRPr lang="en-IL" sz="1200" kern="100" dirty="0">
                         <a:effectLst/>
                         <a:latin typeface="Aptos" panose="020B0004020202020204" pitchFamily="34" charset="0"/>
                         <a:ea typeface="Aptos" panose="020B0004020202020204" pitchFamily="34" charset="0"/>
@@ -9270,7 +9762,7 @@
                     <a:bodyPr/>
                     <a:lstStyle/>
                     <a:p>
-                      <a:pPr>
+                      <a:pPr algn="ctr">
                         <a:lnSpc>
                           <a:spcPct val="115000"/>
                         </a:lnSpc>
@@ -9280,12 +9772,12 @@
                         <a:buNone/>
                       </a:pPr>
                       <a:r>
-                        <a:rPr lang="en-IL" sz="1200" kern="100">
+                        <a:rPr lang="en-IL" sz="1200" kern="100" dirty="0">
                           <a:effectLst/>
                         </a:rPr>
                         <a:t>ALU operation code (padded to 32 bits)</a:t>
                       </a:r>
-                      <a:endParaRPr lang="en-IL" sz="1200" kern="100">
+                      <a:endParaRPr lang="en-IL" sz="1200" kern="100" dirty="0">
                         <a:effectLst/>
                         <a:latin typeface="Aptos" panose="020B0004020202020204" pitchFamily="34" charset="0"/>
                         <a:ea typeface="Aptos" panose="020B0004020202020204" pitchFamily="34" charset="0"/>
@@ -9301,13 +9793,13 @@
                   </a:ext>
                 </a:extLst>
               </a:tr>
-              <a:tr h="318325">
+              <a:tr h="325054">
                 <a:tc>
                   <a:txBody>
                     <a:bodyPr/>
                     <a:lstStyle/>
                     <a:p>
-                      <a:pPr>
+                      <a:pPr algn="ctr">
                         <a:lnSpc>
                           <a:spcPct val="115000"/>
                         </a:lnSpc>
@@ -9337,7 +9829,7 @@
                     <a:bodyPr/>
                     <a:lstStyle/>
                     <a:p>
-                      <a:pPr>
+                      <a:pPr algn="ctr">
                         <a:lnSpc>
                           <a:spcPct val="115000"/>
                         </a:lnSpc>
@@ -9347,12 +9839,24 @@
                         <a:buNone/>
                       </a:pPr>
                       <a:r>
-                        <a:rPr lang="en-IL" sz="1200" kern="100">
+                        <a:rPr lang="en-IL" sz="1200" kern="100" dirty="0">
                           <a:effectLst/>
                         </a:rPr>
-                        <a:t>        {23'b0, addr}</a:t>
+                        <a:t>{23'b0, </a:t>
                       </a:r>
-                      <a:endParaRPr lang="en-IL" sz="1200" kern="100">
+                      <a:r>
+                        <a:rPr lang="en-IL" sz="1200" kern="100" dirty="0" err="1">
+                          <a:effectLst/>
+                        </a:rPr>
+                        <a:t>addr</a:t>
+                      </a:r>
+                      <a:r>
+                        <a:rPr lang="en-IL" sz="1200" kern="100" dirty="0">
+                          <a:effectLst/>
+                        </a:rPr>
+                        <a:t>}</a:t>
+                      </a:r>
+                      <a:endParaRPr lang="en-IL" sz="1200" kern="100" dirty="0">
                         <a:effectLst/>
                         <a:latin typeface="Aptos" panose="020B0004020202020204" pitchFamily="34" charset="0"/>
                         <a:ea typeface="Aptos" panose="020B0004020202020204" pitchFamily="34" charset="0"/>
@@ -9367,7 +9871,7 @@
                     <a:bodyPr/>
                     <a:lstStyle/>
                     <a:p>
-                      <a:pPr>
+                      <a:pPr algn="ctr">
                         <a:lnSpc>
                           <a:spcPct val="115000"/>
                         </a:lnSpc>
@@ -9377,12 +9881,12 @@
                         <a:buNone/>
                       </a:pPr>
                       <a:r>
-                        <a:rPr lang="en-IL" sz="1200" kern="100">
+                        <a:rPr lang="en-IL" sz="1200" kern="100" dirty="0">
                           <a:effectLst/>
                         </a:rPr>
                         <a:t>Memory address (padded to 32 bits)</a:t>
                       </a:r>
-                      <a:endParaRPr lang="en-IL" sz="1200" kern="100">
+                      <a:endParaRPr lang="en-IL" sz="1200" kern="100" dirty="0">
                         <a:effectLst/>
                         <a:latin typeface="Aptos" panose="020B0004020202020204" pitchFamily="34" charset="0"/>
                         <a:ea typeface="Aptos" panose="020B0004020202020204" pitchFamily="34" charset="0"/>
@@ -9398,13 +9902,13 @@
                   </a:ext>
                 </a:extLst>
               </a:tr>
-              <a:tr h="318325">
+              <a:tr h="325054">
                 <a:tc>
                   <a:txBody>
                     <a:bodyPr/>
                     <a:lstStyle/>
                     <a:p>
-                      <a:pPr>
+                      <a:pPr algn="ctr">
                         <a:lnSpc>
                           <a:spcPct val="115000"/>
                         </a:lnSpc>
@@ -9434,7 +9938,7 @@
                     <a:bodyPr/>
                     <a:lstStyle/>
                     <a:p>
-                      <a:pPr>
+                      <a:pPr algn="ctr">
                         <a:lnSpc>
                           <a:spcPct val="115000"/>
                         </a:lnSpc>
@@ -9444,12 +9948,12 @@
                         <a:buNone/>
                       </a:pPr>
                       <a:r>
-                        <a:rPr lang="en-IL" sz="1200" kern="100">
+                        <a:rPr lang="en-IL" sz="1200" kern="100" dirty="0" err="1">
                           <a:effectLst/>
                         </a:rPr>
-                        <a:t>        wr_data</a:t>
+                        <a:t>wr_data</a:t>
                       </a:r>
-                      <a:endParaRPr lang="en-IL" sz="1200" kern="100">
+                      <a:endParaRPr lang="en-IL" sz="1200" kern="100" dirty="0">
                         <a:effectLst/>
                         <a:latin typeface="Aptos" panose="020B0004020202020204" pitchFamily="34" charset="0"/>
                         <a:ea typeface="Aptos" panose="020B0004020202020204" pitchFamily="34" charset="0"/>
@@ -9464,7 +9968,7 @@
                     <a:bodyPr/>
                     <a:lstStyle/>
                     <a:p>
-                      <a:pPr>
+                      <a:pPr algn="ctr">
                         <a:lnSpc>
                           <a:spcPct val="115000"/>
                         </a:lnSpc>
@@ -9474,12 +9978,12 @@
                         <a:buNone/>
                       </a:pPr>
                       <a:r>
-                        <a:rPr lang="en-IL" sz="1200" kern="100">
+                        <a:rPr lang="en-IL" sz="1200" kern="100" dirty="0">
                           <a:effectLst/>
                         </a:rPr>
                         <a:t>Data written to memory</a:t>
                       </a:r>
-                      <a:endParaRPr lang="en-IL" sz="1200" kern="100">
+                      <a:endParaRPr lang="en-IL" sz="1200" kern="100" dirty="0">
                         <a:effectLst/>
                         <a:latin typeface="Aptos" panose="020B0004020202020204" pitchFamily="34" charset="0"/>
                         <a:ea typeface="Aptos" panose="020B0004020202020204" pitchFamily="34" charset="0"/>
@@ -9495,13 +9999,13 @@
                   </a:ext>
                 </a:extLst>
               </a:tr>
-              <a:tr h="318325">
+              <a:tr h="325054">
                 <a:tc>
                   <a:txBody>
                     <a:bodyPr/>
                     <a:lstStyle/>
                     <a:p>
-                      <a:pPr>
+                      <a:pPr algn="ctr">
                         <a:lnSpc>
                           <a:spcPct val="115000"/>
                         </a:lnSpc>
@@ -9531,7 +10035,7 @@
                     <a:bodyPr/>
                     <a:lstStyle/>
                     <a:p>
-                      <a:pPr>
+                      <a:pPr algn="ctr">
                         <a:lnSpc>
                           <a:spcPct val="115000"/>
                         </a:lnSpc>
@@ -9541,12 +10045,12 @@
                         <a:buNone/>
                       </a:pPr>
                       <a:r>
-                        <a:rPr lang="en-IL" sz="1200" kern="100">
+                        <a:rPr lang="en-IL" sz="1200" kern="100" dirty="0" err="1">
                           <a:effectLst/>
                         </a:rPr>
-                        <a:t>        rd_data</a:t>
+                        <a:t>rd_data</a:t>
                       </a:r>
-                      <a:endParaRPr lang="en-IL" sz="1200" kern="100">
+                      <a:endParaRPr lang="en-IL" sz="1200" kern="100" dirty="0">
                         <a:effectLst/>
                         <a:latin typeface="Aptos" panose="020B0004020202020204" pitchFamily="34" charset="0"/>
                         <a:ea typeface="Aptos" panose="020B0004020202020204" pitchFamily="34" charset="0"/>
@@ -9561,7 +10065,7 @@
                     <a:bodyPr/>
                     <a:lstStyle/>
                     <a:p>
-                      <a:pPr>
+                      <a:pPr algn="ctr">
                         <a:lnSpc>
                           <a:spcPct val="115000"/>
                         </a:lnSpc>
@@ -9571,12 +10075,12 @@
                         <a:buNone/>
                       </a:pPr>
                       <a:r>
-                        <a:rPr lang="en-IL" sz="1200" kern="100">
+                        <a:rPr lang="en-IL" sz="1200" kern="100" dirty="0">
                           <a:effectLst/>
                         </a:rPr>
                         <a:t>Data read from memory</a:t>
                       </a:r>
-                      <a:endParaRPr lang="en-IL" sz="1200" kern="100">
+                      <a:endParaRPr lang="en-IL" sz="1200" kern="100" dirty="0">
                         <a:effectLst/>
                         <a:latin typeface="Aptos" panose="020B0004020202020204" pitchFamily="34" charset="0"/>
                         <a:ea typeface="Aptos" panose="020B0004020202020204" pitchFamily="34" charset="0"/>
@@ -9592,13 +10096,13 @@
                   </a:ext>
                 </a:extLst>
               </a:tr>
-              <a:tr h="653233">
+              <a:tr h="667042">
                 <a:tc>
                   <a:txBody>
                     <a:bodyPr/>
                     <a:lstStyle/>
                     <a:p>
-                      <a:pPr>
+                      <a:pPr algn="ctr">
                         <a:lnSpc>
                           <a:spcPct val="115000"/>
                         </a:lnSpc>
@@ -9628,7 +10132,7 @@
                     <a:bodyPr/>
                     <a:lstStyle/>
                     <a:p>
-                      <a:pPr>
+                      <a:pPr algn="ctr">
                         <a:lnSpc>
                           <a:spcPct val="115000"/>
                         </a:lnSpc>
@@ -9638,12 +10142,24 @@
                         <a:buNone/>
                       </a:pPr>
                       <a:r>
-                        <a:rPr lang="en-IL" sz="1200" kern="100">
+                        <a:rPr lang="en-IL" sz="1200" kern="100" dirty="0">
                           <a:effectLst/>
                         </a:rPr>
-                        <a:t>        {31'b0, wr}</a:t>
+                        <a:t>{31'b0, </a:t>
                       </a:r>
-                      <a:endParaRPr lang="en-IL" sz="1200" kern="100">
+                      <a:r>
+                        <a:rPr lang="en-IL" sz="1200" kern="100" dirty="0" err="1">
+                          <a:effectLst/>
+                        </a:rPr>
+                        <a:t>wr</a:t>
+                      </a:r>
+                      <a:r>
+                        <a:rPr lang="en-IL" sz="1200" kern="100" dirty="0">
+                          <a:effectLst/>
+                        </a:rPr>
+                        <a:t>}</a:t>
+                      </a:r>
+                      <a:endParaRPr lang="en-IL" sz="1200" kern="100" dirty="0">
                         <a:effectLst/>
                         <a:latin typeface="Aptos" panose="020B0004020202020204" pitchFamily="34" charset="0"/>
                         <a:ea typeface="Aptos" panose="020B0004020202020204" pitchFamily="34" charset="0"/>
@@ -9658,7 +10174,7 @@
                     <a:bodyPr/>
                     <a:lstStyle/>
                     <a:p>
-                      <a:pPr>
+                      <a:pPr algn="ctr">
                         <a:lnSpc>
                           <a:spcPct val="115000"/>
                         </a:lnSpc>
@@ -9668,12 +10184,12 @@
                         <a:buNone/>
                       </a:pPr>
                       <a:r>
-                        <a:rPr lang="en-IL" sz="1200" kern="100">
+                        <a:rPr lang="en-IL" sz="1200" kern="100" dirty="0">
                           <a:effectLst/>
                         </a:rPr>
                         <a:t>Register written to number (padded to 32 bits)</a:t>
                       </a:r>
-                      <a:endParaRPr lang="en-IL" sz="1200" kern="100">
+                      <a:endParaRPr lang="en-IL" sz="1200" kern="100" dirty="0">
                         <a:effectLst/>
                         <a:latin typeface="Aptos" panose="020B0004020202020204" pitchFamily="34" charset="0"/>
                         <a:ea typeface="Aptos" panose="020B0004020202020204" pitchFamily="34" charset="0"/>
@@ -9689,13 +10205,13 @@
                   </a:ext>
                 </a:extLst>
               </a:tr>
-              <a:tr h="653233">
+              <a:tr h="521511">
                 <a:tc>
                   <a:txBody>
                     <a:bodyPr/>
                     <a:lstStyle/>
                     <a:p>
-                      <a:pPr>
+                      <a:pPr algn="ctr">
                         <a:lnSpc>
                           <a:spcPct val="115000"/>
                         </a:lnSpc>
@@ -9725,7 +10241,7 @@
                     <a:bodyPr/>
                     <a:lstStyle/>
                     <a:p>
-                      <a:pPr>
+                      <a:pPr algn="ctr">
                         <a:lnSpc>
                           <a:spcPct val="115000"/>
                         </a:lnSpc>
@@ -9735,12 +10251,24 @@
                         <a:buNone/>
                       </a:pPr>
                       <a:r>
-                        <a:rPr lang="en-IL" sz="1200" kern="100">
+                        <a:rPr lang="en-IL" sz="1200" kern="100" dirty="0">
                           <a:effectLst/>
                         </a:rPr>
-                        <a:t>        {31'b0, rd}</a:t>
+                        <a:t>{31'b0, </a:t>
                       </a:r>
-                      <a:endParaRPr lang="en-IL" sz="1200" kern="100">
+                      <a:r>
+                        <a:rPr lang="en-IL" sz="1200" kern="100" dirty="0" err="1">
+                          <a:effectLst/>
+                        </a:rPr>
+                        <a:t>rd</a:t>
+                      </a:r>
+                      <a:r>
+                        <a:rPr lang="en-IL" sz="1200" kern="100" dirty="0">
+                          <a:effectLst/>
+                        </a:rPr>
+                        <a:t>}</a:t>
+                      </a:r>
+                      <a:endParaRPr lang="en-IL" sz="1200" kern="100" dirty="0">
                         <a:effectLst/>
                         <a:latin typeface="Aptos" panose="020B0004020202020204" pitchFamily="34" charset="0"/>
                         <a:ea typeface="Aptos" panose="020B0004020202020204" pitchFamily="34" charset="0"/>
@@ -9755,7 +10283,7 @@
                     <a:bodyPr/>
                     <a:lstStyle/>
                     <a:p>
-                      <a:pPr>
+                      <a:pPr algn="ctr">
                         <a:lnSpc>
                           <a:spcPct val="115000"/>
                         </a:lnSpc>
@@ -9765,12 +10293,12 @@
                         <a:buNone/>
                       </a:pPr>
                       <a:r>
-                        <a:rPr lang="en-IL" sz="1200" kern="100">
+                        <a:rPr lang="en-IL" sz="1200" kern="100" dirty="0">
                           <a:effectLst/>
                         </a:rPr>
                         <a:t>Register read from number (padded to 32 bits)</a:t>
                       </a:r>
-                      <a:endParaRPr lang="en-IL" sz="1200" kern="100">
+                      <a:endParaRPr lang="en-IL" sz="1200" kern="100" dirty="0">
                         <a:effectLst/>
                         <a:latin typeface="Aptos" panose="020B0004020202020204" pitchFamily="34" charset="0"/>
                         <a:ea typeface="Aptos" panose="020B0004020202020204" pitchFamily="34" charset="0"/>
@@ -9786,13 +10314,13 @@
                   </a:ext>
                 </a:extLst>
               </a:tr>
-              <a:tr h="318325">
+              <a:tr h="325054">
                 <a:tc>
                   <a:txBody>
                     <a:bodyPr/>
                     <a:lstStyle/>
                     <a:p>
-                      <a:pPr>
+                      <a:pPr algn="ctr">
                         <a:lnSpc>
                           <a:spcPct val="115000"/>
                         </a:lnSpc>
@@ -9822,7 +10350,7 @@
                     <a:bodyPr/>
                     <a:lstStyle/>
                     <a:p>
-                      <a:pPr>
+                      <a:pPr algn="ctr">
                         <a:lnSpc>
                           <a:spcPct val="115000"/>
                         </a:lnSpc>
@@ -9832,12 +10360,24 @@
                         <a:buNone/>
                       </a:pPr>
                       <a:r>
-                        <a:rPr lang="en-IL" sz="1200" kern="100">
+                        <a:rPr lang="en-IL" sz="1200" kern="100" dirty="0">
                           <a:effectLst/>
                         </a:rPr>
-                        <a:t>        {27'b0, reg_num}</a:t>
+                        <a:t>{27'b0, </a:t>
                       </a:r>
-                      <a:endParaRPr lang="en-IL" sz="1200" kern="100">
+                      <a:r>
+                        <a:rPr lang="en-IL" sz="1200" kern="100" dirty="0" err="1">
+                          <a:effectLst/>
+                        </a:rPr>
+                        <a:t>reg_num</a:t>
+                      </a:r>
+                      <a:r>
+                        <a:rPr lang="en-IL" sz="1200" kern="100" dirty="0">
+                          <a:effectLst/>
+                        </a:rPr>
+                        <a:t>}</a:t>
+                      </a:r>
+                      <a:endParaRPr lang="en-IL" sz="1200" kern="100" dirty="0">
                         <a:effectLst/>
                         <a:latin typeface="Aptos" panose="020B0004020202020204" pitchFamily="34" charset="0"/>
                         <a:ea typeface="Aptos" panose="020B0004020202020204" pitchFamily="34" charset="0"/>
@@ -9852,7 +10392,7 @@
                     <a:bodyPr/>
                     <a:lstStyle/>
                     <a:p>
-                      <a:pPr>
+                      <a:pPr algn="ctr">
                         <a:lnSpc>
                           <a:spcPct val="115000"/>
                         </a:lnSpc>
@@ -9862,12 +10402,12 @@
                         <a:buNone/>
                       </a:pPr>
                       <a:r>
-                        <a:rPr lang="en-IL" sz="1200" kern="100">
+                        <a:rPr lang="en-IL" sz="1200" kern="100" dirty="0">
                           <a:effectLst/>
                         </a:rPr>
                         <a:t>Register number (padded to 32 bits)</a:t>
                       </a:r>
-                      <a:endParaRPr lang="en-IL" sz="1200" kern="100">
+                      <a:endParaRPr lang="en-IL" sz="1200" kern="100" dirty="0">
                         <a:effectLst/>
                         <a:latin typeface="Aptos" panose="020B0004020202020204" pitchFamily="34" charset="0"/>
                         <a:ea typeface="Aptos" panose="020B0004020202020204" pitchFamily="34" charset="0"/>
@@ -9883,13 +10423,13 @@
                   </a:ext>
                 </a:extLst>
               </a:tr>
-              <a:tr h="318325">
+              <a:tr h="325054">
                 <a:tc>
                   <a:txBody>
                     <a:bodyPr/>
                     <a:lstStyle/>
                     <a:p>
-                      <a:pPr>
+                      <a:pPr algn="ctr">
                         <a:lnSpc>
                           <a:spcPct val="115000"/>
                         </a:lnSpc>
@@ -9919,7 +10459,7 @@
                     <a:bodyPr/>
                     <a:lstStyle/>
                     <a:p>
-                      <a:pPr>
+                      <a:pPr algn="ctr">
                         <a:lnSpc>
                           <a:spcPct val="115000"/>
                         </a:lnSpc>
@@ -9929,12 +10469,12 @@
                         <a:buNone/>
                       </a:pPr>
                       <a:r>
-                        <a:rPr lang="en-IL" sz="1200" kern="100">
+                        <a:rPr lang="en-IL" sz="1200" kern="100" dirty="0" err="1">
                           <a:effectLst/>
                         </a:rPr>
-                        <a:t>        reg_data</a:t>
+                        <a:t>reg_data</a:t>
                       </a:r>
-                      <a:endParaRPr lang="en-IL" sz="1200" kern="100">
+                      <a:endParaRPr lang="en-IL" sz="1200" kern="100" dirty="0">
                         <a:effectLst/>
                         <a:latin typeface="Aptos" panose="020B0004020202020204" pitchFamily="34" charset="0"/>
                         <a:ea typeface="Aptos" panose="020B0004020202020204" pitchFamily="34" charset="0"/>
@@ -9949,7 +10489,7 @@
                     <a:bodyPr/>
                     <a:lstStyle/>
                     <a:p>
-                      <a:pPr>
+                      <a:pPr algn="ctr">
                         <a:lnSpc>
                           <a:spcPct val="115000"/>
                         </a:lnSpc>
@@ -9959,12 +10499,12 @@
                         <a:buNone/>
                       </a:pPr>
                       <a:r>
-                        <a:rPr lang="en-IL" sz="1200" kern="100">
+                        <a:rPr lang="en-IL" sz="1200" kern="100" dirty="0">
                           <a:effectLst/>
                         </a:rPr>
                         <a:t>Data read from register</a:t>
                       </a:r>
-                      <a:endParaRPr lang="en-IL" sz="1200" kern="100">
+                      <a:endParaRPr lang="en-IL" sz="1200" kern="100" dirty="0">
                         <a:effectLst/>
                         <a:latin typeface="Aptos" panose="020B0004020202020204" pitchFamily="34" charset="0"/>
                         <a:ea typeface="Aptos" panose="020B0004020202020204" pitchFamily="34" charset="0"/>
@@ -9980,13 +10520,13 @@
                   </a:ext>
                 </a:extLst>
               </a:tr>
-              <a:tr h="653233">
+              <a:tr h="667042">
                 <a:tc>
                   <a:txBody>
                     <a:bodyPr/>
                     <a:lstStyle/>
                     <a:p>
-                      <a:pPr>
+                      <a:pPr algn="ctr">
                         <a:lnSpc>
                           <a:spcPct val="115000"/>
                         </a:lnSpc>
@@ -9996,12 +10536,12 @@
                         <a:buNone/>
                       </a:pPr>
                       <a:r>
-                        <a:rPr lang="en-IL" sz="1200" kern="100">
+                        <a:rPr lang="en-IL" sz="1200" kern="100" dirty="0">
                           <a:effectLst/>
                         </a:rPr>
                         <a:t>27</a:t>
                       </a:r>
-                      <a:endParaRPr lang="en-IL" sz="1200" kern="100">
+                      <a:endParaRPr lang="en-IL" sz="1200" kern="100" dirty="0">
                         <a:effectLst/>
                         <a:latin typeface="Aptos" panose="020B0004020202020204" pitchFamily="34" charset="0"/>
                         <a:ea typeface="Aptos" panose="020B0004020202020204" pitchFamily="34" charset="0"/>
@@ -10016,7 +10556,7 @@
                     <a:bodyPr/>
                     <a:lstStyle/>
                     <a:p>
-                      <a:pPr>
+                      <a:pPr algn="ctr">
                         <a:lnSpc>
                           <a:spcPct val="115000"/>
                         </a:lnSpc>
@@ -10026,12 +10566,24 @@
                         <a:buNone/>
                       </a:pPr>
                       <a:r>
-                        <a:rPr lang="en-IL" sz="1200" kern="100">
+                        <a:rPr lang="en-IL" sz="1200" kern="100" dirty="0">
                           <a:effectLst/>
                         </a:rPr>
-                        <a:t>        {31'b0, reg_write_sig}</a:t>
+                        <a:t>{31'b0, </a:t>
                       </a:r>
-                      <a:endParaRPr lang="en-IL" sz="1200" kern="100">
+                      <a:r>
+                        <a:rPr lang="en-IL" sz="1200" kern="100" dirty="0" err="1">
+                          <a:effectLst/>
+                        </a:rPr>
+                        <a:t>reg_write_sig</a:t>
+                      </a:r>
+                      <a:r>
+                        <a:rPr lang="en-IL" sz="1200" kern="100" dirty="0">
+                          <a:effectLst/>
+                        </a:rPr>
+                        <a:t>}</a:t>
+                      </a:r>
+                      <a:endParaRPr lang="en-IL" sz="1200" kern="100" dirty="0">
                         <a:effectLst/>
                         <a:latin typeface="Aptos" panose="020B0004020202020204" pitchFamily="34" charset="0"/>
                         <a:ea typeface="Aptos" panose="020B0004020202020204" pitchFamily="34" charset="0"/>
@@ -10046,7 +10598,7 @@
                     <a:bodyPr/>
                     <a:lstStyle/>
                     <a:p>
-                      <a:pPr>
+                      <a:pPr algn="ctr">
                         <a:lnSpc>
                           <a:spcPct val="115000"/>
                         </a:lnSpc>
@@ -10056,12 +10608,12 @@
                         <a:buNone/>
                       </a:pPr>
                       <a:r>
-                        <a:rPr lang="en-IL" sz="1200" kern="100">
+                        <a:rPr lang="en-IL" sz="1200" kern="100" dirty="0">
                           <a:effectLst/>
                         </a:rPr>
                         <a:t>Register writes enable signal (padded to 32 bits)</a:t>
                       </a:r>
-                      <a:endParaRPr lang="en-IL" sz="1200" kern="100">
+                      <a:endParaRPr lang="en-IL" sz="1200" kern="100" dirty="0">
                         <a:effectLst/>
                         <a:latin typeface="Aptos" panose="020B0004020202020204" pitchFamily="34" charset="0"/>
                         <a:ea typeface="Aptos" panose="020B0004020202020204" pitchFamily="34" charset="0"/>
@@ -10077,13 +10629,13 @@
                   </a:ext>
                 </a:extLst>
               </a:tr>
-              <a:tr h="318325">
+              <a:tr h="325054">
                 <a:tc>
                   <a:txBody>
                     <a:bodyPr/>
                     <a:lstStyle/>
                     <a:p>
-                      <a:pPr>
+                      <a:pPr algn="ctr">
                         <a:lnSpc>
                           <a:spcPct val="115000"/>
                         </a:lnSpc>
@@ -10113,7 +10665,7 @@
                     <a:bodyPr/>
                     <a:lstStyle/>
                     <a:p>
-                      <a:pPr>
+                      <a:pPr algn="ctr">
                         <a:lnSpc>
                           <a:spcPct val="115000"/>
                         </a:lnSpc>
@@ -10122,12 +10674,6 @@
                         </a:spcAft>
                         <a:buNone/>
                       </a:pPr>
-                      <a:r>
-                        <a:rPr lang="en-IL" sz="1200" kern="100" dirty="0">
-                          <a:effectLst/>
-                        </a:rPr>
-                        <a:t>        </a:t>
-                      </a:r>
                       <a:r>
                         <a:rPr lang="en-IL" sz="1200" kern="100" dirty="0" err="1">
                           <a:effectLst/>
@@ -10149,7 +10695,7 @@
                     <a:bodyPr/>
                     <a:lstStyle/>
                     <a:p>
-                      <a:pPr>
+                      <a:pPr algn="ctr">
                         <a:lnSpc>
                           <a:spcPct val="115000"/>
                         </a:lnSpc>
@@ -10187,7 +10733,7 @@
     </p:spTree>
     <p:extLst>
       <p:ext uri="{BB962C8B-B14F-4D97-AF65-F5344CB8AC3E}">
-        <p14:creationId xmlns:p14="http://schemas.microsoft.com/office/powerpoint/2010/main" val="926961068"/>
+        <p14:creationId xmlns:p14="http://schemas.microsoft.com/office/powerpoint/2010/main" val="2802876541"/>
       </p:ext>
     </p:extLst>
   </p:cSld>
@@ -10197,7 +10743,7 @@
 </p:sld>
 </file>
 
-<file path=ppt/slides/slide12.xml><?xml version="1.0" encoding="utf-8"?>
+<file path=ppt/slides/slide11.xml><?xml version="1.0" encoding="utf-8"?>
 <p:sld xmlns:a="http://schemas.openxmlformats.org/drawingml/2006/main" xmlns:r="http://schemas.openxmlformats.org/officeDocument/2006/relationships" xmlns:p="http://schemas.openxmlformats.org/presentationml/2006/main">
   <p:cSld>
     <p:spTree>
@@ -10393,11 +10939,7 @@
             </a:r>
             <a:r>
               <a:rPr lang="en-IL" dirty="0"/>
-              <a:t>Cadence </a:t>
-            </a:r>
-            <a:r>
-              <a:rPr lang="en-IL" dirty="0" err="1"/>
-              <a:t>Innovus</a:t>
+              <a:t>Cadence Innovus</a:t>
             </a:r>
             <a:r>
               <a:rPr lang="en-US" dirty="0"/>
@@ -10418,12 +10960,8 @@
               <a:t>Using </a:t>
             </a:r>
             <a:r>
-              <a:rPr lang="en-IL" dirty="0" err="1"/>
-              <a:t>PrimeTime</a:t>
-            </a:r>
-            <a:r>
               <a:rPr lang="en-IL" dirty="0"/>
-              <a:t> </a:t>
+              <a:t>PrimeTime </a:t>
             </a:r>
             <a:r>
               <a:rPr lang="en-US" dirty="0"/>
@@ -10461,7 +10999,7 @@
 </p:sld>
 </file>
 
-<file path=ppt/slides/slide13.xml><?xml version="1.0" encoding="utf-8"?>
+<file path=ppt/slides/slide12.xml><?xml version="1.0" encoding="utf-8"?>
 <p:sld xmlns:a="http://schemas.openxmlformats.org/drawingml/2006/main" xmlns:r="http://schemas.openxmlformats.org/officeDocument/2006/relationships" xmlns:p="http://schemas.openxmlformats.org/presentationml/2006/main">
   <p:cSld>
     <p:spTree>
@@ -10579,15 +11117,7 @@
             </a:r>
             <a:r>
               <a:rPr lang="en-IL" dirty="0"/>
-              <a:t>This limitation was shown during our attempt to use </a:t>
-            </a:r>
-            <a:r>
-              <a:rPr lang="en-IL" dirty="0" err="1"/>
-              <a:t>PrimeTime</a:t>
-            </a:r>
-            <a:r>
-              <a:rPr lang="en-IL" dirty="0"/>
-              <a:t> (as guided in the long manual) within a project originally structured using the short manual</a:t>
+              <a:t>This limitation was shown during our attempt to use PrimeTime (as guided in the long manual) within a project originally structured using the short manual</a:t>
             </a:r>
             <a:r>
               <a:rPr lang="en-US" dirty="0"/>
@@ -10621,7 +11151,7 @@
 </p:sld>
 </file>
 
-<file path=ppt/slides/slide14.xml><?xml version="1.0" encoding="utf-8"?>
+<file path=ppt/slides/slide13.xml><?xml version="1.0" encoding="utf-8"?>
 <p:sld xmlns:a="http://schemas.openxmlformats.org/drawingml/2006/main" xmlns:r="http://schemas.openxmlformats.org/officeDocument/2006/relationships" xmlns:p="http://schemas.openxmlformats.org/presentationml/2006/main">
   <p:cSld>
     <p:spTree>
@@ -10780,7 +11310,7 @@
             <a:pPr lvl="0"/>
             <a:r>
               <a:rPr lang="en-US" dirty="0"/>
-              <a:t>Maintained Risc-v operations.</a:t>
+              <a:t>Maintained RISC-V operations.</a:t>
             </a:r>
           </a:p>
           <a:p>
@@ -10795,11 +11325,7 @@
             <a:pPr lvl="0"/>
             <a:r>
               <a:rPr lang="en-IL" dirty="0"/>
-              <a:t>A Clock Tree with 1.3ns </a:t>
-            </a:r>
-            <a:r>
-              <a:rPr lang="en-IL" dirty="0" err="1"/>
-              <a:t>slac</a:t>
+              <a:t>A Clock Tree with 1.3ns slac</a:t>
             </a:r>
             <a:r>
               <a:rPr lang="en-US" dirty="0"/>
@@ -10822,14 +11348,9 @@
             </a:r>
           </a:p>
           <a:p>
-            <a:pPr lvl="0"/>
-            <a:r>
-              <a:rPr lang="en-US" dirty="0"/>
-              <a:t>Add a critical memory path ( both here and in report)</a:t>
-            </a:r>
-          </a:p>
-          <a:p>
-            <a:pPr lvl="0"/>
+            <a:pPr marL="0" lvl="0" indent="0">
+              <a:buNone/>
+            </a:pPr>
             <a:endParaRPr lang="en-US" dirty="0"/>
           </a:p>
           <a:p>
@@ -10852,6 +11373,1379 @@
     <p:extLst>
       <p:ext uri="{BB962C8B-B14F-4D97-AF65-F5344CB8AC3E}">
         <p14:creationId xmlns:p14="http://schemas.microsoft.com/office/powerpoint/2010/main" val="1545165814"/>
+      </p:ext>
+    </p:extLst>
+  </p:cSld>
+  <p:clrMapOvr>
+    <a:masterClrMapping/>
+  </p:clrMapOvr>
+</p:sld>
+</file>
+
+<file path=ppt/slides/slide14.xml><?xml version="1.0" encoding="utf-8"?>
+<p:sld xmlns:a="http://schemas.openxmlformats.org/drawingml/2006/main" xmlns:r="http://schemas.openxmlformats.org/officeDocument/2006/relationships" xmlns:p="http://schemas.openxmlformats.org/presentationml/2006/main">
+  <p:cSld>
+    <p:spTree>
+      <p:nvGrpSpPr>
+        <p:cNvPr id="1" name=""/>
+        <p:cNvGrpSpPr/>
+        <p:nvPr/>
+      </p:nvGrpSpPr>
+      <p:grpSpPr>
+        <a:xfrm>
+          <a:off x="0" y="0"/>
+          <a:ext cx="0" cy="0"/>
+          <a:chOff x="0" y="0"/>
+          <a:chExt cx="0" cy="0"/>
+        </a:xfrm>
+      </p:grpSpPr>
+      <p:sp>
+        <p:nvSpPr>
+          <p:cNvPr id="2" name="Title 1">
+            <a:extLst>
+              <a:ext uri="{FF2B5EF4-FFF2-40B4-BE49-F238E27FC236}">
+                <a16:creationId xmlns:a16="http://schemas.microsoft.com/office/drawing/2014/main" id="{DA96EC0D-84AC-0E13-9445-D82F61C14121}"/>
+              </a:ext>
+            </a:extLst>
+          </p:cNvPr>
+          <p:cNvSpPr>
+            <a:spLocks noGrp="1"/>
+          </p:cNvSpPr>
+          <p:nvPr>
+            <p:ph type="title"/>
+          </p:nvPr>
+        </p:nvSpPr>
+        <p:spPr/>
+        <p:txBody>
+          <a:bodyPr/>
+          <a:lstStyle/>
+          <a:p>
+            <a:r>
+              <a:rPr lang="en-US" b="1" dirty="0"/>
+              <a:t>Results</a:t>
+            </a:r>
+            <a:endParaRPr lang="en-IL" dirty="0"/>
+          </a:p>
+        </p:txBody>
+      </p:sp>
+      <p:pic>
+        <p:nvPicPr>
+          <p:cNvPr id="5" name="Content Placeholder 4">
+            <a:extLst>
+              <a:ext uri="{FF2B5EF4-FFF2-40B4-BE49-F238E27FC236}">
+                <a16:creationId xmlns:a16="http://schemas.microsoft.com/office/drawing/2014/main" id="{01A37459-4EEC-A60D-FF87-8D44E302F4AD}"/>
+              </a:ext>
+            </a:extLst>
+          </p:cNvPr>
+          <p:cNvPicPr>
+            <a:picLocks noGrp="1" noChangeAspect="1"/>
+          </p:cNvPicPr>
+          <p:nvPr>
+            <p:ph idx="1"/>
+          </p:nvPr>
+        </p:nvPicPr>
+        <p:blipFill>
+          <a:blip r:embed="rId2"/>
+          <a:stretch>
+            <a:fillRect/>
+          </a:stretch>
+        </p:blipFill>
+        <p:spPr>
+          <a:xfrm>
+            <a:off x="1982772" y="3026664"/>
+            <a:ext cx="7988711" cy="3607816"/>
+          </a:xfrm>
+        </p:spPr>
+      </p:pic>
+      <p:sp>
+        <p:nvSpPr>
+          <p:cNvPr id="7" name="מציין מיקום תוכן 2">
+            <a:extLst>
+              <a:ext uri="{FF2B5EF4-FFF2-40B4-BE49-F238E27FC236}">
+                <a16:creationId xmlns:a16="http://schemas.microsoft.com/office/drawing/2014/main" id="{B1B6DD4D-3ED2-40BD-FDC8-9E8D7B44BFF1}"/>
+              </a:ext>
+            </a:extLst>
+          </p:cNvPr>
+          <p:cNvSpPr txBox="1">
+            <a:spLocks/>
+          </p:cNvSpPr>
+          <p:nvPr/>
+        </p:nvSpPr>
+        <p:spPr>
+          <a:xfrm>
+            <a:off x="234696" y="1782128"/>
+            <a:ext cx="11479784" cy="4760912"/>
+          </a:xfrm>
+          <a:prstGeom prst="rect">
+            <a:avLst/>
+          </a:prstGeom>
+        </p:spPr>
+        <p:txBody>
+          <a:bodyPr vert="horz" lIns="91440" tIns="45720" rIns="91440" bIns="45720" rtlCol="0">
+            <a:normAutofit/>
+          </a:bodyPr>
+          <a:lstStyle>
+            <a:lvl1pPr marL="228600" indent="-228600" algn="l" defTabSz="914400" rtl="0" eaLnBrk="1" latinLnBrk="0" hangingPunct="1">
+              <a:lnSpc>
+                <a:spcPct val="90000"/>
+              </a:lnSpc>
+              <a:spcBef>
+                <a:spcPts val="1000"/>
+              </a:spcBef>
+              <a:buFont typeface="Arial" panose="020B0604020202020204" pitchFamily="34" charset="0"/>
+              <a:buChar char="•"/>
+              <a:defRPr sz="2800" kern="1200">
+                <a:solidFill>
+                  <a:schemeClr val="tx1"/>
+                </a:solidFill>
+                <a:latin typeface="+mn-lt"/>
+                <a:ea typeface="+mn-ea"/>
+                <a:cs typeface="+mn-cs"/>
+              </a:defRPr>
+            </a:lvl1pPr>
+            <a:lvl2pPr marL="685800" indent="-228600" algn="l" defTabSz="914400" rtl="0" eaLnBrk="1" latinLnBrk="0" hangingPunct="1">
+              <a:lnSpc>
+                <a:spcPct val="90000"/>
+              </a:lnSpc>
+              <a:spcBef>
+                <a:spcPts val="500"/>
+              </a:spcBef>
+              <a:buFont typeface="Arial" panose="020B0604020202020204" pitchFamily="34" charset="0"/>
+              <a:buChar char="•"/>
+              <a:defRPr sz="2400" kern="1200">
+                <a:solidFill>
+                  <a:schemeClr val="tx1"/>
+                </a:solidFill>
+                <a:latin typeface="+mn-lt"/>
+                <a:ea typeface="+mn-ea"/>
+                <a:cs typeface="+mn-cs"/>
+              </a:defRPr>
+            </a:lvl2pPr>
+            <a:lvl3pPr marL="1143000" indent="-228600" algn="l" defTabSz="914400" rtl="0" eaLnBrk="1" latinLnBrk="0" hangingPunct="1">
+              <a:lnSpc>
+                <a:spcPct val="90000"/>
+              </a:lnSpc>
+              <a:spcBef>
+                <a:spcPts val="500"/>
+              </a:spcBef>
+              <a:buFont typeface="Arial" panose="020B0604020202020204" pitchFamily="34" charset="0"/>
+              <a:buChar char="•"/>
+              <a:defRPr sz="2000" kern="1200">
+                <a:solidFill>
+                  <a:schemeClr val="tx1"/>
+                </a:solidFill>
+                <a:latin typeface="+mn-lt"/>
+                <a:ea typeface="+mn-ea"/>
+                <a:cs typeface="+mn-cs"/>
+              </a:defRPr>
+            </a:lvl3pPr>
+            <a:lvl4pPr marL="1600200" indent="-228600" algn="l" defTabSz="914400" rtl="0" eaLnBrk="1" latinLnBrk="0" hangingPunct="1">
+              <a:lnSpc>
+                <a:spcPct val="90000"/>
+              </a:lnSpc>
+              <a:spcBef>
+                <a:spcPts val="500"/>
+              </a:spcBef>
+              <a:buFont typeface="Arial" panose="020B0604020202020204" pitchFamily="34" charset="0"/>
+              <a:buChar char="•"/>
+              <a:defRPr sz="1800" kern="1200">
+                <a:solidFill>
+                  <a:schemeClr val="tx1"/>
+                </a:solidFill>
+                <a:latin typeface="+mn-lt"/>
+                <a:ea typeface="+mn-ea"/>
+                <a:cs typeface="+mn-cs"/>
+              </a:defRPr>
+            </a:lvl4pPr>
+            <a:lvl5pPr marL="2057400" indent="-228600" algn="l" defTabSz="914400" rtl="0" eaLnBrk="1" latinLnBrk="0" hangingPunct="1">
+              <a:lnSpc>
+                <a:spcPct val="90000"/>
+              </a:lnSpc>
+              <a:spcBef>
+                <a:spcPts val="500"/>
+              </a:spcBef>
+              <a:buFont typeface="Arial" panose="020B0604020202020204" pitchFamily="34" charset="0"/>
+              <a:buChar char="•"/>
+              <a:defRPr sz="1800" kern="1200">
+                <a:solidFill>
+                  <a:schemeClr val="tx1"/>
+                </a:solidFill>
+                <a:latin typeface="+mn-lt"/>
+                <a:ea typeface="+mn-ea"/>
+                <a:cs typeface="+mn-cs"/>
+              </a:defRPr>
+            </a:lvl5pPr>
+            <a:lvl6pPr marL="2514600" indent="-228600" algn="l" defTabSz="914400" rtl="0" eaLnBrk="1" latinLnBrk="0" hangingPunct="1">
+              <a:lnSpc>
+                <a:spcPct val="90000"/>
+              </a:lnSpc>
+              <a:spcBef>
+                <a:spcPts val="500"/>
+              </a:spcBef>
+              <a:buFont typeface="Arial" panose="020B0604020202020204" pitchFamily="34" charset="0"/>
+              <a:buChar char="•"/>
+              <a:defRPr sz="1800" kern="1200">
+                <a:solidFill>
+                  <a:schemeClr val="tx1"/>
+                </a:solidFill>
+                <a:latin typeface="+mn-lt"/>
+                <a:ea typeface="+mn-ea"/>
+                <a:cs typeface="+mn-cs"/>
+              </a:defRPr>
+            </a:lvl6pPr>
+            <a:lvl7pPr marL="2971800" indent="-228600" algn="l" defTabSz="914400" rtl="0" eaLnBrk="1" latinLnBrk="0" hangingPunct="1">
+              <a:lnSpc>
+                <a:spcPct val="90000"/>
+              </a:lnSpc>
+              <a:spcBef>
+                <a:spcPts val="500"/>
+              </a:spcBef>
+              <a:buFont typeface="Arial" panose="020B0604020202020204" pitchFamily="34" charset="0"/>
+              <a:buChar char="•"/>
+              <a:defRPr sz="1800" kern="1200">
+                <a:solidFill>
+                  <a:schemeClr val="tx1"/>
+                </a:solidFill>
+                <a:latin typeface="+mn-lt"/>
+                <a:ea typeface="+mn-ea"/>
+                <a:cs typeface="+mn-cs"/>
+              </a:defRPr>
+            </a:lvl7pPr>
+            <a:lvl8pPr marL="3429000" indent="-228600" algn="l" defTabSz="914400" rtl="0" eaLnBrk="1" latinLnBrk="0" hangingPunct="1">
+              <a:lnSpc>
+                <a:spcPct val="90000"/>
+              </a:lnSpc>
+              <a:spcBef>
+                <a:spcPts val="500"/>
+              </a:spcBef>
+              <a:buFont typeface="Arial" panose="020B0604020202020204" pitchFamily="34" charset="0"/>
+              <a:buChar char="•"/>
+              <a:defRPr sz="1800" kern="1200">
+                <a:solidFill>
+                  <a:schemeClr val="tx1"/>
+                </a:solidFill>
+                <a:latin typeface="+mn-lt"/>
+                <a:ea typeface="+mn-ea"/>
+                <a:cs typeface="+mn-cs"/>
+              </a:defRPr>
+            </a:lvl8pPr>
+            <a:lvl9pPr marL="3886200" indent="-228600" algn="l" defTabSz="914400" rtl="0" eaLnBrk="1" latinLnBrk="0" hangingPunct="1">
+              <a:lnSpc>
+                <a:spcPct val="90000"/>
+              </a:lnSpc>
+              <a:spcBef>
+                <a:spcPts val="500"/>
+              </a:spcBef>
+              <a:buFont typeface="Arial" panose="020B0604020202020204" pitchFamily="34" charset="0"/>
+              <a:buChar char="•"/>
+              <a:defRPr sz="1800" kern="1200">
+                <a:solidFill>
+                  <a:schemeClr val="tx1"/>
+                </a:solidFill>
+                <a:latin typeface="+mn-lt"/>
+                <a:ea typeface="+mn-ea"/>
+                <a:cs typeface="+mn-cs"/>
+              </a:defRPr>
+            </a:lvl9pPr>
+          </a:lstStyle>
+          <a:p>
+            <a:r>
+              <a:rPr lang="en-US" dirty="0"/>
+              <a:t>The critical path starts at the ALU and ends at memblock3, which is the furthest from the RISC-V core in the physical layout.</a:t>
+            </a:r>
+          </a:p>
+          <a:p>
+            <a:pPr marL="0" indent="0">
+              <a:buFont typeface="Arial" panose="020B0604020202020204" pitchFamily="34" charset="0"/>
+              <a:buNone/>
+            </a:pPr>
+            <a:endParaRPr lang="en-US" dirty="0"/>
+          </a:p>
+          <a:p>
+            <a:endParaRPr lang="he-IL" dirty="0"/>
+          </a:p>
+        </p:txBody>
+      </p:sp>
+      <p:sp>
+        <p:nvSpPr>
+          <p:cNvPr id="8" name="Rectangle 7">
+            <a:extLst>
+              <a:ext uri="{FF2B5EF4-FFF2-40B4-BE49-F238E27FC236}">
+                <a16:creationId xmlns:a16="http://schemas.microsoft.com/office/drawing/2014/main" id="{EE1AE5CB-4A56-6F4C-5EA7-83137618832A}"/>
+              </a:ext>
+            </a:extLst>
+          </p:cNvPr>
+          <p:cNvSpPr/>
+          <p:nvPr/>
+        </p:nvSpPr>
+        <p:spPr>
+          <a:xfrm>
+            <a:off x="2359152" y="6376035"/>
+            <a:ext cx="7476744" cy="167005"/>
+          </a:xfrm>
+          <a:prstGeom prst="rect">
+            <a:avLst/>
+          </a:prstGeom>
+          <a:noFill/>
+          <a:ln w="28575" cap="flat" cmpd="sng" algn="ctr">
+            <a:solidFill>
+              <a:srgbClr val="FF0000"/>
+            </a:solidFill>
+            <a:prstDash val="solid"/>
+            <a:round/>
+            <a:headEnd type="none" w="med" len="med"/>
+            <a:tailEnd type="none" w="med" len="med"/>
+          </a:ln>
+        </p:spPr>
+        <p:style>
+          <a:lnRef idx="0">
+            <a:scrgbClr r="0" g="0" b="0"/>
+          </a:lnRef>
+          <a:fillRef idx="0">
+            <a:scrgbClr r="0" g="0" b="0"/>
+          </a:fillRef>
+          <a:effectRef idx="0">
+            <a:scrgbClr r="0" g="0" b="0"/>
+          </a:effectRef>
+          <a:fontRef idx="minor">
+            <a:schemeClr val="dk1"/>
+          </a:fontRef>
+        </p:style>
+        <p:txBody>
+          <a:bodyPr rtlCol="0" anchor="ctr"/>
+          <a:lstStyle/>
+          <a:p>
+            <a:pPr algn="ctr"/>
+            <a:endParaRPr lang="en-IL" dirty="0"/>
+          </a:p>
+        </p:txBody>
+      </p:sp>
+    </p:spTree>
+    <p:extLst>
+      <p:ext uri="{BB962C8B-B14F-4D97-AF65-F5344CB8AC3E}">
+        <p14:creationId xmlns:p14="http://schemas.microsoft.com/office/powerpoint/2010/main" val="233565378"/>
+      </p:ext>
+    </p:extLst>
+  </p:cSld>
+  <p:clrMapOvr>
+    <a:masterClrMapping/>
+  </p:clrMapOvr>
+</p:sld>
+</file>
+
+<file path=ppt/slides/slide15.xml><?xml version="1.0" encoding="utf-8"?>
+<p:sld xmlns:a="http://schemas.openxmlformats.org/drawingml/2006/main" xmlns:r="http://schemas.openxmlformats.org/officeDocument/2006/relationships" xmlns:p="http://schemas.openxmlformats.org/presentationml/2006/main">
+  <p:cSld>
+    <p:spTree>
+      <p:nvGrpSpPr>
+        <p:cNvPr id="1" name=""/>
+        <p:cNvGrpSpPr/>
+        <p:nvPr/>
+      </p:nvGrpSpPr>
+      <p:grpSpPr>
+        <a:xfrm>
+          <a:off x="0" y="0"/>
+          <a:ext cx="0" cy="0"/>
+          <a:chOff x="0" y="0"/>
+          <a:chExt cx="0" cy="0"/>
+        </a:xfrm>
+      </p:grpSpPr>
+      <p:sp>
+        <p:nvSpPr>
+          <p:cNvPr id="2" name="Title 1">
+            <a:extLst>
+              <a:ext uri="{FF2B5EF4-FFF2-40B4-BE49-F238E27FC236}">
+                <a16:creationId xmlns:a16="http://schemas.microsoft.com/office/drawing/2014/main" id="{62B8C7F1-B055-7983-4738-7A393363024D}"/>
+              </a:ext>
+            </a:extLst>
+          </p:cNvPr>
+          <p:cNvSpPr>
+            <a:spLocks noGrp="1"/>
+          </p:cNvSpPr>
+          <p:nvPr>
+            <p:ph type="title"/>
+          </p:nvPr>
+        </p:nvSpPr>
+        <p:spPr/>
+        <p:txBody>
+          <a:bodyPr/>
+          <a:lstStyle/>
+          <a:p>
+            <a:r>
+              <a:rPr lang="en-US" b="1" dirty="0"/>
+              <a:t>	Simulation – memory write/read</a:t>
+            </a:r>
+            <a:endParaRPr lang="en-IL" b="1" dirty="0"/>
+          </a:p>
+        </p:txBody>
+      </p:sp>
+      <p:pic>
+        <p:nvPicPr>
+          <p:cNvPr id="5" name="Content Placeholder 4" descr="A screenshot of a computer code&#10;&#10;AI-generated content may be incorrect.">
+            <a:extLst>
+              <a:ext uri="{FF2B5EF4-FFF2-40B4-BE49-F238E27FC236}">
+                <a16:creationId xmlns:a16="http://schemas.microsoft.com/office/drawing/2014/main" id="{16354EE9-8512-E031-7778-3B041ADFD15C}"/>
+              </a:ext>
+            </a:extLst>
+          </p:cNvPr>
+          <p:cNvPicPr>
+            <a:picLocks noGrp="1" noChangeAspect="1"/>
+          </p:cNvPicPr>
+          <p:nvPr>
+            <p:ph idx="1"/>
+          </p:nvPr>
+        </p:nvPicPr>
+        <p:blipFill>
+          <a:blip r:embed="rId2">
+            <a:extLst>
+              <a:ext uri="{28A0092B-C50C-407E-A947-70E740481C1C}">
+                <a14:useLocalDpi xmlns:a14="http://schemas.microsoft.com/office/drawing/2010/main" val="0"/>
+              </a:ext>
+            </a:extLst>
+          </a:blip>
+          <a:stretch>
+            <a:fillRect/>
+          </a:stretch>
+        </p:blipFill>
+        <p:spPr>
+          <a:xfrm>
+            <a:off x="10210523" y="0"/>
+            <a:ext cx="1981477" cy="1983439"/>
+          </a:xfrm>
+        </p:spPr>
+      </p:pic>
+      <p:pic>
+        <p:nvPicPr>
+          <p:cNvPr id="6" name="Picture 5">
+            <a:extLst>
+              <a:ext uri="{FF2B5EF4-FFF2-40B4-BE49-F238E27FC236}">
+                <a16:creationId xmlns:a16="http://schemas.microsoft.com/office/drawing/2014/main" id="{194E9DDD-48D1-FE61-AA08-685ACA7E9338}"/>
+              </a:ext>
+            </a:extLst>
+          </p:cNvPr>
+          <p:cNvPicPr>
+            <a:picLocks noChangeAspect="1"/>
+          </p:cNvPicPr>
+          <p:nvPr/>
+        </p:nvPicPr>
+        <p:blipFill>
+          <a:blip r:embed="rId3"/>
+          <a:stretch>
+            <a:fillRect/>
+          </a:stretch>
+        </p:blipFill>
+        <p:spPr>
+          <a:xfrm>
+            <a:off x="0" y="1983438"/>
+            <a:ext cx="12192000" cy="4874561"/>
+          </a:xfrm>
+          <a:prstGeom prst="rect">
+            <a:avLst/>
+          </a:prstGeom>
+        </p:spPr>
+      </p:pic>
+      <p:sp>
+        <p:nvSpPr>
+          <p:cNvPr id="7" name="TextBox 6">
+            <a:extLst>
+              <a:ext uri="{FF2B5EF4-FFF2-40B4-BE49-F238E27FC236}">
+                <a16:creationId xmlns:a16="http://schemas.microsoft.com/office/drawing/2014/main" id="{2EE0D274-BE27-F0E9-7D8F-4E39BA889CDD}"/>
+              </a:ext>
+            </a:extLst>
+          </p:cNvPr>
+          <p:cNvSpPr txBox="1"/>
+          <p:nvPr/>
+        </p:nvSpPr>
+        <p:spPr>
+          <a:xfrm>
+            <a:off x="2334861" y="3980372"/>
+            <a:ext cx="2066223" cy="261610"/>
+          </a:xfrm>
+          <a:prstGeom prst="rect">
+            <a:avLst/>
+          </a:prstGeom>
+          <a:noFill/>
+        </p:spPr>
+        <p:txBody>
+          <a:bodyPr wrap="square" rtlCol="0">
+            <a:spAutoFit/>
+          </a:bodyPr>
+          <a:lstStyle/>
+          <a:p>
+            <a:r>
+              <a:rPr lang="en-US" sz="1100" b="1" dirty="0" err="1">
+                <a:solidFill>
+                  <a:srgbClr val="FF0000"/>
+                </a:solidFill>
+              </a:rPr>
+              <a:t>Regdata</a:t>
+            </a:r>
+            <a:r>
+              <a:rPr lang="en-US" sz="1100" b="1" dirty="0">
+                <a:solidFill>
+                  <a:srgbClr val="FF0000"/>
+                </a:solidFill>
+              </a:rPr>
+              <a:t>== 5b’11010</a:t>
+            </a:r>
+            <a:endParaRPr lang="en-IL" sz="1100" b="1" dirty="0">
+              <a:solidFill>
+                <a:srgbClr val="FF0000"/>
+              </a:solidFill>
+            </a:endParaRPr>
+          </a:p>
+        </p:txBody>
+      </p:sp>
+    </p:spTree>
+    <p:extLst>
+      <p:ext uri="{BB962C8B-B14F-4D97-AF65-F5344CB8AC3E}">
+        <p14:creationId xmlns:p14="http://schemas.microsoft.com/office/powerpoint/2010/main" val="3778233650"/>
+      </p:ext>
+    </p:extLst>
+  </p:cSld>
+  <p:clrMapOvr>
+    <a:masterClrMapping/>
+  </p:clrMapOvr>
+</p:sld>
+</file>
+
+<file path=ppt/slides/slide16.xml><?xml version="1.0" encoding="utf-8"?>
+<p:sld xmlns:a="http://schemas.openxmlformats.org/drawingml/2006/main" xmlns:r="http://schemas.openxmlformats.org/officeDocument/2006/relationships" xmlns:p="http://schemas.openxmlformats.org/presentationml/2006/main">
+  <p:cSld>
+    <p:spTree>
+      <p:nvGrpSpPr>
+        <p:cNvPr id="1" name=""/>
+        <p:cNvGrpSpPr/>
+        <p:nvPr/>
+      </p:nvGrpSpPr>
+      <p:grpSpPr>
+        <a:xfrm>
+          <a:off x="0" y="0"/>
+          <a:ext cx="0" cy="0"/>
+          <a:chOff x="0" y="0"/>
+          <a:chExt cx="0" cy="0"/>
+        </a:xfrm>
+      </p:grpSpPr>
+      <p:sp>
+        <p:nvSpPr>
+          <p:cNvPr id="2" name="Title 1">
+            <a:extLst>
+              <a:ext uri="{FF2B5EF4-FFF2-40B4-BE49-F238E27FC236}">
+                <a16:creationId xmlns:a16="http://schemas.microsoft.com/office/drawing/2014/main" id="{133E0215-6E4E-6DC9-228C-762C846380F3}"/>
+              </a:ext>
+            </a:extLst>
+          </p:cNvPr>
+          <p:cNvSpPr>
+            <a:spLocks noGrp="1"/>
+          </p:cNvSpPr>
+          <p:nvPr>
+            <p:ph type="title"/>
+          </p:nvPr>
+        </p:nvSpPr>
+        <p:spPr/>
+        <p:txBody>
+          <a:bodyPr/>
+          <a:lstStyle/>
+          <a:p>
+            <a:r>
+              <a:rPr lang="en-US" b="1" dirty="0"/>
+              <a:t>Simulation instruction load &amp; debug select </a:t>
+            </a:r>
+            <a:endParaRPr lang="en-IL" b="1" dirty="0"/>
+          </a:p>
+        </p:txBody>
+      </p:sp>
+      <p:pic>
+        <p:nvPicPr>
+          <p:cNvPr id="4" name="Content Placeholder 3">
+            <a:extLst>
+              <a:ext uri="{FF2B5EF4-FFF2-40B4-BE49-F238E27FC236}">
+                <a16:creationId xmlns:a16="http://schemas.microsoft.com/office/drawing/2014/main" id="{329A0A13-9CD2-057B-DA34-1E99DC25B4CB}"/>
+              </a:ext>
+            </a:extLst>
+          </p:cNvPr>
+          <p:cNvPicPr>
+            <a:picLocks noGrp="1" noChangeAspect="1"/>
+          </p:cNvPicPr>
+          <p:nvPr>
+            <p:ph idx="1"/>
+          </p:nvPr>
+        </p:nvPicPr>
+        <p:blipFill>
+          <a:blip r:embed="rId2"/>
+          <a:stretch>
+            <a:fillRect/>
+          </a:stretch>
+        </p:blipFill>
+        <p:spPr>
+          <a:xfrm>
+            <a:off x="0" y="2858687"/>
+            <a:ext cx="12192000" cy="3999313"/>
+          </a:xfrm>
+          <a:prstGeom prst="rect">
+            <a:avLst/>
+          </a:prstGeom>
+        </p:spPr>
+      </p:pic>
+      <p:pic>
+        <p:nvPicPr>
+          <p:cNvPr id="6" name="Picture 5">
+            <a:extLst>
+              <a:ext uri="{FF2B5EF4-FFF2-40B4-BE49-F238E27FC236}">
+                <a16:creationId xmlns:a16="http://schemas.microsoft.com/office/drawing/2014/main" id="{F2EEA111-2A4D-65F3-3676-9ECD2D112C92}"/>
+              </a:ext>
+            </a:extLst>
+          </p:cNvPr>
+          <p:cNvPicPr>
+            <a:picLocks noChangeAspect="1"/>
+          </p:cNvPicPr>
+          <p:nvPr/>
+        </p:nvPicPr>
+        <p:blipFill>
+          <a:blip r:embed="rId3"/>
+          <a:stretch>
+            <a:fillRect/>
+          </a:stretch>
+        </p:blipFill>
+        <p:spPr>
+          <a:xfrm>
+            <a:off x="0" y="1477562"/>
+            <a:ext cx="8162223" cy="1381125"/>
+          </a:xfrm>
+          <a:prstGeom prst="rect">
+            <a:avLst/>
+          </a:prstGeom>
+        </p:spPr>
+      </p:pic>
+      <p:sp>
+        <p:nvSpPr>
+          <p:cNvPr id="7" name="Rectangle 6">
+            <a:extLst>
+              <a:ext uri="{FF2B5EF4-FFF2-40B4-BE49-F238E27FC236}">
+                <a16:creationId xmlns:a16="http://schemas.microsoft.com/office/drawing/2014/main" id="{E648D437-080F-BDB2-8BC6-A85843BB78AF}"/>
+              </a:ext>
+            </a:extLst>
+          </p:cNvPr>
+          <p:cNvSpPr/>
+          <p:nvPr/>
+        </p:nvSpPr>
+        <p:spPr>
+          <a:xfrm>
+            <a:off x="2176180" y="4821382"/>
+            <a:ext cx="1353312" cy="448441"/>
+          </a:xfrm>
+          <a:prstGeom prst="rect">
+            <a:avLst/>
+          </a:prstGeom>
+          <a:noFill/>
+          <a:ln w="19050" cap="flat" cmpd="sng" algn="ctr">
+            <a:solidFill>
+              <a:srgbClr val="00B0F0"/>
+            </a:solidFill>
+            <a:prstDash val="solid"/>
+            <a:round/>
+            <a:headEnd type="none" w="med" len="med"/>
+            <a:tailEnd type="none" w="med" len="med"/>
+          </a:ln>
+        </p:spPr>
+        <p:style>
+          <a:lnRef idx="0">
+            <a:scrgbClr r="0" g="0" b="0"/>
+          </a:lnRef>
+          <a:fillRef idx="0">
+            <a:scrgbClr r="0" g="0" b="0"/>
+          </a:fillRef>
+          <a:effectRef idx="0">
+            <a:scrgbClr r="0" g="0" b="0"/>
+          </a:effectRef>
+          <a:fontRef idx="minor">
+            <a:schemeClr val="dk1"/>
+          </a:fontRef>
+        </p:style>
+        <p:txBody>
+          <a:bodyPr rtlCol="0" anchor="ctr"/>
+          <a:lstStyle/>
+          <a:p>
+            <a:pPr algn="ctr"/>
+            <a:endParaRPr lang="en-IL"/>
+          </a:p>
+        </p:txBody>
+      </p:sp>
+      <p:sp>
+        <p:nvSpPr>
+          <p:cNvPr id="11" name="TextBox 10">
+            <a:extLst>
+              <a:ext uri="{FF2B5EF4-FFF2-40B4-BE49-F238E27FC236}">
+                <a16:creationId xmlns:a16="http://schemas.microsoft.com/office/drawing/2014/main" id="{61C893A6-DEC6-6644-EB11-C2682051E8BB}"/>
+              </a:ext>
+            </a:extLst>
+          </p:cNvPr>
+          <p:cNvSpPr txBox="1"/>
+          <p:nvPr/>
+        </p:nvSpPr>
+        <p:spPr>
+          <a:xfrm>
+            <a:off x="6096000" y="4373564"/>
+            <a:ext cx="2066223" cy="261610"/>
+          </a:xfrm>
+          <a:prstGeom prst="rect">
+            <a:avLst/>
+          </a:prstGeom>
+          <a:noFill/>
+        </p:spPr>
+        <p:txBody>
+          <a:bodyPr wrap="square" rtlCol="0">
+            <a:spAutoFit/>
+          </a:bodyPr>
+          <a:lstStyle/>
+          <a:p>
+            <a:r>
+              <a:rPr lang="en-US" sz="1100" b="1" dirty="0">
+                <a:solidFill>
+                  <a:srgbClr val="FF0000"/>
+                </a:solidFill>
+              </a:rPr>
+              <a:t>Opcode fetch == 5b’00000</a:t>
+            </a:r>
+            <a:endParaRPr lang="en-IL" sz="1100" b="1" dirty="0">
+              <a:solidFill>
+                <a:srgbClr val="FF0000"/>
+              </a:solidFill>
+            </a:endParaRPr>
+          </a:p>
+        </p:txBody>
+      </p:sp>
+      <p:sp>
+        <p:nvSpPr>
+          <p:cNvPr id="13" name="TextBox 12">
+            <a:extLst>
+              <a:ext uri="{FF2B5EF4-FFF2-40B4-BE49-F238E27FC236}">
+                <a16:creationId xmlns:a16="http://schemas.microsoft.com/office/drawing/2014/main" id="{00DE9B21-66E2-C6A6-1B0A-705FE03F665C}"/>
+              </a:ext>
+            </a:extLst>
+          </p:cNvPr>
+          <p:cNvSpPr txBox="1"/>
+          <p:nvPr/>
+        </p:nvSpPr>
+        <p:spPr>
+          <a:xfrm>
+            <a:off x="9000837" y="4373564"/>
+            <a:ext cx="2066223" cy="261610"/>
+          </a:xfrm>
+          <a:prstGeom prst="rect">
+            <a:avLst/>
+          </a:prstGeom>
+          <a:noFill/>
+        </p:spPr>
+        <p:txBody>
+          <a:bodyPr wrap="square" rtlCol="0">
+            <a:spAutoFit/>
+          </a:bodyPr>
+          <a:lstStyle/>
+          <a:p>
+            <a:r>
+              <a:rPr lang="en-US" sz="1100" b="1" dirty="0" err="1">
+                <a:solidFill>
+                  <a:srgbClr val="FF0000"/>
+                </a:solidFill>
+              </a:rPr>
+              <a:t>Regdata</a:t>
+            </a:r>
+            <a:r>
+              <a:rPr lang="en-US" sz="1100" b="1" dirty="0">
+                <a:solidFill>
+                  <a:srgbClr val="FF0000"/>
+                </a:solidFill>
+              </a:rPr>
+              <a:t>== 5b’11010</a:t>
+            </a:r>
+            <a:endParaRPr lang="en-IL" sz="1100" b="1" dirty="0">
+              <a:solidFill>
+                <a:srgbClr val="FF0000"/>
+              </a:solidFill>
+            </a:endParaRPr>
+          </a:p>
+        </p:txBody>
+      </p:sp>
+      <p:sp>
+        <p:nvSpPr>
+          <p:cNvPr id="15" name="Rectangle 14">
+            <a:extLst>
+              <a:ext uri="{FF2B5EF4-FFF2-40B4-BE49-F238E27FC236}">
+                <a16:creationId xmlns:a16="http://schemas.microsoft.com/office/drawing/2014/main" id="{A858B776-93FA-85FA-5F46-7A5C30480451}"/>
+              </a:ext>
+            </a:extLst>
+          </p:cNvPr>
+          <p:cNvSpPr/>
+          <p:nvPr/>
+        </p:nvSpPr>
+        <p:spPr>
+          <a:xfrm>
+            <a:off x="5929459" y="1792238"/>
+            <a:ext cx="1093509" cy="964898"/>
+          </a:xfrm>
+          <a:prstGeom prst="rect">
+            <a:avLst/>
+          </a:prstGeom>
+          <a:noFill/>
+          <a:ln w="19050" cap="flat" cmpd="sng" algn="ctr">
+            <a:solidFill>
+              <a:srgbClr val="00B0F0"/>
+            </a:solidFill>
+            <a:prstDash val="solid"/>
+            <a:round/>
+            <a:headEnd type="none" w="med" len="med"/>
+            <a:tailEnd type="none" w="med" len="med"/>
+          </a:ln>
+        </p:spPr>
+        <p:style>
+          <a:lnRef idx="0">
+            <a:scrgbClr r="0" g="0" b="0"/>
+          </a:lnRef>
+          <a:fillRef idx="0">
+            <a:scrgbClr r="0" g="0" b="0"/>
+          </a:fillRef>
+          <a:effectRef idx="0">
+            <a:scrgbClr r="0" g="0" b="0"/>
+          </a:effectRef>
+          <a:fontRef idx="minor">
+            <a:schemeClr val="dk1"/>
+          </a:fontRef>
+        </p:style>
+        <p:txBody>
+          <a:bodyPr rtlCol="0" anchor="ctr"/>
+          <a:lstStyle/>
+          <a:p>
+            <a:pPr algn="ctr"/>
+            <a:endParaRPr lang="en-IL"/>
+          </a:p>
+        </p:txBody>
+      </p:sp>
+    </p:spTree>
+    <p:extLst>
+      <p:ext uri="{BB962C8B-B14F-4D97-AF65-F5344CB8AC3E}">
+        <p14:creationId xmlns:p14="http://schemas.microsoft.com/office/powerpoint/2010/main" val="2081706317"/>
+      </p:ext>
+    </p:extLst>
+  </p:cSld>
+  <p:clrMapOvr>
+    <a:masterClrMapping/>
+  </p:clrMapOvr>
+</p:sld>
+</file>
+
+<file path=ppt/slides/slide17.xml><?xml version="1.0" encoding="utf-8"?>
+<p:sld xmlns:a="http://schemas.openxmlformats.org/drawingml/2006/main" xmlns:r="http://schemas.openxmlformats.org/officeDocument/2006/relationships" xmlns:p="http://schemas.openxmlformats.org/presentationml/2006/main">
+  <p:cSld>
+    <p:bg>
+      <p:bgPr>
+        <a:solidFill>
+          <a:schemeClr val="bg1"/>
+        </a:solidFill>
+        <a:effectLst/>
+      </p:bgPr>
+    </p:bg>
+    <p:spTree>
+      <p:nvGrpSpPr>
+        <p:cNvPr id="1" name=""/>
+        <p:cNvGrpSpPr/>
+        <p:nvPr/>
+      </p:nvGrpSpPr>
+      <p:grpSpPr>
+        <a:xfrm>
+          <a:off x="0" y="0"/>
+          <a:ext cx="0" cy="0"/>
+          <a:chOff x="0" y="0"/>
+          <a:chExt cx="0" cy="0"/>
+        </a:xfrm>
+      </p:grpSpPr>
+      <p:sp useBgFill="1">
+        <p:nvSpPr>
+          <p:cNvPr id="10" name="Rectangle 9">
+            <a:extLst>
+              <a:ext uri="{FF2B5EF4-FFF2-40B4-BE49-F238E27FC236}">
+                <a16:creationId xmlns:a16="http://schemas.microsoft.com/office/drawing/2014/main" id="{20D5D19D-0789-4518-B5DC-D47ADF69D25A}"/>
+              </a:ext>
+              <a:ext uri="{C183D7F6-B498-43B3-948B-1728B52AA6E4}">
+                <adec:decorative xmlns:adec="http://schemas.microsoft.com/office/drawing/2017/decorative" val="1"/>
+              </a:ext>
+            </a:extLst>
+          </p:cNvPr>
+          <p:cNvSpPr>
+            <a:spLocks noGrp="1" noRot="1" noChangeAspect="1" noMove="1" noResize="1" noEditPoints="1" noAdjustHandles="1" noChangeArrowheads="1" noChangeShapeType="1" noTextEdit="1"/>
+          </p:cNvSpPr>
+          <p:nvPr>
+            <p:extLst>
+              <p:ext uri="{386F3935-93C4-4BCD-93E2-E3B085C9AB24}">
+                <p16:designElem xmlns:p16="http://schemas.microsoft.com/office/powerpoint/2015/main" val="1"/>
+              </p:ext>
+            </p:extLst>
+          </p:nvPr>
+        </p:nvSpPr>
+        <p:spPr>
+          <a:xfrm>
+            <a:off x="0" y="0"/>
+            <a:ext cx="12191999" cy="6857365"/>
+          </a:xfrm>
+          <a:prstGeom prst="rect">
+            <a:avLst/>
+          </a:prstGeom>
+          <a:ln>
+            <a:noFill/>
+          </a:ln>
+        </p:spPr>
+        <p:style>
+          <a:lnRef idx="2">
+            <a:schemeClr val="accent1">
+              <a:shade val="50000"/>
+            </a:schemeClr>
+          </a:lnRef>
+          <a:fillRef idx="1">
+            <a:schemeClr val="accent1"/>
+          </a:fillRef>
+          <a:effectRef idx="0">
+            <a:schemeClr val="accent1"/>
+          </a:effectRef>
+          <a:fontRef idx="minor">
+            <a:schemeClr val="lt1"/>
+          </a:fontRef>
+        </p:style>
+        <p:txBody>
+          <a:bodyPr rtlCol="0" anchor="ctr"/>
+          <a:lstStyle/>
+          <a:p>
+            <a:pPr algn="ctr"/>
+            <a:endParaRPr lang="en-US"/>
+          </a:p>
+        </p:txBody>
+      </p:sp>
+      <p:sp>
+        <p:nvSpPr>
+          <p:cNvPr id="2" name="Title 1">
+            <a:extLst>
+              <a:ext uri="{FF2B5EF4-FFF2-40B4-BE49-F238E27FC236}">
+                <a16:creationId xmlns:a16="http://schemas.microsoft.com/office/drawing/2014/main" id="{BE7E7B91-7D8D-B769-7004-1DCA4E464B2C}"/>
+              </a:ext>
+            </a:extLst>
+          </p:cNvPr>
+          <p:cNvSpPr>
+            <a:spLocks noGrp="1"/>
+          </p:cNvSpPr>
+          <p:nvPr>
+            <p:ph type="title"/>
+          </p:nvPr>
+        </p:nvSpPr>
+        <p:spPr>
+          <a:xfrm>
+            <a:off x="1113810" y="3130041"/>
+            <a:ext cx="4036334" cy="2387600"/>
+          </a:xfrm>
+        </p:spPr>
+        <p:txBody>
+          <a:bodyPr vert="horz" lIns="91440" tIns="45720" rIns="91440" bIns="45720" rtlCol="0" anchor="t">
+            <a:normAutofit/>
+          </a:bodyPr>
+          <a:lstStyle/>
+          <a:p>
+            <a:r>
+              <a:rPr lang="en-US" sz="5400" b="1"/>
+              <a:t>Thank You!</a:t>
+            </a:r>
+          </a:p>
+        </p:txBody>
+      </p:sp>
+      <p:grpSp>
+        <p:nvGrpSpPr>
+          <p:cNvPr id="38" name="Group 37">
+            <a:extLst>
+              <a:ext uri="{FF2B5EF4-FFF2-40B4-BE49-F238E27FC236}">
+                <a16:creationId xmlns:a16="http://schemas.microsoft.com/office/drawing/2014/main" id="{032D8612-31EB-44CF-A1D0-14FD4C705424}"/>
+              </a:ext>
+              <a:ext uri="{C183D7F6-B498-43B3-948B-1728B52AA6E4}">
+                <adec:decorative xmlns:adec="http://schemas.microsoft.com/office/drawing/2017/decorative" val="1"/>
+              </a:ext>
+            </a:extLst>
+          </p:cNvPr>
+          <p:cNvGrpSpPr>
+            <a:grpSpLocks noGrp="1" noUngrp="1" noRot="1" noChangeAspect="1" noMove="1" noResize="1"/>
+          </p:cNvGrpSpPr>
+          <p:nvPr>
+            <p:extLst>
+              <p:ext uri="{386F3935-93C4-4BCD-93E2-E3B085C9AB24}">
+                <p16:designElem xmlns:p16="http://schemas.microsoft.com/office/powerpoint/2015/main" val="1"/>
+              </p:ext>
+            </p:extLst>
+          </p:nvPr>
+        </p:nvGrpSpPr>
+        <p:grpSpPr>
+          <a:xfrm>
+            <a:off x="0" y="3154317"/>
+            <a:ext cx="731521" cy="673460"/>
+            <a:chOff x="3940602" y="308034"/>
+            <a:chExt cx="2116791" cy="3428999"/>
+          </a:xfrm>
+          <a:solidFill>
+            <a:schemeClr val="accent4"/>
+          </a:solidFill>
+        </p:grpSpPr>
+        <p:sp>
+          <p:nvSpPr>
+            <p:cNvPr id="13" name="Rectangle 12">
+              <a:extLst>
+                <a:ext uri="{FF2B5EF4-FFF2-40B4-BE49-F238E27FC236}">
+                  <a16:creationId xmlns:a16="http://schemas.microsoft.com/office/drawing/2014/main" id="{F19A4A0F-1B59-4DB0-9764-D10936E98770}"/>
+                </a:ext>
+                <a:ext uri="{C183D7F6-B498-43B3-948B-1728B52AA6E4}">
+                  <adec:decorative xmlns:adec="http://schemas.microsoft.com/office/drawing/2017/decorative" val="1"/>
+                </a:ext>
+              </a:extLst>
+            </p:cNvPr>
+            <p:cNvSpPr/>
+            <p:nvPr>
+              <p:extLst>
+                <p:ext uri="{386F3935-93C4-4BCD-93E2-E3B085C9AB24}">
+                  <p16:designElem xmlns:p16="http://schemas.microsoft.com/office/powerpoint/2015/main" val="1"/>
+                </p:ext>
+              </p:extLst>
+            </p:nvPr>
+          </p:nvSpPr>
+          <p:spPr>
+            <a:xfrm>
+              <a:off x="3940602" y="308034"/>
+              <a:ext cx="566743" cy="3428999"/>
+            </a:xfrm>
+            <a:prstGeom prst="rect">
+              <a:avLst/>
+            </a:prstGeom>
+            <a:grpFill/>
+            <a:ln>
+              <a:noFill/>
+            </a:ln>
+          </p:spPr>
+          <p:style>
+            <a:lnRef idx="2">
+              <a:schemeClr val="accent1">
+                <a:shade val="50000"/>
+              </a:schemeClr>
+            </a:lnRef>
+            <a:fillRef idx="1">
+              <a:schemeClr val="accent1"/>
+            </a:fillRef>
+            <a:effectRef idx="0">
+              <a:schemeClr val="accent1"/>
+            </a:effectRef>
+            <a:fontRef idx="minor">
+              <a:schemeClr val="lt1"/>
+            </a:fontRef>
+          </p:style>
+          <p:txBody>
+            <a:bodyPr rtlCol="0" anchor="ctr"/>
+            <a:lstStyle/>
+            <a:p>
+              <a:pPr algn="ctr"/>
+              <a:endParaRPr lang="en-US"/>
+            </a:p>
+          </p:txBody>
+        </p:sp>
+        <p:sp>
+          <p:nvSpPr>
+            <p:cNvPr id="14" name="Rectangle 13">
+              <a:extLst>
+                <a:ext uri="{FF2B5EF4-FFF2-40B4-BE49-F238E27FC236}">
+                  <a16:creationId xmlns:a16="http://schemas.microsoft.com/office/drawing/2014/main" id="{F399A70F-F8CD-4992-9EF5-6CF15472E73F}"/>
+                </a:ext>
+                <a:ext uri="{C183D7F6-B498-43B3-948B-1728B52AA6E4}">
+                  <adec:decorative xmlns:adec="http://schemas.microsoft.com/office/drawing/2017/decorative" val="1"/>
+                </a:ext>
+              </a:extLst>
+            </p:cNvPr>
+            <p:cNvSpPr/>
+            <p:nvPr>
+              <p:extLst>
+                <p:ext uri="{386F3935-93C4-4BCD-93E2-E3B085C9AB24}">
+                  <p16:designElem xmlns:p16="http://schemas.microsoft.com/office/powerpoint/2015/main" val="1"/>
+                </p:ext>
+              </p:extLst>
+            </p:nvPr>
+          </p:nvSpPr>
+          <p:spPr>
+            <a:xfrm>
+              <a:off x="4715626" y="308034"/>
+              <a:ext cx="566743" cy="3428999"/>
+            </a:xfrm>
+            <a:prstGeom prst="rect">
+              <a:avLst/>
+            </a:prstGeom>
+            <a:grpFill/>
+            <a:ln>
+              <a:noFill/>
+            </a:ln>
+          </p:spPr>
+          <p:style>
+            <a:lnRef idx="2">
+              <a:schemeClr val="accent1">
+                <a:shade val="50000"/>
+              </a:schemeClr>
+            </a:lnRef>
+            <a:fillRef idx="1">
+              <a:schemeClr val="accent1"/>
+            </a:fillRef>
+            <a:effectRef idx="0">
+              <a:schemeClr val="accent1"/>
+            </a:effectRef>
+            <a:fontRef idx="minor">
+              <a:schemeClr val="lt1"/>
+            </a:fontRef>
+          </p:style>
+          <p:txBody>
+            <a:bodyPr rtlCol="0" anchor="ctr"/>
+            <a:lstStyle/>
+            <a:p>
+              <a:pPr algn="ctr"/>
+              <a:endParaRPr lang="en-US"/>
+            </a:p>
+          </p:txBody>
+        </p:sp>
+        <p:sp>
+          <p:nvSpPr>
+            <p:cNvPr id="15" name="Rectangle 14">
+              <a:extLst>
+                <a:ext uri="{FF2B5EF4-FFF2-40B4-BE49-F238E27FC236}">
+                  <a16:creationId xmlns:a16="http://schemas.microsoft.com/office/drawing/2014/main" id="{48F4FEDC-6D80-458C-A665-075D9B9500FD}"/>
+                </a:ext>
+                <a:ext uri="{C183D7F6-B498-43B3-948B-1728B52AA6E4}">
+                  <adec:decorative xmlns:adec="http://schemas.microsoft.com/office/drawing/2017/decorative" val="1"/>
+                </a:ext>
+              </a:extLst>
+            </p:cNvPr>
+            <p:cNvSpPr/>
+            <p:nvPr>
+              <p:extLst>
+                <p:ext uri="{386F3935-93C4-4BCD-93E2-E3B085C9AB24}">
+                  <p16:designElem xmlns:p16="http://schemas.microsoft.com/office/powerpoint/2015/main" val="1"/>
+                </p:ext>
+              </p:extLst>
+            </p:nvPr>
+          </p:nvSpPr>
+          <p:spPr>
+            <a:xfrm>
+              <a:off x="5490650" y="308034"/>
+              <a:ext cx="566743" cy="3428999"/>
+            </a:xfrm>
+            <a:prstGeom prst="rect">
+              <a:avLst/>
+            </a:prstGeom>
+            <a:grpFill/>
+            <a:ln>
+              <a:noFill/>
+            </a:ln>
+          </p:spPr>
+          <p:style>
+            <a:lnRef idx="2">
+              <a:schemeClr val="accent1">
+                <a:shade val="50000"/>
+              </a:schemeClr>
+            </a:lnRef>
+            <a:fillRef idx="1">
+              <a:schemeClr val="accent1"/>
+            </a:fillRef>
+            <a:effectRef idx="0">
+              <a:schemeClr val="accent1"/>
+            </a:effectRef>
+            <a:fontRef idx="minor">
+              <a:schemeClr val="lt1"/>
+            </a:fontRef>
+          </p:style>
+          <p:txBody>
+            <a:bodyPr rtlCol="0" anchor="ctr"/>
+            <a:lstStyle/>
+            <a:p>
+              <a:pPr algn="ctr"/>
+              <a:endParaRPr lang="en-US"/>
+            </a:p>
+          </p:txBody>
+        </p:sp>
+      </p:grpSp>
+      <p:sp>
+        <p:nvSpPr>
+          <p:cNvPr id="17" name="Rectangle 16">
+            <a:extLst>
+              <a:ext uri="{FF2B5EF4-FFF2-40B4-BE49-F238E27FC236}">
+                <a16:creationId xmlns:a16="http://schemas.microsoft.com/office/drawing/2014/main" id="{B81933D1-5615-42C7-9C0B-4EB7105CCE2D}"/>
+              </a:ext>
+              <a:ext uri="{C183D7F6-B498-43B3-948B-1728B52AA6E4}">
+                <adec:decorative xmlns:adec="http://schemas.microsoft.com/office/drawing/2017/decorative" val="1"/>
+              </a:ext>
+            </a:extLst>
+          </p:cNvPr>
+          <p:cNvSpPr>
+            <a:spLocks noGrp="1" noRot="1" noChangeAspect="1" noMove="1" noResize="1" noEditPoints="1" noAdjustHandles="1" noChangeArrowheads="1" noChangeShapeType="1" noTextEdit="1"/>
+          </p:cNvSpPr>
+          <p:nvPr>
+            <p:extLst>
+              <p:ext uri="{386F3935-93C4-4BCD-93E2-E3B085C9AB24}">
+                <p16:designElem xmlns:p16="http://schemas.microsoft.com/office/powerpoint/2015/main" val="1"/>
+              </p:ext>
+            </p:extLst>
+          </p:nvPr>
+        </p:nvSpPr>
+        <p:spPr>
+          <a:xfrm flipH="1">
+            <a:off x="10697670" y="0"/>
+            <a:ext cx="1494330" cy="6858000"/>
+          </a:xfrm>
+          <a:prstGeom prst="rect">
+            <a:avLst/>
+          </a:prstGeom>
+          <a:solidFill>
+            <a:schemeClr val="accent4"/>
+          </a:solidFill>
+          <a:ln>
+            <a:noFill/>
+          </a:ln>
+        </p:spPr>
+        <p:style>
+          <a:lnRef idx="2">
+            <a:schemeClr val="accent1">
+              <a:shade val="50000"/>
+            </a:schemeClr>
+          </a:lnRef>
+          <a:fillRef idx="1">
+            <a:schemeClr val="accent1"/>
+          </a:fillRef>
+          <a:effectRef idx="0">
+            <a:schemeClr val="accent1"/>
+          </a:effectRef>
+          <a:fontRef idx="minor">
+            <a:schemeClr val="lt1"/>
+          </a:fontRef>
+        </p:style>
+        <p:txBody>
+          <a:bodyPr rtlCol="0" anchor="ctr"/>
+          <a:lstStyle/>
+          <a:p>
+            <a:pPr algn="ctr"/>
+            <a:endParaRPr lang="en-US"/>
+          </a:p>
+        </p:txBody>
+      </p:sp>
+      <p:sp>
+        <p:nvSpPr>
+          <p:cNvPr id="19" name="Rectangle 18">
+            <a:extLst>
+              <a:ext uri="{FF2B5EF4-FFF2-40B4-BE49-F238E27FC236}">
+                <a16:creationId xmlns:a16="http://schemas.microsoft.com/office/drawing/2014/main" id="{19C9EAEA-39D0-4B0E-A0EB-51E7B26740B1}"/>
+              </a:ext>
+              <a:ext uri="{C183D7F6-B498-43B3-948B-1728B52AA6E4}">
+                <adec:decorative xmlns:adec="http://schemas.microsoft.com/office/drawing/2017/decorative" val="1"/>
+              </a:ext>
+            </a:extLst>
+          </p:cNvPr>
+          <p:cNvSpPr>
+            <a:spLocks noGrp="1" noRot="1" noChangeAspect="1" noMove="1" noResize="1" noEditPoints="1" noAdjustHandles="1" noChangeArrowheads="1" noChangeShapeType="1" noTextEdit="1"/>
+          </p:cNvSpPr>
+          <p:nvPr>
+            <p:extLst>
+              <p:ext uri="{386F3935-93C4-4BCD-93E2-E3B085C9AB24}">
+                <p16:designElem xmlns:p16="http://schemas.microsoft.com/office/powerpoint/2015/main" val="1"/>
+              </p:ext>
+            </p:extLst>
+          </p:nvPr>
+        </p:nvSpPr>
+        <p:spPr>
+          <a:xfrm>
+            <a:off x="5685810" y="391886"/>
+            <a:ext cx="6009366" cy="6017078"/>
+          </a:xfrm>
+          <a:prstGeom prst="rect">
+            <a:avLst/>
+          </a:prstGeom>
+          <a:solidFill>
+            <a:schemeClr val="bg1"/>
+          </a:solidFill>
+          <a:ln>
+            <a:noFill/>
+          </a:ln>
+          <a:effectLst>
+            <a:outerShdw blurRad="139700" dist="127000" dir="5400000" algn="t" rotWithShape="0">
+              <a:prstClr val="black">
+                <a:alpha val="15000"/>
+              </a:prstClr>
+            </a:outerShdw>
+          </a:effectLst>
+        </p:spPr>
+        <p:style>
+          <a:lnRef idx="2">
+            <a:schemeClr val="accent1">
+              <a:shade val="50000"/>
+            </a:schemeClr>
+          </a:lnRef>
+          <a:fillRef idx="1">
+            <a:schemeClr val="accent1"/>
+          </a:fillRef>
+          <a:effectRef idx="0">
+            <a:schemeClr val="accent1"/>
+          </a:effectRef>
+          <a:fontRef idx="minor">
+            <a:schemeClr val="lt1"/>
+          </a:fontRef>
+        </p:style>
+        <p:txBody>
+          <a:bodyPr rtlCol="0" anchor="ctr"/>
+          <a:lstStyle/>
+          <a:p>
+            <a:pPr algn="ctr"/>
+            <a:endParaRPr lang="en-US"/>
+          </a:p>
+        </p:txBody>
+      </p:sp>
+      <p:pic>
+        <p:nvPicPr>
+          <p:cNvPr id="5" name="Picture 4" descr="A screen shot of a computer screen&#10;&#10;AI-generated content may be incorrect.">
+            <a:extLst>
+              <a:ext uri="{FF2B5EF4-FFF2-40B4-BE49-F238E27FC236}">
+                <a16:creationId xmlns:a16="http://schemas.microsoft.com/office/drawing/2014/main" id="{5F4C5A23-189E-7406-34EA-852B2B0E4DC4}"/>
+              </a:ext>
+            </a:extLst>
+          </p:cNvPr>
+          <p:cNvPicPr>
+            <a:picLocks noChangeAspect="1"/>
+          </p:cNvPicPr>
+          <p:nvPr/>
+        </p:nvPicPr>
+        <p:blipFill>
+          <a:blip r:embed="rId2">
+            <a:extLst>
+              <a:ext uri="{28A0092B-C50C-407E-A947-70E740481C1C}">
+                <a14:useLocalDpi xmlns:a14="http://schemas.microsoft.com/office/drawing/2010/main" val="0"/>
+              </a:ext>
+            </a:extLst>
+          </a:blip>
+          <a:srcRect l="618" r="-3" b="-3"/>
+          <a:stretch>
+            <a:fillRect/>
+          </a:stretch>
+        </p:blipFill>
+        <p:spPr>
+          <a:xfrm>
+            <a:off x="5922492" y="666728"/>
+            <a:ext cx="5536001" cy="5465791"/>
+          </a:xfrm>
+          <a:prstGeom prst="rect">
+            <a:avLst/>
+          </a:prstGeom>
+          <a:ln>
+            <a:noFill/>
+          </a:ln>
+          <a:effectLst>
+            <a:softEdge rad="112500"/>
+          </a:effectLst>
+        </p:spPr>
+      </p:pic>
+    </p:spTree>
+    <p:extLst>
+      <p:ext uri="{BB962C8B-B14F-4D97-AF65-F5344CB8AC3E}">
+        <p14:creationId xmlns:p14="http://schemas.microsoft.com/office/powerpoint/2010/main" val="614273468"/>
       </p:ext>
     </p:extLst>
   </p:cSld>
@@ -11960,8 +13854,8 @@
         </p:blipFill>
         <p:spPr>
           <a:xfrm>
-            <a:off x="5268116" y="2070028"/>
-            <a:ext cx="4349454" cy="2260194"/>
+            <a:off x="6191111" y="1208218"/>
+            <a:ext cx="5695540" cy="2458526"/>
           </a:xfrm>
           <a:prstGeom prst="rect">
             <a:avLst/>
@@ -11996,8 +13890,8 @@
         </p:blipFill>
         <p:spPr>
           <a:xfrm>
-            <a:off x="5268116" y="4526946"/>
-            <a:ext cx="4085294" cy="2122923"/>
+            <a:off x="6191111" y="3824374"/>
+            <a:ext cx="5695540" cy="2825496"/>
           </a:xfrm>
           <a:prstGeom prst="rect">
             <a:avLst/>
@@ -12032,8 +13926,8 @@
         </p:blipFill>
         <p:spPr>
           <a:xfrm>
-            <a:off x="177643" y="2762912"/>
-            <a:ext cx="5090473" cy="2825496"/>
+            <a:off x="305350" y="2437481"/>
+            <a:ext cx="5695540" cy="2825496"/>
           </a:xfrm>
           <a:prstGeom prst="rect">
             <a:avLst/>
@@ -12505,7 +14399,7 @@
         </p:blipFill>
         <p:spPr>
           <a:xfrm>
-            <a:off x="5624299" y="2727236"/>
+            <a:off x="2679931" y="2407196"/>
             <a:ext cx="6638821" cy="4130764"/>
           </a:xfrm>
           <a:prstGeom prst="rect">
@@ -13138,4 +15032,319 @@
     </a:ext>
   </a:extLst>
 </a:theme>
+</file>
+
+<file path=ppt/theme/theme2.xml><?xml version="1.0" encoding="utf-8"?>
+<a:theme xmlns:a="http://schemas.openxmlformats.org/drawingml/2006/main" name="Office Theme">
+  <a:themeElements>
+    <a:clrScheme name="Office">
+      <a:dk1>
+        <a:sysClr val="windowText" lastClr="000000"/>
+      </a:dk1>
+      <a:lt1>
+        <a:sysClr val="window" lastClr="FFFFFF"/>
+      </a:lt1>
+      <a:dk2>
+        <a:srgbClr val="0E2841"/>
+      </a:dk2>
+      <a:lt2>
+        <a:srgbClr val="E8E8E8"/>
+      </a:lt2>
+      <a:accent1>
+        <a:srgbClr val="156082"/>
+      </a:accent1>
+      <a:accent2>
+        <a:srgbClr val="E97132"/>
+      </a:accent2>
+      <a:accent3>
+        <a:srgbClr val="196B24"/>
+      </a:accent3>
+      <a:accent4>
+        <a:srgbClr val="0F9ED5"/>
+      </a:accent4>
+      <a:accent5>
+        <a:srgbClr val="A02B93"/>
+      </a:accent5>
+      <a:accent6>
+        <a:srgbClr val="4EA72E"/>
+      </a:accent6>
+      <a:hlink>
+        <a:srgbClr val="467886"/>
+      </a:hlink>
+      <a:folHlink>
+        <a:srgbClr val="96607D"/>
+      </a:folHlink>
+    </a:clrScheme>
+    <a:fontScheme name="Office">
+      <a:majorFont>
+        <a:latin typeface="Aptos Display" panose="02110004020202020204"/>
+        <a:ea typeface=""/>
+        <a:cs typeface=""/>
+        <a:font script="Jpan" typeface="游ゴシック Light"/>
+        <a:font script="Hang" typeface="맑은 고딕"/>
+        <a:font script="Hans" typeface="等线 Light"/>
+        <a:font script="Hant" typeface="新細明體"/>
+        <a:font script="Arab" typeface="Times New Roman"/>
+        <a:font script="Hebr" typeface="Times New Roman"/>
+        <a:font script="Thai" typeface="Angsana New"/>
+        <a:font script="Ethi" typeface="Nyala"/>
+        <a:font script="Beng" typeface="Vrinda"/>
+        <a:font script="Gujr" typeface="Shruti"/>
+        <a:font script="Khmr" typeface="MoolBoran"/>
+        <a:font script="Knda" typeface="Tunga"/>
+        <a:font script="Guru" typeface="Raavi"/>
+        <a:font script="Cans" typeface="Euphemia"/>
+        <a:font script="Cher" typeface="Plantagenet Cherokee"/>
+        <a:font script="Yiii" typeface="Microsoft Yi Baiti"/>
+        <a:font script="Tibt" typeface="Microsoft Himalaya"/>
+        <a:font script="Thaa" typeface="MV Boli"/>
+        <a:font script="Deva" typeface="Mangal"/>
+        <a:font script="Telu" typeface="Gautami"/>
+        <a:font script="Taml" typeface="Latha"/>
+        <a:font script="Syrc" typeface="Estrangelo Edessa"/>
+        <a:font script="Orya" typeface="Kalinga"/>
+        <a:font script="Mlym" typeface="Kartika"/>
+        <a:font script="Laoo" typeface="DokChampa"/>
+        <a:font script="Sinh" typeface="Iskoola Pota"/>
+        <a:font script="Mong" typeface="Mongolian Baiti"/>
+        <a:font script="Viet" typeface="Times New Roman"/>
+        <a:font script="Uigh" typeface="Microsoft Uighur"/>
+        <a:font script="Geor" typeface="Sylfaen"/>
+        <a:font script="Armn" typeface="Arial"/>
+        <a:font script="Bugi" typeface="Leelawadee UI"/>
+        <a:font script="Bopo" typeface="Microsoft JhengHei"/>
+        <a:font script="Java" typeface="Javanese Text"/>
+        <a:font script="Lisu" typeface="Segoe UI"/>
+        <a:font script="Mymr" typeface="Myanmar Text"/>
+        <a:font script="Nkoo" typeface="Ebrima"/>
+        <a:font script="Olck" typeface="Nirmala UI"/>
+        <a:font script="Osma" typeface="Ebrima"/>
+        <a:font script="Phag" typeface="Phagspa"/>
+        <a:font script="Syrn" typeface="Estrangelo Edessa"/>
+        <a:font script="Syrj" typeface="Estrangelo Edessa"/>
+        <a:font script="Syre" typeface="Estrangelo Edessa"/>
+        <a:font script="Sora" typeface="Nirmala UI"/>
+        <a:font script="Tale" typeface="Microsoft Tai Le"/>
+        <a:font script="Talu" typeface="Microsoft New Tai Lue"/>
+        <a:font script="Tfng" typeface="Ebrima"/>
+      </a:majorFont>
+      <a:minorFont>
+        <a:latin typeface="Aptos" panose="02110004020202020204"/>
+        <a:ea typeface=""/>
+        <a:cs typeface=""/>
+        <a:font script="Jpan" typeface="游ゴシック"/>
+        <a:font script="Hang" typeface="맑은 고딕"/>
+        <a:font script="Hans" typeface="等线"/>
+        <a:font script="Hant" typeface="新細明體"/>
+        <a:font script="Arab" typeface="Arial"/>
+        <a:font script="Hebr" typeface="Arial"/>
+        <a:font script="Thai" typeface="Cordia New"/>
+        <a:font script="Ethi" typeface="Nyala"/>
+        <a:font script="Beng" typeface="Vrinda"/>
+        <a:font script="Gujr" typeface="Shruti"/>
+        <a:font script="Khmr" typeface="DaunPenh"/>
+        <a:font script="Knda" typeface="Tunga"/>
+        <a:font script="Guru" typeface="Raavi"/>
+        <a:font script="Cans" typeface="Euphemia"/>
+        <a:font script="Cher" typeface="Plantagenet Cherokee"/>
+        <a:font script="Yiii" typeface="Microsoft Yi Baiti"/>
+        <a:font script="Tibt" typeface="Microsoft Himalaya"/>
+        <a:font script="Thaa" typeface="MV Boli"/>
+        <a:font script="Deva" typeface="Mangal"/>
+        <a:font script="Telu" typeface="Gautami"/>
+        <a:font script="Taml" typeface="Latha"/>
+        <a:font script="Syrc" typeface="Estrangelo Edessa"/>
+        <a:font script="Orya" typeface="Kalinga"/>
+        <a:font script="Mlym" typeface="Kartika"/>
+        <a:font script="Laoo" typeface="DokChampa"/>
+        <a:font script="Sinh" typeface="Iskoola Pota"/>
+        <a:font script="Mong" typeface="Mongolian Baiti"/>
+        <a:font script="Viet" typeface="Arial"/>
+        <a:font script="Uigh" typeface="Microsoft Uighur"/>
+        <a:font script="Geor" typeface="Sylfaen"/>
+        <a:font script="Armn" typeface="Arial"/>
+        <a:font script="Bugi" typeface="Leelawadee UI"/>
+        <a:font script="Bopo" typeface="Microsoft JhengHei"/>
+        <a:font script="Java" typeface="Javanese Text"/>
+        <a:font script="Lisu" typeface="Segoe UI"/>
+        <a:font script="Mymr" typeface="Myanmar Text"/>
+        <a:font script="Nkoo" typeface="Ebrima"/>
+        <a:font script="Olck" typeface="Nirmala UI"/>
+        <a:font script="Osma" typeface="Ebrima"/>
+        <a:font script="Phag" typeface="Phagspa"/>
+        <a:font script="Syrn" typeface="Estrangelo Edessa"/>
+        <a:font script="Syrj" typeface="Estrangelo Edessa"/>
+        <a:font script="Syre" typeface="Estrangelo Edessa"/>
+        <a:font script="Sora" typeface="Nirmala UI"/>
+        <a:font script="Tale" typeface="Microsoft Tai Le"/>
+        <a:font script="Talu" typeface="Microsoft New Tai Lue"/>
+        <a:font script="Tfng" typeface="Ebrima"/>
+      </a:minorFont>
+    </a:fontScheme>
+    <a:fmtScheme name="Office">
+      <a:fillStyleLst>
+        <a:solidFill>
+          <a:schemeClr val="phClr"/>
+        </a:solidFill>
+        <a:gradFill rotWithShape="1">
+          <a:gsLst>
+            <a:gs pos="0">
+              <a:schemeClr val="phClr">
+                <a:lumMod val="110000"/>
+                <a:satMod val="105000"/>
+                <a:tint val="67000"/>
+              </a:schemeClr>
+            </a:gs>
+            <a:gs pos="50000">
+              <a:schemeClr val="phClr">
+                <a:lumMod val="105000"/>
+                <a:satMod val="103000"/>
+                <a:tint val="73000"/>
+              </a:schemeClr>
+            </a:gs>
+            <a:gs pos="100000">
+              <a:schemeClr val="phClr">
+                <a:lumMod val="105000"/>
+                <a:satMod val="109000"/>
+                <a:tint val="81000"/>
+              </a:schemeClr>
+            </a:gs>
+          </a:gsLst>
+          <a:lin ang="5400000" scaled="0"/>
+        </a:gradFill>
+        <a:gradFill rotWithShape="1">
+          <a:gsLst>
+            <a:gs pos="0">
+              <a:schemeClr val="phClr">
+                <a:satMod val="103000"/>
+                <a:lumMod val="102000"/>
+                <a:tint val="94000"/>
+              </a:schemeClr>
+            </a:gs>
+            <a:gs pos="50000">
+              <a:schemeClr val="phClr">
+                <a:satMod val="110000"/>
+                <a:lumMod val="100000"/>
+                <a:shade val="100000"/>
+              </a:schemeClr>
+            </a:gs>
+            <a:gs pos="100000">
+              <a:schemeClr val="phClr">
+                <a:lumMod val="99000"/>
+                <a:satMod val="120000"/>
+                <a:shade val="78000"/>
+              </a:schemeClr>
+            </a:gs>
+          </a:gsLst>
+          <a:lin ang="5400000" scaled="0"/>
+        </a:gradFill>
+      </a:fillStyleLst>
+      <a:lnStyleLst>
+        <a:ln w="12700" cap="flat" cmpd="sng" algn="ctr">
+          <a:solidFill>
+            <a:schemeClr val="phClr"/>
+          </a:solidFill>
+          <a:prstDash val="solid"/>
+          <a:miter lim="800000"/>
+        </a:ln>
+        <a:ln w="19050" cap="flat" cmpd="sng" algn="ctr">
+          <a:solidFill>
+            <a:schemeClr val="phClr"/>
+          </a:solidFill>
+          <a:prstDash val="solid"/>
+          <a:miter lim="800000"/>
+        </a:ln>
+        <a:ln w="25400" cap="flat" cmpd="sng" algn="ctr">
+          <a:solidFill>
+            <a:schemeClr val="phClr"/>
+          </a:solidFill>
+          <a:prstDash val="solid"/>
+          <a:miter lim="800000"/>
+        </a:ln>
+      </a:lnStyleLst>
+      <a:effectStyleLst>
+        <a:effectStyle>
+          <a:effectLst/>
+        </a:effectStyle>
+        <a:effectStyle>
+          <a:effectLst/>
+        </a:effectStyle>
+        <a:effectStyle>
+          <a:effectLst>
+            <a:outerShdw blurRad="57150" dist="19050" dir="5400000" algn="ctr" rotWithShape="0">
+              <a:srgbClr val="000000">
+                <a:alpha val="63000"/>
+              </a:srgbClr>
+            </a:outerShdw>
+          </a:effectLst>
+        </a:effectStyle>
+      </a:effectStyleLst>
+      <a:bgFillStyleLst>
+        <a:solidFill>
+          <a:schemeClr val="phClr"/>
+        </a:solidFill>
+        <a:solidFill>
+          <a:schemeClr val="phClr">
+            <a:tint val="95000"/>
+            <a:satMod val="170000"/>
+          </a:schemeClr>
+        </a:solidFill>
+        <a:gradFill rotWithShape="1">
+          <a:gsLst>
+            <a:gs pos="0">
+              <a:schemeClr val="phClr">
+                <a:tint val="93000"/>
+                <a:satMod val="150000"/>
+                <a:shade val="98000"/>
+                <a:lumMod val="102000"/>
+              </a:schemeClr>
+            </a:gs>
+            <a:gs pos="50000">
+              <a:schemeClr val="phClr">
+                <a:tint val="98000"/>
+                <a:satMod val="130000"/>
+                <a:shade val="90000"/>
+                <a:lumMod val="103000"/>
+              </a:schemeClr>
+            </a:gs>
+            <a:gs pos="100000">
+              <a:schemeClr val="phClr">
+                <a:shade val="63000"/>
+                <a:satMod val="120000"/>
+              </a:schemeClr>
+            </a:gs>
+          </a:gsLst>
+          <a:lin ang="5400000" scaled="0"/>
+        </a:gradFill>
+      </a:bgFillStyleLst>
+    </a:fmtScheme>
+  </a:themeElements>
+  <a:objectDefaults>
+    <a:lnDef>
+      <a:spPr/>
+      <a:bodyPr/>
+      <a:lstStyle/>
+      <a:style>
+        <a:lnRef idx="2">
+          <a:schemeClr val="accent1"/>
+        </a:lnRef>
+        <a:fillRef idx="0">
+          <a:schemeClr val="accent1"/>
+        </a:fillRef>
+        <a:effectRef idx="1">
+          <a:schemeClr val="accent1"/>
+        </a:effectRef>
+        <a:fontRef idx="minor">
+          <a:schemeClr val="tx1"/>
+        </a:fontRef>
+      </a:style>
+    </a:lnDef>
+  </a:objectDefaults>
+  <a:extraClrSchemeLst/>
+  <a:extLst>
+    <a:ext uri="{05A4C25C-085E-4340-85A3-A5531E510DB2}">
+      <thm15:themeFamily xmlns:thm15="http://schemas.microsoft.com/office/thememl/2012/main" name="Office Theme" id="{2E142A2C-CD16-42D6-873A-C26D2A0506FA}" vid="{1BDDFF52-6CD6-40A5-AB3C-68EB2F1E4D0A}"/>
+    </a:ext>
+  </a:extLst>
+</a:theme>
 </file>
</xml_diff>

<commit_message>
add sim results to the final report add some more talking about backflow stages in persntation
</commit_message>
<xml_diff>
--- a/Presintaions and Reports/Final presntaion VLSI.pptx
+++ b/Presintaions and Reports/Final presntaion VLSI.pptx
@@ -5,7 +5,7 @@
     <p:sldMasterId id="2147483648" r:id="rId1"/>
   </p:sldMasterIdLst>
   <p:notesMasterIdLst>
-    <p:notesMasterId r:id="rId19"/>
+    <p:notesMasterId r:id="rId23"/>
   </p:notesMasterIdLst>
   <p:sldIdLst>
     <p:sldId id="257" r:id="rId2"/>
@@ -18,13 +18,17 @@
     <p:sldId id="298" r:id="rId9"/>
     <p:sldId id="299" r:id="rId10"/>
     <p:sldId id="304" r:id="rId11"/>
-    <p:sldId id="301" r:id="rId12"/>
-    <p:sldId id="302" r:id="rId13"/>
-    <p:sldId id="303" r:id="rId14"/>
-    <p:sldId id="305" r:id="rId15"/>
-    <p:sldId id="306" r:id="rId16"/>
-    <p:sldId id="307" r:id="rId17"/>
-    <p:sldId id="308" r:id="rId18"/>
+    <p:sldId id="309" r:id="rId12"/>
+    <p:sldId id="301" r:id="rId13"/>
+    <p:sldId id="310" r:id="rId14"/>
+    <p:sldId id="311" r:id="rId15"/>
+    <p:sldId id="312" r:id="rId16"/>
+    <p:sldId id="302" r:id="rId17"/>
+    <p:sldId id="303" r:id="rId18"/>
+    <p:sldId id="305" r:id="rId19"/>
+    <p:sldId id="306" r:id="rId20"/>
+    <p:sldId id="307" r:id="rId21"/>
+    <p:sldId id="308" r:id="rId22"/>
   </p:sldIdLst>
   <p:sldSz cx="12192000" cy="6858000"/>
   <p:notesSz cx="6858000" cy="9144000"/>
@@ -3390,7 +3394,7 @@
           <a:p>
             <a:fld id="{00968C3E-619B-4AA5-B3D1-45D581164E23}" type="datetimeFigureOut">
               <a:rPr lang="en-IL" smtClean="0"/>
-              <a:t>26/06/2025</a:t>
+              <a:t>27/06/2025</a:t>
             </a:fld>
             <a:endParaRPr lang="en-IL"/>
           </a:p>
@@ -3891,7 +3895,7 @@
           <a:p>
             <a:fld id="{4C1E25F6-6904-4FC1-8C19-2CBB5B46E60E}" type="datetimeFigureOut">
               <a:rPr lang="en-IL" smtClean="0"/>
-              <a:t>26/06/2025</a:t>
+              <a:t>27/06/2025</a:t>
             </a:fld>
             <a:endParaRPr lang="en-IL"/>
           </a:p>
@@ -4091,7 +4095,7 @@
           <a:p>
             <a:fld id="{4C1E25F6-6904-4FC1-8C19-2CBB5B46E60E}" type="datetimeFigureOut">
               <a:rPr lang="en-IL" smtClean="0"/>
-              <a:t>26/06/2025</a:t>
+              <a:t>27/06/2025</a:t>
             </a:fld>
             <a:endParaRPr lang="en-IL"/>
           </a:p>
@@ -4301,7 +4305,7 @@
           <a:p>
             <a:fld id="{4C1E25F6-6904-4FC1-8C19-2CBB5B46E60E}" type="datetimeFigureOut">
               <a:rPr lang="en-IL" smtClean="0"/>
-              <a:t>26/06/2025</a:t>
+              <a:t>27/06/2025</a:t>
             </a:fld>
             <a:endParaRPr lang="en-IL"/>
           </a:p>
@@ -4501,7 +4505,7 @@
           <a:p>
             <a:fld id="{4C1E25F6-6904-4FC1-8C19-2CBB5B46E60E}" type="datetimeFigureOut">
               <a:rPr lang="en-IL" smtClean="0"/>
-              <a:t>26/06/2025</a:t>
+              <a:t>27/06/2025</a:t>
             </a:fld>
             <a:endParaRPr lang="en-IL"/>
           </a:p>
@@ -4777,7 +4781,7 @@
           <a:p>
             <a:fld id="{4C1E25F6-6904-4FC1-8C19-2CBB5B46E60E}" type="datetimeFigureOut">
               <a:rPr lang="en-IL" smtClean="0"/>
-              <a:t>26/06/2025</a:t>
+              <a:t>27/06/2025</a:t>
             </a:fld>
             <a:endParaRPr lang="en-IL"/>
           </a:p>
@@ -5045,7 +5049,7 @@
           <a:p>
             <a:fld id="{4C1E25F6-6904-4FC1-8C19-2CBB5B46E60E}" type="datetimeFigureOut">
               <a:rPr lang="en-IL" smtClean="0"/>
-              <a:t>26/06/2025</a:t>
+              <a:t>27/06/2025</a:t>
             </a:fld>
             <a:endParaRPr lang="en-IL"/>
           </a:p>
@@ -5460,7 +5464,7 @@
           <a:p>
             <a:fld id="{4C1E25F6-6904-4FC1-8C19-2CBB5B46E60E}" type="datetimeFigureOut">
               <a:rPr lang="en-IL" smtClean="0"/>
-              <a:t>26/06/2025</a:t>
+              <a:t>27/06/2025</a:t>
             </a:fld>
             <a:endParaRPr lang="en-IL"/>
           </a:p>
@@ -5602,7 +5606,7 @@
           <a:p>
             <a:fld id="{4C1E25F6-6904-4FC1-8C19-2CBB5B46E60E}" type="datetimeFigureOut">
               <a:rPr lang="en-IL" smtClean="0"/>
-              <a:t>26/06/2025</a:t>
+              <a:t>27/06/2025</a:t>
             </a:fld>
             <a:endParaRPr lang="en-IL"/>
           </a:p>
@@ -5715,7 +5719,7 @@
           <a:p>
             <a:fld id="{4C1E25F6-6904-4FC1-8C19-2CBB5B46E60E}" type="datetimeFigureOut">
               <a:rPr lang="en-IL" smtClean="0"/>
-              <a:t>26/06/2025</a:t>
+              <a:t>27/06/2025</a:t>
             </a:fld>
             <a:endParaRPr lang="en-IL"/>
           </a:p>
@@ -6028,7 +6032,7 @@
           <a:p>
             <a:fld id="{4C1E25F6-6904-4FC1-8C19-2CBB5B46E60E}" type="datetimeFigureOut">
               <a:rPr lang="en-IL" smtClean="0"/>
-              <a:t>26/06/2025</a:t>
+              <a:t>27/06/2025</a:t>
             </a:fld>
             <a:endParaRPr lang="en-IL"/>
           </a:p>
@@ -6317,7 +6321,7 @@
           <a:p>
             <a:fld id="{4C1E25F6-6904-4FC1-8C19-2CBB5B46E60E}" type="datetimeFigureOut">
               <a:rPr lang="en-IL" smtClean="0"/>
-              <a:t>26/06/2025</a:t>
+              <a:t>27/06/2025</a:t>
             </a:fld>
             <a:endParaRPr lang="en-IL"/>
           </a:p>
@@ -6560,7 +6564,7 @@
           <a:p>
             <a:fld id="{4C1E25F6-6904-4FC1-8C19-2CBB5B46E60E}" type="datetimeFigureOut">
               <a:rPr lang="en-IL" smtClean="0"/>
-              <a:t>26/06/2025</a:t>
+              <a:t>27/06/2025</a:t>
             </a:fld>
             <a:endParaRPr lang="en-IL"/>
           </a:p>
@@ -10751,6 +10755,219 @@
         <p:cNvPr id="1" name="">
           <a:extLst>
             <a:ext uri="{FF2B5EF4-FFF2-40B4-BE49-F238E27FC236}">
+              <a16:creationId xmlns:a16="http://schemas.microsoft.com/office/drawing/2014/main" id="{3B0B5248-019E-9FD0-FD56-13133099C430}"/>
+            </a:ext>
+          </a:extLst>
+        </p:cNvPr>
+        <p:cNvGrpSpPr/>
+        <p:nvPr/>
+      </p:nvGrpSpPr>
+      <p:grpSpPr>
+        <a:xfrm>
+          <a:off x="0" y="0"/>
+          <a:ext cx="0" cy="0"/>
+          <a:chOff x="0" y="0"/>
+          <a:chExt cx="0" cy="0"/>
+        </a:xfrm>
+      </p:grpSpPr>
+      <p:sp>
+        <p:nvSpPr>
+          <p:cNvPr id="19" name="Rectangle 18">
+            <a:extLst>
+              <a:ext uri="{FF2B5EF4-FFF2-40B4-BE49-F238E27FC236}">
+                <a16:creationId xmlns:a16="http://schemas.microsoft.com/office/drawing/2014/main" id="{305737D5-6CD6-4226-3A0D-CFE8D0D709B3}"/>
+              </a:ext>
+            </a:extLst>
+          </p:cNvPr>
+          <p:cNvSpPr/>
+          <p:nvPr/>
+        </p:nvSpPr>
+        <p:spPr>
+          <a:xfrm>
+            <a:off x="1462167" y="1195602"/>
+            <a:ext cx="10729833" cy="1053885"/>
+          </a:xfrm>
+          <a:prstGeom prst="rect">
+            <a:avLst/>
+          </a:prstGeom>
+        </p:spPr>
+        <p:style>
+          <a:lnRef idx="0">
+            <a:schemeClr val="dk1">
+              <a:alpha val="0"/>
+              <a:hueOff val="0"/>
+              <a:satOff val="0"/>
+              <a:lumOff val="0"/>
+              <a:alphaOff val="0"/>
+            </a:schemeClr>
+          </a:lnRef>
+          <a:fillRef idx="0">
+            <a:schemeClr val="lt1">
+              <a:alpha val="0"/>
+              <a:hueOff val="0"/>
+              <a:satOff val="0"/>
+              <a:lumOff val="0"/>
+              <a:alphaOff val="0"/>
+            </a:schemeClr>
+          </a:fillRef>
+          <a:effectRef idx="0">
+            <a:schemeClr val="lt1">
+              <a:alpha val="0"/>
+              <a:hueOff val="0"/>
+              <a:satOff val="0"/>
+              <a:lumOff val="0"/>
+              <a:alphaOff val="0"/>
+            </a:schemeClr>
+          </a:effectRef>
+          <a:fontRef idx="minor">
+            <a:schemeClr val="tx1">
+              <a:hueOff val="0"/>
+              <a:satOff val="0"/>
+              <a:lumOff val="0"/>
+              <a:alphaOff val="0"/>
+            </a:schemeClr>
+          </a:fontRef>
+        </p:style>
+        <p:txBody>
+          <a:bodyPr/>
+          <a:lstStyle/>
+          <a:p>
+            <a:endParaRPr lang="en-IL"/>
+          </a:p>
+        </p:txBody>
+      </p:sp>
+      <p:sp>
+        <p:nvSpPr>
+          <p:cNvPr id="7" name="כותרת 1">
+            <a:extLst>
+              <a:ext uri="{FF2B5EF4-FFF2-40B4-BE49-F238E27FC236}">
+                <a16:creationId xmlns:a16="http://schemas.microsoft.com/office/drawing/2014/main" id="{3630A281-BAE8-8227-1FCC-CA48059ACB8E}"/>
+              </a:ext>
+            </a:extLst>
+          </p:cNvPr>
+          <p:cNvSpPr>
+            <a:spLocks noGrp="1"/>
+          </p:cNvSpPr>
+          <p:nvPr>
+            <p:ph type="title"/>
+          </p:nvPr>
+        </p:nvSpPr>
+        <p:spPr>
+          <a:xfrm>
+            <a:off x="295189" y="338906"/>
+            <a:ext cx="10319512" cy="592536"/>
+          </a:xfrm>
+        </p:spPr>
+        <p:txBody>
+          <a:bodyPr vert="horz" lIns="91440" tIns="45720" rIns="91440" bIns="45720" rtlCol="0" anchor="b">
+            <a:normAutofit/>
+          </a:bodyPr>
+          <a:lstStyle/>
+          <a:p>
+            <a:pPr rtl="0"/>
+            <a:r>
+              <a:rPr lang="en-US" sz="3200" b="1" i="0" kern="1200" dirty="0">
+                <a:solidFill>
+                  <a:schemeClr val="tx1"/>
+                </a:solidFill>
+                <a:effectLst/>
+                <a:latin typeface="+mj-lt"/>
+                <a:ea typeface="+mj-ea"/>
+                <a:cs typeface="+mj-cs"/>
+              </a:rPr>
+              <a:t>Code &amp; design changes </a:t>
+            </a:r>
+            <a:endParaRPr lang="en-US" sz="3200" b="1" kern="1200" dirty="0">
+              <a:solidFill>
+                <a:schemeClr val="tx1"/>
+              </a:solidFill>
+              <a:latin typeface="+mj-lt"/>
+              <a:ea typeface="+mj-ea"/>
+              <a:cs typeface="+mj-cs"/>
+            </a:endParaRPr>
+          </a:p>
+        </p:txBody>
+      </p:sp>
+      <p:sp>
+        <p:nvSpPr>
+          <p:cNvPr id="4" name="מציין מיקום תוכן 6">
+            <a:extLst>
+              <a:ext uri="{FF2B5EF4-FFF2-40B4-BE49-F238E27FC236}">
+                <a16:creationId xmlns:a16="http://schemas.microsoft.com/office/drawing/2014/main" id="{8193E70E-2E0A-98AF-6C2F-27F59098FB9D}"/>
+              </a:ext>
+            </a:extLst>
+          </p:cNvPr>
+          <p:cNvSpPr>
+            <a:spLocks noGrp="1"/>
+          </p:cNvSpPr>
+          <p:nvPr>
+            <p:ph idx="1"/>
+          </p:nvPr>
+        </p:nvSpPr>
+        <p:spPr>
+          <a:xfrm>
+            <a:off x="0" y="1195602"/>
+            <a:ext cx="11765280" cy="5662398"/>
+          </a:xfrm>
+        </p:spPr>
+        <p:txBody>
+          <a:bodyPr>
+            <a:normAutofit/>
+          </a:bodyPr>
+          <a:lstStyle/>
+          <a:p>
+            <a:r>
+              <a:rPr lang="en-US" sz="2000" dirty="0"/>
+              <a:t> The original design had FPGA memories integrated into it as the system memory, which created some challenges. </a:t>
+            </a:r>
+          </a:p>
+          <a:p>
+            <a:r>
+              <a:rPr lang="en-US" sz="2000" dirty="0"/>
+              <a:t> We had to integrate some files from FPGA libraries to compile and run the design.</a:t>
+            </a:r>
+          </a:p>
+          <a:p>
+            <a:r>
+              <a:rPr lang="en-US" sz="2000" dirty="0"/>
+              <a:t>The design provided incorrect results whenever running commands with an undeviable-by-4 address, and the fact that the FPGA memories operated upon the clock falling (not rising).</a:t>
+            </a:r>
+          </a:p>
+          <a:p>
+            <a:r>
+              <a:rPr lang="en-US" sz="2000" dirty="0"/>
+              <a:t>During the process of replacing the original memory blocks with Tower SRAMs, modifications were made to both the logical and timing aspects of the design, among the key updates, flip-flops were strategically inserted at critical points in the data path, and in some instances, sequential logic was restructured into purely combinational logic to better align with the new memory interface timing system.</a:t>
+            </a:r>
+          </a:p>
+          <a:p>
+            <a:r>
+              <a:rPr lang="en-US" sz="2000" dirty="0"/>
+              <a:t>Throughout this transition, careful attention was given to preserve all existing functionalities of the system, ensuring that no other parts of the design were adversely affected by the modifications.</a:t>
+            </a:r>
+          </a:p>
+        </p:txBody>
+      </p:sp>
+    </p:spTree>
+    <p:extLst>
+      <p:ext uri="{BB962C8B-B14F-4D97-AF65-F5344CB8AC3E}">
+        <p14:creationId xmlns:p14="http://schemas.microsoft.com/office/powerpoint/2010/main" val="296654255"/>
+      </p:ext>
+    </p:extLst>
+  </p:cSld>
+  <p:clrMapOvr>
+    <a:masterClrMapping/>
+  </p:clrMapOvr>
+</p:sld>
+</file>
+
+<file path=ppt/slides/slide12.xml><?xml version="1.0" encoding="utf-8"?>
+<p:sld xmlns:a="http://schemas.openxmlformats.org/drawingml/2006/main" xmlns:r="http://schemas.openxmlformats.org/officeDocument/2006/relationships" xmlns:p="http://schemas.openxmlformats.org/presentationml/2006/main">
+  <p:cSld>
+    <p:spTree>
+      <p:nvGrpSpPr>
+        <p:cNvPr id="1" name="">
+          <a:extLst>
+            <a:ext uri="{FF2B5EF4-FFF2-40B4-BE49-F238E27FC236}">
               <a16:creationId xmlns:a16="http://schemas.microsoft.com/office/drawing/2014/main" id="{8C85286A-8A90-83D4-4BB0-D4D5DBB9A24C}"/>
             </a:ext>
           </a:extLst>
@@ -10891,7 +11108,7 @@
         </p:nvSpPr>
         <p:spPr>
           <a:xfrm>
-            <a:off x="234696" y="1782128"/>
+            <a:off x="298704" y="1284288"/>
             <a:ext cx="11479784" cy="4760912"/>
           </a:xfrm>
         </p:spPr>
@@ -10999,7 +11216,786 @@
 </p:sld>
 </file>
 
-<file path=ppt/slides/slide12.xml><?xml version="1.0" encoding="utf-8"?>
+<file path=ppt/slides/slide13.xml><?xml version="1.0" encoding="utf-8"?>
+<p:sld xmlns:a="http://schemas.openxmlformats.org/drawingml/2006/main" xmlns:r="http://schemas.openxmlformats.org/officeDocument/2006/relationships" xmlns:p="http://schemas.openxmlformats.org/presentationml/2006/main">
+  <p:cSld>
+    <p:spTree>
+      <p:nvGrpSpPr>
+        <p:cNvPr id="1" name="">
+          <a:extLst>
+            <a:ext uri="{FF2B5EF4-FFF2-40B4-BE49-F238E27FC236}">
+              <a16:creationId xmlns:a16="http://schemas.microsoft.com/office/drawing/2014/main" id="{43EDF613-BE53-C1DD-D15B-C2A4D2FCECB4}"/>
+            </a:ext>
+          </a:extLst>
+        </p:cNvPr>
+        <p:cNvGrpSpPr/>
+        <p:nvPr/>
+      </p:nvGrpSpPr>
+      <p:grpSpPr>
+        <a:xfrm>
+          <a:off x="0" y="0"/>
+          <a:ext cx="0" cy="0"/>
+          <a:chOff x="0" y="0"/>
+          <a:chExt cx="0" cy="0"/>
+        </a:xfrm>
+      </p:grpSpPr>
+      <p:sp>
+        <p:nvSpPr>
+          <p:cNvPr id="19" name="Rectangle 18">
+            <a:extLst>
+              <a:ext uri="{FF2B5EF4-FFF2-40B4-BE49-F238E27FC236}">
+                <a16:creationId xmlns:a16="http://schemas.microsoft.com/office/drawing/2014/main" id="{24A562B7-CA17-BDF1-4AB6-0B86B5558D83}"/>
+              </a:ext>
+            </a:extLst>
+          </p:cNvPr>
+          <p:cNvSpPr/>
+          <p:nvPr/>
+        </p:nvSpPr>
+        <p:spPr>
+          <a:xfrm>
+            <a:off x="1462167" y="1195602"/>
+            <a:ext cx="10729833" cy="1053885"/>
+          </a:xfrm>
+          <a:prstGeom prst="rect">
+            <a:avLst/>
+          </a:prstGeom>
+        </p:spPr>
+        <p:style>
+          <a:lnRef idx="0">
+            <a:schemeClr val="dk1">
+              <a:alpha val="0"/>
+              <a:hueOff val="0"/>
+              <a:satOff val="0"/>
+              <a:lumOff val="0"/>
+              <a:alphaOff val="0"/>
+            </a:schemeClr>
+          </a:lnRef>
+          <a:fillRef idx="0">
+            <a:schemeClr val="lt1">
+              <a:alpha val="0"/>
+              <a:hueOff val="0"/>
+              <a:satOff val="0"/>
+              <a:lumOff val="0"/>
+              <a:alphaOff val="0"/>
+            </a:schemeClr>
+          </a:fillRef>
+          <a:effectRef idx="0">
+            <a:schemeClr val="lt1">
+              <a:alpha val="0"/>
+              <a:hueOff val="0"/>
+              <a:satOff val="0"/>
+              <a:lumOff val="0"/>
+              <a:alphaOff val="0"/>
+            </a:schemeClr>
+          </a:effectRef>
+          <a:fontRef idx="minor">
+            <a:schemeClr val="tx1">
+              <a:hueOff val="0"/>
+              <a:satOff val="0"/>
+              <a:lumOff val="0"/>
+              <a:alphaOff val="0"/>
+            </a:schemeClr>
+          </a:fontRef>
+        </p:style>
+        <p:txBody>
+          <a:bodyPr/>
+          <a:lstStyle/>
+          <a:p>
+            <a:endParaRPr lang="en-IL"/>
+          </a:p>
+        </p:txBody>
+      </p:sp>
+      <p:sp>
+        <p:nvSpPr>
+          <p:cNvPr id="7" name="כותרת 1">
+            <a:extLst>
+              <a:ext uri="{FF2B5EF4-FFF2-40B4-BE49-F238E27FC236}">
+                <a16:creationId xmlns:a16="http://schemas.microsoft.com/office/drawing/2014/main" id="{A7BABD51-08C1-4016-A7D6-9A537F5BA893}"/>
+              </a:ext>
+            </a:extLst>
+          </p:cNvPr>
+          <p:cNvSpPr>
+            <a:spLocks noGrp="1"/>
+          </p:cNvSpPr>
+          <p:nvPr>
+            <p:ph type="title"/>
+          </p:nvPr>
+        </p:nvSpPr>
+        <p:spPr>
+          <a:xfrm>
+            <a:off x="298704" y="145669"/>
+            <a:ext cx="10515600" cy="1325563"/>
+          </a:xfrm>
+        </p:spPr>
+        <p:txBody>
+          <a:bodyPr/>
+          <a:lstStyle/>
+          <a:p>
+            <a:r>
+              <a:rPr lang="en-US" b="1" dirty="0"/>
+              <a:t>Synthesis flow </a:t>
+            </a:r>
+            <a:r>
+              <a:rPr lang="en-US" sz="4400" b="1" i="0" kern="1200" dirty="0">
+                <a:solidFill>
+                  <a:schemeClr val="tx1"/>
+                </a:solidFill>
+                <a:effectLst/>
+                <a:ea typeface="+mj-ea"/>
+                <a:cs typeface="+mj-cs"/>
+              </a:rPr>
+              <a:t>:</a:t>
+            </a:r>
+            <a:endParaRPr lang="he-IL" b="1" dirty="0"/>
+          </a:p>
+        </p:txBody>
+      </p:sp>
+      <p:sp>
+        <p:nvSpPr>
+          <p:cNvPr id="8" name="מציין מיקום תוכן 2">
+            <a:extLst>
+              <a:ext uri="{FF2B5EF4-FFF2-40B4-BE49-F238E27FC236}">
+                <a16:creationId xmlns:a16="http://schemas.microsoft.com/office/drawing/2014/main" id="{9C7FAD6F-89B0-D133-5B2D-2F177ADF295B}"/>
+              </a:ext>
+            </a:extLst>
+          </p:cNvPr>
+          <p:cNvSpPr>
+            <a:spLocks noGrp="1"/>
+          </p:cNvSpPr>
+          <p:nvPr>
+            <p:ph idx="1"/>
+          </p:nvPr>
+        </p:nvSpPr>
+        <p:spPr>
+          <a:xfrm>
+            <a:off x="298704" y="1284288"/>
+            <a:ext cx="11479784" cy="4760912"/>
+          </a:xfrm>
+        </p:spPr>
+        <p:txBody>
+          <a:bodyPr/>
+          <a:lstStyle/>
+          <a:p>
+            <a:r>
+              <a:rPr lang="en-US" dirty="0"/>
+              <a:t>Using </a:t>
+            </a:r>
+            <a:r>
+              <a:rPr lang="en-IL" dirty="0"/>
+              <a:t>Synopsys Design Vision</a:t>
+            </a:r>
+            <a:r>
+              <a:rPr lang="en-US" dirty="0"/>
+              <a:t> tool &amp; </a:t>
+            </a:r>
+            <a:r>
+              <a:rPr lang="en-IL" dirty="0"/>
+              <a:t>TSMC TSL 108 Tower Design Kit</a:t>
+            </a:r>
+            <a:r>
+              <a:rPr lang="en-US" dirty="0"/>
+              <a:t> for </a:t>
+            </a:r>
+            <a:r>
+              <a:rPr lang="en-US" b="1" u="sng" dirty="0"/>
+              <a:t>Synthesis flow</a:t>
+            </a:r>
+            <a:r>
+              <a:rPr lang="en-US" dirty="0"/>
+              <a:t>, converting </a:t>
+            </a:r>
+            <a:r>
+              <a:rPr lang="en-IL" dirty="0"/>
+              <a:t>the RTL design into a gate-level netlist that matches the target manufacturing process.</a:t>
+            </a:r>
+            <a:endParaRPr lang="en-US" dirty="0"/>
+          </a:p>
+          <a:p>
+            <a:r>
+              <a:rPr lang="en-US" dirty="0"/>
+              <a:t> To create an efficient </a:t>
+            </a:r>
+            <a:r>
+              <a:rPr lang="en-IL" dirty="0"/>
+              <a:t>gate-level netlist</a:t>
+            </a:r>
+            <a:r>
+              <a:rPr lang="en-US" dirty="0"/>
+              <a:t>, we had to parameterize some general-use modules that we integrated into the design (especially muxes), while always checking the design after compile to ensure area and timing efficacy.</a:t>
+            </a:r>
+            <a:endParaRPr lang="en-IL" dirty="0"/>
+          </a:p>
+          <a:p>
+            <a:pPr marL="0" indent="0" algn="l" rtl="0">
+              <a:buNone/>
+            </a:pPr>
+            <a:endParaRPr lang="en-US" dirty="0"/>
+          </a:p>
+          <a:p>
+            <a:pPr marL="0" indent="0" algn="l" rtl="0">
+              <a:buNone/>
+            </a:pPr>
+            <a:endParaRPr lang="en-US" dirty="0"/>
+          </a:p>
+          <a:p>
+            <a:pPr algn="l" rtl="0"/>
+            <a:endParaRPr lang="he-IL" dirty="0"/>
+          </a:p>
+        </p:txBody>
+      </p:sp>
+    </p:spTree>
+    <p:extLst>
+      <p:ext uri="{BB962C8B-B14F-4D97-AF65-F5344CB8AC3E}">
+        <p14:creationId xmlns:p14="http://schemas.microsoft.com/office/powerpoint/2010/main" val="628777326"/>
+      </p:ext>
+    </p:extLst>
+  </p:cSld>
+  <p:clrMapOvr>
+    <a:masterClrMapping/>
+  </p:clrMapOvr>
+</p:sld>
+</file>
+
+<file path=ppt/slides/slide14.xml><?xml version="1.0" encoding="utf-8"?>
+<p:sld xmlns:a="http://schemas.openxmlformats.org/drawingml/2006/main" xmlns:r="http://schemas.openxmlformats.org/officeDocument/2006/relationships" xmlns:p="http://schemas.openxmlformats.org/presentationml/2006/main">
+  <p:cSld>
+    <p:spTree>
+      <p:nvGrpSpPr>
+        <p:cNvPr id="1" name="">
+          <a:extLst>
+            <a:ext uri="{FF2B5EF4-FFF2-40B4-BE49-F238E27FC236}">
+              <a16:creationId xmlns:a16="http://schemas.microsoft.com/office/drawing/2014/main" id="{450FB5D4-46B7-1E78-08E6-793DB8534D9B}"/>
+            </a:ext>
+          </a:extLst>
+        </p:cNvPr>
+        <p:cNvGrpSpPr/>
+        <p:nvPr/>
+      </p:nvGrpSpPr>
+      <p:grpSpPr>
+        <a:xfrm>
+          <a:off x="0" y="0"/>
+          <a:ext cx="0" cy="0"/>
+          <a:chOff x="0" y="0"/>
+          <a:chExt cx="0" cy="0"/>
+        </a:xfrm>
+      </p:grpSpPr>
+      <p:sp>
+        <p:nvSpPr>
+          <p:cNvPr id="19" name="Rectangle 18">
+            <a:extLst>
+              <a:ext uri="{FF2B5EF4-FFF2-40B4-BE49-F238E27FC236}">
+                <a16:creationId xmlns:a16="http://schemas.microsoft.com/office/drawing/2014/main" id="{DE426446-3B2D-285F-DF92-EEF6356656D9}"/>
+              </a:ext>
+            </a:extLst>
+          </p:cNvPr>
+          <p:cNvSpPr/>
+          <p:nvPr/>
+        </p:nvSpPr>
+        <p:spPr>
+          <a:xfrm>
+            <a:off x="1462167" y="1195602"/>
+            <a:ext cx="10729833" cy="1053885"/>
+          </a:xfrm>
+          <a:prstGeom prst="rect">
+            <a:avLst/>
+          </a:prstGeom>
+        </p:spPr>
+        <p:style>
+          <a:lnRef idx="0">
+            <a:schemeClr val="dk1">
+              <a:alpha val="0"/>
+              <a:hueOff val="0"/>
+              <a:satOff val="0"/>
+              <a:lumOff val="0"/>
+              <a:alphaOff val="0"/>
+            </a:schemeClr>
+          </a:lnRef>
+          <a:fillRef idx="0">
+            <a:schemeClr val="lt1">
+              <a:alpha val="0"/>
+              <a:hueOff val="0"/>
+              <a:satOff val="0"/>
+              <a:lumOff val="0"/>
+              <a:alphaOff val="0"/>
+            </a:schemeClr>
+          </a:fillRef>
+          <a:effectRef idx="0">
+            <a:schemeClr val="lt1">
+              <a:alpha val="0"/>
+              <a:hueOff val="0"/>
+              <a:satOff val="0"/>
+              <a:lumOff val="0"/>
+              <a:alphaOff val="0"/>
+            </a:schemeClr>
+          </a:effectRef>
+          <a:fontRef idx="minor">
+            <a:schemeClr val="tx1">
+              <a:hueOff val="0"/>
+              <a:satOff val="0"/>
+              <a:lumOff val="0"/>
+              <a:alphaOff val="0"/>
+            </a:schemeClr>
+          </a:fontRef>
+        </p:style>
+        <p:txBody>
+          <a:bodyPr/>
+          <a:lstStyle/>
+          <a:p>
+            <a:endParaRPr lang="en-IL"/>
+          </a:p>
+        </p:txBody>
+      </p:sp>
+      <p:sp>
+        <p:nvSpPr>
+          <p:cNvPr id="7" name="כותרת 1">
+            <a:extLst>
+              <a:ext uri="{FF2B5EF4-FFF2-40B4-BE49-F238E27FC236}">
+                <a16:creationId xmlns:a16="http://schemas.microsoft.com/office/drawing/2014/main" id="{DF22506C-BA15-E5AB-2BB8-80A50AE5C00C}"/>
+              </a:ext>
+            </a:extLst>
+          </p:cNvPr>
+          <p:cNvSpPr>
+            <a:spLocks noGrp="1"/>
+          </p:cNvSpPr>
+          <p:nvPr>
+            <p:ph type="title"/>
+          </p:nvPr>
+        </p:nvSpPr>
+        <p:spPr>
+          <a:xfrm>
+            <a:off x="288544" y="0"/>
+            <a:ext cx="10515600" cy="1325563"/>
+          </a:xfrm>
+        </p:spPr>
+        <p:txBody>
+          <a:bodyPr/>
+          <a:lstStyle/>
+          <a:p>
+            <a:r>
+              <a:rPr lang="en-US" b="1" dirty="0"/>
+              <a:t>Layout flow </a:t>
+            </a:r>
+            <a:r>
+              <a:rPr lang="en-US" sz="4400" b="1" i="0" kern="1200" dirty="0">
+                <a:solidFill>
+                  <a:schemeClr val="tx1"/>
+                </a:solidFill>
+                <a:effectLst/>
+                <a:ea typeface="+mj-ea"/>
+                <a:cs typeface="+mj-cs"/>
+              </a:rPr>
+              <a:t>:</a:t>
+            </a:r>
+            <a:endParaRPr lang="he-IL" b="1" dirty="0"/>
+          </a:p>
+        </p:txBody>
+      </p:sp>
+      <p:sp>
+        <p:nvSpPr>
+          <p:cNvPr id="8" name="מציין מיקום תוכן 2">
+            <a:extLst>
+              <a:ext uri="{FF2B5EF4-FFF2-40B4-BE49-F238E27FC236}">
+                <a16:creationId xmlns:a16="http://schemas.microsoft.com/office/drawing/2014/main" id="{E031BCFC-307C-1E56-59C2-0616F50851DA}"/>
+              </a:ext>
+            </a:extLst>
+          </p:cNvPr>
+          <p:cNvSpPr>
+            <a:spLocks noGrp="1"/>
+          </p:cNvSpPr>
+          <p:nvPr>
+            <p:ph idx="1"/>
+          </p:nvPr>
+        </p:nvSpPr>
+        <p:spPr>
+          <a:xfrm>
+            <a:off x="71120" y="1195602"/>
+            <a:ext cx="12049760" cy="5573712"/>
+          </a:xfrm>
+        </p:spPr>
+        <p:txBody>
+          <a:bodyPr>
+            <a:normAutofit/>
+          </a:bodyPr>
+          <a:lstStyle/>
+          <a:p>
+            <a:r>
+              <a:rPr lang="en-US" dirty="0"/>
+              <a:t>Using </a:t>
+            </a:r>
+            <a:r>
+              <a:rPr lang="en-IL" dirty="0"/>
+              <a:t>Cadence </a:t>
+            </a:r>
+            <a:r>
+              <a:rPr lang="en-IL" b="1" u="sng" dirty="0" err="1"/>
+              <a:t>Innovus</a:t>
+            </a:r>
+            <a:r>
+              <a:rPr lang="en-US" b="1" u="sng" dirty="0"/>
+              <a:t> tool &amp; </a:t>
+            </a:r>
+            <a:r>
+              <a:rPr lang="en-IL" b="1" u="sng" dirty="0"/>
+              <a:t>TSMC TSL 108 </a:t>
+            </a:r>
+            <a:r>
+              <a:rPr lang="en-IL" dirty="0"/>
+              <a:t>Tower Design Kit</a:t>
+            </a:r>
+            <a:r>
+              <a:rPr lang="en-US" dirty="0"/>
+              <a:t> for a short layout flow, transforming a synthesized Verilog design into a complete physical chip layout, while trying to maximize the working frequency.</a:t>
+            </a:r>
+          </a:p>
+          <a:p>
+            <a:r>
+              <a:rPr lang="en-US" dirty="0"/>
+              <a:t>Floorplan &amp; Power and ground pins  were defined to setup the chip and enable it’s power ring, Standard cells, including Tower SRAMs, were automatically placed with optimization for timing and congestion. </a:t>
+            </a:r>
+          </a:p>
+          <a:p>
+            <a:pPr marL="0" indent="0">
+              <a:buNone/>
+            </a:pPr>
+            <a:endParaRPr lang="en-US" dirty="0"/>
+          </a:p>
+          <a:p>
+            <a:r>
+              <a:rPr lang="en-US" dirty="0"/>
+              <a:t>Clock Tree Synthesis (CTS) followed, creating a balanced network with 1.3 ns skew for proper synchronization (with a test and try to </a:t>
+            </a:r>
+            <a:r>
+              <a:rPr lang="en-US" dirty="0" err="1"/>
+              <a:t>rudce</a:t>
+            </a:r>
+            <a:r>
+              <a:rPr lang="en-US" dirty="0"/>
+              <a:t> </a:t>
+            </a:r>
+            <a:r>
+              <a:rPr lang="en-US" dirty="0" err="1"/>
+              <a:t>clk</a:t>
+            </a:r>
+            <a:r>
+              <a:rPr lang="en-US" dirty="0"/>
+              <a:t> cycle policy).</a:t>
+            </a:r>
+          </a:p>
+          <a:p>
+            <a:endParaRPr lang="en-US" dirty="0"/>
+          </a:p>
+          <a:p>
+            <a:r>
+              <a:rPr lang="en-US" dirty="0"/>
+              <a:t>Finally, after power routing was completed, full signal routing was carried</a:t>
+            </a:r>
+          </a:p>
+          <a:p>
+            <a:pPr marL="0" indent="0" algn="l" rtl="0">
+              <a:buNone/>
+            </a:pPr>
+            <a:endParaRPr lang="en-US" dirty="0"/>
+          </a:p>
+          <a:p>
+            <a:pPr algn="l" rtl="0"/>
+            <a:endParaRPr lang="he-IL" dirty="0"/>
+          </a:p>
+        </p:txBody>
+      </p:sp>
+    </p:spTree>
+    <p:extLst>
+      <p:ext uri="{BB962C8B-B14F-4D97-AF65-F5344CB8AC3E}">
+        <p14:creationId xmlns:p14="http://schemas.microsoft.com/office/powerpoint/2010/main" val="1965035072"/>
+      </p:ext>
+    </p:extLst>
+  </p:cSld>
+  <p:clrMapOvr>
+    <a:masterClrMapping/>
+  </p:clrMapOvr>
+</p:sld>
+</file>
+
+<file path=ppt/slides/slide15.xml><?xml version="1.0" encoding="utf-8"?>
+<p:sld xmlns:a="http://schemas.openxmlformats.org/drawingml/2006/main" xmlns:r="http://schemas.openxmlformats.org/officeDocument/2006/relationships" xmlns:p="http://schemas.openxmlformats.org/presentationml/2006/main">
+  <p:cSld>
+    <p:spTree>
+      <p:nvGrpSpPr>
+        <p:cNvPr id="1" name="">
+          <a:extLst>
+            <a:ext uri="{FF2B5EF4-FFF2-40B4-BE49-F238E27FC236}">
+              <a16:creationId xmlns:a16="http://schemas.microsoft.com/office/drawing/2014/main" id="{5F3D9C39-63B9-0FF5-4A6F-A4FD45A12489}"/>
+            </a:ext>
+          </a:extLst>
+        </p:cNvPr>
+        <p:cNvGrpSpPr/>
+        <p:nvPr/>
+      </p:nvGrpSpPr>
+      <p:grpSpPr>
+        <a:xfrm>
+          <a:off x="0" y="0"/>
+          <a:ext cx="0" cy="0"/>
+          <a:chOff x="0" y="0"/>
+          <a:chExt cx="0" cy="0"/>
+        </a:xfrm>
+      </p:grpSpPr>
+      <p:sp>
+        <p:nvSpPr>
+          <p:cNvPr id="19" name="Rectangle 18">
+            <a:extLst>
+              <a:ext uri="{FF2B5EF4-FFF2-40B4-BE49-F238E27FC236}">
+                <a16:creationId xmlns:a16="http://schemas.microsoft.com/office/drawing/2014/main" id="{5815323F-93A0-E92B-52C2-55C1E42850F2}"/>
+              </a:ext>
+            </a:extLst>
+          </p:cNvPr>
+          <p:cNvSpPr/>
+          <p:nvPr/>
+        </p:nvSpPr>
+        <p:spPr>
+          <a:xfrm>
+            <a:off x="1462167" y="1195602"/>
+            <a:ext cx="10729833" cy="1053885"/>
+          </a:xfrm>
+          <a:prstGeom prst="rect">
+            <a:avLst/>
+          </a:prstGeom>
+        </p:spPr>
+        <p:style>
+          <a:lnRef idx="0">
+            <a:schemeClr val="dk1">
+              <a:alpha val="0"/>
+              <a:hueOff val="0"/>
+              <a:satOff val="0"/>
+              <a:lumOff val="0"/>
+              <a:alphaOff val="0"/>
+            </a:schemeClr>
+          </a:lnRef>
+          <a:fillRef idx="0">
+            <a:schemeClr val="lt1">
+              <a:alpha val="0"/>
+              <a:hueOff val="0"/>
+              <a:satOff val="0"/>
+              <a:lumOff val="0"/>
+              <a:alphaOff val="0"/>
+            </a:schemeClr>
+          </a:fillRef>
+          <a:effectRef idx="0">
+            <a:schemeClr val="lt1">
+              <a:alpha val="0"/>
+              <a:hueOff val="0"/>
+              <a:satOff val="0"/>
+              <a:lumOff val="0"/>
+              <a:alphaOff val="0"/>
+            </a:schemeClr>
+          </a:effectRef>
+          <a:fontRef idx="minor">
+            <a:schemeClr val="tx1">
+              <a:hueOff val="0"/>
+              <a:satOff val="0"/>
+              <a:lumOff val="0"/>
+              <a:alphaOff val="0"/>
+            </a:schemeClr>
+          </a:fontRef>
+        </p:style>
+        <p:txBody>
+          <a:bodyPr/>
+          <a:lstStyle/>
+          <a:p>
+            <a:endParaRPr lang="en-IL"/>
+          </a:p>
+        </p:txBody>
+      </p:sp>
+      <p:sp>
+        <p:nvSpPr>
+          <p:cNvPr id="7" name="כותרת 1">
+            <a:extLst>
+              <a:ext uri="{FF2B5EF4-FFF2-40B4-BE49-F238E27FC236}">
+                <a16:creationId xmlns:a16="http://schemas.microsoft.com/office/drawing/2014/main" id="{81E3FA5E-AC7A-8383-79E5-CAF6A87499E6}"/>
+              </a:ext>
+            </a:extLst>
+          </p:cNvPr>
+          <p:cNvSpPr>
+            <a:spLocks noGrp="1"/>
+          </p:cNvSpPr>
+          <p:nvPr>
+            <p:ph type="title"/>
+          </p:nvPr>
+        </p:nvSpPr>
+        <p:spPr>
+          <a:xfrm>
+            <a:off x="288544" y="0"/>
+            <a:ext cx="10515600" cy="1325563"/>
+          </a:xfrm>
+        </p:spPr>
+        <p:txBody>
+          <a:bodyPr/>
+          <a:lstStyle/>
+          <a:p>
+            <a:r>
+              <a:rPr lang="en-US" b="1" dirty="0"/>
+              <a:t>STA Check:</a:t>
+            </a:r>
+            <a:endParaRPr lang="he-IL" b="1" dirty="0"/>
+          </a:p>
+        </p:txBody>
+      </p:sp>
+      <p:sp>
+        <p:nvSpPr>
+          <p:cNvPr id="8" name="מציין מיקום תוכן 2">
+            <a:extLst>
+              <a:ext uri="{FF2B5EF4-FFF2-40B4-BE49-F238E27FC236}">
+                <a16:creationId xmlns:a16="http://schemas.microsoft.com/office/drawing/2014/main" id="{7A9C9526-C3E4-681C-E07B-146EF2B7BF71}"/>
+              </a:ext>
+            </a:extLst>
+          </p:cNvPr>
+          <p:cNvSpPr>
+            <a:spLocks noGrp="1"/>
+          </p:cNvSpPr>
+          <p:nvPr>
+            <p:ph idx="1"/>
+          </p:nvPr>
+        </p:nvSpPr>
+        <p:spPr>
+          <a:xfrm>
+            <a:off x="71120" y="1195602"/>
+            <a:ext cx="12049760" cy="5573712"/>
+          </a:xfrm>
+        </p:spPr>
+        <p:txBody>
+          <a:bodyPr>
+            <a:normAutofit/>
+          </a:bodyPr>
+          <a:lstStyle/>
+          <a:p>
+            <a:r>
+              <a:rPr lang="en-US" dirty="0"/>
+              <a:t>Using </a:t>
+            </a:r>
+            <a:r>
+              <a:rPr lang="en-IL" b="1" dirty="0" err="1"/>
+              <a:t>PrimeTime</a:t>
+            </a:r>
+            <a:r>
+              <a:rPr lang="en-IL" dirty="0"/>
+              <a:t> tool</a:t>
+            </a:r>
+            <a:r>
+              <a:rPr lang="en-US" dirty="0"/>
+              <a:t> &amp; </a:t>
+            </a:r>
+            <a:r>
+              <a:rPr lang="en-IL" dirty="0"/>
+              <a:t>Tower Design Kit</a:t>
+            </a:r>
+            <a:r>
+              <a:rPr lang="en-US" dirty="0"/>
+              <a:t>, for </a:t>
+            </a:r>
+            <a:r>
+              <a:rPr lang="en-IL" dirty="0"/>
+              <a:t>timing violations in the design</a:t>
+            </a:r>
+            <a:r>
+              <a:rPr lang="en-US" dirty="0"/>
+              <a:t> &amp; trying to achieve maximum working frequency.</a:t>
+            </a:r>
+          </a:p>
+          <a:p>
+            <a:r>
+              <a:rPr lang="en-IL" dirty="0"/>
+              <a:t>By using slightly modified scripts</a:t>
+            </a:r>
+            <a:r>
+              <a:rPr lang="en-US" dirty="0"/>
+              <a:t> (adaptive to our design and </a:t>
+            </a:r>
+            <a:r>
+              <a:rPr lang="en-US" dirty="0" err="1"/>
+              <a:t>libares</a:t>
+            </a:r>
+            <a:r>
+              <a:rPr lang="en-US" dirty="0"/>
+              <a:t>)</a:t>
+            </a:r>
+            <a:r>
+              <a:rPr lang="en-IL" dirty="0"/>
+              <a:t>, </a:t>
+            </a:r>
+            <a:r>
+              <a:rPr lang="en-IL" dirty="0" err="1"/>
+              <a:t>PrimeTime</a:t>
+            </a:r>
+            <a:r>
+              <a:rPr lang="en-IL" dirty="0"/>
+              <a:t> verifies </a:t>
+            </a:r>
+            <a:r>
+              <a:rPr lang="en-IL" b="1" dirty="0"/>
+              <a:t>setup and hold constraints</a:t>
+            </a:r>
+            <a:r>
+              <a:rPr lang="en-IL" dirty="0"/>
+              <a:t>, </a:t>
+            </a:r>
+            <a:r>
+              <a:rPr lang="en-IL" b="1" dirty="0"/>
+              <a:t>path delays</a:t>
+            </a:r>
+            <a:r>
+              <a:rPr lang="en-IL" dirty="0"/>
+              <a:t>, and </a:t>
+            </a:r>
+            <a:r>
+              <a:rPr lang="en-IL" b="1" dirty="0"/>
+              <a:t>critical corner cases</a:t>
+            </a:r>
+            <a:r>
+              <a:rPr lang="en-IL" dirty="0"/>
+              <a:t>.</a:t>
+            </a:r>
+          </a:p>
+          <a:p>
+            <a:r>
+              <a:rPr lang="en-IL" dirty="0"/>
+              <a:t>This process enables us to </a:t>
+            </a:r>
+            <a:r>
+              <a:rPr lang="en-IL" b="1" dirty="0"/>
+              <a:t>debug timing issues</a:t>
+            </a:r>
+            <a:r>
+              <a:rPr lang="en-IL" dirty="0"/>
+              <a:t> and adjust the </a:t>
+            </a:r>
+            <a:r>
+              <a:rPr lang="en-IL" b="1" dirty="0"/>
+              <a:t>operating frequency</a:t>
+            </a:r>
+            <a:r>
+              <a:rPr lang="en-IL" dirty="0"/>
+              <a:t> </a:t>
+            </a:r>
+            <a:r>
+              <a:rPr lang="en-US" dirty="0"/>
+              <a:t>after each design/clock change.</a:t>
+            </a:r>
+            <a:endParaRPr lang="he-IL" dirty="0"/>
+          </a:p>
+        </p:txBody>
+      </p:sp>
+    </p:spTree>
+    <p:extLst>
+      <p:ext uri="{BB962C8B-B14F-4D97-AF65-F5344CB8AC3E}">
+        <p14:creationId xmlns:p14="http://schemas.microsoft.com/office/powerpoint/2010/main" val="182786622"/>
+      </p:ext>
+    </p:extLst>
+  </p:cSld>
+  <p:clrMapOvr>
+    <a:masterClrMapping/>
+  </p:clrMapOvr>
+</p:sld>
+</file>
+
+<file path=ppt/slides/slide16.xml><?xml version="1.0" encoding="utf-8"?>
 <p:sld xmlns:a="http://schemas.openxmlformats.org/drawingml/2006/main" xmlns:r="http://schemas.openxmlformats.org/officeDocument/2006/relationships" xmlns:p="http://schemas.openxmlformats.org/presentationml/2006/main">
   <p:cSld>
     <p:spTree>
@@ -11151,7 +12147,7 @@
 </p:sld>
 </file>
 
-<file path=ppt/slides/slide13.xml><?xml version="1.0" encoding="utf-8"?>
+<file path=ppt/slides/slide17.xml><?xml version="1.0" encoding="utf-8"?>
 <p:sld xmlns:a="http://schemas.openxmlformats.org/drawingml/2006/main" xmlns:r="http://schemas.openxmlformats.org/officeDocument/2006/relationships" xmlns:p="http://schemas.openxmlformats.org/presentationml/2006/main">
   <p:cSld>
     <p:spTree>
@@ -11382,7 +12378,7 @@
 </p:sld>
 </file>
 
-<file path=ppt/slides/slide14.xml><?xml version="1.0" encoding="utf-8"?>
+<file path=ppt/slides/slide18.xml><?xml version="1.0" encoding="utf-8"?>
 <p:sld xmlns:a="http://schemas.openxmlformats.org/drawingml/2006/main" xmlns:r="http://schemas.openxmlformats.org/officeDocument/2006/relationships" xmlns:p="http://schemas.openxmlformats.org/presentationml/2006/main">
   <p:cSld>
     <p:spTree>
@@ -11415,7 +12411,12 @@
             <p:ph type="title"/>
           </p:nvPr>
         </p:nvSpPr>
-        <p:spPr/>
+        <p:spPr>
+          <a:xfrm>
+            <a:off x="712216" y="206216"/>
+            <a:ext cx="10515600" cy="1325563"/>
+          </a:xfrm>
+        </p:spPr>
         <p:txBody>
           <a:bodyPr/>
           <a:lstStyle/>
@@ -11452,7 +12453,7 @@
         </p:blipFill>
         <p:spPr>
           <a:xfrm>
-            <a:off x="1982772" y="3026664"/>
+            <a:off x="3588052" y="3128264"/>
             <a:ext cx="7988711" cy="3607816"/>
           </a:xfrm>
         </p:spPr>
@@ -11473,7 +12474,7 @@
         </p:nvSpPr>
         <p:spPr>
           <a:xfrm>
-            <a:off x="234696" y="1782128"/>
+            <a:off x="0" y="1422083"/>
             <a:ext cx="11479784" cy="4760912"/>
           </a:xfrm>
           <a:prstGeom prst="rect">
@@ -11651,7 +12652,13 @@
           <a:p>
             <a:r>
               <a:rPr lang="en-US" dirty="0"/>
-              <a:t>The critical path starts at the ALU and ends at memblock3, which is the furthest from the RISC-V core in the physical layout.</a:t>
+              <a:t>One of critical paths, that was created due to our memory &amp; design changes.</a:t>
+            </a:r>
+          </a:p>
+          <a:p>
+            <a:r>
+              <a:rPr lang="en-US" dirty="0"/>
+              <a:t> starts at the ALU and ends at memblock3, which is the furthest from the RISC-V core in the physical layout.</a:t>
             </a:r>
           </a:p>
           <a:p>
@@ -11733,7 +12740,7 @@
 </p:sld>
 </file>
 
-<file path=ppt/slides/slide15.xml><?xml version="1.0" encoding="utf-8"?>
+<file path=ppt/slides/slide19.xml><?xml version="1.0" encoding="utf-8"?>
 <p:sld xmlns:a="http://schemas.openxmlformats.org/drawingml/2006/main" xmlns:r="http://schemas.openxmlformats.org/officeDocument/2006/relationships" xmlns:p="http://schemas.openxmlformats.org/presentationml/2006/main">
   <p:cSld>
     <p:spTree>
@@ -11909,7 +12916,241 @@
 </p:sld>
 </file>
 
-<file path=ppt/slides/slide16.xml><?xml version="1.0" encoding="utf-8"?>
+<file path=ppt/slides/slide2.xml><?xml version="1.0" encoding="utf-8"?>
+<p:sld xmlns:a="http://schemas.openxmlformats.org/drawingml/2006/main" xmlns:r="http://schemas.openxmlformats.org/officeDocument/2006/relationships" xmlns:p="http://schemas.openxmlformats.org/presentationml/2006/main">
+  <p:cSld>
+    <p:spTree>
+      <p:nvGrpSpPr>
+        <p:cNvPr id="1" name="">
+          <a:extLst>
+            <a:ext uri="{FF2B5EF4-FFF2-40B4-BE49-F238E27FC236}">
+              <a16:creationId xmlns:a16="http://schemas.microsoft.com/office/drawing/2014/main" id="{67DE582A-B816-B5E2-A91B-C56EDA8821EE}"/>
+            </a:ext>
+          </a:extLst>
+        </p:cNvPr>
+        <p:cNvGrpSpPr/>
+        <p:nvPr/>
+      </p:nvGrpSpPr>
+      <p:grpSpPr>
+        <a:xfrm>
+          <a:off x="0" y="0"/>
+          <a:ext cx="0" cy="0"/>
+          <a:chOff x="0" y="0"/>
+          <a:chExt cx="0" cy="0"/>
+        </a:xfrm>
+      </p:grpSpPr>
+      <p:sp>
+        <p:nvSpPr>
+          <p:cNvPr id="19" name="Rectangle 18">
+            <a:extLst>
+              <a:ext uri="{FF2B5EF4-FFF2-40B4-BE49-F238E27FC236}">
+                <a16:creationId xmlns:a16="http://schemas.microsoft.com/office/drawing/2014/main" id="{7C4C55D4-3308-3EA0-7B77-FC2396C235CC}"/>
+              </a:ext>
+            </a:extLst>
+          </p:cNvPr>
+          <p:cNvSpPr/>
+          <p:nvPr/>
+        </p:nvSpPr>
+        <p:spPr>
+          <a:xfrm>
+            <a:off x="1462167" y="1195602"/>
+            <a:ext cx="10729833" cy="1053885"/>
+          </a:xfrm>
+          <a:prstGeom prst="rect">
+            <a:avLst/>
+          </a:prstGeom>
+        </p:spPr>
+        <p:style>
+          <a:lnRef idx="0">
+            <a:schemeClr val="dk1">
+              <a:alpha val="0"/>
+              <a:hueOff val="0"/>
+              <a:satOff val="0"/>
+              <a:lumOff val="0"/>
+              <a:alphaOff val="0"/>
+            </a:schemeClr>
+          </a:lnRef>
+          <a:fillRef idx="0">
+            <a:schemeClr val="lt1">
+              <a:alpha val="0"/>
+              <a:hueOff val="0"/>
+              <a:satOff val="0"/>
+              <a:lumOff val="0"/>
+              <a:alphaOff val="0"/>
+            </a:schemeClr>
+          </a:fillRef>
+          <a:effectRef idx="0">
+            <a:schemeClr val="lt1">
+              <a:alpha val="0"/>
+              <a:hueOff val="0"/>
+              <a:satOff val="0"/>
+              <a:lumOff val="0"/>
+              <a:alphaOff val="0"/>
+            </a:schemeClr>
+          </a:effectRef>
+          <a:fontRef idx="minor">
+            <a:schemeClr val="tx1">
+              <a:hueOff val="0"/>
+              <a:satOff val="0"/>
+              <a:lumOff val="0"/>
+              <a:alphaOff val="0"/>
+            </a:schemeClr>
+          </a:fontRef>
+        </p:style>
+        <p:txBody>
+          <a:bodyPr/>
+          <a:lstStyle/>
+          <a:p>
+            <a:endParaRPr lang="en-IL"/>
+          </a:p>
+        </p:txBody>
+      </p:sp>
+      <p:sp>
+        <p:nvSpPr>
+          <p:cNvPr id="7" name="כותרת 1">
+            <a:extLst>
+              <a:ext uri="{FF2B5EF4-FFF2-40B4-BE49-F238E27FC236}">
+                <a16:creationId xmlns:a16="http://schemas.microsoft.com/office/drawing/2014/main" id="{79C6818C-99F7-98C5-1B6D-58B48E415932}"/>
+              </a:ext>
+            </a:extLst>
+          </p:cNvPr>
+          <p:cNvSpPr>
+            <a:spLocks noGrp="1"/>
+          </p:cNvSpPr>
+          <p:nvPr>
+            <p:ph type="title"/>
+          </p:nvPr>
+        </p:nvSpPr>
+        <p:spPr>
+          <a:xfrm>
+            <a:off x="591312" y="328549"/>
+            <a:ext cx="10515600" cy="1325563"/>
+          </a:xfrm>
+        </p:spPr>
+        <p:txBody>
+          <a:bodyPr>
+            <a:normAutofit/>
+          </a:bodyPr>
+          <a:lstStyle/>
+          <a:p>
+            <a:pPr rtl="0"/>
+            <a:r>
+              <a:rPr lang="en-US" b="1" dirty="0">
+                <a:cs typeface="Arial" panose="020B0604020202020204" pitchFamily="34" charset="0"/>
+              </a:rPr>
+              <a:t>Agenda</a:t>
+            </a:r>
+            <a:endParaRPr lang="he-IL" b="1" dirty="0">
+              <a:cs typeface="Arial" panose="020B0604020202020204" pitchFamily="34" charset="0"/>
+            </a:endParaRPr>
+          </a:p>
+        </p:txBody>
+      </p:sp>
+      <p:sp>
+        <p:nvSpPr>
+          <p:cNvPr id="8" name="מציין מיקום תוכן 2">
+            <a:extLst>
+              <a:ext uri="{FF2B5EF4-FFF2-40B4-BE49-F238E27FC236}">
+                <a16:creationId xmlns:a16="http://schemas.microsoft.com/office/drawing/2014/main" id="{01CF4E00-C42F-FA9F-F2B6-510A0DD033DD}"/>
+              </a:ext>
+            </a:extLst>
+          </p:cNvPr>
+          <p:cNvSpPr>
+            <a:spLocks noGrp="1"/>
+          </p:cNvSpPr>
+          <p:nvPr>
+            <p:ph idx="1"/>
+          </p:nvPr>
+        </p:nvSpPr>
+        <p:spPr>
+          <a:xfrm>
+            <a:off x="591312" y="1789049"/>
+            <a:ext cx="10515600" cy="4351338"/>
+          </a:xfrm>
+        </p:spPr>
+        <p:txBody>
+          <a:bodyPr>
+            <a:normAutofit/>
+          </a:bodyPr>
+          <a:lstStyle/>
+          <a:p>
+            <a:pPr rtl="0"/>
+            <a:r>
+              <a:rPr lang="en-US" b="0" i="0" dirty="0">
+                <a:effectLst/>
+                <a:cs typeface="Arial" panose="020B0604020202020204" pitchFamily="34" charset="0"/>
+              </a:rPr>
+              <a:t>Background.</a:t>
+            </a:r>
+          </a:p>
+          <a:p>
+            <a:pPr rtl="0"/>
+            <a:r>
+              <a:rPr lang="en-US" b="0" i="0" dirty="0">
+                <a:effectLst/>
+                <a:cs typeface="Arial" panose="020B0604020202020204" pitchFamily="34" charset="0"/>
+              </a:rPr>
+              <a:t> Project definition and goals.</a:t>
+            </a:r>
+          </a:p>
+          <a:p>
+            <a:pPr rtl="0"/>
+            <a:r>
+              <a:rPr lang="en-US" b="0" i="0" dirty="0">
+                <a:effectLst/>
+                <a:cs typeface="Arial" panose="020B0604020202020204" pitchFamily="34" charset="0"/>
+              </a:rPr>
+              <a:t> Alternative solutions.</a:t>
+            </a:r>
+          </a:p>
+          <a:p>
+            <a:pPr rtl="0"/>
+            <a:r>
+              <a:rPr lang="en-US" b="0" i="0" dirty="0">
+                <a:effectLst/>
+                <a:cs typeface="Arial" panose="020B0604020202020204" pitchFamily="34" charset="0"/>
+              </a:rPr>
+              <a:t> Architectural design of the selected solution.</a:t>
+            </a:r>
+          </a:p>
+          <a:p>
+            <a:pPr rtl="0"/>
+            <a:r>
+              <a:rPr lang="en-US" dirty="0">
+                <a:cs typeface="Arial" panose="020B0604020202020204" pitchFamily="34" charset="0"/>
+              </a:rPr>
+              <a:t>Back-end flow.</a:t>
+            </a:r>
+          </a:p>
+          <a:p>
+            <a:pPr rtl="0"/>
+            <a:r>
+              <a:rPr lang="en-US" dirty="0">
+                <a:cs typeface="Arial" panose="020B0604020202020204" pitchFamily="34" charset="0"/>
+              </a:rPr>
+              <a:t>Results</a:t>
+            </a:r>
+            <a:br>
+              <a:rPr lang="en-US" dirty="0"/>
+            </a:br>
+            <a:endParaRPr lang="he-IL" dirty="0"/>
+          </a:p>
+        </p:txBody>
+      </p:sp>
+    </p:spTree>
+    <p:extLst>
+      <p:ext uri="{BB962C8B-B14F-4D97-AF65-F5344CB8AC3E}">
+        <p14:creationId xmlns:p14="http://schemas.microsoft.com/office/powerpoint/2010/main" val="2615003805"/>
+      </p:ext>
+    </p:extLst>
+  </p:cSld>
+  <p:clrMapOvr>
+    <a:masterClrMapping/>
+  </p:clrMapOvr>
+</p:sld>
+</file>
+
+<file path=ppt/slides/slide20.xml><?xml version="1.0" encoding="utf-8"?>
 <p:sld xmlns:a="http://schemas.openxmlformats.org/drawingml/2006/main" xmlns:r="http://schemas.openxmlformats.org/officeDocument/2006/relationships" xmlns:p="http://schemas.openxmlformats.org/presentationml/2006/main">
   <p:cSld>
     <p:spTree>
@@ -12234,7 +13475,7 @@
 </p:sld>
 </file>
 
-<file path=ppt/slides/slide17.xml><?xml version="1.0" encoding="utf-8"?>
+<file path=ppt/slides/slide21.xml><?xml version="1.0" encoding="utf-8"?>
 <p:sld xmlns:a="http://schemas.openxmlformats.org/drawingml/2006/main" xmlns:r="http://schemas.openxmlformats.org/officeDocument/2006/relationships" xmlns:p="http://schemas.openxmlformats.org/presentationml/2006/main">
   <p:cSld>
     <p:bg>
@@ -12746,240 +13987,6 @@
     <p:extLst>
       <p:ext uri="{BB962C8B-B14F-4D97-AF65-F5344CB8AC3E}">
         <p14:creationId xmlns:p14="http://schemas.microsoft.com/office/powerpoint/2010/main" val="614273468"/>
-      </p:ext>
-    </p:extLst>
-  </p:cSld>
-  <p:clrMapOvr>
-    <a:masterClrMapping/>
-  </p:clrMapOvr>
-</p:sld>
-</file>
-
-<file path=ppt/slides/slide2.xml><?xml version="1.0" encoding="utf-8"?>
-<p:sld xmlns:a="http://schemas.openxmlformats.org/drawingml/2006/main" xmlns:r="http://schemas.openxmlformats.org/officeDocument/2006/relationships" xmlns:p="http://schemas.openxmlformats.org/presentationml/2006/main">
-  <p:cSld>
-    <p:spTree>
-      <p:nvGrpSpPr>
-        <p:cNvPr id="1" name="">
-          <a:extLst>
-            <a:ext uri="{FF2B5EF4-FFF2-40B4-BE49-F238E27FC236}">
-              <a16:creationId xmlns:a16="http://schemas.microsoft.com/office/drawing/2014/main" id="{67DE582A-B816-B5E2-A91B-C56EDA8821EE}"/>
-            </a:ext>
-          </a:extLst>
-        </p:cNvPr>
-        <p:cNvGrpSpPr/>
-        <p:nvPr/>
-      </p:nvGrpSpPr>
-      <p:grpSpPr>
-        <a:xfrm>
-          <a:off x="0" y="0"/>
-          <a:ext cx="0" cy="0"/>
-          <a:chOff x="0" y="0"/>
-          <a:chExt cx="0" cy="0"/>
-        </a:xfrm>
-      </p:grpSpPr>
-      <p:sp>
-        <p:nvSpPr>
-          <p:cNvPr id="19" name="Rectangle 18">
-            <a:extLst>
-              <a:ext uri="{FF2B5EF4-FFF2-40B4-BE49-F238E27FC236}">
-                <a16:creationId xmlns:a16="http://schemas.microsoft.com/office/drawing/2014/main" id="{7C4C55D4-3308-3EA0-7B77-FC2396C235CC}"/>
-              </a:ext>
-            </a:extLst>
-          </p:cNvPr>
-          <p:cNvSpPr/>
-          <p:nvPr/>
-        </p:nvSpPr>
-        <p:spPr>
-          <a:xfrm>
-            <a:off x="1462167" y="1195602"/>
-            <a:ext cx="10729833" cy="1053885"/>
-          </a:xfrm>
-          <a:prstGeom prst="rect">
-            <a:avLst/>
-          </a:prstGeom>
-        </p:spPr>
-        <p:style>
-          <a:lnRef idx="0">
-            <a:schemeClr val="dk1">
-              <a:alpha val="0"/>
-              <a:hueOff val="0"/>
-              <a:satOff val="0"/>
-              <a:lumOff val="0"/>
-              <a:alphaOff val="0"/>
-            </a:schemeClr>
-          </a:lnRef>
-          <a:fillRef idx="0">
-            <a:schemeClr val="lt1">
-              <a:alpha val="0"/>
-              <a:hueOff val="0"/>
-              <a:satOff val="0"/>
-              <a:lumOff val="0"/>
-              <a:alphaOff val="0"/>
-            </a:schemeClr>
-          </a:fillRef>
-          <a:effectRef idx="0">
-            <a:schemeClr val="lt1">
-              <a:alpha val="0"/>
-              <a:hueOff val="0"/>
-              <a:satOff val="0"/>
-              <a:lumOff val="0"/>
-              <a:alphaOff val="0"/>
-            </a:schemeClr>
-          </a:effectRef>
-          <a:fontRef idx="minor">
-            <a:schemeClr val="tx1">
-              <a:hueOff val="0"/>
-              <a:satOff val="0"/>
-              <a:lumOff val="0"/>
-              <a:alphaOff val="0"/>
-            </a:schemeClr>
-          </a:fontRef>
-        </p:style>
-        <p:txBody>
-          <a:bodyPr/>
-          <a:lstStyle/>
-          <a:p>
-            <a:endParaRPr lang="en-IL"/>
-          </a:p>
-        </p:txBody>
-      </p:sp>
-      <p:sp>
-        <p:nvSpPr>
-          <p:cNvPr id="7" name="כותרת 1">
-            <a:extLst>
-              <a:ext uri="{FF2B5EF4-FFF2-40B4-BE49-F238E27FC236}">
-                <a16:creationId xmlns:a16="http://schemas.microsoft.com/office/drawing/2014/main" id="{79C6818C-99F7-98C5-1B6D-58B48E415932}"/>
-              </a:ext>
-            </a:extLst>
-          </p:cNvPr>
-          <p:cNvSpPr>
-            <a:spLocks noGrp="1"/>
-          </p:cNvSpPr>
-          <p:nvPr>
-            <p:ph type="title"/>
-          </p:nvPr>
-        </p:nvSpPr>
-        <p:spPr>
-          <a:xfrm>
-            <a:off x="591312" y="328549"/>
-            <a:ext cx="10515600" cy="1325563"/>
-          </a:xfrm>
-        </p:spPr>
-        <p:txBody>
-          <a:bodyPr>
-            <a:normAutofit/>
-          </a:bodyPr>
-          <a:lstStyle/>
-          <a:p>
-            <a:pPr rtl="0"/>
-            <a:r>
-              <a:rPr lang="en-US" b="1" dirty="0">
-                <a:cs typeface="Arial" panose="020B0604020202020204" pitchFamily="34" charset="0"/>
-              </a:rPr>
-              <a:t>Agenda</a:t>
-            </a:r>
-            <a:endParaRPr lang="he-IL" b="1" dirty="0">
-              <a:cs typeface="Arial" panose="020B0604020202020204" pitchFamily="34" charset="0"/>
-            </a:endParaRPr>
-          </a:p>
-        </p:txBody>
-      </p:sp>
-      <p:sp>
-        <p:nvSpPr>
-          <p:cNvPr id="8" name="מציין מיקום תוכן 2">
-            <a:extLst>
-              <a:ext uri="{FF2B5EF4-FFF2-40B4-BE49-F238E27FC236}">
-                <a16:creationId xmlns:a16="http://schemas.microsoft.com/office/drawing/2014/main" id="{01CF4E00-C42F-FA9F-F2B6-510A0DD033DD}"/>
-              </a:ext>
-            </a:extLst>
-          </p:cNvPr>
-          <p:cNvSpPr>
-            <a:spLocks noGrp="1"/>
-          </p:cNvSpPr>
-          <p:nvPr>
-            <p:ph idx="1"/>
-          </p:nvPr>
-        </p:nvSpPr>
-        <p:spPr>
-          <a:xfrm>
-            <a:off x="591312" y="1789049"/>
-            <a:ext cx="10515600" cy="4351338"/>
-          </a:xfrm>
-        </p:spPr>
-        <p:txBody>
-          <a:bodyPr>
-            <a:normAutofit/>
-          </a:bodyPr>
-          <a:lstStyle/>
-          <a:p>
-            <a:pPr rtl="0"/>
-            <a:r>
-              <a:rPr lang="en-US" b="0" i="0" dirty="0">
-                <a:effectLst/>
-                <a:cs typeface="Arial" panose="020B0604020202020204" pitchFamily="34" charset="0"/>
-              </a:rPr>
-              <a:t>Background.</a:t>
-            </a:r>
-          </a:p>
-          <a:p>
-            <a:pPr rtl="0"/>
-            <a:r>
-              <a:rPr lang="en-US" b="0" i="0" dirty="0">
-                <a:effectLst/>
-                <a:cs typeface="Arial" panose="020B0604020202020204" pitchFamily="34" charset="0"/>
-              </a:rPr>
-              <a:t> Project definition and goals.</a:t>
-            </a:r>
-          </a:p>
-          <a:p>
-            <a:pPr rtl="0"/>
-            <a:r>
-              <a:rPr lang="en-US" b="0" i="0" dirty="0">
-                <a:effectLst/>
-                <a:cs typeface="Arial" panose="020B0604020202020204" pitchFamily="34" charset="0"/>
-              </a:rPr>
-              <a:t> Alternative solutions.</a:t>
-            </a:r>
-          </a:p>
-          <a:p>
-            <a:pPr rtl="0"/>
-            <a:r>
-              <a:rPr lang="en-US" b="0" i="0" dirty="0">
-                <a:effectLst/>
-                <a:cs typeface="Arial" panose="020B0604020202020204" pitchFamily="34" charset="0"/>
-              </a:rPr>
-              <a:t> Architectural design of the selected solution.</a:t>
-            </a:r>
-          </a:p>
-          <a:p>
-            <a:pPr rtl="0"/>
-            <a:r>
-              <a:rPr lang="en-US" dirty="0">
-                <a:cs typeface="Arial" panose="020B0604020202020204" pitchFamily="34" charset="0"/>
-              </a:rPr>
-              <a:t>Back-end flow.</a:t>
-            </a:r>
-          </a:p>
-          <a:p>
-            <a:pPr rtl="0"/>
-            <a:r>
-              <a:rPr lang="en-US" dirty="0">
-                <a:cs typeface="Arial" panose="020B0604020202020204" pitchFamily="34" charset="0"/>
-              </a:rPr>
-              <a:t>Results</a:t>
-            </a:r>
-            <a:br>
-              <a:rPr lang="en-US" dirty="0"/>
-            </a:br>
-            <a:endParaRPr lang="he-IL" dirty="0"/>
-          </a:p>
-        </p:txBody>
-      </p:sp>
-    </p:spTree>
-    <p:extLst>
-      <p:ext uri="{BB962C8B-B14F-4D97-AF65-F5344CB8AC3E}">
-        <p14:creationId xmlns:p14="http://schemas.microsoft.com/office/powerpoint/2010/main" val="2615003805"/>
       </p:ext>
     </p:extLst>
   </p:cSld>

</xml_diff>